<commit_message>
viele Prototypen-Dateien - lange hinausgezoegerter Commit
</commit_message>
<xml_diff>
--- a/prototyp/symbole_und_farben.pptx
+++ b/prototyp/symbole_und_farben.pptx
@@ -5,11 +5,13 @@
     <p:sldMasterId id="2147483648" r:id="rId1"/>
   </p:sldMasterIdLst>
   <p:sldIdLst>
-    <p:sldId id="256" r:id="rId2"/>
-    <p:sldId id="259" r:id="rId3"/>
-    <p:sldId id="263" r:id="rId4"/>
-    <p:sldId id="262" r:id="rId5"/>
-    <p:sldId id="261" r:id="rId6"/>
+    <p:sldId id="265" r:id="rId2"/>
+    <p:sldId id="256" r:id="rId3"/>
+    <p:sldId id="259" r:id="rId4"/>
+    <p:sldId id="263" r:id="rId5"/>
+    <p:sldId id="262" r:id="rId6"/>
+    <p:sldId id="261" r:id="rId7"/>
+    <p:sldId id="264" r:id="rId8"/>
   </p:sldIdLst>
   <p:sldSz cx="12192000" cy="6858000"/>
   <p:notesSz cx="6858000" cy="9144000"/>
@@ -265,7 +267,7 @@
           <a:p>
             <a:fld id="{B52076B9-41B9-4289-B1FF-FFD8BCB4D7C3}" type="datetimeFigureOut">
               <a:rPr lang="de-AT" smtClean="0"/>
-              <a:t>27.04.2024</a:t>
+              <a:t>13.05.2024</a:t>
             </a:fld>
             <a:endParaRPr lang="de-AT"/>
           </a:p>
@@ -465,7 +467,7 @@
           <a:p>
             <a:fld id="{B52076B9-41B9-4289-B1FF-FFD8BCB4D7C3}" type="datetimeFigureOut">
               <a:rPr lang="de-AT" smtClean="0"/>
-              <a:t>27.04.2024</a:t>
+              <a:t>13.05.2024</a:t>
             </a:fld>
             <a:endParaRPr lang="de-AT"/>
           </a:p>
@@ -675,7 +677,7 @@
           <a:p>
             <a:fld id="{B52076B9-41B9-4289-B1FF-FFD8BCB4D7C3}" type="datetimeFigureOut">
               <a:rPr lang="de-AT" smtClean="0"/>
-              <a:t>27.04.2024</a:t>
+              <a:t>13.05.2024</a:t>
             </a:fld>
             <a:endParaRPr lang="de-AT"/>
           </a:p>
@@ -875,7 +877,7 @@
           <a:p>
             <a:fld id="{B52076B9-41B9-4289-B1FF-FFD8BCB4D7C3}" type="datetimeFigureOut">
               <a:rPr lang="de-AT" smtClean="0"/>
-              <a:t>27.04.2024</a:t>
+              <a:t>13.05.2024</a:t>
             </a:fld>
             <a:endParaRPr lang="de-AT"/>
           </a:p>
@@ -1151,7 +1153,7 @@
           <a:p>
             <a:fld id="{B52076B9-41B9-4289-B1FF-FFD8BCB4D7C3}" type="datetimeFigureOut">
               <a:rPr lang="de-AT" smtClean="0"/>
-              <a:t>27.04.2024</a:t>
+              <a:t>13.05.2024</a:t>
             </a:fld>
             <a:endParaRPr lang="de-AT"/>
           </a:p>
@@ -1419,7 +1421,7 @@
           <a:p>
             <a:fld id="{B52076B9-41B9-4289-B1FF-FFD8BCB4D7C3}" type="datetimeFigureOut">
               <a:rPr lang="de-AT" smtClean="0"/>
-              <a:t>27.04.2024</a:t>
+              <a:t>13.05.2024</a:t>
             </a:fld>
             <a:endParaRPr lang="de-AT"/>
           </a:p>
@@ -1834,7 +1836,7 @@
           <a:p>
             <a:fld id="{B52076B9-41B9-4289-B1FF-FFD8BCB4D7C3}" type="datetimeFigureOut">
               <a:rPr lang="de-AT" smtClean="0"/>
-              <a:t>27.04.2024</a:t>
+              <a:t>13.05.2024</a:t>
             </a:fld>
             <a:endParaRPr lang="de-AT"/>
           </a:p>
@@ -1976,7 +1978,7 @@
           <a:p>
             <a:fld id="{B52076B9-41B9-4289-B1FF-FFD8BCB4D7C3}" type="datetimeFigureOut">
               <a:rPr lang="de-AT" smtClean="0"/>
-              <a:t>27.04.2024</a:t>
+              <a:t>13.05.2024</a:t>
             </a:fld>
             <a:endParaRPr lang="de-AT"/>
           </a:p>
@@ -2089,7 +2091,7 @@
           <a:p>
             <a:fld id="{B52076B9-41B9-4289-B1FF-FFD8BCB4D7C3}" type="datetimeFigureOut">
               <a:rPr lang="de-AT" smtClean="0"/>
-              <a:t>27.04.2024</a:t>
+              <a:t>13.05.2024</a:t>
             </a:fld>
             <a:endParaRPr lang="de-AT"/>
           </a:p>
@@ -2402,7 +2404,7 @@
           <a:p>
             <a:fld id="{B52076B9-41B9-4289-B1FF-FFD8BCB4D7C3}" type="datetimeFigureOut">
               <a:rPr lang="de-AT" smtClean="0"/>
-              <a:t>27.04.2024</a:t>
+              <a:t>13.05.2024</a:t>
             </a:fld>
             <a:endParaRPr lang="de-AT"/>
           </a:p>
@@ -2691,7 +2693,7 @@
           <a:p>
             <a:fld id="{B52076B9-41B9-4289-B1FF-FFD8BCB4D7C3}" type="datetimeFigureOut">
               <a:rPr lang="de-AT" smtClean="0"/>
-              <a:t>27.04.2024</a:t>
+              <a:t>13.05.2024</a:t>
             </a:fld>
             <a:endParaRPr lang="de-AT"/>
           </a:p>
@@ -2934,7 +2936,7 @@
           <a:p>
             <a:fld id="{B52076B9-41B9-4289-B1FF-FFD8BCB4D7C3}" type="datetimeFigureOut">
               <a:rPr lang="de-AT" smtClean="0"/>
-              <a:t>27.04.2024</a:t>
+              <a:t>13.05.2024</a:t>
             </a:fld>
             <a:endParaRPr lang="de-AT"/>
           </a:p>
@@ -3351,205 +3353,12 @@
           <a:chExt cx="0" cy="0"/>
         </a:xfrm>
       </p:grpSpPr>
-      <p:sp>
-        <p:nvSpPr>
-          <p:cNvPr id="4" name="Ellipse 3">
-            <a:extLst>
-              <a:ext uri="{FF2B5EF4-FFF2-40B4-BE49-F238E27FC236}">
-                <a16:creationId xmlns:a16="http://schemas.microsoft.com/office/drawing/2014/main" id="{501A0FE4-DB83-169F-053E-C81E177DE4BF}"/>
-              </a:ext>
-            </a:extLst>
-          </p:cNvPr>
-          <p:cNvSpPr/>
-          <p:nvPr/>
-        </p:nvSpPr>
-        <p:spPr>
-          <a:xfrm>
-            <a:off x="3902148" y="2292618"/>
-            <a:ext cx="3240000" cy="3240000"/>
-          </a:xfrm>
-          <a:prstGeom prst="ellipse">
-            <a:avLst/>
-          </a:prstGeom>
-          <a:noFill/>
-          <a:ln w="114300">
-            <a:solidFill>
-              <a:srgbClr val="ED3C0B"/>
-            </a:solidFill>
-          </a:ln>
-        </p:spPr>
-        <p:style>
-          <a:lnRef idx="2">
-            <a:schemeClr val="accent1">
-              <a:shade val="15000"/>
-            </a:schemeClr>
-          </a:lnRef>
-          <a:fillRef idx="1">
-            <a:schemeClr val="accent1"/>
-          </a:fillRef>
-          <a:effectRef idx="0">
-            <a:schemeClr val="accent1"/>
-          </a:effectRef>
-          <a:fontRef idx="minor">
-            <a:schemeClr val="lt1"/>
-          </a:fontRef>
-        </p:style>
-        <p:txBody>
-          <a:bodyPr rtlCol="0" anchor="ctr"/>
-          <a:lstStyle/>
-          <a:p>
-            <a:pPr algn="ctr"/>
-            <a:endParaRPr lang="de-AT"/>
-          </a:p>
-        </p:txBody>
-      </p:sp>
-      <p:sp>
-        <p:nvSpPr>
-          <p:cNvPr id="5" name="Ellipse 4">
-            <a:extLst>
-              <a:ext uri="{FF2B5EF4-FFF2-40B4-BE49-F238E27FC236}">
-                <a16:creationId xmlns:a16="http://schemas.microsoft.com/office/drawing/2014/main" id="{5CBF1A37-1023-CFF2-5D23-7183F1F6EFFA}"/>
-              </a:ext>
-            </a:extLst>
-          </p:cNvPr>
-          <p:cNvSpPr/>
-          <p:nvPr/>
-        </p:nvSpPr>
-        <p:spPr>
-          <a:xfrm>
-            <a:off x="4172148" y="2562618"/>
-            <a:ext cx="2700000" cy="2700000"/>
-          </a:xfrm>
-          <a:prstGeom prst="ellipse">
-            <a:avLst/>
-          </a:prstGeom>
-          <a:noFill/>
-          <a:ln w="114300">
-            <a:solidFill>
-              <a:srgbClr val="ED3C0B"/>
-            </a:solidFill>
-          </a:ln>
-        </p:spPr>
-        <p:style>
-          <a:lnRef idx="2">
-            <a:schemeClr val="accent1">
-              <a:shade val="15000"/>
-            </a:schemeClr>
-          </a:lnRef>
-          <a:fillRef idx="1">
-            <a:schemeClr val="accent1"/>
-          </a:fillRef>
-          <a:effectRef idx="0">
-            <a:schemeClr val="accent1"/>
-          </a:effectRef>
-          <a:fontRef idx="minor">
-            <a:schemeClr val="lt1"/>
-          </a:fontRef>
-        </p:style>
-        <p:txBody>
-          <a:bodyPr rtlCol="0" anchor="ctr"/>
-          <a:lstStyle/>
-          <a:p>
-            <a:pPr algn="ctr"/>
-            <a:endParaRPr lang="de-AT" sz="15000" dirty="0">
-              <a:solidFill>
-                <a:srgbClr val="ED3C0B"/>
-              </a:solidFill>
-              <a:latin typeface="OCR A Extended" panose="02010509020102010303" pitchFamily="50" charset="0"/>
-            </a:endParaRPr>
-          </a:p>
-        </p:txBody>
-      </p:sp>
-      <p:sp>
-        <p:nvSpPr>
-          <p:cNvPr id="7" name="Textfeld 6">
-            <a:extLst>
-              <a:ext uri="{FF2B5EF4-FFF2-40B4-BE49-F238E27FC236}">
-                <a16:creationId xmlns:a16="http://schemas.microsoft.com/office/drawing/2014/main" id="{27BFBACB-375C-B4E5-8AEC-C75880750C4F}"/>
-              </a:ext>
-            </a:extLst>
-          </p:cNvPr>
-          <p:cNvSpPr txBox="1"/>
-          <p:nvPr/>
-        </p:nvSpPr>
-        <p:spPr>
-          <a:xfrm>
-            <a:off x="4878899" y="2649409"/>
-            <a:ext cx="854591" cy="2400657"/>
-          </a:xfrm>
-          <a:prstGeom prst="rect">
-            <a:avLst/>
-          </a:prstGeom>
-          <a:noFill/>
-        </p:spPr>
-        <p:txBody>
-          <a:bodyPr wrap="square">
-            <a:spAutoFit/>
-          </a:bodyPr>
-          <a:lstStyle/>
-          <a:p>
-            <a:r>
-              <a:rPr lang="de-DE" sz="15000" dirty="0">
-                <a:solidFill>
-                  <a:srgbClr val="ED3C0B"/>
-                </a:solidFill>
-                <a:latin typeface="OCR A Extended" panose="02010509020102010303" pitchFamily="50" charset="0"/>
-              </a:rPr>
-              <a:t>i</a:t>
-            </a:r>
-            <a:endParaRPr lang="de-AT" sz="15000" dirty="0"/>
-          </a:p>
-        </p:txBody>
-      </p:sp>
-      <p:sp>
-        <p:nvSpPr>
-          <p:cNvPr id="8" name="Textfeld 7">
-            <a:extLst>
-              <a:ext uri="{FF2B5EF4-FFF2-40B4-BE49-F238E27FC236}">
-                <a16:creationId xmlns:a16="http://schemas.microsoft.com/office/drawing/2014/main" id="{60E4CC86-7B2C-D4B8-E36B-17CAC186596F}"/>
-              </a:ext>
-            </a:extLst>
-          </p:cNvPr>
-          <p:cNvSpPr txBox="1"/>
-          <p:nvPr/>
-        </p:nvSpPr>
-        <p:spPr>
-          <a:xfrm>
-            <a:off x="9609925" y="1814522"/>
-            <a:ext cx="1561658" cy="2862322"/>
-          </a:xfrm>
-          <a:prstGeom prst="rect">
-            <a:avLst/>
-          </a:prstGeom>
-          <a:noFill/>
-        </p:spPr>
-        <p:txBody>
-          <a:bodyPr wrap="square">
-            <a:spAutoFit/>
-          </a:bodyPr>
-          <a:lstStyle/>
-          <a:p>
-            <a:r>
-              <a:rPr lang="de-DE" sz="18000" b="1" dirty="0">
-                <a:solidFill>
-                  <a:srgbClr val="ED3C0B"/>
-                </a:solidFill>
-                <a:latin typeface="Eurostile" panose="020B0504020202050204" pitchFamily="34" charset="0"/>
-              </a:rPr>
-              <a:t>?</a:t>
-            </a:r>
-            <a:endParaRPr lang="de-AT" sz="18000" b="1" dirty="0">
-              <a:latin typeface="Eurostile" panose="020B0504020202050204" pitchFamily="34" charset="0"/>
-            </a:endParaRPr>
-          </a:p>
-        </p:txBody>
-      </p:sp>
       <p:pic>
         <p:nvPicPr>
-          <p:cNvPr id="10" name="Grafik 9">
-            <a:extLst>
-              <a:ext uri="{FF2B5EF4-FFF2-40B4-BE49-F238E27FC236}">
-                <a16:creationId xmlns:a16="http://schemas.microsoft.com/office/drawing/2014/main" id="{0A8AC64D-8BDB-63BE-2C3A-7CE34454BF60}"/>
+          <p:cNvPr id="8" name="Grafik 7">
+            <a:extLst>
+              <a:ext uri="{FF2B5EF4-FFF2-40B4-BE49-F238E27FC236}">
+                <a16:creationId xmlns:a16="http://schemas.microsoft.com/office/drawing/2014/main" id="{9B1AB4DF-E8E7-D254-CAEA-FDB23F88DA3C}"/>
               </a:ext>
             </a:extLst>
           </p:cNvPr>
@@ -3559,15 +3368,57 @@
           <p:nvPr/>
         </p:nvPicPr>
         <p:blipFill>
-          <a:blip r:embed="rId2"/>
+          <a:blip r:embed="rId2">
+            <a:extLst>
+              <a:ext uri="{96DAC541-7B7A-43D3-8B79-37D633B846F1}">
+                <asvg:svgBlip xmlns:asvg="http://schemas.microsoft.com/office/drawing/2016/SVG/main" r:embed="rId3"/>
+              </a:ext>
+            </a:extLst>
+          </a:blip>
           <a:stretch>
             <a:fillRect/>
           </a:stretch>
         </p:blipFill>
         <p:spPr>
           <a:xfrm>
-            <a:off x="215501" y="1189572"/>
-            <a:ext cx="3956647" cy="4810161"/>
+            <a:off x="1117767" y="1646032"/>
+            <a:ext cx="3551538" cy="3420000"/>
+          </a:xfrm>
+          <a:prstGeom prst="rect">
+            <a:avLst/>
+          </a:prstGeom>
+        </p:spPr>
+      </p:pic>
+      <p:pic>
+        <p:nvPicPr>
+          <p:cNvPr id="10" name="Grafik 9">
+            <a:extLst>
+              <a:ext uri="{FF2B5EF4-FFF2-40B4-BE49-F238E27FC236}">
+                <a16:creationId xmlns:a16="http://schemas.microsoft.com/office/drawing/2014/main" id="{316360F0-C34D-B3BC-C5C6-47299752FC83}"/>
+              </a:ext>
+            </a:extLst>
+          </p:cNvPr>
+          <p:cNvPicPr>
+            <a:picLocks noChangeAspect="1"/>
+          </p:cNvPicPr>
+          <p:nvPr/>
+        </p:nvPicPr>
+        <p:blipFill>
+          <a:blip r:embed="rId4">
+            <a:extLst>
+              <a:ext uri="{96DAC541-7B7A-43D3-8B79-37D633B846F1}">
+                <asvg:svgBlip xmlns:asvg="http://schemas.microsoft.com/office/drawing/2016/SVG/main" r:embed="rId5"/>
+              </a:ext>
+            </a:extLst>
+          </a:blip>
+          <a:stretch>
+            <a:fillRect/>
+          </a:stretch>
+        </p:blipFill>
+        <p:spPr>
+          <a:xfrm>
+            <a:off x="6426460" y="1858086"/>
+            <a:ext cx="4104000" cy="3420000"/>
           </a:xfrm>
           <a:prstGeom prst="rect">
             <a:avLst/>
@@ -3577,7 +3428,7 @@
     </p:spTree>
     <p:extLst>
       <p:ext uri="{BB962C8B-B14F-4D97-AF65-F5344CB8AC3E}">
-        <p14:creationId xmlns:p14="http://schemas.microsoft.com/office/powerpoint/2010/main" val="2182264236"/>
+        <p14:creationId xmlns:p14="http://schemas.microsoft.com/office/powerpoint/2010/main" val="4144257889"/>
       </p:ext>
     </p:extLst>
   </p:cSld>
@@ -3604,528 +3455,233 @@
           <a:chExt cx="0" cy="0"/>
         </a:xfrm>
       </p:grpSpPr>
-      <p:cxnSp>
-        <p:nvCxnSpPr>
-          <p:cNvPr id="7" name="Gerader Verbinder 6">
-            <a:extLst>
-              <a:ext uri="{FF2B5EF4-FFF2-40B4-BE49-F238E27FC236}">
-                <a16:creationId xmlns:a16="http://schemas.microsoft.com/office/drawing/2014/main" id="{871513E0-27F3-46EA-A76E-3E818E72613C}"/>
-              </a:ext>
-            </a:extLst>
-          </p:cNvPr>
-          <p:cNvCxnSpPr/>
+      <p:sp>
+        <p:nvSpPr>
+          <p:cNvPr id="4" name="Ellipse 3">
+            <a:extLst>
+              <a:ext uri="{FF2B5EF4-FFF2-40B4-BE49-F238E27FC236}">
+                <a16:creationId xmlns:a16="http://schemas.microsoft.com/office/drawing/2014/main" id="{501A0FE4-DB83-169F-053E-C81E177DE4BF}"/>
+              </a:ext>
+            </a:extLst>
+          </p:cNvPr>
+          <p:cNvSpPr/>
           <p:nvPr/>
-        </p:nvCxnSpPr>
-        <p:spPr>
-          <a:xfrm flipV="1">
-            <a:off x="2917104" y="953669"/>
-            <a:ext cx="4370047" cy="2002704"/>
-          </a:xfrm>
-          <a:prstGeom prst="line">
+        </p:nvSpPr>
+        <p:spPr>
+          <a:xfrm>
+            <a:off x="3902148" y="2292618"/>
+            <a:ext cx="3240000" cy="3240000"/>
+          </a:xfrm>
+          <a:prstGeom prst="ellipse">
             <a:avLst/>
           </a:prstGeom>
-          <a:ln w="9525"/>
+          <a:noFill/>
+          <a:ln w="114300">
+            <a:solidFill>
+              <a:srgbClr val="ED3C0B"/>
+            </a:solidFill>
+          </a:ln>
         </p:spPr>
         <p:style>
           <a:lnRef idx="2">
-            <a:schemeClr val="dk1"/>
+            <a:schemeClr val="accent1">
+              <a:shade val="15000"/>
+            </a:schemeClr>
           </a:lnRef>
-          <a:fillRef idx="0">
-            <a:schemeClr val="dk1"/>
+          <a:fillRef idx="1">
+            <a:schemeClr val="accent1"/>
           </a:fillRef>
-          <a:effectRef idx="1">
-            <a:schemeClr val="dk1"/>
+          <a:effectRef idx="0">
+            <a:schemeClr val="accent1"/>
           </a:effectRef>
           <a:fontRef idx="minor">
-            <a:schemeClr val="tx1"/>
+            <a:schemeClr val="lt1"/>
           </a:fontRef>
         </p:style>
-      </p:cxnSp>
-      <p:cxnSp>
-        <p:nvCxnSpPr>
-          <p:cNvPr id="9" name="Gerader Verbinder 8">
-            <a:extLst>
-              <a:ext uri="{FF2B5EF4-FFF2-40B4-BE49-F238E27FC236}">
-                <a16:creationId xmlns:a16="http://schemas.microsoft.com/office/drawing/2014/main" id="{30176299-A412-17C1-3662-24D85C7C04E9}"/>
-              </a:ext>
-            </a:extLst>
-          </p:cNvPr>
-          <p:cNvCxnSpPr/>
+        <p:txBody>
+          <a:bodyPr rtlCol="0" anchor="ctr"/>
+          <a:lstStyle/>
+          <a:p>
+            <a:pPr algn="ctr"/>
+            <a:endParaRPr lang="de-AT"/>
+          </a:p>
+        </p:txBody>
+      </p:sp>
+      <p:sp>
+        <p:nvSpPr>
+          <p:cNvPr id="5" name="Ellipse 4">
+            <a:extLst>
+              <a:ext uri="{FF2B5EF4-FFF2-40B4-BE49-F238E27FC236}">
+                <a16:creationId xmlns:a16="http://schemas.microsoft.com/office/drawing/2014/main" id="{5CBF1A37-1023-CFF2-5D23-7183F1F6EFFA}"/>
+              </a:ext>
+            </a:extLst>
+          </p:cNvPr>
+          <p:cNvSpPr/>
           <p:nvPr/>
-        </p:nvCxnSpPr>
-        <p:spPr>
-          <a:xfrm flipV="1">
-            <a:off x="2911494" y="1262209"/>
-            <a:ext cx="751716" cy="1710993"/>
-          </a:xfrm>
-          <a:prstGeom prst="line">
+        </p:nvSpPr>
+        <p:spPr>
+          <a:xfrm>
+            <a:off x="4172148" y="2562618"/>
+            <a:ext cx="2700000" cy="2700000"/>
+          </a:xfrm>
+          <a:prstGeom prst="ellipse">
             <a:avLst/>
           </a:prstGeom>
-          <a:ln w="9525"/>
+          <a:noFill/>
+          <a:ln w="114300">
+            <a:solidFill>
+              <a:srgbClr val="ED3C0B"/>
+            </a:solidFill>
+          </a:ln>
         </p:spPr>
         <p:style>
           <a:lnRef idx="2">
-            <a:schemeClr val="dk1"/>
+            <a:schemeClr val="accent1">
+              <a:shade val="15000"/>
+            </a:schemeClr>
           </a:lnRef>
-          <a:fillRef idx="0">
-            <a:schemeClr val="dk1"/>
+          <a:fillRef idx="1">
+            <a:schemeClr val="accent1"/>
           </a:fillRef>
-          <a:effectRef idx="1">
-            <a:schemeClr val="dk1"/>
+          <a:effectRef idx="0">
+            <a:schemeClr val="accent1"/>
           </a:effectRef>
           <a:fontRef idx="minor">
-            <a:schemeClr val="tx1"/>
+            <a:schemeClr val="lt1"/>
           </a:fontRef>
         </p:style>
-      </p:cxnSp>
-      <p:cxnSp>
-        <p:nvCxnSpPr>
-          <p:cNvPr id="11" name="Gerader Verbinder 10">
-            <a:extLst>
-              <a:ext uri="{FF2B5EF4-FFF2-40B4-BE49-F238E27FC236}">
-                <a16:creationId xmlns:a16="http://schemas.microsoft.com/office/drawing/2014/main" id="{297B748D-1927-BE70-9D3B-6CD4FC253C29}"/>
-              </a:ext>
-            </a:extLst>
-          </p:cNvPr>
-          <p:cNvCxnSpPr/>
+        <p:txBody>
+          <a:bodyPr rtlCol="0" anchor="ctr"/>
+          <a:lstStyle/>
+          <a:p>
+            <a:pPr algn="ctr"/>
+            <a:endParaRPr lang="de-AT" sz="15000" dirty="0">
+              <a:solidFill>
+                <a:srgbClr val="ED3C0B"/>
+              </a:solidFill>
+              <a:latin typeface="OCR A Extended" panose="02010509020102010303" pitchFamily="50" charset="0"/>
+            </a:endParaRPr>
+          </a:p>
+        </p:txBody>
+      </p:sp>
+      <p:sp>
+        <p:nvSpPr>
+          <p:cNvPr id="7" name="Textfeld 6">
+            <a:extLst>
+              <a:ext uri="{FF2B5EF4-FFF2-40B4-BE49-F238E27FC236}">
+                <a16:creationId xmlns:a16="http://schemas.microsoft.com/office/drawing/2014/main" id="{27BFBACB-375C-B4E5-8AEC-C75880750C4F}"/>
+              </a:ext>
+            </a:extLst>
+          </p:cNvPr>
+          <p:cNvSpPr txBox="1"/>
           <p:nvPr/>
-        </p:nvCxnSpPr>
+        </p:nvSpPr>
         <p:spPr>
           <a:xfrm>
-            <a:off x="3702479" y="1262209"/>
-            <a:ext cx="1464161" cy="3191985"/>
-          </a:xfrm>
-          <a:prstGeom prst="line">
+            <a:off x="4878899" y="2649409"/>
+            <a:ext cx="854591" cy="2400657"/>
+          </a:xfrm>
+          <a:prstGeom prst="rect">
             <a:avLst/>
           </a:prstGeom>
-          <a:ln w="9525"/>
-        </p:spPr>
-        <p:style>
-          <a:lnRef idx="2">
-            <a:schemeClr val="dk1"/>
-          </a:lnRef>
-          <a:fillRef idx="0">
-            <a:schemeClr val="dk1"/>
-          </a:fillRef>
-          <a:effectRef idx="1">
-            <a:schemeClr val="dk1"/>
-          </a:effectRef>
-          <a:fontRef idx="minor">
-            <a:schemeClr val="tx1"/>
-          </a:fontRef>
-        </p:style>
-      </p:cxnSp>
-      <p:cxnSp>
-        <p:nvCxnSpPr>
-          <p:cNvPr id="13" name="Gerader Verbinder 12">
-            <a:extLst>
-              <a:ext uri="{FF2B5EF4-FFF2-40B4-BE49-F238E27FC236}">
-                <a16:creationId xmlns:a16="http://schemas.microsoft.com/office/drawing/2014/main" id="{4576D5A5-5CDD-766F-47C9-676D5DEB3C8C}"/>
-              </a:ext>
-            </a:extLst>
-          </p:cNvPr>
-          <p:cNvCxnSpPr/>
+          <a:noFill/>
+        </p:spPr>
+        <p:txBody>
+          <a:bodyPr wrap="square">
+            <a:spAutoFit/>
+          </a:bodyPr>
+          <a:lstStyle/>
+          <a:p>
+            <a:r>
+              <a:rPr lang="de-DE" sz="15000" dirty="0">
+                <a:solidFill>
+                  <a:srgbClr val="ED3C0B"/>
+                </a:solidFill>
+                <a:latin typeface="OCR A Extended" panose="02010509020102010303" pitchFamily="50" charset="0"/>
+              </a:rPr>
+              <a:t>i</a:t>
+            </a:r>
+            <a:endParaRPr lang="de-AT" sz="15000" dirty="0"/>
+          </a:p>
+        </p:txBody>
+      </p:sp>
+      <p:sp>
+        <p:nvSpPr>
+          <p:cNvPr id="8" name="Textfeld 7">
+            <a:extLst>
+              <a:ext uri="{FF2B5EF4-FFF2-40B4-BE49-F238E27FC236}">
+                <a16:creationId xmlns:a16="http://schemas.microsoft.com/office/drawing/2014/main" id="{60E4CC86-7B2C-D4B8-E36B-17CAC186596F}"/>
+              </a:ext>
+            </a:extLst>
+          </p:cNvPr>
+          <p:cNvSpPr txBox="1"/>
           <p:nvPr/>
-        </p:nvCxnSpPr>
+        </p:nvSpPr>
         <p:spPr>
           <a:xfrm>
-            <a:off x="2911494" y="2956373"/>
-            <a:ext cx="5617298" cy="1346356"/>
-          </a:xfrm>
-          <a:prstGeom prst="line">
+            <a:off x="9609925" y="1814522"/>
+            <a:ext cx="1561658" cy="2862322"/>
+          </a:xfrm>
+          <a:prstGeom prst="rect">
             <a:avLst/>
           </a:prstGeom>
-          <a:ln w="9525"/>
-        </p:spPr>
-        <p:style>
-          <a:lnRef idx="2">
-            <a:schemeClr val="dk1"/>
-          </a:lnRef>
-          <a:fillRef idx="0">
-            <a:schemeClr val="dk1"/>
-          </a:fillRef>
-          <a:effectRef idx="1">
-            <a:schemeClr val="dk1"/>
-          </a:effectRef>
-          <a:fontRef idx="minor">
-            <a:schemeClr val="tx1"/>
-          </a:fontRef>
-        </p:style>
-      </p:cxnSp>
-      <p:cxnSp>
-        <p:nvCxnSpPr>
-          <p:cNvPr id="15" name="Gerader Verbinder 14">
-            <a:extLst>
-              <a:ext uri="{FF2B5EF4-FFF2-40B4-BE49-F238E27FC236}">
-                <a16:creationId xmlns:a16="http://schemas.microsoft.com/office/drawing/2014/main" id="{52191099-8CD5-7958-BEBB-3AC4E7F0FA71}"/>
-              </a:ext>
-            </a:extLst>
-          </p:cNvPr>
-          <p:cNvCxnSpPr/>
+          <a:noFill/>
+        </p:spPr>
+        <p:txBody>
+          <a:bodyPr wrap="square">
+            <a:spAutoFit/>
+          </a:bodyPr>
+          <a:lstStyle/>
+          <a:p>
+            <a:r>
+              <a:rPr lang="de-DE" sz="18000" b="1" dirty="0">
+                <a:solidFill>
+                  <a:srgbClr val="ED3C0B"/>
+                </a:solidFill>
+                <a:latin typeface="Eurostile" panose="020B0504020202050204" pitchFamily="34" charset="0"/>
+              </a:rPr>
+              <a:t>?</a:t>
+            </a:r>
+            <a:endParaRPr lang="de-AT" sz="18000" b="1" dirty="0">
+              <a:latin typeface="Eurostile" panose="020B0504020202050204" pitchFamily="34" charset="0"/>
+            </a:endParaRPr>
+          </a:p>
+        </p:txBody>
+      </p:sp>
+      <p:pic>
+        <p:nvPicPr>
+          <p:cNvPr id="10" name="Grafik 9">
+            <a:extLst>
+              <a:ext uri="{FF2B5EF4-FFF2-40B4-BE49-F238E27FC236}">
+                <a16:creationId xmlns:a16="http://schemas.microsoft.com/office/drawing/2014/main" id="{0A8AC64D-8BDB-63BE-2C3A-7CE34454BF60}"/>
+              </a:ext>
+            </a:extLst>
+          </p:cNvPr>
+          <p:cNvPicPr>
+            <a:picLocks noChangeAspect="1"/>
+          </p:cNvPicPr>
           <p:nvPr/>
-        </p:nvCxnSpPr>
+        </p:nvPicPr>
+        <p:blipFill>
+          <a:blip r:embed="rId2"/>
+          <a:stretch>
+            <a:fillRect/>
+          </a:stretch>
+        </p:blipFill>
         <p:spPr>
           <a:xfrm>
-            <a:off x="2911494" y="2973202"/>
-            <a:ext cx="2255146" cy="1480992"/>
-          </a:xfrm>
-          <a:prstGeom prst="line">
+            <a:off x="215501" y="1189572"/>
+            <a:ext cx="3956647" cy="4810161"/>
+          </a:xfrm>
+          <a:prstGeom prst="rect">
             <a:avLst/>
           </a:prstGeom>
-          <a:ln w="9525"/>
-        </p:spPr>
-        <p:style>
-          <a:lnRef idx="2">
-            <a:schemeClr val="dk1"/>
-          </a:lnRef>
-          <a:fillRef idx="0">
-            <a:schemeClr val="dk1"/>
-          </a:fillRef>
-          <a:effectRef idx="1">
-            <a:schemeClr val="dk1"/>
-          </a:effectRef>
-          <a:fontRef idx="minor">
-            <a:schemeClr val="tx1"/>
-          </a:fontRef>
-        </p:style>
-      </p:cxnSp>
-      <p:cxnSp>
-        <p:nvCxnSpPr>
-          <p:cNvPr id="17" name="Gerader Verbinder 16">
-            <a:extLst>
-              <a:ext uri="{FF2B5EF4-FFF2-40B4-BE49-F238E27FC236}">
-                <a16:creationId xmlns:a16="http://schemas.microsoft.com/office/drawing/2014/main" id="{6BF01FA4-616D-EA93-654F-B4C1739D5220}"/>
-              </a:ext>
-            </a:extLst>
-          </p:cNvPr>
-          <p:cNvCxnSpPr/>
-          <p:nvPr/>
-        </p:nvCxnSpPr>
-        <p:spPr>
-          <a:xfrm>
-            <a:off x="5166640" y="4454194"/>
-            <a:ext cx="1744653" cy="589031"/>
-          </a:xfrm>
-          <a:prstGeom prst="line">
-            <a:avLst/>
-          </a:prstGeom>
-          <a:ln w="9525"/>
-        </p:spPr>
-        <p:style>
-          <a:lnRef idx="2">
-            <a:schemeClr val="dk1"/>
-          </a:lnRef>
-          <a:fillRef idx="0">
-            <a:schemeClr val="dk1"/>
-          </a:fillRef>
-          <a:effectRef idx="1">
-            <a:schemeClr val="dk1"/>
-          </a:effectRef>
-          <a:fontRef idx="minor">
-            <a:schemeClr val="tx1"/>
-          </a:fontRef>
-        </p:style>
-      </p:cxnSp>
-      <p:cxnSp>
-        <p:nvCxnSpPr>
-          <p:cNvPr id="19" name="Gerader Verbinder 18">
-            <a:extLst>
-              <a:ext uri="{FF2B5EF4-FFF2-40B4-BE49-F238E27FC236}">
-                <a16:creationId xmlns:a16="http://schemas.microsoft.com/office/drawing/2014/main" id="{C8B0F0C3-AD10-CE99-C571-964EACD1EDC7}"/>
-              </a:ext>
-            </a:extLst>
-          </p:cNvPr>
-          <p:cNvCxnSpPr/>
-          <p:nvPr/>
-        </p:nvCxnSpPr>
-        <p:spPr>
-          <a:xfrm flipV="1">
-            <a:off x="6973001" y="4302729"/>
-            <a:ext cx="1555791" cy="740496"/>
-          </a:xfrm>
-          <a:prstGeom prst="line">
-            <a:avLst/>
-          </a:prstGeom>
-          <a:ln w="9525"/>
-        </p:spPr>
-        <p:style>
-          <a:lnRef idx="2">
-            <a:schemeClr val="dk1"/>
-          </a:lnRef>
-          <a:fillRef idx="0">
-            <a:schemeClr val="dk1"/>
-          </a:fillRef>
-          <a:effectRef idx="1">
-            <a:schemeClr val="dk1"/>
-          </a:effectRef>
-          <a:fontRef idx="minor">
-            <a:schemeClr val="tx1"/>
-          </a:fontRef>
-        </p:style>
-      </p:cxnSp>
-      <p:cxnSp>
-        <p:nvCxnSpPr>
-          <p:cNvPr id="21" name="Gerader Verbinder 20">
-            <a:extLst>
-              <a:ext uri="{FF2B5EF4-FFF2-40B4-BE49-F238E27FC236}">
-                <a16:creationId xmlns:a16="http://schemas.microsoft.com/office/drawing/2014/main" id="{0FEC2F52-A362-1717-BF91-EE5017ED5B2A}"/>
-              </a:ext>
-            </a:extLst>
-          </p:cNvPr>
-          <p:cNvCxnSpPr/>
-          <p:nvPr/>
-        </p:nvCxnSpPr>
-        <p:spPr>
-          <a:xfrm flipH="1" flipV="1">
-            <a:off x="6911293" y="2889055"/>
-            <a:ext cx="1656768" cy="1413674"/>
-          </a:xfrm>
-          <a:prstGeom prst="line">
-            <a:avLst/>
-          </a:prstGeom>
-          <a:ln w="9525"/>
-        </p:spPr>
-        <p:style>
-          <a:lnRef idx="2">
-            <a:schemeClr val="dk1"/>
-          </a:lnRef>
-          <a:fillRef idx="0">
-            <a:schemeClr val="dk1"/>
-          </a:fillRef>
-          <a:effectRef idx="1">
-            <a:schemeClr val="dk1"/>
-          </a:effectRef>
-          <a:fontRef idx="minor">
-            <a:schemeClr val="tx1"/>
-          </a:fontRef>
-        </p:style>
-      </p:cxnSp>
-      <p:cxnSp>
-        <p:nvCxnSpPr>
-          <p:cNvPr id="23" name="Gerader Verbinder 22">
-            <a:extLst>
-              <a:ext uri="{FF2B5EF4-FFF2-40B4-BE49-F238E27FC236}">
-                <a16:creationId xmlns:a16="http://schemas.microsoft.com/office/drawing/2014/main" id="{EC9DC9FB-FF54-31F7-0206-128972C556A3}"/>
-              </a:ext>
-            </a:extLst>
-          </p:cNvPr>
-          <p:cNvCxnSpPr/>
-          <p:nvPr/>
-        </p:nvCxnSpPr>
-        <p:spPr>
-          <a:xfrm flipH="1" flipV="1">
-            <a:off x="5346155" y="2753718"/>
-            <a:ext cx="1565138" cy="157776"/>
-          </a:xfrm>
-          <a:prstGeom prst="line">
-            <a:avLst/>
-          </a:prstGeom>
-          <a:ln w="9525"/>
-        </p:spPr>
-        <p:style>
-          <a:lnRef idx="2">
-            <a:schemeClr val="dk1"/>
-          </a:lnRef>
-          <a:fillRef idx="0">
-            <a:schemeClr val="dk1"/>
-          </a:fillRef>
-          <a:effectRef idx="1">
-            <a:schemeClr val="dk1"/>
-          </a:effectRef>
-          <a:fontRef idx="minor">
-            <a:schemeClr val="tx1"/>
-          </a:fontRef>
-        </p:style>
-      </p:cxnSp>
-      <p:cxnSp>
-        <p:nvCxnSpPr>
-          <p:cNvPr id="25" name="Gerader Verbinder 24">
-            <a:extLst>
-              <a:ext uri="{FF2B5EF4-FFF2-40B4-BE49-F238E27FC236}">
-                <a16:creationId xmlns:a16="http://schemas.microsoft.com/office/drawing/2014/main" id="{4ED29B56-AE50-EA1F-B070-C4BC288AA28A}"/>
-              </a:ext>
-            </a:extLst>
-          </p:cNvPr>
-          <p:cNvCxnSpPr/>
-          <p:nvPr/>
-        </p:nvCxnSpPr>
-        <p:spPr>
-          <a:xfrm flipV="1">
-            <a:off x="6911293" y="2434660"/>
-            <a:ext cx="2260756" cy="521713"/>
-          </a:xfrm>
-          <a:prstGeom prst="line">
-            <a:avLst/>
-          </a:prstGeom>
-          <a:ln w="9525"/>
-        </p:spPr>
-        <p:style>
-          <a:lnRef idx="2">
-            <a:schemeClr val="dk1"/>
-          </a:lnRef>
-          <a:fillRef idx="0">
-            <a:schemeClr val="dk1"/>
-          </a:fillRef>
-          <a:effectRef idx="1">
-            <a:schemeClr val="dk1"/>
-          </a:effectRef>
-          <a:fontRef idx="minor">
-            <a:schemeClr val="tx1"/>
-          </a:fontRef>
-        </p:style>
-      </p:cxnSp>
-      <p:cxnSp>
-        <p:nvCxnSpPr>
-          <p:cNvPr id="27" name="Gerader Verbinder 26">
-            <a:extLst>
-              <a:ext uri="{FF2B5EF4-FFF2-40B4-BE49-F238E27FC236}">
-                <a16:creationId xmlns:a16="http://schemas.microsoft.com/office/drawing/2014/main" id="{3DE7468D-DFD5-A58E-9C27-D57D67AFF75D}"/>
-              </a:ext>
-            </a:extLst>
-          </p:cNvPr>
-          <p:cNvCxnSpPr/>
-          <p:nvPr/>
-        </p:nvCxnSpPr>
-        <p:spPr>
-          <a:xfrm flipH="1" flipV="1">
-            <a:off x="7236663" y="953669"/>
-            <a:ext cx="1885059" cy="1469771"/>
-          </a:xfrm>
-          <a:prstGeom prst="line">
-            <a:avLst/>
-          </a:prstGeom>
-          <a:ln w="9525"/>
-        </p:spPr>
-        <p:style>
-          <a:lnRef idx="2">
-            <a:schemeClr val="dk1"/>
-          </a:lnRef>
-          <a:fillRef idx="0">
-            <a:schemeClr val="dk1"/>
-          </a:fillRef>
-          <a:effectRef idx="1">
-            <a:schemeClr val="dk1"/>
-          </a:effectRef>
-          <a:fontRef idx="minor">
-            <a:schemeClr val="tx1"/>
-          </a:fontRef>
-        </p:style>
-      </p:cxnSp>
-      <p:cxnSp>
-        <p:nvCxnSpPr>
-          <p:cNvPr id="29" name="Gerader Verbinder 28">
-            <a:extLst>
-              <a:ext uri="{FF2B5EF4-FFF2-40B4-BE49-F238E27FC236}">
-                <a16:creationId xmlns:a16="http://schemas.microsoft.com/office/drawing/2014/main" id="{B86476C7-3541-64E8-5014-B405EB6CACC7}"/>
-              </a:ext>
-            </a:extLst>
-          </p:cNvPr>
-          <p:cNvCxnSpPr/>
-          <p:nvPr/>
-        </p:nvCxnSpPr>
-        <p:spPr>
-          <a:xfrm flipV="1">
-            <a:off x="6911293" y="936840"/>
-            <a:ext cx="314150" cy="1974654"/>
-          </a:xfrm>
-          <a:prstGeom prst="line">
-            <a:avLst/>
-          </a:prstGeom>
-          <a:ln w="9525"/>
-        </p:spPr>
-        <p:style>
-          <a:lnRef idx="2">
-            <a:schemeClr val="dk1"/>
-          </a:lnRef>
-          <a:fillRef idx="0">
-            <a:schemeClr val="dk1"/>
-          </a:fillRef>
-          <a:effectRef idx="1">
-            <a:schemeClr val="dk1"/>
-          </a:effectRef>
-          <a:fontRef idx="minor">
-            <a:schemeClr val="tx1"/>
-          </a:fontRef>
-        </p:style>
-      </p:cxnSp>
-      <p:cxnSp>
-        <p:nvCxnSpPr>
-          <p:cNvPr id="31" name="Gerader Verbinder 30">
-            <a:extLst>
-              <a:ext uri="{FF2B5EF4-FFF2-40B4-BE49-F238E27FC236}">
-                <a16:creationId xmlns:a16="http://schemas.microsoft.com/office/drawing/2014/main" id="{ED0173B2-4B84-BC16-67E5-5E6F5F911EF5}"/>
-              </a:ext>
-            </a:extLst>
-          </p:cNvPr>
-          <p:cNvCxnSpPr/>
-          <p:nvPr/>
-        </p:nvCxnSpPr>
-        <p:spPr>
-          <a:xfrm flipH="1" flipV="1">
-            <a:off x="5480790" y="802204"/>
-            <a:ext cx="1430503" cy="2137340"/>
-          </a:xfrm>
-          <a:prstGeom prst="line">
-            <a:avLst/>
-          </a:prstGeom>
-          <a:ln w="9525"/>
-        </p:spPr>
-        <p:style>
-          <a:lnRef idx="2">
-            <a:schemeClr val="dk1"/>
-          </a:lnRef>
-          <a:fillRef idx="0">
-            <a:schemeClr val="dk1"/>
-          </a:fillRef>
-          <a:effectRef idx="1">
-            <a:schemeClr val="dk1"/>
-          </a:effectRef>
-          <a:fontRef idx="minor">
-            <a:schemeClr val="tx1"/>
-          </a:fontRef>
-        </p:style>
-      </p:cxnSp>
-      <p:cxnSp>
-        <p:nvCxnSpPr>
-          <p:cNvPr id="33" name="Gerader Verbinder 32">
-            <a:extLst>
-              <a:ext uri="{FF2B5EF4-FFF2-40B4-BE49-F238E27FC236}">
-                <a16:creationId xmlns:a16="http://schemas.microsoft.com/office/drawing/2014/main" id="{6943028A-2DA2-9551-0D2D-14B3531B2DDA}"/>
-              </a:ext>
-            </a:extLst>
-          </p:cNvPr>
-          <p:cNvCxnSpPr/>
-          <p:nvPr/>
-        </p:nvCxnSpPr>
-        <p:spPr>
-          <a:xfrm flipV="1">
-            <a:off x="5346155" y="802204"/>
-            <a:ext cx="100977" cy="1935386"/>
-          </a:xfrm>
-          <a:prstGeom prst="line">
-            <a:avLst/>
-          </a:prstGeom>
-          <a:ln w="9525"/>
-        </p:spPr>
-        <p:style>
-          <a:lnRef idx="2">
-            <a:schemeClr val="dk1"/>
-          </a:lnRef>
-          <a:fillRef idx="0">
-            <a:schemeClr val="dk1"/>
-          </a:fillRef>
-          <a:effectRef idx="1">
-            <a:schemeClr val="dk1"/>
-          </a:effectRef>
-          <a:fontRef idx="minor">
-            <a:schemeClr val="tx1"/>
-          </a:fontRef>
-        </p:style>
-      </p:cxnSp>
+        </p:spPr>
+      </p:pic>
     </p:spTree>
     <p:extLst>
       <p:ext uri="{BB962C8B-B14F-4D97-AF65-F5344CB8AC3E}">
-        <p14:creationId xmlns:p14="http://schemas.microsoft.com/office/powerpoint/2010/main" val="756043445"/>
+        <p14:creationId xmlns:p14="http://schemas.microsoft.com/office/powerpoint/2010/main" val="2182264236"/>
       </p:ext>
     </p:extLst>
   </p:cSld>
@@ -4670,137 +4226,10 @@
           </a:fontRef>
         </p:style>
       </p:cxnSp>
-      <p:cxnSp>
-        <p:nvCxnSpPr>
-          <p:cNvPr id="35" name="Gerader Verbinder 34">
-            <a:extLst>
-              <a:ext uri="{FF2B5EF4-FFF2-40B4-BE49-F238E27FC236}">
-                <a16:creationId xmlns:a16="http://schemas.microsoft.com/office/drawing/2014/main" id="{A06CE8BF-6B23-3854-3365-1F09E7B9CE2D}"/>
-              </a:ext>
-            </a:extLst>
-          </p:cNvPr>
-          <p:cNvCxnSpPr/>
-          <p:nvPr/>
-        </p:nvCxnSpPr>
-        <p:spPr>
-          <a:xfrm>
-            <a:off x="3668820" y="1255897"/>
-            <a:ext cx="84147" cy="3658301"/>
-          </a:xfrm>
-          <a:prstGeom prst="line">
-            <a:avLst/>
-          </a:prstGeom>
-          <a:ln w="9525">
-            <a:solidFill>
-              <a:srgbClr val="94B31C"/>
-            </a:solidFill>
-          </a:ln>
-        </p:spPr>
-        <p:style>
-          <a:lnRef idx="2">
-            <a:schemeClr val="accent1"/>
-          </a:lnRef>
-          <a:fillRef idx="0">
-            <a:schemeClr val="accent1"/>
-          </a:fillRef>
-          <a:effectRef idx="1">
-            <a:schemeClr val="accent1"/>
-          </a:effectRef>
-          <a:fontRef idx="minor">
-            <a:schemeClr val="tx1"/>
-          </a:fontRef>
-        </p:style>
-      </p:cxnSp>
-      <p:cxnSp>
-        <p:nvCxnSpPr>
-          <p:cNvPr id="37" name="Gerader Verbinder 36">
-            <a:extLst>
-              <a:ext uri="{FF2B5EF4-FFF2-40B4-BE49-F238E27FC236}">
-                <a16:creationId xmlns:a16="http://schemas.microsoft.com/office/drawing/2014/main" id="{3A3F9B94-D591-4722-1FC8-59E12584B3AE}"/>
-              </a:ext>
-            </a:extLst>
-          </p:cNvPr>
-          <p:cNvCxnSpPr/>
-          <p:nvPr/>
-        </p:nvCxnSpPr>
-        <p:spPr>
-          <a:xfrm flipV="1">
-            <a:off x="3769797" y="4447882"/>
-            <a:ext cx="1385623" cy="443878"/>
-          </a:xfrm>
-          <a:prstGeom prst="line">
-            <a:avLst/>
-          </a:prstGeom>
-          <a:ln w="9525">
-            <a:solidFill>
-              <a:srgbClr val="94B31C"/>
-            </a:solidFill>
-          </a:ln>
-        </p:spPr>
-        <p:style>
-          <a:lnRef idx="2">
-            <a:schemeClr val="accent1"/>
-          </a:lnRef>
-          <a:fillRef idx="0">
-            <a:schemeClr val="accent1"/>
-          </a:fillRef>
-          <a:effectRef idx="1">
-            <a:schemeClr val="accent1"/>
-          </a:effectRef>
-          <a:fontRef idx="minor">
-            <a:schemeClr val="tx1"/>
-          </a:fontRef>
-        </p:style>
-      </p:cxnSp>
-      <p:cxnSp>
-        <p:nvCxnSpPr>
-          <p:cNvPr id="2" name="Gerade Verbindung mit Pfeil 1">
-            <a:extLst>
-              <a:ext uri="{FF2B5EF4-FFF2-40B4-BE49-F238E27FC236}">
-                <a16:creationId xmlns:a16="http://schemas.microsoft.com/office/drawing/2014/main" id="{679D061E-4B24-50EA-0173-A03E5699E4FF}"/>
-              </a:ext>
-            </a:extLst>
-          </p:cNvPr>
-          <p:cNvCxnSpPr>
-            <a:cxnSpLocks/>
-          </p:cNvCxnSpPr>
-          <p:nvPr/>
-        </p:nvCxnSpPr>
-        <p:spPr>
-          <a:xfrm flipV="1">
-            <a:off x="1757479" y="4286746"/>
-            <a:ext cx="333375" cy="461963"/>
-          </a:xfrm>
-          <a:prstGeom prst="straightConnector1">
-            <a:avLst/>
-          </a:prstGeom>
-          <a:ln w="9525">
-            <a:solidFill>
-              <a:srgbClr val="94B31C"/>
-            </a:solidFill>
-            <a:headEnd w="lg" len="lg"/>
-            <a:tailEnd type="stealth" w="lg" len="lg"/>
-          </a:ln>
-        </p:spPr>
-        <p:style>
-          <a:lnRef idx="2">
-            <a:schemeClr val="accent1"/>
-          </a:lnRef>
-          <a:fillRef idx="0">
-            <a:schemeClr val="accent1"/>
-          </a:fillRef>
-          <a:effectRef idx="1">
-            <a:schemeClr val="accent1"/>
-          </a:effectRef>
-          <a:fontRef idx="minor">
-            <a:schemeClr val="tx1"/>
-          </a:fontRef>
-        </p:style>
-      </p:cxnSp>
     </p:spTree>
     <p:extLst>
       <p:ext uri="{BB962C8B-B14F-4D97-AF65-F5344CB8AC3E}">
-        <p14:creationId xmlns:p14="http://schemas.microsoft.com/office/powerpoint/2010/main" val="3660824256"/>
+        <p14:creationId xmlns:p14="http://schemas.microsoft.com/office/powerpoint/2010/main" val="756043445"/>
       </p:ext>
     </p:extLst>
   </p:cSld>
@@ -5365,17 +4794,21 @@
           <a:prstGeom prst="line">
             <a:avLst/>
           </a:prstGeom>
-          <a:ln w="9525"/>
+          <a:ln w="9525">
+            <a:solidFill>
+              <a:srgbClr val="94B31C"/>
+            </a:solidFill>
+          </a:ln>
         </p:spPr>
         <p:style>
-          <a:lnRef idx="1">
-            <a:schemeClr val="dk1"/>
+          <a:lnRef idx="2">
+            <a:schemeClr val="accent1"/>
           </a:lnRef>
           <a:fillRef idx="0">
-            <a:schemeClr val="dk1"/>
+            <a:schemeClr val="accent1"/>
           </a:fillRef>
-          <a:effectRef idx="0">
-            <a:schemeClr val="dk1"/>
+          <a:effectRef idx="1">
+            <a:schemeClr val="accent1"/>
           </a:effectRef>
           <a:fontRef idx="minor">
             <a:schemeClr val="tx1"/>
@@ -5402,17 +4835,21 @@
           <a:prstGeom prst="line">
             <a:avLst/>
           </a:prstGeom>
-          <a:ln w="9525"/>
+          <a:ln w="9525">
+            <a:solidFill>
+              <a:srgbClr val="94B31C"/>
+            </a:solidFill>
+          </a:ln>
         </p:spPr>
         <p:style>
-          <a:lnRef idx="1">
-            <a:schemeClr val="dk1"/>
+          <a:lnRef idx="2">
+            <a:schemeClr val="accent1"/>
           </a:lnRef>
           <a:fillRef idx="0">
-            <a:schemeClr val="dk1"/>
+            <a:schemeClr val="accent1"/>
           </a:fillRef>
-          <a:effectRef idx="0">
-            <a:schemeClr val="dk1"/>
+          <a:effectRef idx="1">
+            <a:schemeClr val="accent1"/>
           </a:effectRef>
           <a:fontRef idx="minor">
             <a:schemeClr val="tx1"/>
@@ -5442,19 +4879,22 @@
             <a:avLst/>
           </a:prstGeom>
           <a:ln w="9525">
+            <a:solidFill>
+              <a:srgbClr val="94B31C"/>
+            </a:solidFill>
             <a:headEnd w="lg" len="lg"/>
             <a:tailEnd type="stealth" w="lg" len="lg"/>
           </a:ln>
         </p:spPr>
         <p:style>
-          <a:lnRef idx="1">
-            <a:schemeClr val="dk1"/>
+          <a:lnRef idx="2">
+            <a:schemeClr val="accent1"/>
           </a:lnRef>
           <a:fillRef idx="0">
-            <a:schemeClr val="dk1"/>
+            <a:schemeClr val="accent1"/>
           </a:fillRef>
-          <a:effectRef idx="0">
-            <a:schemeClr val="dk1"/>
+          <a:effectRef idx="1">
+            <a:schemeClr val="accent1"/>
           </a:effectRef>
           <a:fontRef idx="minor">
             <a:schemeClr val="tx1"/>
@@ -5464,7 +4904,7 @@
     </p:spTree>
     <p:extLst>
       <p:ext uri="{BB962C8B-B14F-4D97-AF65-F5344CB8AC3E}">
-        <p14:creationId xmlns:p14="http://schemas.microsoft.com/office/powerpoint/2010/main" val="1178704449"/>
+        <p14:creationId xmlns:p14="http://schemas.microsoft.com/office/powerpoint/2010/main" val="3660824256"/>
       </p:ext>
     </p:extLst>
   </p:cSld>
@@ -5491,6 +4931,670 @@
           <a:chExt cx="0" cy="0"/>
         </a:xfrm>
       </p:grpSpPr>
+      <p:cxnSp>
+        <p:nvCxnSpPr>
+          <p:cNvPr id="7" name="Gerader Verbinder 6">
+            <a:extLst>
+              <a:ext uri="{FF2B5EF4-FFF2-40B4-BE49-F238E27FC236}">
+                <a16:creationId xmlns:a16="http://schemas.microsoft.com/office/drawing/2014/main" id="{871513E0-27F3-46EA-A76E-3E818E72613C}"/>
+              </a:ext>
+            </a:extLst>
+          </p:cNvPr>
+          <p:cNvCxnSpPr/>
+          <p:nvPr/>
+        </p:nvCxnSpPr>
+        <p:spPr>
+          <a:xfrm flipV="1">
+            <a:off x="2917104" y="953669"/>
+            <a:ext cx="4370047" cy="2002704"/>
+          </a:xfrm>
+          <a:prstGeom prst="line">
+            <a:avLst/>
+          </a:prstGeom>
+          <a:ln w="9525"/>
+        </p:spPr>
+        <p:style>
+          <a:lnRef idx="2">
+            <a:schemeClr val="dk1"/>
+          </a:lnRef>
+          <a:fillRef idx="0">
+            <a:schemeClr val="dk1"/>
+          </a:fillRef>
+          <a:effectRef idx="1">
+            <a:schemeClr val="dk1"/>
+          </a:effectRef>
+          <a:fontRef idx="minor">
+            <a:schemeClr val="tx1"/>
+          </a:fontRef>
+        </p:style>
+      </p:cxnSp>
+      <p:cxnSp>
+        <p:nvCxnSpPr>
+          <p:cNvPr id="9" name="Gerader Verbinder 8">
+            <a:extLst>
+              <a:ext uri="{FF2B5EF4-FFF2-40B4-BE49-F238E27FC236}">
+                <a16:creationId xmlns:a16="http://schemas.microsoft.com/office/drawing/2014/main" id="{30176299-A412-17C1-3662-24D85C7C04E9}"/>
+              </a:ext>
+            </a:extLst>
+          </p:cNvPr>
+          <p:cNvCxnSpPr/>
+          <p:nvPr/>
+        </p:nvCxnSpPr>
+        <p:spPr>
+          <a:xfrm flipV="1">
+            <a:off x="2911494" y="1262209"/>
+            <a:ext cx="751716" cy="1710993"/>
+          </a:xfrm>
+          <a:prstGeom prst="line">
+            <a:avLst/>
+          </a:prstGeom>
+          <a:ln w="9525"/>
+        </p:spPr>
+        <p:style>
+          <a:lnRef idx="2">
+            <a:schemeClr val="dk1"/>
+          </a:lnRef>
+          <a:fillRef idx="0">
+            <a:schemeClr val="dk1"/>
+          </a:fillRef>
+          <a:effectRef idx="1">
+            <a:schemeClr val="dk1"/>
+          </a:effectRef>
+          <a:fontRef idx="minor">
+            <a:schemeClr val="tx1"/>
+          </a:fontRef>
+        </p:style>
+      </p:cxnSp>
+      <p:cxnSp>
+        <p:nvCxnSpPr>
+          <p:cNvPr id="11" name="Gerader Verbinder 10">
+            <a:extLst>
+              <a:ext uri="{FF2B5EF4-FFF2-40B4-BE49-F238E27FC236}">
+                <a16:creationId xmlns:a16="http://schemas.microsoft.com/office/drawing/2014/main" id="{297B748D-1927-BE70-9D3B-6CD4FC253C29}"/>
+              </a:ext>
+            </a:extLst>
+          </p:cNvPr>
+          <p:cNvCxnSpPr/>
+          <p:nvPr/>
+        </p:nvCxnSpPr>
+        <p:spPr>
+          <a:xfrm>
+            <a:off x="3702479" y="1262209"/>
+            <a:ext cx="1464161" cy="3191985"/>
+          </a:xfrm>
+          <a:prstGeom prst="line">
+            <a:avLst/>
+          </a:prstGeom>
+          <a:ln w="9525"/>
+        </p:spPr>
+        <p:style>
+          <a:lnRef idx="2">
+            <a:schemeClr val="dk1"/>
+          </a:lnRef>
+          <a:fillRef idx="0">
+            <a:schemeClr val="dk1"/>
+          </a:fillRef>
+          <a:effectRef idx="1">
+            <a:schemeClr val="dk1"/>
+          </a:effectRef>
+          <a:fontRef idx="minor">
+            <a:schemeClr val="tx1"/>
+          </a:fontRef>
+        </p:style>
+      </p:cxnSp>
+      <p:cxnSp>
+        <p:nvCxnSpPr>
+          <p:cNvPr id="13" name="Gerader Verbinder 12">
+            <a:extLst>
+              <a:ext uri="{FF2B5EF4-FFF2-40B4-BE49-F238E27FC236}">
+                <a16:creationId xmlns:a16="http://schemas.microsoft.com/office/drawing/2014/main" id="{4576D5A5-5CDD-766F-47C9-676D5DEB3C8C}"/>
+              </a:ext>
+            </a:extLst>
+          </p:cNvPr>
+          <p:cNvCxnSpPr/>
+          <p:nvPr/>
+        </p:nvCxnSpPr>
+        <p:spPr>
+          <a:xfrm>
+            <a:off x="2911494" y="2956373"/>
+            <a:ext cx="5617298" cy="1346356"/>
+          </a:xfrm>
+          <a:prstGeom prst="line">
+            <a:avLst/>
+          </a:prstGeom>
+          <a:ln w="9525"/>
+        </p:spPr>
+        <p:style>
+          <a:lnRef idx="2">
+            <a:schemeClr val="dk1"/>
+          </a:lnRef>
+          <a:fillRef idx="0">
+            <a:schemeClr val="dk1"/>
+          </a:fillRef>
+          <a:effectRef idx="1">
+            <a:schemeClr val="dk1"/>
+          </a:effectRef>
+          <a:fontRef idx="minor">
+            <a:schemeClr val="tx1"/>
+          </a:fontRef>
+        </p:style>
+      </p:cxnSp>
+      <p:cxnSp>
+        <p:nvCxnSpPr>
+          <p:cNvPr id="15" name="Gerader Verbinder 14">
+            <a:extLst>
+              <a:ext uri="{FF2B5EF4-FFF2-40B4-BE49-F238E27FC236}">
+                <a16:creationId xmlns:a16="http://schemas.microsoft.com/office/drawing/2014/main" id="{52191099-8CD5-7958-BEBB-3AC4E7F0FA71}"/>
+              </a:ext>
+            </a:extLst>
+          </p:cNvPr>
+          <p:cNvCxnSpPr/>
+          <p:nvPr/>
+        </p:nvCxnSpPr>
+        <p:spPr>
+          <a:xfrm>
+            <a:off x="2911494" y="2973202"/>
+            <a:ext cx="2255146" cy="1480992"/>
+          </a:xfrm>
+          <a:prstGeom prst="line">
+            <a:avLst/>
+          </a:prstGeom>
+          <a:ln w="9525"/>
+        </p:spPr>
+        <p:style>
+          <a:lnRef idx="2">
+            <a:schemeClr val="dk1"/>
+          </a:lnRef>
+          <a:fillRef idx="0">
+            <a:schemeClr val="dk1"/>
+          </a:fillRef>
+          <a:effectRef idx="1">
+            <a:schemeClr val="dk1"/>
+          </a:effectRef>
+          <a:fontRef idx="minor">
+            <a:schemeClr val="tx1"/>
+          </a:fontRef>
+        </p:style>
+      </p:cxnSp>
+      <p:cxnSp>
+        <p:nvCxnSpPr>
+          <p:cNvPr id="17" name="Gerader Verbinder 16">
+            <a:extLst>
+              <a:ext uri="{FF2B5EF4-FFF2-40B4-BE49-F238E27FC236}">
+                <a16:creationId xmlns:a16="http://schemas.microsoft.com/office/drawing/2014/main" id="{6BF01FA4-616D-EA93-654F-B4C1739D5220}"/>
+              </a:ext>
+            </a:extLst>
+          </p:cNvPr>
+          <p:cNvCxnSpPr/>
+          <p:nvPr/>
+        </p:nvCxnSpPr>
+        <p:spPr>
+          <a:xfrm>
+            <a:off x="5166640" y="4454194"/>
+            <a:ext cx="1744653" cy="589031"/>
+          </a:xfrm>
+          <a:prstGeom prst="line">
+            <a:avLst/>
+          </a:prstGeom>
+          <a:ln w="9525"/>
+        </p:spPr>
+        <p:style>
+          <a:lnRef idx="2">
+            <a:schemeClr val="dk1"/>
+          </a:lnRef>
+          <a:fillRef idx="0">
+            <a:schemeClr val="dk1"/>
+          </a:fillRef>
+          <a:effectRef idx="1">
+            <a:schemeClr val="dk1"/>
+          </a:effectRef>
+          <a:fontRef idx="minor">
+            <a:schemeClr val="tx1"/>
+          </a:fontRef>
+        </p:style>
+      </p:cxnSp>
+      <p:cxnSp>
+        <p:nvCxnSpPr>
+          <p:cNvPr id="19" name="Gerader Verbinder 18">
+            <a:extLst>
+              <a:ext uri="{FF2B5EF4-FFF2-40B4-BE49-F238E27FC236}">
+                <a16:creationId xmlns:a16="http://schemas.microsoft.com/office/drawing/2014/main" id="{C8B0F0C3-AD10-CE99-C571-964EACD1EDC7}"/>
+              </a:ext>
+            </a:extLst>
+          </p:cNvPr>
+          <p:cNvCxnSpPr/>
+          <p:nvPr/>
+        </p:nvCxnSpPr>
+        <p:spPr>
+          <a:xfrm flipV="1">
+            <a:off x="6973001" y="4302729"/>
+            <a:ext cx="1555791" cy="740496"/>
+          </a:xfrm>
+          <a:prstGeom prst="line">
+            <a:avLst/>
+          </a:prstGeom>
+          <a:ln w="9525"/>
+        </p:spPr>
+        <p:style>
+          <a:lnRef idx="2">
+            <a:schemeClr val="dk1"/>
+          </a:lnRef>
+          <a:fillRef idx="0">
+            <a:schemeClr val="dk1"/>
+          </a:fillRef>
+          <a:effectRef idx="1">
+            <a:schemeClr val="dk1"/>
+          </a:effectRef>
+          <a:fontRef idx="minor">
+            <a:schemeClr val="tx1"/>
+          </a:fontRef>
+        </p:style>
+      </p:cxnSp>
+      <p:cxnSp>
+        <p:nvCxnSpPr>
+          <p:cNvPr id="21" name="Gerader Verbinder 20">
+            <a:extLst>
+              <a:ext uri="{FF2B5EF4-FFF2-40B4-BE49-F238E27FC236}">
+                <a16:creationId xmlns:a16="http://schemas.microsoft.com/office/drawing/2014/main" id="{0FEC2F52-A362-1717-BF91-EE5017ED5B2A}"/>
+              </a:ext>
+            </a:extLst>
+          </p:cNvPr>
+          <p:cNvCxnSpPr/>
+          <p:nvPr/>
+        </p:nvCxnSpPr>
+        <p:spPr>
+          <a:xfrm flipH="1" flipV="1">
+            <a:off x="6911293" y="2889055"/>
+            <a:ext cx="1656768" cy="1413674"/>
+          </a:xfrm>
+          <a:prstGeom prst="line">
+            <a:avLst/>
+          </a:prstGeom>
+          <a:ln w="9525"/>
+        </p:spPr>
+        <p:style>
+          <a:lnRef idx="2">
+            <a:schemeClr val="dk1"/>
+          </a:lnRef>
+          <a:fillRef idx="0">
+            <a:schemeClr val="dk1"/>
+          </a:fillRef>
+          <a:effectRef idx="1">
+            <a:schemeClr val="dk1"/>
+          </a:effectRef>
+          <a:fontRef idx="minor">
+            <a:schemeClr val="tx1"/>
+          </a:fontRef>
+        </p:style>
+      </p:cxnSp>
+      <p:cxnSp>
+        <p:nvCxnSpPr>
+          <p:cNvPr id="23" name="Gerader Verbinder 22">
+            <a:extLst>
+              <a:ext uri="{FF2B5EF4-FFF2-40B4-BE49-F238E27FC236}">
+                <a16:creationId xmlns:a16="http://schemas.microsoft.com/office/drawing/2014/main" id="{EC9DC9FB-FF54-31F7-0206-128972C556A3}"/>
+              </a:ext>
+            </a:extLst>
+          </p:cNvPr>
+          <p:cNvCxnSpPr/>
+          <p:nvPr/>
+        </p:nvCxnSpPr>
+        <p:spPr>
+          <a:xfrm flipH="1" flipV="1">
+            <a:off x="5346155" y="2753718"/>
+            <a:ext cx="1565138" cy="157776"/>
+          </a:xfrm>
+          <a:prstGeom prst="line">
+            <a:avLst/>
+          </a:prstGeom>
+          <a:ln w="9525"/>
+        </p:spPr>
+        <p:style>
+          <a:lnRef idx="2">
+            <a:schemeClr val="dk1"/>
+          </a:lnRef>
+          <a:fillRef idx="0">
+            <a:schemeClr val="dk1"/>
+          </a:fillRef>
+          <a:effectRef idx="1">
+            <a:schemeClr val="dk1"/>
+          </a:effectRef>
+          <a:fontRef idx="minor">
+            <a:schemeClr val="tx1"/>
+          </a:fontRef>
+        </p:style>
+      </p:cxnSp>
+      <p:cxnSp>
+        <p:nvCxnSpPr>
+          <p:cNvPr id="25" name="Gerader Verbinder 24">
+            <a:extLst>
+              <a:ext uri="{FF2B5EF4-FFF2-40B4-BE49-F238E27FC236}">
+                <a16:creationId xmlns:a16="http://schemas.microsoft.com/office/drawing/2014/main" id="{4ED29B56-AE50-EA1F-B070-C4BC288AA28A}"/>
+              </a:ext>
+            </a:extLst>
+          </p:cNvPr>
+          <p:cNvCxnSpPr/>
+          <p:nvPr/>
+        </p:nvCxnSpPr>
+        <p:spPr>
+          <a:xfrm flipV="1">
+            <a:off x="6911293" y="2434660"/>
+            <a:ext cx="2260756" cy="521713"/>
+          </a:xfrm>
+          <a:prstGeom prst="line">
+            <a:avLst/>
+          </a:prstGeom>
+          <a:ln w="9525"/>
+        </p:spPr>
+        <p:style>
+          <a:lnRef idx="2">
+            <a:schemeClr val="dk1"/>
+          </a:lnRef>
+          <a:fillRef idx="0">
+            <a:schemeClr val="dk1"/>
+          </a:fillRef>
+          <a:effectRef idx="1">
+            <a:schemeClr val="dk1"/>
+          </a:effectRef>
+          <a:fontRef idx="minor">
+            <a:schemeClr val="tx1"/>
+          </a:fontRef>
+        </p:style>
+      </p:cxnSp>
+      <p:cxnSp>
+        <p:nvCxnSpPr>
+          <p:cNvPr id="27" name="Gerader Verbinder 26">
+            <a:extLst>
+              <a:ext uri="{FF2B5EF4-FFF2-40B4-BE49-F238E27FC236}">
+                <a16:creationId xmlns:a16="http://schemas.microsoft.com/office/drawing/2014/main" id="{3DE7468D-DFD5-A58E-9C27-D57D67AFF75D}"/>
+              </a:ext>
+            </a:extLst>
+          </p:cNvPr>
+          <p:cNvCxnSpPr/>
+          <p:nvPr/>
+        </p:nvCxnSpPr>
+        <p:spPr>
+          <a:xfrm flipH="1" flipV="1">
+            <a:off x="7236663" y="953669"/>
+            <a:ext cx="1885059" cy="1469771"/>
+          </a:xfrm>
+          <a:prstGeom prst="line">
+            <a:avLst/>
+          </a:prstGeom>
+          <a:ln w="9525"/>
+        </p:spPr>
+        <p:style>
+          <a:lnRef idx="2">
+            <a:schemeClr val="dk1"/>
+          </a:lnRef>
+          <a:fillRef idx="0">
+            <a:schemeClr val="dk1"/>
+          </a:fillRef>
+          <a:effectRef idx="1">
+            <a:schemeClr val="dk1"/>
+          </a:effectRef>
+          <a:fontRef idx="minor">
+            <a:schemeClr val="tx1"/>
+          </a:fontRef>
+        </p:style>
+      </p:cxnSp>
+      <p:cxnSp>
+        <p:nvCxnSpPr>
+          <p:cNvPr id="29" name="Gerader Verbinder 28">
+            <a:extLst>
+              <a:ext uri="{FF2B5EF4-FFF2-40B4-BE49-F238E27FC236}">
+                <a16:creationId xmlns:a16="http://schemas.microsoft.com/office/drawing/2014/main" id="{B86476C7-3541-64E8-5014-B405EB6CACC7}"/>
+              </a:ext>
+            </a:extLst>
+          </p:cNvPr>
+          <p:cNvCxnSpPr/>
+          <p:nvPr/>
+        </p:nvCxnSpPr>
+        <p:spPr>
+          <a:xfrm flipV="1">
+            <a:off x="6911293" y="936840"/>
+            <a:ext cx="314150" cy="1974654"/>
+          </a:xfrm>
+          <a:prstGeom prst="line">
+            <a:avLst/>
+          </a:prstGeom>
+          <a:ln w="9525"/>
+        </p:spPr>
+        <p:style>
+          <a:lnRef idx="2">
+            <a:schemeClr val="dk1"/>
+          </a:lnRef>
+          <a:fillRef idx="0">
+            <a:schemeClr val="dk1"/>
+          </a:fillRef>
+          <a:effectRef idx="1">
+            <a:schemeClr val="dk1"/>
+          </a:effectRef>
+          <a:fontRef idx="minor">
+            <a:schemeClr val="tx1"/>
+          </a:fontRef>
+        </p:style>
+      </p:cxnSp>
+      <p:cxnSp>
+        <p:nvCxnSpPr>
+          <p:cNvPr id="31" name="Gerader Verbinder 30">
+            <a:extLst>
+              <a:ext uri="{FF2B5EF4-FFF2-40B4-BE49-F238E27FC236}">
+                <a16:creationId xmlns:a16="http://schemas.microsoft.com/office/drawing/2014/main" id="{ED0173B2-4B84-BC16-67E5-5E6F5F911EF5}"/>
+              </a:ext>
+            </a:extLst>
+          </p:cNvPr>
+          <p:cNvCxnSpPr/>
+          <p:nvPr/>
+        </p:nvCxnSpPr>
+        <p:spPr>
+          <a:xfrm flipH="1" flipV="1">
+            <a:off x="5480790" y="802204"/>
+            <a:ext cx="1430503" cy="2137340"/>
+          </a:xfrm>
+          <a:prstGeom prst="line">
+            <a:avLst/>
+          </a:prstGeom>
+          <a:ln w="9525"/>
+        </p:spPr>
+        <p:style>
+          <a:lnRef idx="2">
+            <a:schemeClr val="dk1"/>
+          </a:lnRef>
+          <a:fillRef idx="0">
+            <a:schemeClr val="dk1"/>
+          </a:fillRef>
+          <a:effectRef idx="1">
+            <a:schemeClr val="dk1"/>
+          </a:effectRef>
+          <a:fontRef idx="minor">
+            <a:schemeClr val="tx1"/>
+          </a:fontRef>
+        </p:style>
+      </p:cxnSp>
+      <p:cxnSp>
+        <p:nvCxnSpPr>
+          <p:cNvPr id="33" name="Gerader Verbinder 32">
+            <a:extLst>
+              <a:ext uri="{FF2B5EF4-FFF2-40B4-BE49-F238E27FC236}">
+                <a16:creationId xmlns:a16="http://schemas.microsoft.com/office/drawing/2014/main" id="{6943028A-2DA2-9551-0D2D-14B3531B2DDA}"/>
+              </a:ext>
+            </a:extLst>
+          </p:cNvPr>
+          <p:cNvCxnSpPr/>
+          <p:nvPr/>
+        </p:nvCxnSpPr>
+        <p:spPr>
+          <a:xfrm flipV="1">
+            <a:off x="5346155" y="802204"/>
+            <a:ext cx="100977" cy="1935386"/>
+          </a:xfrm>
+          <a:prstGeom prst="line">
+            <a:avLst/>
+          </a:prstGeom>
+          <a:ln w="9525"/>
+        </p:spPr>
+        <p:style>
+          <a:lnRef idx="2">
+            <a:schemeClr val="dk1"/>
+          </a:lnRef>
+          <a:fillRef idx="0">
+            <a:schemeClr val="dk1"/>
+          </a:fillRef>
+          <a:effectRef idx="1">
+            <a:schemeClr val="dk1"/>
+          </a:effectRef>
+          <a:fontRef idx="minor">
+            <a:schemeClr val="tx1"/>
+          </a:fontRef>
+        </p:style>
+      </p:cxnSp>
+      <p:cxnSp>
+        <p:nvCxnSpPr>
+          <p:cNvPr id="35" name="Gerader Verbinder 34">
+            <a:extLst>
+              <a:ext uri="{FF2B5EF4-FFF2-40B4-BE49-F238E27FC236}">
+                <a16:creationId xmlns:a16="http://schemas.microsoft.com/office/drawing/2014/main" id="{A06CE8BF-6B23-3854-3365-1F09E7B9CE2D}"/>
+              </a:ext>
+            </a:extLst>
+          </p:cNvPr>
+          <p:cNvCxnSpPr/>
+          <p:nvPr/>
+        </p:nvCxnSpPr>
+        <p:spPr>
+          <a:xfrm>
+            <a:off x="3668820" y="1255897"/>
+            <a:ext cx="84147" cy="3658301"/>
+          </a:xfrm>
+          <a:prstGeom prst="line">
+            <a:avLst/>
+          </a:prstGeom>
+          <a:ln w="9525"/>
+        </p:spPr>
+        <p:style>
+          <a:lnRef idx="1">
+            <a:schemeClr val="dk1"/>
+          </a:lnRef>
+          <a:fillRef idx="0">
+            <a:schemeClr val="dk1"/>
+          </a:fillRef>
+          <a:effectRef idx="0">
+            <a:schemeClr val="dk1"/>
+          </a:effectRef>
+          <a:fontRef idx="minor">
+            <a:schemeClr val="tx1"/>
+          </a:fontRef>
+        </p:style>
+      </p:cxnSp>
+      <p:cxnSp>
+        <p:nvCxnSpPr>
+          <p:cNvPr id="37" name="Gerader Verbinder 36">
+            <a:extLst>
+              <a:ext uri="{FF2B5EF4-FFF2-40B4-BE49-F238E27FC236}">
+                <a16:creationId xmlns:a16="http://schemas.microsoft.com/office/drawing/2014/main" id="{3A3F9B94-D591-4722-1FC8-59E12584B3AE}"/>
+              </a:ext>
+            </a:extLst>
+          </p:cNvPr>
+          <p:cNvCxnSpPr/>
+          <p:nvPr/>
+        </p:nvCxnSpPr>
+        <p:spPr>
+          <a:xfrm flipV="1">
+            <a:off x="3769797" y="4447882"/>
+            <a:ext cx="1385623" cy="443878"/>
+          </a:xfrm>
+          <a:prstGeom prst="line">
+            <a:avLst/>
+          </a:prstGeom>
+          <a:ln w="9525"/>
+        </p:spPr>
+        <p:style>
+          <a:lnRef idx="1">
+            <a:schemeClr val="dk1"/>
+          </a:lnRef>
+          <a:fillRef idx="0">
+            <a:schemeClr val="dk1"/>
+          </a:fillRef>
+          <a:effectRef idx="0">
+            <a:schemeClr val="dk1"/>
+          </a:effectRef>
+          <a:fontRef idx="minor">
+            <a:schemeClr val="tx1"/>
+          </a:fontRef>
+        </p:style>
+      </p:cxnSp>
+      <p:cxnSp>
+        <p:nvCxnSpPr>
+          <p:cNvPr id="2" name="Gerade Verbindung mit Pfeil 1">
+            <a:extLst>
+              <a:ext uri="{FF2B5EF4-FFF2-40B4-BE49-F238E27FC236}">
+                <a16:creationId xmlns:a16="http://schemas.microsoft.com/office/drawing/2014/main" id="{679D061E-4B24-50EA-0173-A03E5699E4FF}"/>
+              </a:ext>
+            </a:extLst>
+          </p:cNvPr>
+          <p:cNvCxnSpPr>
+            <a:cxnSpLocks/>
+          </p:cNvCxnSpPr>
+          <p:nvPr/>
+        </p:nvCxnSpPr>
+        <p:spPr>
+          <a:xfrm flipV="1">
+            <a:off x="1757479" y="4286746"/>
+            <a:ext cx="333375" cy="461963"/>
+          </a:xfrm>
+          <a:prstGeom prst="straightConnector1">
+            <a:avLst/>
+          </a:prstGeom>
+          <a:ln w="9525">
+            <a:headEnd w="lg" len="lg"/>
+            <a:tailEnd type="stealth" w="lg" len="lg"/>
+          </a:ln>
+        </p:spPr>
+        <p:style>
+          <a:lnRef idx="1">
+            <a:schemeClr val="dk1"/>
+          </a:lnRef>
+          <a:fillRef idx="0">
+            <a:schemeClr val="dk1"/>
+          </a:fillRef>
+          <a:effectRef idx="0">
+            <a:schemeClr val="dk1"/>
+          </a:effectRef>
+          <a:fontRef idx="minor">
+            <a:schemeClr val="tx1"/>
+          </a:fontRef>
+        </p:style>
+      </p:cxnSp>
+    </p:spTree>
+    <p:extLst>
+      <p:ext uri="{BB962C8B-B14F-4D97-AF65-F5344CB8AC3E}">
+        <p14:creationId xmlns:p14="http://schemas.microsoft.com/office/powerpoint/2010/main" val="1178704449"/>
+      </p:ext>
+    </p:extLst>
+  </p:cSld>
+  <p:clrMapOvr>
+    <a:masterClrMapping/>
+  </p:clrMapOvr>
+</p:sld>
+</file>
+
+<file path=ppt/slides/slide6.xml><?xml version="1.0" encoding="utf-8"?>
+<p:sld xmlns:a="http://schemas.openxmlformats.org/drawingml/2006/main" xmlns:r="http://schemas.openxmlformats.org/officeDocument/2006/relationships" xmlns:p="http://schemas.openxmlformats.org/presentationml/2006/main">
+  <p:cSld>
+    <p:spTree>
+      <p:nvGrpSpPr>
+        <p:cNvPr id="1" name=""/>
+        <p:cNvGrpSpPr/>
+        <p:nvPr/>
+      </p:nvGrpSpPr>
+      <p:grpSpPr>
+        <a:xfrm>
+          <a:off x="0" y="0"/>
+          <a:ext cx="0" cy="0"/>
+          <a:chOff x="0" y="0"/>
+          <a:chExt cx="0" cy="0"/>
+        </a:xfrm>
+      </p:grpSpPr>
       <p:pic>
         <p:nvPicPr>
           <p:cNvPr id="5" name="Grafik 4" descr="Ein Bild, das Text, Screenshot, Kreis, Schrift enthält.&#10;&#10;Automatisch generierte Beschreibung">
@@ -5531,6 +5635,204 @@
     <p:extLst>
       <p:ext uri="{BB962C8B-B14F-4D97-AF65-F5344CB8AC3E}">
         <p14:creationId xmlns:p14="http://schemas.microsoft.com/office/powerpoint/2010/main" val="1268346369"/>
+      </p:ext>
+    </p:extLst>
+  </p:cSld>
+  <p:clrMapOvr>
+    <a:masterClrMapping/>
+  </p:clrMapOvr>
+</p:sld>
+</file>
+
+<file path=ppt/slides/slide7.xml><?xml version="1.0" encoding="utf-8"?>
+<p:sld xmlns:a="http://schemas.openxmlformats.org/drawingml/2006/main" xmlns:r="http://schemas.openxmlformats.org/officeDocument/2006/relationships" xmlns:p="http://schemas.openxmlformats.org/presentationml/2006/main">
+  <p:cSld>
+    <p:spTree>
+      <p:nvGrpSpPr>
+        <p:cNvPr id="1" name=""/>
+        <p:cNvGrpSpPr/>
+        <p:nvPr/>
+      </p:nvGrpSpPr>
+      <p:grpSpPr>
+        <a:xfrm>
+          <a:off x="0" y="0"/>
+          <a:ext cx="0" cy="0"/>
+          <a:chOff x="0" y="0"/>
+          <a:chExt cx="0" cy="0"/>
+        </a:xfrm>
+      </p:grpSpPr>
+      <p:sp>
+        <p:nvSpPr>
+          <p:cNvPr id="4" name="Rechteck: abgerundete Ecken 3">
+            <a:extLst>
+              <a:ext uri="{FF2B5EF4-FFF2-40B4-BE49-F238E27FC236}">
+                <a16:creationId xmlns:a16="http://schemas.microsoft.com/office/drawing/2014/main" id="{D581A684-B317-BCD1-749C-E7D0DEAB183F}"/>
+              </a:ext>
+            </a:extLst>
+          </p:cNvPr>
+          <p:cNvSpPr/>
+          <p:nvPr/>
+        </p:nvSpPr>
+        <p:spPr>
+          <a:xfrm>
+            <a:off x="4380614" y="2200941"/>
+            <a:ext cx="3476846" cy="398720"/>
+          </a:xfrm>
+          <a:prstGeom prst="roundRect">
+            <a:avLst>
+              <a:gd name="adj" fmla="val 50000"/>
+            </a:avLst>
+          </a:prstGeom>
+          <a:solidFill>
+            <a:srgbClr val="0070C0"/>
+          </a:solidFill>
+          <a:ln>
+            <a:solidFill>
+              <a:srgbClr val="0070C0"/>
+            </a:solidFill>
+          </a:ln>
+        </p:spPr>
+        <p:style>
+          <a:lnRef idx="2">
+            <a:schemeClr val="accent1">
+              <a:shade val="15000"/>
+            </a:schemeClr>
+          </a:lnRef>
+          <a:fillRef idx="1">
+            <a:schemeClr val="accent1"/>
+          </a:fillRef>
+          <a:effectRef idx="0">
+            <a:schemeClr val="accent1"/>
+          </a:effectRef>
+          <a:fontRef idx="minor">
+            <a:schemeClr val="lt1"/>
+          </a:fontRef>
+        </p:style>
+        <p:txBody>
+          <a:bodyPr rtlCol="0" anchor="ctr"/>
+          <a:lstStyle/>
+          <a:p>
+            <a:pPr algn="ctr"/>
+            <a:endParaRPr lang="de-AT"/>
+          </a:p>
+        </p:txBody>
+      </p:sp>
+      <p:sp>
+        <p:nvSpPr>
+          <p:cNvPr id="5" name="Rechteck: abgerundete Ecken 4">
+            <a:extLst>
+              <a:ext uri="{FF2B5EF4-FFF2-40B4-BE49-F238E27FC236}">
+                <a16:creationId xmlns:a16="http://schemas.microsoft.com/office/drawing/2014/main" id="{75A51632-564E-359E-DDD8-3AC9A8C75A35}"/>
+              </a:ext>
+            </a:extLst>
+          </p:cNvPr>
+          <p:cNvSpPr/>
+          <p:nvPr/>
+        </p:nvSpPr>
+        <p:spPr>
+          <a:xfrm>
+            <a:off x="4380614" y="3156100"/>
+            <a:ext cx="3476846" cy="398720"/>
+          </a:xfrm>
+          <a:prstGeom prst="roundRect">
+            <a:avLst>
+              <a:gd name="adj" fmla="val 50000"/>
+            </a:avLst>
+          </a:prstGeom>
+          <a:solidFill>
+            <a:srgbClr val="0070C0"/>
+          </a:solidFill>
+          <a:ln>
+            <a:solidFill>
+              <a:srgbClr val="0070C0"/>
+            </a:solidFill>
+          </a:ln>
+        </p:spPr>
+        <p:style>
+          <a:lnRef idx="2">
+            <a:schemeClr val="accent1">
+              <a:shade val="15000"/>
+            </a:schemeClr>
+          </a:lnRef>
+          <a:fillRef idx="1">
+            <a:schemeClr val="accent1"/>
+          </a:fillRef>
+          <a:effectRef idx="0">
+            <a:schemeClr val="accent1"/>
+          </a:effectRef>
+          <a:fontRef idx="minor">
+            <a:schemeClr val="lt1"/>
+          </a:fontRef>
+        </p:style>
+        <p:txBody>
+          <a:bodyPr rtlCol="0" anchor="ctr"/>
+          <a:lstStyle/>
+          <a:p>
+            <a:pPr algn="ctr"/>
+            <a:endParaRPr lang="de-AT"/>
+          </a:p>
+        </p:txBody>
+      </p:sp>
+      <p:sp>
+        <p:nvSpPr>
+          <p:cNvPr id="6" name="Rechteck: abgerundete Ecken 5">
+            <a:extLst>
+              <a:ext uri="{FF2B5EF4-FFF2-40B4-BE49-F238E27FC236}">
+                <a16:creationId xmlns:a16="http://schemas.microsoft.com/office/drawing/2014/main" id="{EE523258-8D63-A4E8-2E0F-5F22BA861A78}"/>
+              </a:ext>
+            </a:extLst>
+          </p:cNvPr>
+          <p:cNvSpPr/>
+          <p:nvPr/>
+        </p:nvSpPr>
+        <p:spPr>
+          <a:xfrm>
+            <a:off x="4380614" y="4150243"/>
+            <a:ext cx="3476846" cy="398720"/>
+          </a:xfrm>
+          <a:prstGeom prst="roundRect">
+            <a:avLst>
+              <a:gd name="adj" fmla="val 50000"/>
+            </a:avLst>
+          </a:prstGeom>
+          <a:solidFill>
+            <a:srgbClr val="0070C0"/>
+          </a:solidFill>
+          <a:ln>
+            <a:solidFill>
+              <a:srgbClr val="0070C0"/>
+            </a:solidFill>
+          </a:ln>
+        </p:spPr>
+        <p:style>
+          <a:lnRef idx="2">
+            <a:schemeClr val="accent1">
+              <a:shade val="15000"/>
+            </a:schemeClr>
+          </a:lnRef>
+          <a:fillRef idx="1">
+            <a:schemeClr val="accent1"/>
+          </a:fillRef>
+          <a:effectRef idx="0">
+            <a:schemeClr val="accent1"/>
+          </a:effectRef>
+          <a:fontRef idx="minor">
+            <a:schemeClr val="lt1"/>
+          </a:fontRef>
+        </p:style>
+        <p:txBody>
+          <a:bodyPr rtlCol="0" anchor="ctr"/>
+          <a:lstStyle/>
+          <a:p>
+            <a:pPr algn="ctr"/>
+            <a:endParaRPr lang="de-AT"/>
+          </a:p>
+        </p:txBody>
+      </p:sp>
+    </p:spTree>
+    <p:extLst>
+      <p:ext uri="{BB962C8B-B14F-4D97-AF65-F5344CB8AC3E}">
+        <p14:creationId xmlns:p14="http://schemas.microsoft.com/office/powerpoint/2010/main" val="2002859208"/>
       </p:ext>
     </p:extLst>
   </p:cSld>

</xml_diff>

<commit_message>
icon getestet - Zuteilung der Adressen für Knoten im Peer-to-Peer-System
</commit_message>
<xml_diff>
--- a/prototyp/symbole_und_farben.pptx
+++ b/prototyp/symbole_und_farben.pptx
@@ -5,13 +5,15 @@
     <p:sldMasterId id="2147483648" r:id="rId1"/>
   </p:sldMasterIdLst>
   <p:sldIdLst>
-    <p:sldId id="265" r:id="rId2"/>
-    <p:sldId id="256" r:id="rId3"/>
-    <p:sldId id="259" r:id="rId4"/>
-    <p:sldId id="263" r:id="rId5"/>
-    <p:sldId id="262" r:id="rId6"/>
-    <p:sldId id="261" r:id="rId7"/>
-    <p:sldId id="264" r:id="rId8"/>
+    <p:sldId id="266" r:id="rId2"/>
+    <p:sldId id="267" r:id="rId3"/>
+    <p:sldId id="265" r:id="rId4"/>
+    <p:sldId id="256" r:id="rId5"/>
+    <p:sldId id="259" r:id="rId6"/>
+    <p:sldId id="263" r:id="rId7"/>
+    <p:sldId id="262" r:id="rId8"/>
+    <p:sldId id="261" r:id="rId9"/>
+    <p:sldId id="264" r:id="rId10"/>
   </p:sldIdLst>
   <p:sldSz cx="12192000" cy="6858000"/>
   <p:notesSz cx="6858000" cy="9144000"/>
@@ -267,7 +269,7 @@
           <a:p>
             <a:fld id="{B52076B9-41B9-4289-B1FF-FFD8BCB4D7C3}" type="datetimeFigureOut">
               <a:rPr lang="de-AT" smtClean="0"/>
-              <a:t>13.05.2024</a:t>
+              <a:t>16.05.2024</a:t>
             </a:fld>
             <a:endParaRPr lang="de-AT"/>
           </a:p>
@@ -467,7 +469,7 @@
           <a:p>
             <a:fld id="{B52076B9-41B9-4289-B1FF-FFD8BCB4D7C3}" type="datetimeFigureOut">
               <a:rPr lang="de-AT" smtClean="0"/>
-              <a:t>13.05.2024</a:t>
+              <a:t>16.05.2024</a:t>
             </a:fld>
             <a:endParaRPr lang="de-AT"/>
           </a:p>
@@ -677,7 +679,7 @@
           <a:p>
             <a:fld id="{B52076B9-41B9-4289-B1FF-FFD8BCB4D7C3}" type="datetimeFigureOut">
               <a:rPr lang="de-AT" smtClean="0"/>
-              <a:t>13.05.2024</a:t>
+              <a:t>16.05.2024</a:t>
             </a:fld>
             <a:endParaRPr lang="de-AT"/>
           </a:p>
@@ -877,7 +879,7 @@
           <a:p>
             <a:fld id="{B52076B9-41B9-4289-B1FF-FFD8BCB4D7C3}" type="datetimeFigureOut">
               <a:rPr lang="de-AT" smtClean="0"/>
-              <a:t>13.05.2024</a:t>
+              <a:t>16.05.2024</a:t>
             </a:fld>
             <a:endParaRPr lang="de-AT"/>
           </a:p>
@@ -1153,7 +1155,7 @@
           <a:p>
             <a:fld id="{B52076B9-41B9-4289-B1FF-FFD8BCB4D7C3}" type="datetimeFigureOut">
               <a:rPr lang="de-AT" smtClean="0"/>
-              <a:t>13.05.2024</a:t>
+              <a:t>16.05.2024</a:t>
             </a:fld>
             <a:endParaRPr lang="de-AT"/>
           </a:p>
@@ -1421,7 +1423,7 @@
           <a:p>
             <a:fld id="{B52076B9-41B9-4289-B1FF-FFD8BCB4D7C3}" type="datetimeFigureOut">
               <a:rPr lang="de-AT" smtClean="0"/>
-              <a:t>13.05.2024</a:t>
+              <a:t>16.05.2024</a:t>
             </a:fld>
             <a:endParaRPr lang="de-AT"/>
           </a:p>
@@ -1836,7 +1838,7 @@
           <a:p>
             <a:fld id="{B52076B9-41B9-4289-B1FF-FFD8BCB4D7C3}" type="datetimeFigureOut">
               <a:rPr lang="de-AT" smtClean="0"/>
-              <a:t>13.05.2024</a:t>
+              <a:t>16.05.2024</a:t>
             </a:fld>
             <a:endParaRPr lang="de-AT"/>
           </a:p>
@@ -1978,7 +1980,7 @@
           <a:p>
             <a:fld id="{B52076B9-41B9-4289-B1FF-FFD8BCB4D7C3}" type="datetimeFigureOut">
               <a:rPr lang="de-AT" smtClean="0"/>
-              <a:t>13.05.2024</a:t>
+              <a:t>16.05.2024</a:t>
             </a:fld>
             <a:endParaRPr lang="de-AT"/>
           </a:p>
@@ -2091,7 +2093,7 @@
           <a:p>
             <a:fld id="{B52076B9-41B9-4289-B1FF-FFD8BCB4D7C3}" type="datetimeFigureOut">
               <a:rPr lang="de-AT" smtClean="0"/>
-              <a:t>13.05.2024</a:t>
+              <a:t>16.05.2024</a:t>
             </a:fld>
             <a:endParaRPr lang="de-AT"/>
           </a:p>
@@ -2404,7 +2406,7 @@
           <a:p>
             <a:fld id="{B52076B9-41B9-4289-B1FF-FFD8BCB4D7C3}" type="datetimeFigureOut">
               <a:rPr lang="de-AT" smtClean="0"/>
-              <a:t>13.05.2024</a:t>
+              <a:t>16.05.2024</a:t>
             </a:fld>
             <a:endParaRPr lang="de-AT"/>
           </a:p>
@@ -2693,7 +2695,7 @@
           <a:p>
             <a:fld id="{B52076B9-41B9-4289-B1FF-FFD8BCB4D7C3}" type="datetimeFigureOut">
               <a:rPr lang="de-AT" smtClean="0"/>
-              <a:t>13.05.2024</a:t>
+              <a:t>16.05.2024</a:t>
             </a:fld>
             <a:endParaRPr lang="de-AT"/>
           </a:p>
@@ -2936,7 +2938,7 @@
           <a:p>
             <a:fld id="{B52076B9-41B9-4289-B1FF-FFD8BCB4D7C3}" type="datetimeFigureOut">
               <a:rPr lang="de-AT" smtClean="0"/>
-              <a:t>13.05.2024</a:t>
+              <a:t>16.05.2024</a:t>
             </a:fld>
             <a:endParaRPr lang="de-AT"/>
           </a:p>
@@ -3353,82 +3355,591 @@
           <a:chExt cx="0" cy="0"/>
         </a:xfrm>
       </p:grpSpPr>
-      <p:pic>
-        <p:nvPicPr>
-          <p:cNvPr id="8" name="Grafik 7">
-            <a:extLst>
-              <a:ext uri="{FF2B5EF4-FFF2-40B4-BE49-F238E27FC236}">
-                <a16:creationId xmlns:a16="http://schemas.microsoft.com/office/drawing/2014/main" id="{9B1AB4DF-E8E7-D254-CAEA-FDB23F88DA3C}"/>
-              </a:ext>
-            </a:extLst>
-          </p:cNvPr>
-          <p:cNvPicPr>
-            <a:picLocks noChangeAspect="1"/>
-          </p:cNvPicPr>
-          <p:nvPr/>
-        </p:nvPicPr>
-        <p:blipFill>
-          <a:blip r:embed="rId2">
-            <a:extLst>
-              <a:ext uri="{96DAC541-7B7A-43D3-8B79-37D633B846F1}">
-                <asvg:svgBlip xmlns:asvg="http://schemas.microsoft.com/office/drawing/2016/SVG/main" r:embed="rId3"/>
-              </a:ext>
-            </a:extLst>
-          </a:blip>
-          <a:stretch>
-            <a:fillRect/>
-          </a:stretch>
-        </p:blipFill>
+      <p:sp>
+        <p:nvSpPr>
+          <p:cNvPr id="2" name="Rechteck: abgerundete Ecken 1">
+            <a:extLst>
+              <a:ext uri="{FF2B5EF4-FFF2-40B4-BE49-F238E27FC236}">
+                <a16:creationId xmlns:a16="http://schemas.microsoft.com/office/drawing/2014/main" id="{BC09CB24-47BF-A73F-0022-784DE2089263}"/>
+              </a:ext>
+            </a:extLst>
+          </p:cNvPr>
+          <p:cNvSpPr/>
+          <p:nvPr/>
+        </p:nvSpPr>
         <p:spPr>
           <a:xfrm>
-            <a:off x="1117767" y="1646032"/>
-            <a:ext cx="3551538" cy="3420000"/>
+            <a:off x="2955851" y="967563"/>
+            <a:ext cx="5401340" cy="5400000"/>
+          </a:xfrm>
+          <a:prstGeom prst="roundRect">
+            <a:avLst>
+              <a:gd name="adj" fmla="val 10494"/>
+            </a:avLst>
+          </a:prstGeom>
+          <a:solidFill>
+            <a:srgbClr val="D5E5C2"/>
+          </a:solidFill>
+          <a:ln w="76200"/>
+        </p:spPr>
+        <p:style>
+          <a:lnRef idx="2">
+            <a:schemeClr val="accent1">
+              <a:shade val="15000"/>
+            </a:schemeClr>
+          </a:lnRef>
+          <a:fillRef idx="1">
+            <a:schemeClr val="accent1"/>
+          </a:fillRef>
+          <a:effectRef idx="0">
+            <a:schemeClr val="accent1"/>
+          </a:effectRef>
+          <a:fontRef idx="minor">
+            <a:schemeClr val="lt1"/>
+          </a:fontRef>
+        </p:style>
+        <p:txBody>
+          <a:bodyPr rtlCol="0" anchor="ctr"/>
+          <a:lstStyle/>
+          <a:p>
+            <a:pPr algn="ctr"/>
+            <a:endParaRPr lang="de-AT" sz="17000" dirty="0">
+              <a:solidFill>
+                <a:srgbClr val="FF0000"/>
+              </a:solidFill>
+              <a:latin typeface="SquareSlab711 Lt BT" panose="02060506020206060203" pitchFamily="18" charset="0"/>
+            </a:endParaRPr>
+          </a:p>
+        </p:txBody>
+      </p:sp>
+      <p:sp>
+        <p:nvSpPr>
+          <p:cNvPr id="7" name="Rechteck 6">
+            <a:extLst>
+              <a:ext uri="{FF2B5EF4-FFF2-40B4-BE49-F238E27FC236}">
+                <a16:creationId xmlns:a16="http://schemas.microsoft.com/office/drawing/2014/main" id="{E3C20C71-AA25-C474-9364-6C32F0B291CA}"/>
+              </a:ext>
+            </a:extLst>
+          </p:cNvPr>
+          <p:cNvSpPr/>
+          <p:nvPr/>
+        </p:nvSpPr>
+        <p:spPr>
+          <a:xfrm>
+            <a:off x="5959549" y="1488558"/>
+            <a:ext cx="1685260" cy="2397642"/>
           </a:xfrm>
           <a:prstGeom prst="rect">
             <a:avLst/>
           </a:prstGeom>
-        </p:spPr>
-      </p:pic>
-      <p:pic>
-        <p:nvPicPr>
-          <p:cNvPr id="10" name="Grafik 9">
-            <a:extLst>
-              <a:ext uri="{FF2B5EF4-FFF2-40B4-BE49-F238E27FC236}">
-                <a16:creationId xmlns:a16="http://schemas.microsoft.com/office/drawing/2014/main" id="{316360F0-C34D-B3BC-C5C6-47299752FC83}"/>
-              </a:ext>
-            </a:extLst>
-          </p:cNvPr>
-          <p:cNvPicPr>
-            <a:picLocks noChangeAspect="1"/>
-          </p:cNvPicPr>
-          <p:nvPr/>
-        </p:nvPicPr>
-        <p:blipFill>
-          <a:blip r:embed="rId4">
-            <a:extLst>
-              <a:ext uri="{96DAC541-7B7A-43D3-8B79-37D633B846F1}">
-                <asvg:svgBlip xmlns:asvg="http://schemas.microsoft.com/office/drawing/2016/SVG/main" r:embed="rId5"/>
-              </a:ext>
-            </a:extLst>
-          </a:blip>
-          <a:stretch>
-            <a:fillRect/>
-          </a:stretch>
-        </p:blipFill>
+          <a:solidFill>
+            <a:schemeClr val="bg1"/>
+          </a:solidFill>
+          <a:ln w="76200">
+            <a:solidFill>
+              <a:schemeClr val="tx1"/>
+            </a:solidFill>
+          </a:ln>
+        </p:spPr>
+        <p:style>
+          <a:lnRef idx="2">
+            <a:schemeClr val="accent1">
+              <a:shade val="15000"/>
+            </a:schemeClr>
+          </a:lnRef>
+          <a:fillRef idx="1">
+            <a:schemeClr val="accent1"/>
+          </a:fillRef>
+          <a:effectRef idx="0">
+            <a:schemeClr val="accent1"/>
+          </a:effectRef>
+          <a:fontRef idx="minor">
+            <a:schemeClr val="lt1"/>
+          </a:fontRef>
+        </p:style>
+        <p:txBody>
+          <a:bodyPr rtlCol="0" anchor="ctr"/>
+          <a:lstStyle/>
+          <a:p>
+            <a:pPr algn="ctr"/>
+            <a:endParaRPr lang="de-AT"/>
+          </a:p>
+        </p:txBody>
+      </p:sp>
+      <p:sp>
+        <p:nvSpPr>
+          <p:cNvPr id="6" name="Rechteck 5">
+            <a:extLst>
+              <a:ext uri="{FF2B5EF4-FFF2-40B4-BE49-F238E27FC236}">
+                <a16:creationId xmlns:a16="http://schemas.microsoft.com/office/drawing/2014/main" id="{CE532A85-5F5F-C7EB-13B6-D8CF7AA3B8E0}"/>
+              </a:ext>
+            </a:extLst>
+          </p:cNvPr>
+          <p:cNvSpPr/>
+          <p:nvPr/>
+        </p:nvSpPr>
         <p:spPr>
           <a:xfrm>
-            <a:off x="6426460" y="1858086"/>
-            <a:ext cx="4104000" cy="3420000"/>
+            <a:off x="3615070" y="1488558"/>
+            <a:ext cx="1685260" cy="2397642"/>
           </a:xfrm>
           <a:prstGeom prst="rect">
             <a:avLst/>
           </a:prstGeom>
-        </p:spPr>
-      </p:pic>
+          <a:solidFill>
+            <a:schemeClr val="bg1"/>
+          </a:solidFill>
+          <a:ln w="76200">
+            <a:solidFill>
+              <a:schemeClr val="tx1"/>
+            </a:solidFill>
+          </a:ln>
+        </p:spPr>
+        <p:style>
+          <a:lnRef idx="2">
+            <a:schemeClr val="accent1">
+              <a:shade val="15000"/>
+            </a:schemeClr>
+          </a:lnRef>
+          <a:fillRef idx="1">
+            <a:schemeClr val="accent1"/>
+          </a:fillRef>
+          <a:effectRef idx="0">
+            <a:schemeClr val="accent1"/>
+          </a:effectRef>
+          <a:fontRef idx="minor">
+            <a:schemeClr val="lt1"/>
+          </a:fontRef>
+        </p:style>
+        <p:txBody>
+          <a:bodyPr rtlCol="0" anchor="ctr"/>
+          <a:lstStyle/>
+          <a:p>
+            <a:pPr algn="ctr"/>
+            <a:endParaRPr lang="de-AT"/>
+          </a:p>
+        </p:txBody>
+      </p:sp>
+      <p:sp>
+        <p:nvSpPr>
+          <p:cNvPr id="4" name="Textfeld 3">
+            <a:extLst>
+              <a:ext uri="{FF2B5EF4-FFF2-40B4-BE49-F238E27FC236}">
+                <a16:creationId xmlns:a16="http://schemas.microsoft.com/office/drawing/2014/main" id="{A96CAC5B-562F-81C7-C338-DEDBE172A843}"/>
+              </a:ext>
+            </a:extLst>
+          </p:cNvPr>
+          <p:cNvSpPr txBox="1"/>
+          <p:nvPr/>
+        </p:nvSpPr>
+        <p:spPr>
+          <a:xfrm>
+            <a:off x="3956641" y="1240672"/>
+            <a:ext cx="992815" cy="2862322"/>
+          </a:xfrm>
+          <a:prstGeom prst="rect">
+            <a:avLst/>
+          </a:prstGeom>
+          <a:noFill/>
+        </p:spPr>
+        <p:txBody>
+          <a:bodyPr wrap="square">
+            <a:spAutoFit/>
+          </a:bodyPr>
+          <a:lstStyle/>
+          <a:p>
+            <a:pPr algn="ctr"/>
+            <a:r>
+              <a:rPr lang="de-AT" sz="18000" dirty="0">
+                <a:solidFill>
+                  <a:srgbClr val="336117"/>
+                </a:solidFill>
+                <a:latin typeface="SquareSlab711 Lt BT" panose="02060506020206060203" pitchFamily="18" charset="0"/>
+              </a:rPr>
+              <a:t>B</a:t>
+            </a:r>
+          </a:p>
+        </p:txBody>
+      </p:sp>
+      <p:sp>
+        <p:nvSpPr>
+          <p:cNvPr id="5" name="Textfeld 4">
+            <a:extLst>
+              <a:ext uri="{FF2B5EF4-FFF2-40B4-BE49-F238E27FC236}">
+                <a16:creationId xmlns:a16="http://schemas.microsoft.com/office/drawing/2014/main" id="{42D5443E-C370-107E-75B1-9F8083C43B75}"/>
+              </a:ext>
+            </a:extLst>
+          </p:cNvPr>
+          <p:cNvSpPr txBox="1"/>
+          <p:nvPr/>
+        </p:nvSpPr>
+        <p:spPr>
+          <a:xfrm>
+            <a:off x="6301120" y="1240672"/>
+            <a:ext cx="992815" cy="2862322"/>
+          </a:xfrm>
+          <a:prstGeom prst="rect">
+            <a:avLst/>
+          </a:prstGeom>
+          <a:noFill/>
+        </p:spPr>
+        <p:txBody>
+          <a:bodyPr wrap="square">
+            <a:spAutoFit/>
+          </a:bodyPr>
+          <a:lstStyle/>
+          <a:p>
+            <a:pPr algn="ctr"/>
+            <a:r>
+              <a:rPr lang="de-AT" sz="18000" dirty="0">
+                <a:solidFill>
+                  <a:srgbClr val="336117"/>
+                </a:solidFill>
+                <a:latin typeface="SquareSlab711 Lt BT" panose="02060506020206060203" pitchFamily="18" charset="0"/>
+              </a:rPr>
+              <a:t>C</a:t>
+            </a:r>
+          </a:p>
+        </p:txBody>
+      </p:sp>
+      <p:sp>
+        <p:nvSpPr>
+          <p:cNvPr id="8" name="Rechteck: abgerundete Ecken 7">
+            <a:extLst>
+              <a:ext uri="{FF2B5EF4-FFF2-40B4-BE49-F238E27FC236}">
+                <a16:creationId xmlns:a16="http://schemas.microsoft.com/office/drawing/2014/main" id="{0FCA1F9D-D0F7-8A28-51B3-6453C9338E50}"/>
+              </a:ext>
+            </a:extLst>
+          </p:cNvPr>
+          <p:cNvSpPr/>
+          <p:nvPr/>
+        </p:nvSpPr>
+        <p:spPr>
+          <a:xfrm>
+            <a:off x="5004168" y="5042489"/>
+            <a:ext cx="1242237" cy="653903"/>
+          </a:xfrm>
+          <a:prstGeom prst="roundRect">
+            <a:avLst>
+              <a:gd name="adj" fmla="val 45122"/>
+            </a:avLst>
+          </a:prstGeom>
+          <a:noFill/>
+          <a:ln w="76200">
+            <a:solidFill>
+              <a:schemeClr val="tx1"/>
+            </a:solidFill>
+          </a:ln>
+        </p:spPr>
+        <p:style>
+          <a:lnRef idx="2">
+            <a:schemeClr val="accent1">
+              <a:shade val="15000"/>
+            </a:schemeClr>
+          </a:lnRef>
+          <a:fillRef idx="1">
+            <a:schemeClr val="accent1"/>
+          </a:fillRef>
+          <a:effectRef idx="0">
+            <a:schemeClr val="accent1"/>
+          </a:effectRef>
+          <a:fontRef idx="minor">
+            <a:schemeClr val="lt1"/>
+          </a:fontRef>
+        </p:style>
+        <p:txBody>
+          <a:bodyPr rtlCol="0" anchor="ctr"/>
+          <a:lstStyle/>
+          <a:p>
+            <a:pPr algn="ctr"/>
+            <a:endParaRPr lang="de-AT"/>
+          </a:p>
+        </p:txBody>
+      </p:sp>
+      <p:sp>
+        <p:nvSpPr>
+          <p:cNvPr id="9" name="Rechteck: abgerundete Ecken 8">
+            <a:extLst>
+              <a:ext uri="{FF2B5EF4-FFF2-40B4-BE49-F238E27FC236}">
+                <a16:creationId xmlns:a16="http://schemas.microsoft.com/office/drawing/2014/main" id="{BDB4102E-1B20-BB68-834E-D0FFE2291398}"/>
+              </a:ext>
+            </a:extLst>
+          </p:cNvPr>
+          <p:cNvSpPr/>
+          <p:nvPr/>
+        </p:nvSpPr>
+        <p:spPr>
+          <a:xfrm rot="5400000">
+            <a:off x="6176407" y="4558039"/>
+            <a:ext cx="1242237" cy="653903"/>
+          </a:xfrm>
+          <a:prstGeom prst="roundRect">
+            <a:avLst>
+              <a:gd name="adj" fmla="val 45122"/>
+            </a:avLst>
+          </a:prstGeom>
+          <a:noFill/>
+          <a:ln w="76200">
+            <a:solidFill>
+              <a:schemeClr val="tx1"/>
+            </a:solidFill>
+          </a:ln>
+        </p:spPr>
+        <p:style>
+          <a:lnRef idx="2">
+            <a:schemeClr val="accent1">
+              <a:shade val="15000"/>
+            </a:schemeClr>
+          </a:lnRef>
+          <a:fillRef idx="1">
+            <a:schemeClr val="accent1"/>
+          </a:fillRef>
+          <a:effectRef idx="0">
+            <a:schemeClr val="accent1"/>
+          </a:effectRef>
+          <a:fontRef idx="minor">
+            <a:schemeClr val="lt1"/>
+          </a:fontRef>
+        </p:style>
+        <p:txBody>
+          <a:bodyPr rtlCol="0" anchor="ctr"/>
+          <a:lstStyle/>
+          <a:p>
+            <a:pPr algn="ctr"/>
+            <a:endParaRPr lang="de-AT"/>
+          </a:p>
+        </p:txBody>
+      </p:sp>
+      <p:sp>
+        <p:nvSpPr>
+          <p:cNvPr id="10" name="Rechteck: abgerundete Ecken 9">
+            <a:extLst>
+              <a:ext uri="{FF2B5EF4-FFF2-40B4-BE49-F238E27FC236}">
+                <a16:creationId xmlns:a16="http://schemas.microsoft.com/office/drawing/2014/main" id="{E8910211-87AA-C83A-72D8-5EDC94ED9596}"/>
+              </a:ext>
+            </a:extLst>
+          </p:cNvPr>
+          <p:cNvSpPr/>
+          <p:nvPr/>
+        </p:nvSpPr>
+        <p:spPr>
+          <a:xfrm rot="5400000">
+            <a:off x="3831929" y="4558817"/>
+            <a:ext cx="1242237" cy="653903"/>
+          </a:xfrm>
+          <a:prstGeom prst="roundRect">
+            <a:avLst>
+              <a:gd name="adj" fmla="val 45122"/>
+            </a:avLst>
+          </a:prstGeom>
+          <a:noFill/>
+          <a:ln w="76200">
+            <a:solidFill>
+              <a:schemeClr val="tx1"/>
+            </a:solidFill>
+          </a:ln>
+        </p:spPr>
+        <p:style>
+          <a:lnRef idx="2">
+            <a:schemeClr val="accent1">
+              <a:shade val="15000"/>
+            </a:schemeClr>
+          </a:lnRef>
+          <a:fillRef idx="1">
+            <a:schemeClr val="accent1"/>
+          </a:fillRef>
+          <a:effectRef idx="0">
+            <a:schemeClr val="accent1"/>
+          </a:effectRef>
+          <a:fontRef idx="minor">
+            <a:schemeClr val="lt1"/>
+          </a:fontRef>
+        </p:style>
+        <p:txBody>
+          <a:bodyPr rtlCol="0" anchor="ctr"/>
+          <a:lstStyle/>
+          <a:p>
+            <a:pPr algn="ctr"/>
+            <a:endParaRPr lang="de-AT"/>
+          </a:p>
+        </p:txBody>
+      </p:sp>
+      <p:cxnSp>
+        <p:nvCxnSpPr>
+          <p:cNvPr id="12" name="Gerader Verbinder 11">
+            <a:extLst>
+              <a:ext uri="{FF2B5EF4-FFF2-40B4-BE49-F238E27FC236}">
+                <a16:creationId xmlns:a16="http://schemas.microsoft.com/office/drawing/2014/main" id="{11C9D5CD-EB88-D3A2-8679-8C32C525FA4F}"/>
+              </a:ext>
+            </a:extLst>
+          </p:cNvPr>
+          <p:cNvCxnSpPr>
+            <a:cxnSpLocks/>
+          </p:cNvCxnSpPr>
+          <p:nvPr/>
+        </p:nvCxnSpPr>
+        <p:spPr>
+          <a:xfrm>
+            <a:off x="4453048" y="3886200"/>
+            <a:ext cx="0" cy="930349"/>
+          </a:xfrm>
+          <a:prstGeom prst="line">
+            <a:avLst/>
+          </a:prstGeom>
+          <a:ln w="76200">
+            <a:solidFill>
+              <a:schemeClr val="tx1"/>
+            </a:solidFill>
+          </a:ln>
+        </p:spPr>
+        <p:style>
+          <a:lnRef idx="2">
+            <a:schemeClr val="accent1"/>
+          </a:lnRef>
+          <a:fillRef idx="0">
+            <a:schemeClr val="accent1"/>
+          </a:fillRef>
+          <a:effectRef idx="1">
+            <a:schemeClr val="accent1"/>
+          </a:effectRef>
+          <a:fontRef idx="minor">
+            <a:schemeClr val="tx1"/>
+          </a:fontRef>
+        </p:style>
+      </p:cxnSp>
+      <p:cxnSp>
+        <p:nvCxnSpPr>
+          <p:cNvPr id="13" name="Gerader Verbinder 12">
+            <a:extLst>
+              <a:ext uri="{FF2B5EF4-FFF2-40B4-BE49-F238E27FC236}">
+                <a16:creationId xmlns:a16="http://schemas.microsoft.com/office/drawing/2014/main" id="{9F815772-6D0E-B477-6064-C49D547ECFBF}"/>
+              </a:ext>
+            </a:extLst>
+          </p:cNvPr>
+          <p:cNvCxnSpPr>
+            <a:cxnSpLocks/>
+          </p:cNvCxnSpPr>
+          <p:nvPr/>
+        </p:nvCxnSpPr>
+        <p:spPr>
+          <a:xfrm flipH="1">
+            <a:off x="6797525" y="3884644"/>
+            <a:ext cx="1" cy="931905"/>
+          </a:xfrm>
+          <a:prstGeom prst="line">
+            <a:avLst/>
+          </a:prstGeom>
+          <a:ln w="76200">
+            <a:solidFill>
+              <a:schemeClr val="tx1"/>
+            </a:solidFill>
+          </a:ln>
+        </p:spPr>
+        <p:style>
+          <a:lnRef idx="2">
+            <a:schemeClr val="accent1"/>
+          </a:lnRef>
+          <a:fillRef idx="0">
+            <a:schemeClr val="accent1"/>
+          </a:fillRef>
+          <a:effectRef idx="1">
+            <a:schemeClr val="accent1"/>
+          </a:effectRef>
+          <a:fontRef idx="minor">
+            <a:schemeClr val="tx1"/>
+          </a:fontRef>
+        </p:style>
+      </p:cxnSp>
+      <p:cxnSp>
+        <p:nvCxnSpPr>
+          <p:cNvPr id="14" name="Gerader Verbinder 13">
+            <a:extLst>
+              <a:ext uri="{FF2B5EF4-FFF2-40B4-BE49-F238E27FC236}">
+                <a16:creationId xmlns:a16="http://schemas.microsoft.com/office/drawing/2014/main" id="{72EBE02A-034C-5489-27C7-A813B37E9077}"/>
+              </a:ext>
+            </a:extLst>
+          </p:cNvPr>
+          <p:cNvCxnSpPr>
+            <a:cxnSpLocks/>
+          </p:cNvCxnSpPr>
+          <p:nvPr/>
+        </p:nvCxnSpPr>
+        <p:spPr>
+          <a:xfrm flipH="1">
+            <a:off x="5805377" y="5039055"/>
+            <a:ext cx="992147" cy="330385"/>
+          </a:xfrm>
+          <a:prstGeom prst="line">
+            <a:avLst/>
+          </a:prstGeom>
+          <a:ln w="76200">
+            <a:solidFill>
+              <a:schemeClr val="tx1"/>
+            </a:solidFill>
+          </a:ln>
+        </p:spPr>
+        <p:style>
+          <a:lnRef idx="2">
+            <a:schemeClr val="accent1"/>
+          </a:lnRef>
+          <a:fillRef idx="0">
+            <a:schemeClr val="accent1"/>
+          </a:fillRef>
+          <a:effectRef idx="1">
+            <a:schemeClr val="accent1"/>
+          </a:effectRef>
+          <a:fontRef idx="minor">
+            <a:schemeClr val="tx1"/>
+          </a:fontRef>
+        </p:style>
+      </p:cxnSp>
+      <p:cxnSp>
+        <p:nvCxnSpPr>
+          <p:cNvPr id="17" name="Gerader Verbinder 16">
+            <a:extLst>
+              <a:ext uri="{FF2B5EF4-FFF2-40B4-BE49-F238E27FC236}">
+                <a16:creationId xmlns:a16="http://schemas.microsoft.com/office/drawing/2014/main" id="{BB2F3107-8EF8-2682-E346-E878B9743FEE}"/>
+              </a:ext>
+            </a:extLst>
+          </p:cNvPr>
+          <p:cNvCxnSpPr>
+            <a:cxnSpLocks/>
+          </p:cNvCxnSpPr>
+          <p:nvPr/>
+        </p:nvCxnSpPr>
+        <p:spPr>
+          <a:xfrm>
+            <a:off x="4443082" y="5039055"/>
+            <a:ext cx="1035343" cy="330385"/>
+          </a:xfrm>
+          <a:prstGeom prst="line">
+            <a:avLst/>
+          </a:prstGeom>
+          <a:ln w="76200">
+            <a:solidFill>
+              <a:schemeClr val="tx1"/>
+            </a:solidFill>
+          </a:ln>
+        </p:spPr>
+        <p:style>
+          <a:lnRef idx="2">
+            <a:schemeClr val="accent1"/>
+          </a:lnRef>
+          <a:fillRef idx="0">
+            <a:schemeClr val="accent1"/>
+          </a:fillRef>
+          <a:effectRef idx="1">
+            <a:schemeClr val="accent1"/>
+          </a:effectRef>
+          <a:fontRef idx="minor">
+            <a:schemeClr val="tx1"/>
+          </a:fontRef>
+        </p:style>
+      </p:cxnSp>
     </p:spTree>
     <p:extLst>
       <p:ext uri="{BB962C8B-B14F-4D97-AF65-F5344CB8AC3E}">
-        <p14:creationId xmlns:p14="http://schemas.microsoft.com/office/powerpoint/2010/main" val="4144257889"/>
+        <p14:creationId xmlns:p14="http://schemas.microsoft.com/office/powerpoint/2010/main" val="2577280802"/>
       </p:ext>
     </p:extLst>
   </p:cSld>
@@ -3457,10 +3968,10 @@
       </p:grpSpPr>
       <p:sp>
         <p:nvSpPr>
-          <p:cNvPr id="4" name="Ellipse 3">
-            <a:extLst>
-              <a:ext uri="{FF2B5EF4-FFF2-40B4-BE49-F238E27FC236}">
-                <a16:creationId xmlns:a16="http://schemas.microsoft.com/office/drawing/2014/main" id="{501A0FE4-DB83-169F-053E-C81E177DE4BF}"/>
+          <p:cNvPr id="2" name="Rechteck: abgerundete Ecken 1">
+            <a:extLst>
+              <a:ext uri="{FF2B5EF4-FFF2-40B4-BE49-F238E27FC236}">
+                <a16:creationId xmlns:a16="http://schemas.microsoft.com/office/drawing/2014/main" id="{BC09CB24-47BF-A73F-0022-784DE2089263}"/>
               </a:ext>
             </a:extLst>
           </p:cNvPr>
@@ -3469,18 +3980,18 @@
         </p:nvSpPr>
         <p:spPr>
           <a:xfrm>
-            <a:off x="3902148" y="2292618"/>
-            <a:ext cx="3240000" cy="3240000"/>
-          </a:xfrm>
-          <a:prstGeom prst="ellipse">
-            <a:avLst/>
-          </a:prstGeom>
-          <a:noFill/>
-          <a:ln w="114300">
-            <a:solidFill>
-              <a:srgbClr val="ED3C0B"/>
-            </a:solidFill>
-          </a:ln>
+            <a:off x="2902079" y="839973"/>
+            <a:ext cx="5508000" cy="5508000"/>
+          </a:xfrm>
+          <a:prstGeom prst="roundRect">
+            <a:avLst>
+              <a:gd name="adj" fmla="val 10494"/>
+            </a:avLst>
+          </a:prstGeom>
+          <a:solidFill>
+            <a:srgbClr val="D5E5C2"/>
+          </a:solidFill>
+          <a:ln w="133350"/>
         </p:spPr>
         <p:style>
           <a:lnRef idx="2">
@@ -3503,16 +4014,21 @@
           <a:lstStyle/>
           <a:p>
             <a:pPr algn="ctr"/>
-            <a:endParaRPr lang="de-AT"/>
-          </a:p>
-        </p:txBody>
-      </p:sp>
-      <p:sp>
-        <p:nvSpPr>
-          <p:cNvPr id="5" name="Ellipse 4">
-            <a:extLst>
-              <a:ext uri="{FF2B5EF4-FFF2-40B4-BE49-F238E27FC236}">
-                <a16:creationId xmlns:a16="http://schemas.microsoft.com/office/drawing/2014/main" id="{5CBF1A37-1023-CFF2-5D23-7183F1F6EFFA}"/>
+            <a:endParaRPr lang="de-AT" sz="17000" dirty="0">
+              <a:solidFill>
+                <a:srgbClr val="FF0000"/>
+              </a:solidFill>
+              <a:latin typeface="SquareSlab711 Lt BT" panose="02060506020206060203" pitchFamily="18" charset="0"/>
+            </a:endParaRPr>
+          </a:p>
+        </p:txBody>
+      </p:sp>
+      <p:sp>
+        <p:nvSpPr>
+          <p:cNvPr id="7" name="Rechteck 6">
+            <a:extLst>
+              <a:ext uri="{FF2B5EF4-FFF2-40B4-BE49-F238E27FC236}">
+                <a16:creationId xmlns:a16="http://schemas.microsoft.com/office/drawing/2014/main" id="{E3C20C71-AA25-C474-9364-6C32F0B291CA}"/>
               </a:ext>
             </a:extLst>
           </p:cNvPr>
@@ -3521,17 +4037,17 @@
         </p:nvSpPr>
         <p:spPr>
           <a:xfrm>
-            <a:off x="4172148" y="2562618"/>
-            <a:ext cx="2700000" cy="2700000"/>
-          </a:xfrm>
-          <a:prstGeom prst="ellipse">
-            <a:avLst/>
-          </a:prstGeom>
-          <a:noFill/>
-          <a:ln w="114300">
-            <a:solidFill>
-              <a:srgbClr val="ED3C0B"/>
-            </a:solidFill>
+            <a:off x="5932973" y="1288421"/>
+            <a:ext cx="2187307" cy="3423682"/>
+          </a:xfrm>
+          <a:prstGeom prst="rect">
+            <a:avLst/>
+          </a:prstGeom>
+          <a:solidFill>
+            <a:schemeClr val="bg1"/>
+          </a:solidFill>
+          <a:ln w="76200">
+            <a:noFill/>
           </a:ln>
         </p:spPr>
         <p:style>
@@ -3555,21 +4071,68 @@
           <a:lstStyle/>
           <a:p>
             <a:pPr algn="ctr"/>
-            <a:endParaRPr lang="de-AT" sz="15000" dirty="0">
-              <a:solidFill>
-                <a:srgbClr val="ED3C0B"/>
-              </a:solidFill>
-              <a:latin typeface="OCR A Extended" panose="02010509020102010303" pitchFamily="50" charset="0"/>
-            </a:endParaRPr>
-          </a:p>
-        </p:txBody>
-      </p:sp>
-      <p:sp>
-        <p:nvSpPr>
-          <p:cNvPr id="7" name="Textfeld 6">
-            <a:extLst>
-              <a:ext uri="{FF2B5EF4-FFF2-40B4-BE49-F238E27FC236}">
-                <a16:creationId xmlns:a16="http://schemas.microsoft.com/office/drawing/2014/main" id="{27BFBACB-375C-B4E5-8AEC-C75880750C4F}"/>
+            <a:endParaRPr lang="de-AT"/>
+          </a:p>
+        </p:txBody>
+      </p:sp>
+      <p:sp>
+        <p:nvSpPr>
+          <p:cNvPr id="6" name="Rechteck 5">
+            <a:extLst>
+              <a:ext uri="{FF2B5EF4-FFF2-40B4-BE49-F238E27FC236}">
+                <a16:creationId xmlns:a16="http://schemas.microsoft.com/office/drawing/2014/main" id="{CE532A85-5F5F-C7EB-13B6-D8CF7AA3B8E0}"/>
+              </a:ext>
+            </a:extLst>
+          </p:cNvPr>
+          <p:cNvSpPr/>
+          <p:nvPr/>
+        </p:nvSpPr>
+        <p:spPr>
+          <a:xfrm>
+            <a:off x="3174814" y="1282001"/>
+            <a:ext cx="2348797" cy="3430102"/>
+          </a:xfrm>
+          <a:prstGeom prst="rect">
+            <a:avLst/>
+          </a:prstGeom>
+          <a:solidFill>
+            <a:schemeClr val="bg1"/>
+          </a:solidFill>
+          <a:ln w="76200">
+            <a:noFill/>
+          </a:ln>
+        </p:spPr>
+        <p:style>
+          <a:lnRef idx="2">
+            <a:schemeClr val="accent1">
+              <a:shade val="15000"/>
+            </a:schemeClr>
+          </a:lnRef>
+          <a:fillRef idx="1">
+            <a:schemeClr val="accent1"/>
+          </a:fillRef>
+          <a:effectRef idx="0">
+            <a:schemeClr val="accent1"/>
+          </a:effectRef>
+          <a:fontRef idx="minor">
+            <a:schemeClr val="lt1"/>
+          </a:fontRef>
+        </p:style>
+        <p:txBody>
+          <a:bodyPr rtlCol="0" anchor="ctr"/>
+          <a:lstStyle/>
+          <a:p>
+            <a:pPr algn="ctr"/>
+            <a:endParaRPr lang="de-AT"/>
+          </a:p>
+        </p:txBody>
+      </p:sp>
+      <p:sp>
+        <p:nvSpPr>
+          <p:cNvPr id="4" name="Textfeld 3">
+            <a:extLst>
+              <a:ext uri="{FF2B5EF4-FFF2-40B4-BE49-F238E27FC236}">
+                <a16:creationId xmlns:a16="http://schemas.microsoft.com/office/drawing/2014/main" id="{A96CAC5B-562F-81C7-C338-DEDBE172A843}"/>
               </a:ext>
             </a:extLst>
           </p:cNvPr>
@@ -3578,8 +4141,8 @@
         </p:nvSpPr>
         <p:spPr>
           <a:xfrm>
-            <a:off x="4878899" y="2649409"/>
-            <a:ext cx="854591" cy="2400657"/>
+            <a:off x="3867260" y="175439"/>
+            <a:ext cx="992815" cy="5478423"/>
           </a:xfrm>
           <a:prstGeom prst="rect">
             <a:avLst/>
@@ -3592,25 +4155,25 @@
           </a:bodyPr>
           <a:lstStyle/>
           <a:p>
+            <a:pPr algn="ctr"/>
             <a:r>
-              <a:rPr lang="de-DE" sz="15000" dirty="0">
+              <a:rPr lang="de-AT" sz="35000" dirty="0">
                 <a:solidFill>
-                  <a:srgbClr val="ED3C0B"/>
+                  <a:srgbClr val="336117"/>
                 </a:solidFill>
-                <a:latin typeface="OCR A Extended" panose="02010509020102010303" pitchFamily="50" charset="0"/>
+                <a:latin typeface="SquareSlab711 Lt BT" panose="02060506020206060203" pitchFamily="18" charset="0"/>
               </a:rPr>
-              <a:t>i</a:t>
+              <a:t>B</a:t>
             </a:r>
-            <a:endParaRPr lang="de-AT" sz="15000" dirty="0"/>
-          </a:p>
-        </p:txBody>
-      </p:sp>
-      <p:sp>
-        <p:nvSpPr>
-          <p:cNvPr id="8" name="Textfeld 7">
-            <a:extLst>
-              <a:ext uri="{FF2B5EF4-FFF2-40B4-BE49-F238E27FC236}">
-                <a16:creationId xmlns:a16="http://schemas.microsoft.com/office/drawing/2014/main" id="{60E4CC86-7B2C-D4B8-E36B-17CAC186596F}"/>
+          </a:p>
+        </p:txBody>
+      </p:sp>
+      <p:sp>
+        <p:nvSpPr>
+          <p:cNvPr id="5" name="Textfeld 4">
+            <a:extLst>
+              <a:ext uri="{FF2B5EF4-FFF2-40B4-BE49-F238E27FC236}">
+                <a16:creationId xmlns:a16="http://schemas.microsoft.com/office/drawing/2014/main" id="{42D5443E-C370-107E-75B1-9F8083C43B75}"/>
               </a:ext>
             </a:extLst>
           </p:cNvPr>
@@ -3619,8 +4182,8 @@
         </p:nvSpPr>
         <p:spPr>
           <a:xfrm>
-            <a:off x="9609925" y="1814522"/>
-            <a:ext cx="1561658" cy="2862322"/>
+            <a:off x="6535922" y="175439"/>
+            <a:ext cx="992815" cy="5616922"/>
           </a:xfrm>
           <a:prstGeom prst="rect">
             <a:avLst/>
@@ -3633,55 +4196,357 @@
           </a:bodyPr>
           <a:lstStyle/>
           <a:p>
+            <a:pPr algn="ctr"/>
             <a:r>
-              <a:rPr lang="de-DE" sz="18000" b="1" dirty="0">
+              <a:rPr lang="de-AT" sz="35000" dirty="0">
                 <a:solidFill>
-                  <a:srgbClr val="ED3C0B"/>
+                  <a:srgbClr val="336117"/>
                 </a:solidFill>
-                <a:latin typeface="Eurostile" panose="020B0504020202050204" pitchFamily="34" charset="0"/>
+                <a:latin typeface="SquareSlab711 Lt BT" panose="02060506020206060203" pitchFamily="18" charset="0"/>
               </a:rPr>
-              <a:t>?</a:t>
+              <a:t>C</a:t>
             </a:r>
-            <a:endParaRPr lang="de-AT" sz="18000" b="1" dirty="0">
-              <a:latin typeface="Eurostile" panose="020B0504020202050204" pitchFamily="34" charset="0"/>
-            </a:endParaRPr>
-          </a:p>
-        </p:txBody>
-      </p:sp>
-      <p:pic>
-        <p:nvPicPr>
-          <p:cNvPr id="10" name="Grafik 9">
-            <a:extLst>
-              <a:ext uri="{FF2B5EF4-FFF2-40B4-BE49-F238E27FC236}">
-                <a16:creationId xmlns:a16="http://schemas.microsoft.com/office/drawing/2014/main" id="{0A8AC64D-8BDB-63BE-2C3A-7CE34454BF60}"/>
-              </a:ext>
-            </a:extLst>
-          </p:cNvPr>
-          <p:cNvPicPr>
-            <a:picLocks noChangeAspect="1"/>
-          </p:cNvPicPr>
-          <p:nvPr/>
-        </p:nvPicPr>
-        <p:blipFill>
-          <a:blip r:embed="rId2"/>
-          <a:stretch>
-            <a:fillRect/>
-          </a:stretch>
-        </p:blipFill>
+          </a:p>
+        </p:txBody>
+      </p:sp>
+      <p:sp>
+        <p:nvSpPr>
+          <p:cNvPr id="8" name="Rechteck: abgerundete Ecken 7">
+            <a:extLst>
+              <a:ext uri="{FF2B5EF4-FFF2-40B4-BE49-F238E27FC236}">
+                <a16:creationId xmlns:a16="http://schemas.microsoft.com/office/drawing/2014/main" id="{0FCA1F9D-D0F7-8A28-51B3-6453C9338E50}"/>
+              </a:ext>
+            </a:extLst>
+          </p:cNvPr>
+          <p:cNvSpPr/>
+          <p:nvPr/>
+        </p:nvSpPr>
         <p:spPr>
           <a:xfrm>
-            <a:off x="215501" y="1189572"/>
-            <a:ext cx="3956647" cy="4810161"/>
-          </a:xfrm>
-          <a:prstGeom prst="rect">
-            <a:avLst/>
-          </a:prstGeom>
-        </p:spPr>
-      </p:pic>
+            <a:off x="5134251" y="5290746"/>
+            <a:ext cx="1130206" cy="653903"/>
+          </a:xfrm>
+          <a:prstGeom prst="roundRect">
+            <a:avLst>
+              <a:gd name="adj" fmla="val 45122"/>
+            </a:avLst>
+          </a:prstGeom>
+          <a:noFill/>
+          <a:ln w="139700">
+            <a:solidFill>
+              <a:schemeClr val="tx1"/>
+            </a:solidFill>
+          </a:ln>
+        </p:spPr>
+        <p:style>
+          <a:lnRef idx="2">
+            <a:schemeClr val="accent1">
+              <a:shade val="15000"/>
+            </a:schemeClr>
+          </a:lnRef>
+          <a:fillRef idx="1">
+            <a:schemeClr val="accent1"/>
+          </a:fillRef>
+          <a:effectRef idx="0">
+            <a:schemeClr val="accent1"/>
+          </a:effectRef>
+          <a:fontRef idx="minor">
+            <a:schemeClr val="lt1"/>
+          </a:fontRef>
+        </p:style>
+        <p:txBody>
+          <a:bodyPr rtlCol="0" anchor="ctr"/>
+          <a:lstStyle/>
+          <a:p>
+            <a:pPr algn="ctr"/>
+            <a:endParaRPr lang="de-AT"/>
+          </a:p>
+        </p:txBody>
+      </p:sp>
+      <p:sp>
+        <p:nvSpPr>
+          <p:cNvPr id="9" name="Rechteck: abgerundete Ecken 8">
+            <a:extLst>
+              <a:ext uri="{FF2B5EF4-FFF2-40B4-BE49-F238E27FC236}">
+                <a16:creationId xmlns:a16="http://schemas.microsoft.com/office/drawing/2014/main" id="{BDB4102E-1B20-BB68-834E-D0FFE2291398}"/>
+              </a:ext>
+            </a:extLst>
+          </p:cNvPr>
+          <p:cNvSpPr/>
+          <p:nvPr/>
+        </p:nvSpPr>
+        <p:spPr>
+          <a:xfrm rot="5400000">
+            <a:off x="6522574" y="5119439"/>
+            <a:ext cx="1058216" cy="653903"/>
+          </a:xfrm>
+          <a:prstGeom prst="roundRect">
+            <a:avLst>
+              <a:gd name="adj" fmla="val 45122"/>
+            </a:avLst>
+          </a:prstGeom>
+          <a:noFill/>
+          <a:ln w="139700">
+            <a:solidFill>
+              <a:schemeClr val="tx1"/>
+            </a:solidFill>
+          </a:ln>
+        </p:spPr>
+        <p:style>
+          <a:lnRef idx="2">
+            <a:schemeClr val="accent1">
+              <a:shade val="15000"/>
+            </a:schemeClr>
+          </a:lnRef>
+          <a:fillRef idx="1">
+            <a:schemeClr val="accent1"/>
+          </a:fillRef>
+          <a:effectRef idx="0">
+            <a:schemeClr val="accent1"/>
+          </a:effectRef>
+          <a:fontRef idx="minor">
+            <a:schemeClr val="lt1"/>
+          </a:fontRef>
+        </p:style>
+        <p:txBody>
+          <a:bodyPr rtlCol="0" anchor="ctr"/>
+          <a:lstStyle/>
+          <a:p>
+            <a:pPr algn="ctr"/>
+            <a:endParaRPr lang="de-AT"/>
+          </a:p>
+        </p:txBody>
+      </p:sp>
+      <p:sp>
+        <p:nvSpPr>
+          <p:cNvPr id="10" name="Rechteck: abgerundete Ecken 9">
+            <a:extLst>
+              <a:ext uri="{FF2B5EF4-FFF2-40B4-BE49-F238E27FC236}">
+                <a16:creationId xmlns:a16="http://schemas.microsoft.com/office/drawing/2014/main" id="{E8910211-87AA-C83A-72D8-5EDC94ED9596}"/>
+              </a:ext>
+            </a:extLst>
+          </p:cNvPr>
+          <p:cNvSpPr/>
+          <p:nvPr/>
+        </p:nvSpPr>
+        <p:spPr>
+          <a:xfrm rot="5400000">
+            <a:off x="3810434" y="5138789"/>
+            <a:ext cx="1019514" cy="653903"/>
+          </a:xfrm>
+          <a:prstGeom prst="roundRect">
+            <a:avLst>
+              <a:gd name="adj" fmla="val 45122"/>
+            </a:avLst>
+          </a:prstGeom>
+          <a:noFill/>
+          <a:ln w="139700">
+            <a:solidFill>
+              <a:schemeClr val="tx1"/>
+            </a:solidFill>
+          </a:ln>
+        </p:spPr>
+        <p:style>
+          <a:lnRef idx="2">
+            <a:schemeClr val="accent1">
+              <a:shade val="15000"/>
+            </a:schemeClr>
+          </a:lnRef>
+          <a:fillRef idx="1">
+            <a:schemeClr val="accent1"/>
+          </a:fillRef>
+          <a:effectRef idx="0">
+            <a:schemeClr val="accent1"/>
+          </a:effectRef>
+          <a:fontRef idx="minor">
+            <a:schemeClr val="lt1"/>
+          </a:fontRef>
+        </p:style>
+        <p:txBody>
+          <a:bodyPr rtlCol="0" anchor="ctr"/>
+          <a:lstStyle/>
+          <a:p>
+            <a:pPr algn="ctr"/>
+            <a:endParaRPr lang="de-AT"/>
+          </a:p>
+        </p:txBody>
+      </p:sp>
+      <p:cxnSp>
+        <p:nvCxnSpPr>
+          <p:cNvPr id="12" name="Gerader Verbinder 11">
+            <a:extLst>
+              <a:ext uri="{FF2B5EF4-FFF2-40B4-BE49-F238E27FC236}">
+                <a16:creationId xmlns:a16="http://schemas.microsoft.com/office/drawing/2014/main" id="{11C9D5CD-EB88-D3A2-8679-8C32C525FA4F}"/>
+              </a:ext>
+            </a:extLst>
+          </p:cNvPr>
+          <p:cNvCxnSpPr>
+            <a:cxnSpLocks/>
+          </p:cNvCxnSpPr>
+          <p:nvPr/>
+        </p:nvCxnSpPr>
+        <p:spPr>
+          <a:xfrm>
+            <a:off x="4320192" y="4726389"/>
+            <a:ext cx="0" cy="579431"/>
+          </a:xfrm>
+          <a:prstGeom prst="line">
+            <a:avLst/>
+          </a:prstGeom>
+          <a:ln w="139700">
+            <a:solidFill>
+              <a:schemeClr val="tx1"/>
+            </a:solidFill>
+          </a:ln>
+        </p:spPr>
+        <p:style>
+          <a:lnRef idx="2">
+            <a:schemeClr val="accent1"/>
+          </a:lnRef>
+          <a:fillRef idx="0">
+            <a:schemeClr val="accent1"/>
+          </a:fillRef>
+          <a:effectRef idx="1">
+            <a:schemeClr val="accent1"/>
+          </a:effectRef>
+          <a:fontRef idx="minor">
+            <a:schemeClr val="tx1"/>
+          </a:fontRef>
+        </p:style>
+      </p:cxnSp>
+      <p:cxnSp>
+        <p:nvCxnSpPr>
+          <p:cNvPr id="13" name="Gerader Verbinder 12">
+            <a:extLst>
+              <a:ext uri="{FF2B5EF4-FFF2-40B4-BE49-F238E27FC236}">
+                <a16:creationId xmlns:a16="http://schemas.microsoft.com/office/drawing/2014/main" id="{9F815772-6D0E-B477-6064-C49D547ECFBF}"/>
+              </a:ext>
+            </a:extLst>
+          </p:cNvPr>
+          <p:cNvCxnSpPr>
+            <a:cxnSpLocks/>
+          </p:cNvCxnSpPr>
+          <p:nvPr/>
+        </p:nvCxnSpPr>
+        <p:spPr>
+          <a:xfrm>
+            <a:off x="7051683" y="4686910"/>
+            <a:ext cx="0" cy="579600"/>
+          </a:xfrm>
+          <a:prstGeom prst="line">
+            <a:avLst/>
+          </a:prstGeom>
+          <a:ln w="139700">
+            <a:solidFill>
+              <a:schemeClr val="tx1"/>
+            </a:solidFill>
+          </a:ln>
+        </p:spPr>
+        <p:style>
+          <a:lnRef idx="2">
+            <a:schemeClr val="accent1"/>
+          </a:lnRef>
+          <a:fillRef idx="0">
+            <a:schemeClr val="accent1"/>
+          </a:fillRef>
+          <a:effectRef idx="1">
+            <a:schemeClr val="accent1"/>
+          </a:effectRef>
+          <a:fontRef idx="minor">
+            <a:schemeClr val="tx1"/>
+          </a:fontRef>
+        </p:style>
+      </p:cxnSp>
+      <p:cxnSp>
+        <p:nvCxnSpPr>
+          <p:cNvPr id="14" name="Gerader Verbinder 13">
+            <a:extLst>
+              <a:ext uri="{FF2B5EF4-FFF2-40B4-BE49-F238E27FC236}">
+                <a16:creationId xmlns:a16="http://schemas.microsoft.com/office/drawing/2014/main" id="{72EBE02A-034C-5489-27C7-A813B37E9077}"/>
+              </a:ext>
+            </a:extLst>
+          </p:cNvPr>
+          <p:cNvCxnSpPr>
+            <a:cxnSpLocks/>
+          </p:cNvCxnSpPr>
+          <p:nvPr/>
+        </p:nvCxnSpPr>
+        <p:spPr>
+          <a:xfrm flipH="1">
+            <a:off x="5999832" y="5638045"/>
+            <a:ext cx="1072180" cy="0"/>
+          </a:xfrm>
+          <a:prstGeom prst="line">
+            <a:avLst/>
+          </a:prstGeom>
+          <a:ln w="139700">
+            <a:solidFill>
+              <a:schemeClr val="tx1"/>
+            </a:solidFill>
+          </a:ln>
+        </p:spPr>
+        <p:style>
+          <a:lnRef idx="2">
+            <a:schemeClr val="accent1"/>
+          </a:lnRef>
+          <a:fillRef idx="0">
+            <a:schemeClr val="accent1"/>
+          </a:fillRef>
+          <a:effectRef idx="1">
+            <a:schemeClr val="accent1"/>
+          </a:effectRef>
+          <a:fontRef idx="minor">
+            <a:schemeClr val="tx1"/>
+          </a:fontRef>
+        </p:style>
+      </p:cxnSp>
+      <p:cxnSp>
+        <p:nvCxnSpPr>
+          <p:cNvPr id="17" name="Gerader Verbinder 16">
+            <a:extLst>
+              <a:ext uri="{FF2B5EF4-FFF2-40B4-BE49-F238E27FC236}">
+                <a16:creationId xmlns:a16="http://schemas.microsoft.com/office/drawing/2014/main" id="{BB2F3107-8EF8-2682-E346-E878B9743FEE}"/>
+              </a:ext>
+            </a:extLst>
+          </p:cNvPr>
+          <p:cNvCxnSpPr>
+            <a:cxnSpLocks/>
+          </p:cNvCxnSpPr>
+          <p:nvPr/>
+        </p:nvCxnSpPr>
+        <p:spPr>
+          <a:xfrm flipV="1">
+            <a:off x="4322619" y="5638045"/>
+            <a:ext cx="1144652" cy="16206"/>
+          </a:xfrm>
+          <a:prstGeom prst="line">
+            <a:avLst/>
+          </a:prstGeom>
+          <a:ln w="139700">
+            <a:solidFill>
+              <a:schemeClr val="tx1"/>
+            </a:solidFill>
+          </a:ln>
+        </p:spPr>
+        <p:style>
+          <a:lnRef idx="2">
+            <a:schemeClr val="accent1"/>
+          </a:lnRef>
+          <a:fillRef idx="0">
+            <a:schemeClr val="accent1"/>
+          </a:fillRef>
+          <a:effectRef idx="1">
+            <a:schemeClr val="accent1"/>
+          </a:effectRef>
+          <a:fontRef idx="minor">
+            <a:schemeClr val="tx1"/>
+          </a:fontRef>
+        </p:style>
+      </p:cxnSp>
     </p:spTree>
     <p:extLst>
       <p:ext uri="{BB962C8B-B14F-4D97-AF65-F5344CB8AC3E}">
-        <p14:creationId xmlns:p14="http://schemas.microsoft.com/office/powerpoint/2010/main" val="2182264236"/>
+        <p14:creationId xmlns:p14="http://schemas.microsoft.com/office/powerpoint/2010/main" val="2340635178"/>
       </p:ext>
     </p:extLst>
   </p:cSld>
@@ -3708,528 +4573,82 @@
           <a:chExt cx="0" cy="0"/>
         </a:xfrm>
       </p:grpSpPr>
-      <p:cxnSp>
-        <p:nvCxnSpPr>
-          <p:cNvPr id="7" name="Gerader Verbinder 6">
-            <a:extLst>
-              <a:ext uri="{FF2B5EF4-FFF2-40B4-BE49-F238E27FC236}">
-                <a16:creationId xmlns:a16="http://schemas.microsoft.com/office/drawing/2014/main" id="{871513E0-27F3-46EA-A76E-3E818E72613C}"/>
-              </a:ext>
-            </a:extLst>
-          </p:cNvPr>
-          <p:cNvCxnSpPr/>
-          <p:nvPr/>
-        </p:nvCxnSpPr>
-        <p:spPr>
-          <a:xfrm flipV="1">
-            <a:off x="2917104" y="953669"/>
-            <a:ext cx="4370047" cy="2002704"/>
-          </a:xfrm>
-          <a:prstGeom prst="line">
-            <a:avLst/>
-          </a:prstGeom>
-          <a:ln w="9525"/>
-        </p:spPr>
-        <p:style>
-          <a:lnRef idx="2">
-            <a:schemeClr val="dk1"/>
-          </a:lnRef>
-          <a:fillRef idx="0">
-            <a:schemeClr val="dk1"/>
-          </a:fillRef>
-          <a:effectRef idx="1">
-            <a:schemeClr val="dk1"/>
-          </a:effectRef>
-          <a:fontRef idx="minor">
-            <a:schemeClr val="tx1"/>
-          </a:fontRef>
-        </p:style>
-      </p:cxnSp>
-      <p:cxnSp>
-        <p:nvCxnSpPr>
-          <p:cNvPr id="9" name="Gerader Verbinder 8">
-            <a:extLst>
-              <a:ext uri="{FF2B5EF4-FFF2-40B4-BE49-F238E27FC236}">
-                <a16:creationId xmlns:a16="http://schemas.microsoft.com/office/drawing/2014/main" id="{30176299-A412-17C1-3662-24D85C7C04E9}"/>
-              </a:ext>
-            </a:extLst>
-          </p:cNvPr>
-          <p:cNvCxnSpPr/>
-          <p:nvPr/>
-        </p:nvCxnSpPr>
-        <p:spPr>
-          <a:xfrm flipV="1">
-            <a:off x="2911494" y="1262209"/>
-            <a:ext cx="751716" cy="1710993"/>
-          </a:xfrm>
-          <a:prstGeom prst="line">
-            <a:avLst/>
-          </a:prstGeom>
-          <a:ln w="9525"/>
-        </p:spPr>
-        <p:style>
-          <a:lnRef idx="2">
-            <a:schemeClr val="dk1"/>
-          </a:lnRef>
-          <a:fillRef idx="0">
-            <a:schemeClr val="dk1"/>
-          </a:fillRef>
-          <a:effectRef idx="1">
-            <a:schemeClr val="dk1"/>
-          </a:effectRef>
-          <a:fontRef idx="minor">
-            <a:schemeClr val="tx1"/>
-          </a:fontRef>
-        </p:style>
-      </p:cxnSp>
-      <p:cxnSp>
-        <p:nvCxnSpPr>
-          <p:cNvPr id="11" name="Gerader Verbinder 10">
-            <a:extLst>
-              <a:ext uri="{FF2B5EF4-FFF2-40B4-BE49-F238E27FC236}">
-                <a16:creationId xmlns:a16="http://schemas.microsoft.com/office/drawing/2014/main" id="{297B748D-1927-BE70-9D3B-6CD4FC253C29}"/>
-              </a:ext>
-            </a:extLst>
-          </p:cNvPr>
-          <p:cNvCxnSpPr/>
-          <p:nvPr/>
-        </p:nvCxnSpPr>
+      <p:pic>
+        <p:nvPicPr>
+          <p:cNvPr id="8" name="Grafik 7">
+            <a:extLst>
+              <a:ext uri="{FF2B5EF4-FFF2-40B4-BE49-F238E27FC236}">
+                <a16:creationId xmlns:a16="http://schemas.microsoft.com/office/drawing/2014/main" id="{9B1AB4DF-E8E7-D254-CAEA-FDB23F88DA3C}"/>
+              </a:ext>
+            </a:extLst>
+          </p:cNvPr>
+          <p:cNvPicPr>
+            <a:picLocks noChangeAspect="1"/>
+          </p:cNvPicPr>
+          <p:nvPr/>
+        </p:nvPicPr>
+        <p:blipFill>
+          <a:blip r:embed="rId2">
+            <a:extLst>
+              <a:ext uri="{96DAC541-7B7A-43D3-8B79-37D633B846F1}">
+                <asvg:svgBlip xmlns:asvg="http://schemas.microsoft.com/office/drawing/2016/SVG/main" r:embed="rId3"/>
+              </a:ext>
+            </a:extLst>
+          </a:blip>
+          <a:stretch>
+            <a:fillRect/>
+          </a:stretch>
+        </p:blipFill>
         <p:spPr>
           <a:xfrm>
-            <a:off x="3702479" y="1262209"/>
-            <a:ext cx="1464161" cy="3191985"/>
-          </a:xfrm>
-          <a:prstGeom prst="line">
-            <a:avLst/>
-          </a:prstGeom>
-          <a:ln w="9525"/>
-        </p:spPr>
-        <p:style>
-          <a:lnRef idx="2">
-            <a:schemeClr val="dk1"/>
-          </a:lnRef>
-          <a:fillRef idx="0">
-            <a:schemeClr val="dk1"/>
-          </a:fillRef>
-          <a:effectRef idx="1">
-            <a:schemeClr val="dk1"/>
-          </a:effectRef>
-          <a:fontRef idx="minor">
-            <a:schemeClr val="tx1"/>
-          </a:fontRef>
-        </p:style>
-      </p:cxnSp>
-      <p:cxnSp>
-        <p:nvCxnSpPr>
-          <p:cNvPr id="13" name="Gerader Verbinder 12">
-            <a:extLst>
-              <a:ext uri="{FF2B5EF4-FFF2-40B4-BE49-F238E27FC236}">
-                <a16:creationId xmlns:a16="http://schemas.microsoft.com/office/drawing/2014/main" id="{4576D5A5-5CDD-766F-47C9-676D5DEB3C8C}"/>
-              </a:ext>
-            </a:extLst>
-          </p:cNvPr>
-          <p:cNvCxnSpPr/>
-          <p:nvPr/>
-        </p:nvCxnSpPr>
+            <a:off x="1117767" y="1646032"/>
+            <a:ext cx="3551538" cy="3420000"/>
+          </a:xfrm>
+          <a:prstGeom prst="rect">
+            <a:avLst/>
+          </a:prstGeom>
+        </p:spPr>
+      </p:pic>
+      <p:pic>
+        <p:nvPicPr>
+          <p:cNvPr id="10" name="Grafik 9">
+            <a:extLst>
+              <a:ext uri="{FF2B5EF4-FFF2-40B4-BE49-F238E27FC236}">
+                <a16:creationId xmlns:a16="http://schemas.microsoft.com/office/drawing/2014/main" id="{316360F0-C34D-B3BC-C5C6-47299752FC83}"/>
+              </a:ext>
+            </a:extLst>
+          </p:cNvPr>
+          <p:cNvPicPr>
+            <a:picLocks noChangeAspect="1"/>
+          </p:cNvPicPr>
+          <p:nvPr/>
+        </p:nvPicPr>
+        <p:blipFill>
+          <a:blip r:embed="rId4">
+            <a:extLst>
+              <a:ext uri="{96DAC541-7B7A-43D3-8B79-37D633B846F1}">
+                <asvg:svgBlip xmlns:asvg="http://schemas.microsoft.com/office/drawing/2016/SVG/main" r:embed="rId5"/>
+              </a:ext>
+            </a:extLst>
+          </a:blip>
+          <a:stretch>
+            <a:fillRect/>
+          </a:stretch>
+        </p:blipFill>
         <p:spPr>
           <a:xfrm>
-            <a:off x="2911494" y="2956373"/>
-            <a:ext cx="5617298" cy="1346356"/>
-          </a:xfrm>
-          <a:prstGeom prst="line">
-            <a:avLst/>
-          </a:prstGeom>
-          <a:ln w="9525"/>
-        </p:spPr>
-        <p:style>
-          <a:lnRef idx="2">
-            <a:schemeClr val="dk1"/>
-          </a:lnRef>
-          <a:fillRef idx="0">
-            <a:schemeClr val="dk1"/>
-          </a:fillRef>
-          <a:effectRef idx="1">
-            <a:schemeClr val="dk1"/>
-          </a:effectRef>
-          <a:fontRef idx="minor">
-            <a:schemeClr val="tx1"/>
-          </a:fontRef>
-        </p:style>
-      </p:cxnSp>
-      <p:cxnSp>
-        <p:nvCxnSpPr>
-          <p:cNvPr id="15" name="Gerader Verbinder 14">
-            <a:extLst>
-              <a:ext uri="{FF2B5EF4-FFF2-40B4-BE49-F238E27FC236}">
-                <a16:creationId xmlns:a16="http://schemas.microsoft.com/office/drawing/2014/main" id="{52191099-8CD5-7958-BEBB-3AC4E7F0FA71}"/>
-              </a:ext>
-            </a:extLst>
-          </p:cNvPr>
-          <p:cNvCxnSpPr/>
-          <p:nvPr/>
-        </p:nvCxnSpPr>
-        <p:spPr>
-          <a:xfrm>
-            <a:off x="2911494" y="2973202"/>
-            <a:ext cx="2255146" cy="1480992"/>
-          </a:xfrm>
-          <a:prstGeom prst="line">
-            <a:avLst/>
-          </a:prstGeom>
-          <a:ln w="9525"/>
-        </p:spPr>
-        <p:style>
-          <a:lnRef idx="2">
-            <a:schemeClr val="dk1"/>
-          </a:lnRef>
-          <a:fillRef idx="0">
-            <a:schemeClr val="dk1"/>
-          </a:fillRef>
-          <a:effectRef idx="1">
-            <a:schemeClr val="dk1"/>
-          </a:effectRef>
-          <a:fontRef idx="minor">
-            <a:schemeClr val="tx1"/>
-          </a:fontRef>
-        </p:style>
-      </p:cxnSp>
-      <p:cxnSp>
-        <p:nvCxnSpPr>
-          <p:cNvPr id="17" name="Gerader Verbinder 16">
-            <a:extLst>
-              <a:ext uri="{FF2B5EF4-FFF2-40B4-BE49-F238E27FC236}">
-                <a16:creationId xmlns:a16="http://schemas.microsoft.com/office/drawing/2014/main" id="{6BF01FA4-616D-EA93-654F-B4C1739D5220}"/>
-              </a:ext>
-            </a:extLst>
-          </p:cNvPr>
-          <p:cNvCxnSpPr/>
-          <p:nvPr/>
-        </p:nvCxnSpPr>
-        <p:spPr>
-          <a:xfrm>
-            <a:off x="5166640" y="4454194"/>
-            <a:ext cx="1744653" cy="589031"/>
-          </a:xfrm>
-          <a:prstGeom prst="line">
-            <a:avLst/>
-          </a:prstGeom>
-          <a:ln w="9525"/>
-        </p:spPr>
-        <p:style>
-          <a:lnRef idx="2">
-            <a:schemeClr val="dk1"/>
-          </a:lnRef>
-          <a:fillRef idx="0">
-            <a:schemeClr val="dk1"/>
-          </a:fillRef>
-          <a:effectRef idx="1">
-            <a:schemeClr val="dk1"/>
-          </a:effectRef>
-          <a:fontRef idx="minor">
-            <a:schemeClr val="tx1"/>
-          </a:fontRef>
-        </p:style>
-      </p:cxnSp>
-      <p:cxnSp>
-        <p:nvCxnSpPr>
-          <p:cNvPr id="19" name="Gerader Verbinder 18">
-            <a:extLst>
-              <a:ext uri="{FF2B5EF4-FFF2-40B4-BE49-F238E27FC236}">
-                <a16:creationId xmlns:a16="http://schemas.microsoft.com/office/drawing/2014/main" id="{C8B0F0C3-AD10-CE99-C571-964EACD1EDC7}"/>
-              </a:ext>
-            </a:extLst>
-          </p:cNvPr>
-          <p:cNvCxnSpPr/>
-          <p:nvPr/>
-        </p:nvCxnSpPr>
-        <p:spPr>
-          <a:xfrm flipV="1">
-            <a:off x="6973001" y="4302729"/>
-            <a:ext cx="1555791" cy="740496"/>
-          </a:xfrm>
-          <a:prstGeom prst="line">
-            <a:avLst/>
-          </a:prstGeom>
-          <a:ln w="9525"/>
-        </p:spPr>
-        <p:style>
-          <a:lnRef idx="2">
-            <a:schemeClr val="dk1"/>
-          </a:lnRef>
-          <a:fillRef idx="0">
-            <a:schemeClr val="dk1"/>
-          </a:fillRef>
-          <a:effectRef idx="1">
-            <a:schemeClr val="dk1"/>
-          </a:effectRef>
-          <a:fontRef idx="minor">
-            <a:schemeClr val="tx1"/>
-          </a:fontRef>
-        </p:style>
-      </p:cxnSp>
-      <p:cxnSp>
-        <p:nvCxnSpPr>
-          <p:cNvPr id="21" name="Gerader Verbinder 20">
-            <a:extLst>
-              <a:ext uri="{FF2B5EF4-FFF2-40B4-BE49-F238E27FC236}">
-                <a16:creationId xmlns:a16="http://schemas.microsoft.com/office/drawing/2014/main" id="{0FEC2F52-A362-1717-BF91-EE5017ED5B2A}"/>
-              </a:ext>
-            </a:extLst>
-          </p:cNvPr>
-          <p:cNvCxnSpPr/>
-          <p:nvPr/>
-        </p:nvCxnSpPr>
-        <p:spPr>
-          <a:xfrm flipH="1" flipV="1">
-            <a:off x="6911293" y="2889055"/>
-            <a:ext cx="1656768" cy="1413674"/>
-          </a:xfrm>
-          <a:prstGeom prst="line">
-            <a:avLst/>
-          </a:prstGeom>
-          <a:ln w="9525"/>
-        </p:spPr>
-        <p:style>
-          <a:lnRef idx="2">
-            <a:schemeClr val="dk1"/>
-          </a:lnRef>
-          <a:fillRef idx="0">
-            <a:schemeClr val="dk1"/>
-          </a:fillRef>
-          <a:effectRef idx="1">
-            <a:schemeClr val="dk1"/>
-          </a:effectRef>
-          <a:fontRef idx="minor">
-            <a:schemeClr val="tx1"/>
-          </a:fontRef>
-        </p:style>
-      </p:cxnSp>
-      <p:cxnSp>
-        <p:nvCxnSpPr>
-          <p:cNvPr id="23" name="Gerader Verbinder 22">
-            <a:extLst>
-              <a:ext uri="{FF2B5EF4-FFF2-40B4-BE49-F238E27FC236}">
-                <a16:creationId xmlns:a16="http://schemas.microsoft.com/office/drawing/2014/main" id="{EC9DC9FB-FF54-31F7-0206-128972C556A3}"/>
-              </a:ext>
-            </a:extLst>
-          </p:cNvPr>
-          <p:cNvCxnSpPr/>
-          <p:nvPr/>
-        </p:nvCxnSpPr>
-        <p:spPr>
-          <a:xfrm flipH="1" flipV="1">
-            <a:off x="5346155" y="2753718"/>
-            <a:ext cx="1565138" cy="157776"/>
-          </a:xfrm>
-          <a:prstGeom prst="line">
-            <a:avLst/>
-          </a:prstGeom>
-          <a:ln w="9525"/>
-        </p:spPr>
-        <p:style>
-          <a:lnRef idx="2">
-            <a:schemeClr val="dk1"/>
-          </a:lnRef>
-          <a:fillRef idx="0">
-            <a:schemeClr val="dk1"/>
-          </a:fillRef>
-          <a:effectRef idx="1">
-            <a:schemeClr val="dk1"/>
-          </a:effectRef>
-          <a:fontRef idx="minor">
-            <a:schemeClr val="tx1"/>
-          </a:fontRef>
-        </p:style>
-      </p:cxnSp>
-      <p:cxnSp>
-        <p:nvCxnSpPr>
-          <p:cNvPr id="25" name="Gerader Verbinder 24">
-            <a:extLst>
-              <a:ext uri="{FF2B5EF4-FFF2-40B4-BE49-F238E27FC236}">
-                <a16:creationId xmlns:a16="http://schemas.microsoft.com/office/drawing/2014/main" id="{4ED29B56-AE50-EA1F-B070-C4BC288AA28A}"/>
-              </a:ext>
-            </a:extLst>
-          </p:cNvPr>
-          <p:cNvCxnSpPr/>
-          <p:nvPr/>
-        </p:nvCxnSpPr>
-        <p:spPr>
-          <a:xfrm flipV="1">
-            <a:off x="6911293" y="2434660"/>
-            <a:ext cx="2260756" cy="521713"/>
-          </a:xfrm>
-          <a:prstGeom prst="line">
-            <a:avLst/>
-          </a:prstGeom>
-          <a:ln w="9525"/>
-        </p:spPr>
-        <p:style>
-          <a:lnRef idx="2">
-            <a:schemeClr val="dk1"/>
-          </a:lnRef>
-          <a:fillRef idx="0">
-            <a:schemeClr val="dk1"/>
-          </a:fillRef>
-          <a:effectRef idx="1">
-            <a:schemeClr val="dk1"/>
-          </a:effectRef>
-          <a:fontRef idx="minor">
-            <a:schemeClr val="tx1"/>
-          </a:fontRef>
-        </p:style>
-      </p:cxnSp>
-      <p:cxnSp>
-        <p:nvCxnSpPr>
-          <p:cNvPr id="27" name="Gerader Verbinder 26">
-            <a:extLst>
-              <a:ext uri="{FF2B5EF4-FFF2-40B4-BE49-F238E27FC236}">
-                <a16:creationId xmlns:a16="http://schemas.microsoft.com/office/drawing/2014/main" id="{3DE7468D-DFD5-A58E-9C27-D57D67AFF75D}"/>
-              </a:ext>
-            </a:extLst>
-          </p:cNvPr>
-          <p:cNvCxnSpPr/>
-          <p:nvPr/>
-        </p:nvCxnSpPr>
-        <p:spPr>
-          <a:xfrm flipH="1" flipV="1">
-            <a:off x="7236663" y="953669"/>
-            <a:ext cx="1885059" cy="1469771"/>
-          </a:xfrm>
-          <a:prstGeom prst="line">
-            <a:avLst/>
-          </a:prstGeom>
-          <a:ln w="9525"/>
-        </p:spPr>
-        <p:style>
-          <a:lnRef idx="2">
-            <a:schemeClr val="dk1"/>
-          </a:lnRef>
-          <a:fillRef idx="0">
-            <a:schemeClr val="dk1"/>
-          </a:fillRef>
-          <a:effectRef idx="1">
-            <a:schemeClr val="dk1"/>
-          </a:effectRef>
-          <a:fontRef idx="minor">
-            <a:schemeClr val="tx1"/>
-          </a:fontRef>
-        </p:style>
-      </p:cxnSp>
-      <p:cxnSp>
-        <p:nvCxnSpPr>
-          <p:cNvPr id="29" name="Gerader Verbinder 28">
-            <a:extLst>
-              <a:ext uri="{FF2B5EF4-FFF2-40B4-BE49-F238E27FC236}">
-                <a16:creationId xmlns:a16="http://schemas.microsoft.com/office/drawing/2014/main" id="{B86476C7-3541-64E8-5014-B405EB6CACC7}"/>
-              </a:ext>
-            </a:extLst>
-          </p:cNvPr>
-          <p:cNvCxnSpPr/>
-          <p:nvPr/>
-        </p:nvCxnSpPr>
-        <p:spPr>
-          <a:xfrm flipV="1">
-            <a:off x="6911293" y="936840"/>
-            <a:ext cx="314150" cy="1974654"/>
-          </a:xfrm>
-          <a:prstGeom prst="line">
-            <a:avLst/>
-          </a:prstGeom>
-          <a:ln w="9525"/>
-        </p:spPr>
-        <p:style>
-          <a:lnRef idx="2">
-            <a:schemeClr val="dk1"/>
-          </a:lnRef>
-          <a:fillRef idx="0">
-            <a:schemeClr val="dk1"/>
-          </a:fillRef>
-          <a:effectRef idx="1">
-            <a:schemeClr val="dk1"/>
-          </a:effectRef>
-          <a:fontRef idx="minor">
-            <a:schemeClr val="tx1"/>
-          </a:fontRef>
-        </p:style>
-      </p:cxnSp>
-      <p:cxnSp>
-        <p:nvCxnSpPr>
-          <p:cNvPr id="31" name="Gerader Verbinder 30">
-            <a:extLst>
-              <a:ext uri="{FF2B5EF4-FFF2-40B4-BE49-F238E27FC236}">
-                <a16:creationId xmlns:a16="http://schemas.microsoft.com/office/drawing/2014/main" id="{ED0173B2-4B84-BC16-67E5-5E6F5F911EF5}"/>
-              </a:ext>
-            </a:extLst>
-          </p:cNvPr>
-          <p:cNvCxnSpPr/>
-          <p:nvPr/>
-        </p:nvCxnSpPr>
-        <p:spPr>
-          <a:xfrm flipH="1" flipV="1">
-            <a:off x="5480790" y="802204"/>
-            <a:ext cx="1430503" cy="2137340"/>
-          </a:xfrm>
-          <a:prstGeom prst="line">
-            <a:avLst/>
-          </a:prstGeom>
-          <a:ln w="9525"/>
-        </p:spPr>
-        <p:style>
-          <a:lnRef idx="2">
-            <a:schemeClr val="dk1"/>
-          </a:lnRef>
-          <a:fillRef idx="0">
-            <a:schemeClr val="dk1"/>
-          </a:fillRef>
-          <a:effectRef idx="1">
-            <a:schemeClr val="dk1"/>
-          </a:effectRef>
-          <a:fontRef idx="minor">
-            <a:schemeClr val="tx1"/>
-          </a:fontRef>
-        </p:style>
-      </p:cxnSp>
-      <p:cxnSp>
-        <p:nvCxnSpPr>
-          <p:cNvPr id="33" name="Gerader Verbinder 32">
-            <a:extLst>
-              <a:ext uri="{FF2B5EF4-FFF2-40B4-BE49-F238E27FC236}">
-                <a16:creationId xmlns:a16="http://schemas.microsoft.com/office/drawing/2014/main" id="{6943028A-2DA2-9551-0D2D-14B3531B2DDA}"/>
-              </a:ext>
-            </a:extLst>
-          </p:cNvPr>
-          <p:cNvCxnSpPr/>
-          <p:nvPr/>
-        </p:nvCxnSpPr>
-        <p:spPr>
-          <a:xfrm flipV="1">
-            <a:off x="5346155" y="802204"/>
-            <a:ext cx="100977" cy="1935386"/>
-          </a:xfrm>
-          <a:prstGeom prst="line">
-            <a:avLst/>
-          </a:prstGeom>
-          <a:ln w="9525"/>
-        </p:spPr>
-        <p:style>
-          <a:lnRef idx="2">
-            <a:schemeClr val="dk1"/>
-          </a:lnRef>
-          <a:fillRef idx="0">
-            <a:schemeClr val="dk1"/>
-          </a:fillRef>
-          <a:effectRef idx="1">
-            <a:schemeClr val="dk1"/>
-          </a:effectRef>
-          <a:fontRef idx="minor">
-            <a:schemeClr val="tx1"/>
-          </a:fontRef>
-        </p:style>
-      </p:cxnSp>
+            <a:off x="6426460" y="1858086"/>
+            <a:ext cx="4104000" cy="3420000"/>
+          </a:xfrm>
+          <a:prstGeom prst="rect">
+            <a:avLst/>
+          </a:prstGeom>
+        </p:spPr>
+      </p:pic>
     </p:spTree>
     <p:extLst>
       <p:ext uri="{BB962C8B-B14F-4D97-AF65-F5344CB8AC3E}">
-        <p14:creationId xmlns:p14="http://schemas.microsoft.com/office/powerpoint/2010/main" val="756043445"/>
+        <p14:creationId xmlns:p14="http://schemas.microsoft.com/office/powerpoint/2010/main" val="4144257889"/>
       </p:ext>
     </p:extLst>
   </p:cSld>
@@ -4256,655 +4675,233 @@
           <a:chExt cx="0" cy="0"/>
         </a:xfrm>
       </p:grpSpPr>
-      <p:cxnSp>
-        <p:nvCxnSpPr>
-          <p:cNvPr id="7" name="Gerader Verbinder 6">
-            <a:extLst>
-              <a:ext uri="{FF2B5EF4-FFF2-40B4-BE49-F238E27FC236}">
-                <a16:creationId xmlns:a16="http://schemas.microsoft.com/office/drawing/2014/main" id="{871513E0-27F3-46EA-A76E-3E818E72613C}"/>
-              </a:ext>
-            </a:extLst>
-          </p:cNvPr>
-          <p:cNvCxnSpPr/>
-          <p:nvPr/>
-        </p:nvCxnSpPr>
-        <p:spPr>
-          <a:xfrm flipV="1">
-            <a:off x="2917104" y="953669"/>
-            <a:ext cx="4370047" cy="2002704"/>
-          </a:xfrm>
-          <a:prstGeom prst="line">
-            <a:avLst/>
-          </a:prstGeom>
-          <a:ln w="9525"/>
+      <p:sp>
+        <p:nvSpPr>
+          <p:cNvPr id="4" name="Ellipse 3">
+            <a:extLst>
+              <a:ext uri="{FF2B5EF4-FFF2-40B4-BE49-F238E27FC236}">
+                <a16:creationId xmlns:a16="http://schemas.microsoft.com/office/drawing/2014/main" id="{501A0FE4-DB83-169F-053E-C81E177DE4BF}"/>
+              </a:ext>
+            </a:extLst>
+          </p:cNvPr>
+          <p:cNvSpPr/>
+          <p:nvPr/>
+        </p:nvSpPr>
+        <p:spPr>
+          <a:xfrm>
+            <a:off x="3902148" y="2292618"/>
+            <a:ext cx="3240000" cy="3240000"/>
+          </a:xfrm>
+          <a:prstGeom prst="ellipse">
+            <a:avLst/>
+          </a:prstGeom>
+          <a:noFill/>
+          <a:ln w="114300">
+            <a:solidFill>
+              <a:srgbClr val="ED3C0B"/>
+            </a:solidFill>
+          </a:ln>
         </p:spPr>
         <p:style>
           <a:lnRef idx="2">
-            <a:schemeClr val="dk1"/>
+            <a:schemeClr val="accent1">
+              <a:shade val="15000"/>
+            </a:schemeClr>
           </a:lnRef>
-          <a:fillRef idx="0">
-            <a:schemeClr val="dk1"/>
-          </a:fillRef>
-          <a:effectRef idx="1">
-            <a:schemeClr val="dk1"/>
-          </a:effectRef>
-          <a:fontRef idx="minor">
-            <a:schemeClr val="tx1"/>
-          </a:fontRef>
-        </p:style>
-      </p:cxnSp>
-      <p:cxnSp>
-        <p:nvCxnSpPr>
-          <p:cNvPr id="9" name="Gerader Verbinder 8">
-            <a:extLst>
-              <a:ext uri="{FF2B5EF4-FFF2-40B4-BE49-F238E27FC236}">
-                <a16:creationId xmlns:a16="http://schemas.microsoft.com/office/drawing/2014/main" id="{30176299-A412-17C1-3662-24D85C7C04E9}"/>
-              </a:ext>
-            </a:extLst>
-          </p:cNvPr>
-          <p:cNvCxnSpPr/>
-          <p:nvPr/>
-        </p:nvCxnSpPr>
-        <p:spPr>
-          <a:xfrm flipV="1">
-            <a:off x="2911494" y="1262209"/>
-            <a:ext cx="751716" cy="1710993"/>
-          </a:xfrm>
-          <a:prstGeom prst="line">
-            <a:avLst/>
-          </a:prstGeom>
-          <a:ln w="9525"/>
-        </p:spPr>
-        <p:style>
-          <a:lnRef idx="2">
-            <a:schemeClr val="dk1"/>
-          </a:lnRef>
-          <a:fillRef idx="0">
-            <a:schemeClr val="dk1"/>
-          </a:fillRef>
-          <a:effectRef idx="1">
-            <a:schemeClr val="dk1"/>
-          </a:effectRef>
-          <a:fontRef idx="minor">
-            <a:schemeClr val="tx1"/>
-          </a:fontRef>
-        </p:style>
-      </p:cxnSp>
-      <p:cxnSp>
-        <p:nvCxnSpPr>
-          <p:cNvPr id="11" name="Gerader Verbinder 10">
-            <a:extLst>
-              <a:ext uri="{FF2B5EF4-FFF2-40B4-BE49-F238E27FC236}">
-                <a16:creationId xmlns:a16="http://schemas.microsoft.com/office/drawing/2014/main" id="{297B748D-1927-BE70-9D3B-6CD4FC253C29}"/>
-              </a:ext>
-            </a:extLst>
-          </p:cNvPr>
-          <p:cNvCxnSpPr/>
-          <p:nvPr/>
-        </p:nvCxnSpPr>
-        <p:spPr>
-          <a:xfrm>
-            <a:off x="3702479" y="1262209"/>
-            <a:ext cx="1464161" cy="3191985"/>
-          </a:xfrm>
-          <a:prstGeom prst="line">
-            <a:avLst/>
-          </a:prstGeom>
-          <a:ln w="9525"/>
-        </p:spPr>
-        <p:style>
-          <a:lnRef idx="2">
-            <a:schemeClr val="dk1"/>
-          </a:lnRef>
-          <a:fillRef idx="0">
-            <a:schemeClr val="dk1"/>
-          </a:fillRef>
-          <a:effectRef idx="1">
-            <a:schemeClr val="dk1"/>
-          </a:effectRef>
-          <a:fontRef idx="minor">
-            <a:schemeClr val="tx1"/>
-          </a:fontRef>
-        </p:style>
-      </p:cxnSp>
-      <p:cxnSp>
-        <p:nvCxnSpPr>
-          <p:cNvPr id="13" name="Gerader Verbinder 12">
-            <a:extLst>
-              <a:ext uri="{FF2B5EF4-FFF2-40B4-BE49-F238E27FC236}">
-                <a16:creationId xmlns:a16="http://schemas.microsoft.com/office/drawing/2014/main" id="{4576D5A5-5CDD-766F-47C9-676D5DEB3C8C}"/>
-              </a:ext>
-            </a:extLst>
-          </p:cNvPr>
-          <p:cNvCxnSpPr/>
-          <p:nvPr/>
-        </p:nvCxnSpPr>
-        <p:spPr>
-          <a:xfrm>
-            <a:off x="2911494" y="2956373"/>
-            <a:ext cx="5617298" cy="1346356"/>
-          </a:xfrm>
-          <a:prstGeom prst="line">
-            <a:avLst/>
-          </a:prstGeom>
-          <a:ln w="9525"/>
-        </p:spPr>
-        <p:style>
-          <a:lnRef idx="2">
-            <a:schemeClr val="dk1"/>
-          </a:lnRef>
-          <a:fillRef idx="0">
-            <a:schemeClr val="dk1"/>
-          </a:fillRef>
-          <a:effectRef idx="1">
-            <a:schemeClr val="dk1"/>
-          </a:effectRef>
-          <a:fontRef idx="minor">
-            <a:schemeClr val="tx1"/>
-          </a:fontRef>
-        </p:style>
-      </p:cxnSp>
-      <p:cxnSp>
-        <p:nvCxnSpPr>
-          <p:cNvPr id="15" name="Gerader Verbinder 14">
-            <a:extLst>
-              <a:ext uri="{FF2B5EF4-FFF2-40B4-BE49-F238E27FC236}">
-                <a16:creationId xmlns:a16="http://schemas.microsoft.com/office/drawing/2014/main" id="{52191099-8CD5-7958-BEBB-3AC4E7F0FA71}"/>
-              </a:ext>
-            </a:extLst>
-          </p:cNvPr>
-          <p:cNvCxnSpPr/>
-          <p:nvPr/>
-        </p:nvCxnSpPr>
-        <p:spPr>
-          <a:xfrm>
-            <a:off x="2911494" y="2973202"/>
-            <a:ext cx="2255146" cy="1480992"/>
-          </a:xfrm>
-          <a:prstGeom prst="line">
-            <a:avLst/>
-          </a:prstGeom>
-          <a:ln w="9525"/>
-        </p:spPr>
-        <p:style>
-          <a:lnRef idx="2">
-            <a:schemeClr val="dk1"/>
-          </a:lnRef>
-          <a:fillRef idx="0">
-            <a:schemeClr val="dk1"/>
-          </a:fillRef>
-          <a:effectRef idx="1">
-            <a:schemeClr val="dk1"/>
-          </a:effectRef>
-          <a:fontRef idx="minor">
-            <a:schemeClr val="tx1"/>
-          </a:fontRef>
-        </p:style>
-      </p:cxnSp>
-      <p:cxnSp>
-        <p:nvCxnSpPr>
-          <p:cNvPr id="17" name="Gerader Verbinder 16">
-            <a:extLst>
-              <a:ext uri="{FF2B5EF4-FFF2-40B4-BE49-F238E27FC236}">
-                <a16:creationId xmlns:a16="http://schemas.microsoft.com/office/drawing/2014/main" id="{6BF01FA4-616D-EA93-654F-B4C1739D5220}"/>
-              </a:ext>
-            </a:extLst>
-          </p:cNvPr>
-          <p:cNvCxnSpPr/>
-          <p:nvPr/>
-        </p:nvCxnSpPr>
-        <p:spPr>
-          <a:xfrm>
-            <a:off x="5166640" y="4454194"/>
-            <a:ext cx="1744653" cy="589031"/>
-          </a:xfrm>
-          <a:prstGeom prst="line">
-            <a:avLst/>
-          </a:prstGeom>
-          <a:ln w="9525"/>
-        </p:spPr>
-        <p:style>
-          <a:lnRef idx="2">
-            <a:schemeClr val="dk1"/>
-          </a:lnRef>
-          <a:fillRef idx="0">
-            <a:schemeClr val="dk1"/>
-          </a:fillRef>
-          <a:effectRef idx="1">
-            <a:schemeClr val="dk1"/>
-          </a:effectRef>
-          <a:fontRef idx="minor">
-            <a:schemeClr val="tx1"/>
-          </a:fontRef>
-        </p:style>
-      </p:cxnSp>
-      <p:cxnSp>
-        <p:nvCxnSpPr>
-          <p:cNvPr id="19" name="Gerader Verbinder 18">
-            <a:extLst>
-              <a:ext uri="{FF2B5EF4-FFF2-40B4-BE49-F238E27FC236}">
-                <a16:creationId xmlns:a16="http://schemas.microsoft.com/office/drawing/2014/main" id="{C8B0F0C3-AD10-CE99-C571-964EACD1EDC7}"/>
-              </a:ext>
-            </a:extLst>
-          </p:cNvPr>
-          <p:cNvCxnSpPr/>
-          <p:nvPr/>
-        </p:nvCxnSpPr>
-        <p:spPr>
-          <a:xfrm flipV="1">
-            <a:off x="6973001" y="4302729"/>
-            <a:ext cx="1555791" cy="740496"/>
-          </a:xfrm>
-          <a:prstGeom prst="line">
-            <a:avLst/>
-          </a:prstGeom>
-          <a:ln w="9525"/>
-        </p:spPr>
-        <p:style>
-          <a:lnRef idx="2">
-            <a:schemeClr val="dk1"/>
-          </a:lnRef>
-          <a:fillRef idx="0">
-            <a:schemeClr val="dk1"/>
-          </a:fillRef>
-          <a:effectRef idx="1">
-            <a:schemeClr val="dk1"/>
-          </a:effectRef>
-          <a:fontRef idx="minor">
-            <a:schemeClr val="tx1"/>
-          </a:fontRef>
-        </p:style>
-      </p:cxnSp>
-      <p:cxnSp>
-        <p:nvCxnSpPr>
-          <p:cNvPr id="21" name="Gerader Verbinder 20">
-            <a:extLst>
-              <a:ext uri="{FF2B5EF4-FFF2-40B4-BE49-F238E27FC236}">
-                <a16:creationId xmlns:a16="http://schemas.microsoft.com/office/drawing/2014/main" id="{0FEC2F52-A362-1717-BF91-EE5017ED5B2A}"/>
-              </a:ext>
-            </a:extLst>
-          </p:cNvPr>
-          <p:cNvCxnSpPr/>
-          <p:nvPr/>
-        </p:nvCxnSpPr>
-        <p:spPr>
-          <a:xfrm flipH="1" flipV="1">
-            <a:off x="6911293" y="2889055"/>
-            <a:ext cx="1656768" cy="1413674"/>
-          </a:xfrm>
-          <a:prstGeom prst="line">
-            <a:avLst/>
-          </a:prstGeom>
-          <a:ln w="9525"/>
-        </p:spPr>
-        <p:style>
-          <a:lnRef idx="2">
-            <a:schemeClr val="dk1"/>
-          </a:lnRef>
-          <a:fillRef idx="0">
-            <a:schemeClr val="dk1"/>
-          </a:fillRef>
-          <a:effectRef idx="1">
-            <a:schemeClr val="dk1"/>
-          </a:effectRef>
-          <a:fontRef idx="minor">
-            <a:schemeClr val="tx1"/>
-          </a:fontRef>
-        </p:style>
-      </p:cxnSp>
-      <p:cxnSp>
-        <p:nvCxnSpPr>
-          <p:cNvPr id="23" name="Gerader Verbinder 22">
-            <a:extLst>
-              <a:ext uri="{FF2B5EF4-FFF2-40B4-BE49-F238E27FC236}">
-                <a16:creationId xmlns:a16="http://schemas.microsoft.com/office/drawing/2014/main" id="{EC9DC9FB-FF54-31F7-0206-128972C556A3}"/>
-              </a:ext>
-            </a:extLst>
-          </p:cNvPr>
-          <p:cNvCxnSpPr/>
-          <p:nvPr/>
-        </p:nvCxnSpPr>
-        <p:spPr>
-          <a:xfrm flipH="1" flipV="1">
-            <a:off x="5346155" y="2753718"/>
-            <a:ext cx="1565138" cy="157776"/>
-          </a:xfrm>
-          <a:prstGeom prst="line">
-            <a:avLst/>
-          </a:prstGeom>
-          <a:ln w="9525"/>
-        </p:spPr>
-        <p:style>
-          <a:lnRef idx="2">
-            <a:schemeClr val="dk1"/>
-          </a:lnRef>
-          <a:fillRef idx="0">
-            <a:schemeClr val="dk1"/>
-          </a:fillRef>
-          <a:effectRef idx="1">
-            <a:schemeClr val="dk1"/>
-          </a:effectRef>
-          <a:fontRef idx="minor">
-            <a:schemeClr val="tx1"/>
-          </a:fontRef>
-        </p:style>
-      </p:cxnSp>
-      <p:cxnSp>
-        <p:nvCxnSpPr>
-          <p:cNvPr id="25" name="Gerader Verbinder 24">
-            <a:extLst>
-              <a:ext uri="{FF2B5EF4-FFF2-40B4-BE49-F238E27FC236}">
-                <a16:creationId xmlns:a16="http://schemas.microsoft.com/office/drawing/2014/main" id="{4ED29B56-AE50-EA1F-B070-C4BC288AA28A}"/>
-              </a:ext>
-            </a:extLst>
-          </p:cNvPr>
-          <p:cNvCxnSpPr/>
-          <p:nvPr/>
-        </p:nvCxnSpPr>
-        <p:spPr>
-          <a:xfrm flipV="1">
-            <a:off x="6911293" y="2434660"/>
-            <a:ext cx="2260756" cy="521713"/>
-          </a:xfrm>
-          <a:prstGeom prst="line">
-            <a:avLst/>
-          </a:prstGeom>
-          <a:ln w="9525"/>
-        </p:spPr>
-        <p:style>
-          <a:lnRef idx="2">
-            <a:schemeClr val="dk1"/>
-          </a:lnRef>
-          <a:fillRef idx="0">
-            <a:schemeClr val="dk1"/>
-          </a:fillRef>
-          <a:effectRef idx="1">
-            <a:schemeClr val="dk1"/>
-          </a:effectRef>
-          <a:fontRef idx="minor">
-            <a:schemeClr val="tx1"/>
-          </a:fontRef>
-        </p:style>
-      </p:cxnSp>
-      <p:cxnSp>
-        <p:nvCxnSpPr>
-          <p:cNvPr id="27" name="Gerader Verbinder 26">
-            <a:extLst>
-              <a:ext uri="{FF2B5EF4-FFF2-40B4-BE49-F238E27FC236}">
-                <a16:creationId xmlns:a16="http://schemas.microsoft.com/office/drawing/2014/main" id="{3DE7468D-DFD5-A58E-9C27-D57D67AFF75D}"/>
-              </a:ext>
-            </a:extLst>
-          </p:cNvPr>
-          <p:cNvCxnSpPr/>
-          <p:nvPr/>
-        </p:nvCxnSpPr>
-        <p:spPr>
-          <a:xfrm flipH="1" flipV="1">
-            <a:off x="7236663" y="953669"/>
-            <a:ext cx="1885059" cy="1469771"/>
-          </a:xfrm>
-          <a:prstGeom prst="line">
-            <a:avLst/>
-          </a:prstGeom>
-          <a:ln w="9525"/>
-        </p:spPr>
-        <p:style>
-          <a:lnRef idx="2">
-            <a:schemeClr val="dk1"/>
-          </a:lnRef>
-          <a:fillRef idx="0">
-            <a:schemeClr val="dk1"/>
-          </a:fillRef>
-          <a:effectRef idx="1">
-            <a:schemeClr val="dk1"/>
-          </a:effectRef>
-          <a:fontRef idx="minor">
-            <a:schemeClr val="tx1"/>
-          </a:fontRef>
-        </p:style>
-      </p:cxnSp>
-      <p:cxnSp>
-        <p:nvCxnSpPr>
-          <p:cNvPr id="29" name="Gerader Verbinder 28">
-            <a:extLst>
-              <a:ext uri="{FF2B5EF4-FFF2-40B4-BE49-F238E27FC236}">
-                <a16:creationId xmlns:a16="http://schemas.microsoft.com/office/drawing/2014/main" id="{B86476C7-3541-64E8-5014-B405EB6CACC7}"/>
-              </a:ext>
-            </a:extLst>
-          </p:cNvPr>
-          <p:cNvCxnSpPr/>
-          <p:nvPr/>
-        </p:nvCxnSpPr>
-        <p:spPr>
-          <a:xfrm flipV="1">
-            <a:off x="6911293" y="936840"/>
-            <a:ext cx="314150" cy="1974654"/>
-          </a:xfrm>
-          <a:prstGeom prst="line">
-            <a:avLst/>
-          </a:prstGeom>
-          <a:ln w="9525"/>
-        </p:spPr>
-        <p:style>
-          <a:lnRef idx="2">
-            <a:schemeClr val="dk1"/>
-          </a:lnRef>
-          <a:fillRef idx="0">
-            <a:schemeClr val="dk1"/>
-          </a:fillRef>
-          <a:effectRef idx="1">
-            <a:schemeClr val="dk1"/>
-          </a:effectRef>
-          <a:fontRef idx="minor">
-            <a:schemeClr val="tx1"/>
-          </a:fontRef>
-        </p:style>
-      </p:cxnSp>
-      <p:cxnSp>
-        <p:nvCxnSpPr>
-          <p:cNvPr id="31" name="Gerader Verbinder 30">
-            <a:extLst>
-              <a:ext uri="{FF2B5EF4-FFF2-40B4-BE49-F238E27FC236}">
-                <a16:creationId xmlns:a16="http://schemas.microsoft.com/office/drawing/2014/main" id="{ED0173B2-4B84-BC16-67E5-5E6F5F911EF5}"/>
-              </a:ext>
-            </a:extLst>
-          </p:cNvPr>
-          <p:cNvCxnSpPr/>
-          <p:nvPr/>
-        </p:nvCxnSpPr>
-        <p:spPr>
-          <a:xfrm flipH="1" flipV="1">
-            <a:off x="5480790" y="802204"/>
-            <a:ext cx="1430503" cy="2137340"/>
-          </a:xfrm>
-          <a:prstGeom prst="line">
-            <a:avLst/>
-          </a:prstGeom>
-          <a:ln w="9525"/>
-        </p:spPr>
-        <p:style>
-          <a:lnRef idx="2">
-            <a:schemeClr val="dk1"/>
-          </a:lnRef>
-          <a:fillRef idx="0">
-            <a:schemeClr val="dk1"/>
-          </a:fillRef>
-          <a:effectRef idx="1">
-            <a:schemeClr val="dk1"/>
-          </a:effectRef>
-          <a:fontRef idx="minor">
-            <a:schemeClr val="tx1"/>
-          </a:fontRef>
-        </p:style>
-      </p:cxnSp>
-      <p:cxnSp>
-        <p:nvCxnSpPr>
-          <p:cNvPr id="33" name="Gerader Verbinder 32">
-            <a:extLst>
-              <a:ext uri="{FF2B5EF4-FFF2-40B4-BE49-F238E27FC236}">
-                <a16:creationId xmlns:a16="http://schemas.microsoft.com/office/drawing/2014/main" id="{6943028A-2DA2-9551-0D2D-14B3531B2DDA}"/>
-              </a:ext>
-            </a:extLst>
-          </p:cNvPr>
-          <p:cNvCxnSpPr/>
-          <p:nvPr/>
-        </p:nvCxnSpPr>
-        <p:spPr>
-          <a:xfrm flipV="1">
-            <a:off x="5346155" y="802204"/>
-            <a:ext cx="100977" cy="1935386"/>
-          </a:xfrm>
-          <a:prstGeom prst="line">
-            <a:avLst/>
-          </a:prstGeom>
-          <a:ln w="9525"/>
-        </p:spPr>
-        <p:style>
-          <a:lnRef idx="2">
-            <a:schemeClr val="dk1"/>
-          </a:lnRef>
-          <a:fillRef idx="0">
-            <a:schemeClr val="dk1"/>
-          </a:fillRef>
-          <a:effectRef idx="1">
-            <a:schemeClr val="dk1"/>
-          </a:effectRef>
-          <a:fontRef idx="minor">
-            <a:schemeClr val="tx1"/>
-          </a:fontRef>
-        </p:style>
-      </p:cxnSp>
-      <p:cxnSp>
-        <p:nvCxnSpPr>
-          <p:cNvPr id="35" name="Gerader Verbinder 34">
-            <a:extLst>
-              <a:ext uri="{FF2B5EF4-FFF2-40B4-BE49-F238E27FC236}">
-                <a16:creationId xmlns:a16="http://schemas.microsoft.com/office/drawing/2014/main" id="{A06CE8BF-6B23-3854-3365-1F09E7B9CE2D}"/>
-              </a:ext>
-            </a:extLst>
-          </p:cNvPr>
-          <p:cNvCxnSpPr/>
-          <p:nvPr/>
-        </p:nvCxnSpPr>
-        <p:spPr>
-          <a:xfrm>
-            <a:off x="3668820" y="1255897"/>
-            <a:ext cx="84147" cy="3658301"/>
-          </a:xfrm>
-          <a:prstGeom prst="line">
-            <a:avLst/>
-          </a:prstGeom>
-          <a:ln w="9525">
-            <a:solidFill>
-              <a:srgbClr val="94B31C"/>
-            </a:solidFill>
-          </a:ln>
-        </p:spPr>
-        <p:style>
-          <a:lnRef idx="2">
-            <a:schemeClr val="accent1"/>
-          </a:lnRef>
-          <a:fillRef idx="0">
+          <a:fillRef idx="1">
             <a:schemeClr val="accent1"/>
           </a:fillRef>
-          <a:effectRef idx="1">
+          <a:effectRef idx="0">
             <a:schemeClr val="accent1"/>
           </a:effectRef>
           <a:fontRef idx="minor">
-            <a:schemeClr val="tx1"/>
+            <a:schemeClr val="lt1"/>
           </a:fontRef>
         </p:style>
-      </p:cxnSp>
-      <p:cxnSp>
-        <p:nvCxnSpPr>
-          <p:cNvPr id="37" name="Gerader Verbinder 36">
-            <a:extLst>
-              <a:ext uri="{FF2B5EF4-FFF2-40B4-BE49-F238E27FC236}">
-                <a16:creationId xmlns:a16="http://schemas.microsoft.com/office/drawing/2014/main" id="{3A3F9B94-D591-4722-1FC8-59E12584B3AE}"/>
-              </a:ext>
-            </a:extLst>
-          </p:cNvPr>
-          <p:cNvCxnSpPr/>
-          <p:nvPr/>
-        </p:nvCxnSpPr>
-        <p:spPr>
-          <a:xfrm flipV="1">
-            <a:off x="3769797" y="4447882"/>
-            <a:ext cx="1385623" cy="443878"/>
-          </a:xfrm>
-          <a:prstGeom prst="line">
-            <a:avLst/>
-          </a:prstGeom>
-          <a:ln w="9525">
+        <p:txBody>
+          <a:bodyPr rtlCol="0" anchor="ctr"/>
+          <a:lstStyle/>
+          <a:p>
+            <a:pPr algn="ctr"/>
+            <a:endParaRPr lang="de-AT"/>
+          </a:p>
+        </p:txBody>
+      </p:sp>
+      <p:sp>
+        <p:nvSpPr>
+          <p:cNvPr id="5" name="Ellipse 4">
+            <a:extLst>
+              <a:ext uri="{FF2B5EF4-FFF2-40B4-BE49-F238E27FC236}">
+                <a16:creationId xmlns:a16="http://schemas.microsoft.com/office/drawing/2014/main" id="{5CBF1A37-1023-CFF2-5D23-7183F1F6EFFA}"/>
+              </a:ext>
+            </a:extLst>
+          </p:cNvPr>
+          <p:cNvSpPr/>
+          <p:nvPr/>
+        </p:nvSpPr>
+        <p:spPr>
+          <a:xfrm>
+            <a:off x="4172148" y="2562618"/>
+            <a:ext cx="2700000" cy="2700000"/>
+          </a:xfrm>
+          <a:prstGeom prst="ellipse">
+            <a:avLst/>
+          </a:prstGeom>
+          <a:noFill/>
+          <a:ln w="114300">
             <a:solidFill>
-              <a:srgbClr val="94B31C"/>
+              <a:srgbClr val="ED3C0B"/>
             </a:solidFill>
           </a:ln>
         </p:spPr>
         <p:style>
           <a:lnRef idx="2">
-            <a:schemeClr val="accent1"/>
+            <a:schemeClr val="accent1">
+              <a:shade val="15000"/>
+            </a:schemeClr>
           </a:lnRef>
-          <a:fillRef idx="0">
+          <a:fillRef idx="1">
             <a:schemeClr val="accent1"/>
           </a:fillRef>
-          <a:effectRef idx="1">
+          <a:effectRef idx="0">
             <a:schemeClr val="accent1"/>
           </a:effectRef>
           <a:fontRef idx="minor">
-            <a:schemeClr val="tx1"/>
+            <a:schemeClr val="lt1"/>
           </a:fontRef>
         </p:style>
-      </p:cxnSp>
-      <p:cxnSp>
-        <p:nvCxnSpPr>
-          <p:cNvPr id="2" name="Gerade Verbindung mit Pfeil 1">
-            <a:extLst>
-              <a:ext uri="{FF2B5EF4-FFF2-40B4-BE49-F238E27FC236}">
-                <a16:creationId xmlns:a16="http://schemas.microsoft.com/office/drawing/2014/main" id="{679D061E-4B24-50EA-0173-A03E5699E4FF}"/>
-              </a:ext>
-            </a:extLst>
-          </p:cNvPr>
-          <p:cNvCxnSpPr>
-            <a:cxnSpLocks/>
-          </p:cNvCxnSpPr>
-          <p:nvPr/>
-        </p:nvCxnSpPr>
-        <p:spPr>
-          <a:xfrm flipV="1">
-            <a:off x="1757479" y="4286746"/>
-            <a:ext cx="333375" cy="461963"/>
-          </a:xfrm>
-          <a:prstGeom prst="straightConnector1">
-            <a:avLst/>
-          </a:prstGeom>
-          <a:ln w="9525">
-            <a:solidFill>
-              <a:srgbClr val="94B31C"/>
-            </a:solidFill>
-            <a:headEnd w="lg" len="lg"/>
-            <a:tailEnd type="stealth" w="lg" len="lg"/>
-          </a:ln>
-        </p:spPr>
-        <p:style>
-          <a:lnRef idx="2">
-            <a:schemeClr val="accent1"/>
-          </a:lnRef>
-          <a:fillRef idx="0">
-            <a:schemeClr val="accent1"/>
-          </a:fillRef>
-          <a:effectRef idx="1">
-            <a:schemeClr val="accent1"/>
-          </a:effectRef>
-          <a:fontRef idx="minor">
-            <a:schemeClr val="tx1"/>
-          </a:fontRef>
-        </p:style>
-      </p:cxnSp>
+        <p:txBody>
+          <a:bodyPr rtlCol="0" anchor="ctr"/>
+          <a:lstStyle/>
+          <a:p>
+            <a:pPr algn="ctr"/>
+            <a:endParaRPr lang="de-AT" sz="15000" dirty="0">
+              <a:solidFill>
+                <a:srgbClr val="ED3C0B"/>
+              </a:solidFill>
+              <a:latin typeface="OCR A Extended" panose="02010509020102010303" pitchFamily="50" charset="0"/>
+            </a:endParaRPr>
+          </a:p>
+        </p:txBody>
+      </p:sp>
+      <p:sp>
+        <p:nvSpPr>
+          <p:cNvPr id="7" name="Textfeld 6">
+            <a:extLst>
+              <a:ext uri="{FF2B5EF4-FFF2-40B4-BE49-F238E27FC236}">
+                <a16:creationId xmlns:a16="http://schemas.microsoft.com/office/drawing/2014/main" id="{27BFBACB-375C-B4E5-8AEC-C75880750C4F}"/>
+              </a:ext>
+            </a:extLst>
+          </p:cNvPr>
+          <p:cNvSpPr txBox="1"/>
+          <p:nvPr/>
+        </p:nvSpPr>
+        <p:spPr>
+          <a:xfrm>
+            <a:off x="4878899" y="2649409"/>
+            <a:ext cx="854591" cy="2400657"/>
+          </a:xfrm>
+          <a:prstGeom prst="rect">
+            <a:avLst/>
+          </a:prstGeom>
+          <a:noFill/>
+        </p:spPr>
+        <p:txBody>
+          <a:bodyPr wrap="square">
+            <a:spAutoFit/>
+          </a:bodyPr>
+          <a:lstStyle/>
+          <a:p>
+            <a:r>
+              <a:rPr lang="de-DE" sz="15000" dirty="0">
+                <a:solidFill>
+                  <a:srgbClr val="ED3C0B"/>
+                </a:solidFill>
+                <a:latin typeface="OCR A Extended" panose="02010509020102010303" pitchFamily="50" charset="0"/>
+              </a:rPr>
+              <a:t>i</a:t>
+            </a:r>
+            <a:endParaRPr lang="de-AT" sz="15000" dirty="0"/>
+          </a:p>
+        </p:txBody>
+      </p:sp>
+      <p:sp>
+        <p:nvSpPr>
+          <p:cNvPr id="8" name="Textfeld 7">
+            <a:extLst>
+              <a:ext uri="{FF2B5EF4-FFF2-40B4-BE49-F238E27FC236}">
+                <a16:creationId xmlns:a16="http://schemas.microsoft.com/office/drawing/2014/main" id="{60E4CC86-7B2C-D4B8-E36B-17CAC186596F}"/>
+              </a:ext>
+            </a:extLst>
+          </p:cNvPr>
+          <p:cNvSpPr txBox="1"/>
+          <p:nvPr/>
+        </p:nvSpPr>
+        <p:spPr>
+          <a:xfrm>
+            <a:off x="9609925" y="1814522"/>
+            <a:ext cx="1561658" cy="2862322"/>
+          </a:xfrm>
+          <a:prstGeom prst="rect">
+            <a:avLst/>
+          </a:prstGeom>
+          <a:noFill/>
+        </p:spPr>
+        <p:txBody>
+          <a:bodyPr wrap="square">
+            <a:spAutoFit/>
+          </a:bodyPr>
+          <a:lstStyle/>
+          <a:p>
+            <a:r>
+              <a:rPr lang="de-DE" sz="18000" b="1" dirty="0">
+                <a:solidFill>
+                  <a:srgbClr val="ED3C0B"/>
+                </a:solidFill>
+                <a:latin typeface="Eurostile" panose="020B0504020202050204" pitchFamily="34" charset="0"/>
+              </a:rPr>
+              <a:t>?</a:t>
+            </a:r>
+            <a:endParaRPr lang="de-AT" sz="18000" b="1" dirty="0">
+              <a:latin typeface="Eurostile" panose="020B0504020202050204" pitchFamily="34" charset="0"/>
+            </a:endParaRPr>
+          </a:p>
+        </p:txBody>
+      </p:sp>
+      <p:pic>
+        <p:nvPicPr>
+          <p:cNvPr id="10" name="Grafik 9">
+            <a:extLst>
+              <a:ext uri="{FF2B5EF4-FFF2-40B4-BE49-F238E27FC236}">
+                <a16:creationId xmlns:a16="http://schemas.microsoft.com/office/drawing/2014/main" id="{0A8AC64D-8BDB-63BE-2C3A-7CE34454BF60}"/>
+              </a:ext>
+            </a:extLst>
+          </p:cNvPr>
+          <p:cNvPicPr>
+            <a:picLocks noChangeAspect="1"/>
+          </p:cNvPicPr>
+          <p:nvPr/>
+        </p:nvPicPr>
+        <p:blipFill>
+          <a:blip r:embed="rId2"/>
+          <a:stretch>
+            <a:fillRect/>
+          </a:stretch>
+        </p:blipFill>
+        <p:spPr>
+          <a:xfrm>
+            <a:off x="215501" y="1189572"/>
+            <a:ext cx="3956647" cy="4810161"/>
+          </a:xfrm>
+          <a:prstGeom prst="rect">
+            <a:avLst/>
+          </a:prstGeom>
+        </p:spPr>
+      </p:pic>
     </p:spTree>
     <p:extLst>
       <p:ext uri="{BB962C8B-B14F-4D97-AF65-F5344CB8AC3E}">
-        <p14:creationId xmlns:p14="http://schemas.microsoft.com/office/powerpoint/2010/main" val="3660824256"/>
+        <p14:creationId xmlns:p14="http://schemas.microsoft.com/office/powerpoint/2010/main" val="2182264236"/>
       </p:ext>
     </p:extLst>
   </p:cSld>
@@ -5449,126 +5446,10 @@
           </a:fontRef>
         </p:style>
       </p:cxnSp>
-      <p:cxnSp>
-        <p:nvCxnSpPr>
-          <p:cNvPr id="35" name="Gerader Verbinder 34">
-            <a:extLst>
-              <a:ext uri="{FF2B5EF4-FFF2-40B4-BE49-F238E27FC236}">
-                <a16:creationId xmlns:a16="http://schemas.microsoft.com/office/drawing/2014/main" id="{A06CE8BF-6B23-3854-3365-1F09E7B9CE2D}"/>
-              </a:ext>
-            </a:extLst>
-          </p:cNvPr>
-          <p:cNvCxnSpPr/>
-          <p:nvPr/>
-        </p:nvCxnSpPr>
-        <p:spPr>
-          <a:xfrm>
-            <a:off x="3668820" y="1255897"/>
-            <a:ext cx="84147" cy="3658301"/>
-          </a:xfrm>
-          <a:prstGeom prst="line">
-            <a:avLst/>
-          </a:prstGeom>
-          <a:ln w="9525"/>
-        </p:spPr>
-        <p:style>
-          <a:lnRef idx="1">
-            <a:schemeClr val="dk1"/>
-          </a:lnRef>
-          <a:fillRef idx="0">
-            <a:schemeClr val="dk1"/>
-          </a:fillRef>
-          <a:effectRef idx="0">
-            <a:schemeClr val="dk1"/>
-          </a:effectRef>
-          <a:fontRef idx="minor">
-            <a:schemeClr val="tx1"/>
-          </a:fontRef>
-        </p:style>
-      </p:cxnSp>
-      <p:cxnSp>
-        <p:nvCxnSpPr>
-          <p:cNvPr id="37" name="Gerader Verbinder 36">
-            <a:extLst>
-              <a:ext uri="{FF2B5EF4-FFF2-40B4-BE49-F238E27FC236}">
-                <a16:creationId xmlns:a16="http://schemas.microsoft.com/office/drawing/2014/main" id="{3A3F9B94-D591-4722-1FC8-59E12584B3AE}"/>
-              </a:ext>
-            </a:extLst>
-          </p:cNvPr>
-          <p:cNvCxnSpPr/>
-          <p:nvPr/>
-        </p:nvCxnSpPr>
-        <p:spPr>
-          <a:xfrm flipV="1">
-            <a:off x="3769797" y="4447882"/>
-            <a:ext cx="1385623" cy="443878"/>
-          </a:xfrm>
-          <a:prstGeom prst="line">
-            <a:avLst/>
-          </a:prstGeom>
-          <a:ln w="9525"/>
-        </p:spPr>
-        <p:style>
-          <a:lnRef idx="1">
-            <a:schemeClr val="dk1"/>
-          </a:lnRef>
-          <a:fillRef idx="0">
-            <a:schemeClr val="dk1"/>
-          </a:fillRef>
-          <a:effectRef idx="0">
-            <a:schemeClr val="dk1"/>
-          </a:effectRef>
-          <a:fontRef idx="minor">
-            <a:schemeClr val="tx1"/>
-          </a:fontRef>
-        </p:style>
-      </p:cxnSp>
-      <p:cxnSp>
-        <p:nvCxnSpPr>
-          <p:cNvPr id="2" name="Gerade Verbindung mit Pfeil 1">
-            <a:extLst>
-              <a:ext uri="{FF2B5EF4-FFF2-40B4-BE49-F238E27FC236}">
-                <a16:creationId xmlns:a16="http://schemas.microsoft.com/office/drawing/2014/main" id="{679D061E-4B24-50EA-0173-A03E5699E4FF}"/>
-              </a:ext>
-            </a:extLst>
-          </p:cNvPr>
-          <p:cNvCxnSpPr>
-            <a:cxnSpLocks/>
-          </p:cNvCxnSpPr>
-          <p:nvPr/>
-        </p:nvCxnSpPr>
-        <p:spPr>
-          <a:xfrm flipV="1">
-            <a:off x="1757479" y="4286746"/>
-            <a:ext cx="333375" cy="461963"/>
-          </a:xfrm>
-          <a:prstGeom prst="straightConnector1">
-            <a:avLst/>
-          </a:prstGeom>
-          <a:ln w="9525">
-            <a:headEnd w="lg" len="lg"/>
-            <a:tailEnd type="stealth" w="lg" len="lg"/>
-          </a:ln>
-        </p:spPr>
-        <p:style>
-          <a:lnRef idx="1">
-            <a:schemeClr val="dk1"/>
-          </a:lnRef>
-          <a:fillRef idx="0">
-            <a:schemeClr val="dk1"/>
-          </a:fillRef>
-          <a:effectRef idx="0">
-            <a:schemeClr val="dk1"/>
-          </a:effectRef>
-          <a:fontRef idx="minor">
-            <a:schemeClr val="tx1"/>
-          </a:fontRef>
-        </p:style>
-      </p:cxnSp>
     </p:spTree>
     <p:extLst>
       <p:ext uri="{BB962C8B-B14F-4D97-AF65-F5344CB8AC3E}">
-        <p14:creationId xmlns:p14="http://schemas.microsoft.com/office/powerpoint/2010/main" val="1178704449"/>
+        <p14:creationId xmlns:p14="http://schemas.microsoft.com/office/powerpoint/2010/main" val="756043445"/>
       </p:ext>
     </p:extLst>
   </p:cSld>
@@ -5595,6 +5476,1345 @@
           <a:chExt cx="0" cy="0"/>
         </a:xfrm>
       </p:grpSpPr>
+      <p:cxnSp>
+        <p:nvCxnSpPr>
+          <p:cNvPr id="7" name="Gerader Verbinder 6">
+            <a:extLst>
+              <a:ext uri="{FF2B5EF4-FFF2-40B4-BE49-F238E27FC236}">
+                <a16:creationId xmlns:a16="http://schemas.microsoft.com/office/drawing/2014/main" id="{871513E0-27F3-46EA-A76E-3E818E72613C}"/>
+              </a:ext>
+            </a:extLst>
+          </p:cNvPr>
+          <p:cNvCxnSpPr/>
+          <p:nvPr/>
+        </p:nvCxnSpPr>
+        <p:spPr>
+          <a:xfrm flipV="1">
+            <a:off x="2917104" y="953669"/>
+            <a:ext cx="4370047" cy="2002704"/>
+          </a:xfrm>
+          <a:prstGeom prst="line">
+            <a:avLst/>
+          </a:prstGeom>
+          <a:ln w="9525"/>
+        </p:spPr>
+        <p:style>
+          <a:lnRef idx="2">
+            <a:schemeClr val="dk1"/>
+          </a:lnRef>
+          <a:fillRef idx="0">
+            <a:schemeClr val="dk1"/>
+          </a:fillRef>
+          <a:effectRef idx="1">
+            <a:schemeClr val="dk1"/>
+          </a:effectRef>
+          <a:fontRef idx="minor">
+            <a:schemeClr val="tx1"/>
+          </a:fontRef>
+        </p:style>
+      </p:cxnSp>
+      <p:cxnSp>
+        <p:nvCxnSpPr>
+          <p:cNvPr id="9" name="Gerader Verbinder 8">
+            <a:extLst>
+              <a:ext uri="{FF2B5EF4-FFF2-40B4-BE49-F238E27FC236}">
+                <a16:creationId xmlns:a16="http://schemas.microsoft.com/office/drawing/2014/main" id="{30176299-A412-17C1-3662-24D85C7C04E9}"/>
+              </a:ext>
+            </a:extLst>
+          </p:cNvPr>
+          <p:cNvCxnSpPr/>
+          <p:nvPr/>
+        </p:nvCxnSpPr>
+        <p:spPr>
+          <a:xfrm flipV="1">
+            <a:off x="2911494" y="1262209"/>
+            <a:ext cx="751716" cy="1710993"/>
+          </a:xfrm>
+          <a:prstGeom prst="line">
+            <a:avLst/>
+          </a:prstGeom>
+          <a:ln w="9525"/>
+        </p:spPr>
+        <p:style>
+          <a:lnRef idx="2">
+            <a:schemeClr val="dk1"/>
+          </a:lnRef>
+          <a:fillRef idx="0">
+            <a:schemeClr val="dk1"/>
+          </a:fillRef>
+          <a:effectRef idx="1">
+            <a:schemeClr val="dk1"/>
+          </a:effectRef>
+          <a:fontRef idx="minor">
+            <a:schemeClr val="tx1"/>
+          </a:fontRef>
+        </p:style>
+      </p:cxnSp>
+      <p:cxnSp>
+        <p:nvCxnSpPr>
+          <p:cNvPr id="11" name="Gerader Verbinder 10">
+            <a:extLst>
+              <a:ext uri="{FF2B5EF4-FFF2-40B4-BE49-F238E27FC236}">
+                <a16:creationId xmlns:a16="http://schemas.microsoft.com/office/drawing/2014/main" id="{297B748D-1927-BE70-9D3B-6CD4FC253C29}"/>
+              </a:ext>
+            </a:extLst>
+          </p:cNvPr>
+          <p:cNvCxnSpPr/>
+          <p:nvPr/>
+        </p:nvCxnSpPr>
+        <p:spPr>
+          <a:xfrm>
+            <a:off x="3702479" y="1262209"/>
+            <a:ext cx="1464161" cy="3191985"/>
+          </a:xfrm>
+          <a:prstGeom prst="line">
+            <a:avLst/>
+          </a:prstGeom>
+          <a:ln w="9525"/>
+        </p:spPr>
+        <p:style>
+          <a:lnRef idx="2">
+            <a:schemeClr val="dk1"/>
+          </a:lnRef>
+          <a:fillRef idx="0">
+            <a:schemeClr val="dk1"/>
+          </a:fillRef>
+          <a:effectRef idx="1">
+            <a:schemeClr val="dk1"/>
+          </a:effectRef>
+          <a:fontRef idx="minor">
+            <a:schemeClr val="tx1"/>
+          </a:fontRef>
+        </p:style>
+      </p:cxnSp>
+      <p:cxnSp>
+        <p:nvCxnSpPr>
+          <p:cNvPr id="13" name="Gerader Verbinder 12">
+            <a:extLst>
+              <a:ext uri="{FF2B5EF4-FFF2-40B4-BE49-F238E27FC236}">
+                <a16:creationId xmlns:a16="http://schemas.microsoft.com/office/drawing/2014/main" id="{4576D5A5-5CDD-766F-47C9-676D5DEB3C8C}"/>
+              </a:ext>
+            </a:extLst>
+          </p:cNvPr>
+          <p:cNvCxnSpPr/>
+          <p:nvPr/>
+        </p:nvCxnSpPr>
+        <p:spPr>
+          <a:xfrm>
+            <a:off x="2911494" y="2956373"/>
+            <a:ext cx="5617298" cy="1346356"/>
+          </a:xfrm>
+          <a:prstGeom prst="line">
+            <a:avLst/>
+          </a:prstGeom>
+          <a:ln w="9525"/>
+        </p:spPr>
+        <p:style>
+          <a:lnRef idx="2">
+            <a:schemeClr val="dk1"/>
+          </a:lnRef>
+          <a:fillRef idx="0">
+            <a:schemeClr val="dk1"/>
+          </a:fillRef>
+          <a:effectRef idx="1">
+            <a:schemeClr val="dk1"/>
+          </a:effectRef>
+          <a:fontRef idx="minor">
+            <a:schemeClr val="tx1"/>
+          </a:fontRef>
+        </p:style>
+      </p:cxnSp>
+      <p:cxnSp>
+        <p:nvCxnSpPr>
+          <p:cNvPr id="15" name="Gerader Verbinder 14">
+            <a:extLst>
+              <a:ext uri="{FF2B5EF4-FFF2-40B4-BE49-F238E27FC236}">
+                <a16:creationId xmlns:a16="http://schemas.microsoft.com/office/drawing/2014/main" id="{52191099-8CD5-7958-BEBB-3AC4E7F0FA71}"/>
+              </a:ext>
+            </a:extLst>
+          </p:cNvPr>
+          <p:cNvCxnSpPr/>
+          <p:nvPr/>
+        </p:nvCxnSpPr>
+        <p:spPr>
+          <a:xfrm>
+            <a:off x="2911494" y="2973202"/>
+            <a:ext cx="2255146" cy="1480992"/>
+          </a:xfrm>
+          <a:prstGeom prst="line">
+            <a:avLst/>
+          </a:prstGeom>
+          <a:ln w="9525"/>
+        </p:spPr>
+        <p:style>
+          <a:lnRef idx="2">
+            <a:schemeClr val="dk1"/>
+          </a:lnRef>
+          <a:fillRef idx="0">
+            <a:schemeClr val="dk1"/>
+          </a:fillRef>
+          <a:effectRef idx="1">
+            <a:schemeClr val="dk1"/>
+          </a:effectRef>
+          <a:fontRef idx="minor">
+            <a:schemeClr val="tx1"/>
+          </a:fontRef>
+        </p:style>
+      </p:cxnSp>
+      <p:cxnSp>
+        <p:nvCxnSpPr>
+          <p:cNvPr id="17" name="Gerader Verbinder 16">
+            <a:extLst>
+              <a:ext uri="{FF2B5EF4-FFF2-40B4-BE49-F238E27FC236}">
+                <a16:creationId xmlns:a16="http://schemas.microsoft.com/office/drawing/2014/main" id="{6BF01FA4-616D-EA93-654F-B4C1739D5220}"/>
+              </a:ext>
+            </a:extLst>
+          </p:cNvPr>
+          <p:cNvCxnSpPr/>
+          <p:nvPr/>
+        </p:nvCxnSpPr>
+        <p:spPr>
+          <a:xfrm>
+            <a:off x="5166640" y="4454194"/>
+            <a:ext cx="1744653" cy="589031"/>
+          </a:xfrm>
+          <a:prstGeom prst="line">
+            <a:avLst/>
+          </a:prstGeom>
+          <a:ln w="9525"/>
+        </p:spPr>
+        <p:style>
+          <a:lnRef idx="2">
+            <a:schemeClr val="dk1"/>
+          </a:lnRef>
+          <a:fillRef idx="0">
+            <a:schemeClr val="dk1"/>
+          </a:fillRef>
+          <a:effectRef idx="1">
+            <a:schemeClr val="dk1"/>
+          </a:effectRef>
+          <a:fontRef idx="minor">
+            <a:schemeClr val="tx1"/>
+          </a:fontRef>
+        </p:style>
+      </p:cxnSp>
+      <p:cxnSp>
+        <p:nvCxnSpPr>
+          <p:cNvPr id="19" name="Gerader Verbinder 18">
+            <a:extLst>
+              <a:ext uri="{FF2B5EF4-FFF2-40B4-BE49-F238E27FC236}">
+                <a16:creationId xmlns:a16="http://schemas.microsoft.com/office/drawing/2014/main" id="{C8B0F0C3-AD10-CE99-C571-964EACD1EDC7}"/>
+              </a:ext>
+            </a:extLst>
+          </p:cNvPr>
+          <p:cNvCxnSpPr/>
+          <p:nvPr/>
+        </p:nvCxnSpPr>
+        <p:spPr>
+          <a:xfrm flipV="1">
+            <a:off x="6973001" y="4302729"/>
+            <a:ext cx="1555791" cy="740496"/>
+          </a:xfrm>
+          <a:prstGeom prst="line">
+            <a:avLst/>
+          </a:prstGeom>
+          <a:ln w="9525"/>
+        </p:spPr>
+        <p:style>
+          <a:lnRef idx="2">
+            <a:schemeClr val="dk1"/>
+          </a:lnRef>
+          <a:fillRef idx="0">
+            <a:schemeClr val="dk1"/>
+          </a:fillRef>
+          <a:effectRef idx="1">
+            <a:schemeClr val="dk1"/>
+          </a:effectRef>
+          <a:fontRef idx="minor">
+            <a:schemeClr val="tx1"/>
+          </a:fontRef>
+        </p:style>
+      </p:cxnSp>
+      <p:cxnSp>
+        <p:nvCxnSpPr>
+          <p:cNvPr id="21" name="Gerader Verbinder 20">
+            <a:extLst>
+              <a:ext uri="{FF2B5EF4-FFF2-40B4-BE49-F238E27FC236}">
+                <a16:creationId xmlns:a16="http://schemas.microsoft.com/office/drawing/2014/main" id="{0FEC2F52-A362-1717-BF91-EE5017ED5B2A}"/>
+              </a:ext>
+            </a:extLst>
+          </p:cNvPr>
+          <p:cNvCxnSpPr/>
+          <p:nvPr/>
+        </p:nvCxnSpPr>
+        <p:spPr>
+          <a:xfrm flipH="1" flipV="1">
+            <a:off x="6911293" y="2889055"/>
+            <a:ext cx="1656768" cy="1413674"/>
+          </a:xfrm>
+          <a:prstGeom prst="line">
+            <a:avLst/>
+          </a:prstGeom>
+          <a:ln w="9525"/>
+        </p:spPr>
+        <p:style>
+          <a:lnRef idx="2">
+            <a:schemeClr val="dk1"/>
+          </a:lnRef>
+          <a:fillRef idx="0">
+            <a:schemeClr val="dk1"/>
+          </a:fillRef>
+          <a:effectRef idx="1">
+            <a:schemeClr val="dk1"/>
+          </a:effectRef>
+          <a:fontRef idx="minor">
+            <a:schemeClr val="tx1"/>
+          </a:fontRef>
+        </p:style>
+      </p:cxnSp>
+      <p:cxnSp>
+        <p:nvCxnSpPr>
+          <p:cNvPr id="23" name="Gerader Verbinder 22">
+            <a:extLst>
+              <a:ext uri="{FF2B5EF4-FFF2-40B4-BE49-F238E27FC236}">
+                <a16:creationId xmlns:a16="http://schemas.microsoft.com/office/drawing/2014/main" id="{EC9DC9FB-FF54-31F7-0206-128972C556A3}"/>
+              </a:ext>
+            </a:extLst>
+          </p:cNvPr>
+          <p:cNvCxnSpPr/>
+          <p:nvPr/>
+        </p:nvCxnSpPr>
+        <p:spPr>
+          <a:xfrm flipH="1" flipV="1">
+            <a:off x="5346155" y="2753718"/>
+            <a:ext cx="1565138" cy="157776"/>
+          </a:xfrm>
+          <a:prstGeom prst="line">
+            <a:avLst/>
+          </a:prstGeom>
+          <a:ln w="9525"/>
+        </p:spPr>
+        <p:style>
+          <a:lnRef idx="2">
+            <a:schemeClr val="dk1"/>
+          </a:lnRef>
+          <a:fillRef idx="0">
+            <a:schemeClr val="dk1"/>
+          </a:fillRef>
+          <a:effectRef idx="1">
+            <a:schemeClr val="dk1"/>
+          </a:effectRef>
+          <a:fontRef idx="minor">
+            <a:schemeClr val="tx1"/>
+          </a:fontRef>
+        </p:style>
+      </p:cxnSp>
+      <p:cxnSp>
+        <p:nvCxnSpPr>
+          <p:cNvPr id="25" name="Gerader Verbinder 24">
+            <a:extLst>
+              <a:ext uri="{FF2B5EF4-FFF2-40B4-BE49-F238E27FC236}">
+                <a16:creationId xmlns:a16="http://schemas.microsoft.com/office/drawing/2014/main" id="{4ED29B56-AE50-EA1F-B070-C4BC288AA28A}"/>
+              </a:ext>
+            </a:extLst>
+          </p:cNvPr>
+          <p:cNvCxnSpPr/>
+          <p:nvPr/>
+        </p:nvCxnSpPr>
+        <p:spPr>
+          <a:xfrm flipV="1">
+            <a:off x="6911293" y="2434660"/>
+            <a:ext cx="2260756" cy="521713"/>
+          </a:xfrm>
+          <a:prstGeom prst="line">
+            <a:avLst/>
+          </a:prstGeom>
+          <a:ln w="9525"/>
+        </p:spPr>
+        <p:style>
+          <a:lnRef idx="2">
+            <a:schemeClr val="dk1"/>
+          </a:lnRef>
+          <a:fillRef idx="0">
+            <a:schemeClr val="dk1"/>
+          </a:fillRef>
+          <a:effectRef idx="1">
+            <a:schemeClr val="dk1"/>
+          </a:effectRef>
+          <a:fontRef idx="minor">
+            <a:schemeClr val="tx1"/>
+          </a:fontRef>
+        </p:style>
+      </p:cxnSp>
+      <p:cxnSp>
+        <p:nvCxnSpPr>
+          <p:cNvPr id="27" name="Gerader Verbinder 26">
+            <a:extLst>
+              <a:ext uri="{FF2B5EF4-FFF2-40B4-BE49-F238E27FC236}">
+                <a16:creationId xmlns:a16="http://schemas.microsoft.com/office/drawing/2014/main" id="{3DE7468D-DFD5-A58E-9C27-D57D67AFF75D}"/>
+              </a:ext>
+            </a:extLst>
+          </p:cNvPr>
+          <p:cNvCxnSpPr/>
+          <p:nvPr/>
+        </p:nvCxnSpPr>
+        <p:spPr>
+          <a:xfrm flipH="1" flipV="1">
+            <a:off x="7236663" y="953669"/>
+            <a:ext cx="1885059" cy="1469771"/>
+          </a:xfrm>
+          <a:prstGeom prst="line">
+            <a:avLst/>
+          </a:prstGeom>
+          <a:ln w="9525"/>
+        </p:spPr>
+        <p:style>
+          <a:lnRef idx="2">
+            <a:schemeClr val="dk1"/>
+          </a:lnRef>
+          <a:fillRef idx="0">
+            <a:schemeClr val="dk1"/>
+          </a:fillRef>
+          <a:effectRef idx="1">
+            <a:schemeClr val="dk1"/>
+          </a:effectRef>
+          <a:fontRef idx="minor">
+            <a:schemeClr val="tx1"/>
+          </a:fontRef>
+        </p:style>
+      </p:cxnSp>
+      <p:cxnSp>
+        <p:nvCxnSpPr>
+          <p:cNvPr id="29" name="Gerader Verbinder 28">
+            <a:extLst>
+              <a:ext uri="{FF2B5EF4-FFF2-40B4-BE49-F238E27FC236}">
+                <a16:creationId xmlns:a16="http://schemas.microsoft.com/office/drawing/2014/main" id="{B86476C7-3541-64E8-5014-B405EB6CACC7}"/>
+              </a:ext>
+            </a:extLst>
+          </p:cNvPr>
+          <p:cNvCxnSpPr/>
+          <p:nvPr/>
+        </p:nvCxnSpPr>
+        <p:spPr>
+          <a:xfrm flipV="1">
+            <a:off x="6911293" y="936840"/>
+            <a:ext cx="314150" cy="1974654"/>
+          </a:xfrm>
+          <a:prstGeom prst="line">
+            <a:avLst/>
+          </a:prstGeom>
+          <a:ln w="9525"/>
+        </p:spPr>
+        <p:style>
+          <a:lnRef idx="2">
+            <a:schemeClr val="dk1"/>
+          </a:lnRef>
+          <a:fillRef idx="0">
+            <a:schemeClr val="dk1"/>
+          </a:fillRef>
+          <a:effectRef idx="1">
+            <a:schemeClr val="dk1"/>
+          </a:effectRef>
+          <a:fontRef idx="minor">
+            <a:schemeClr val="tx1"/>
+          </a:fontRef>
+        </p:style>
+      </p:cxnSp>
+      <p:cxnSp>
+        <p:nvCxnSpPr>
+          <p:cNvPr id="31" name="Gerader Verbinder 30">
+            <a:extLst>
+              <a:ext uri="{FF2B5EF4-FFF2-40B4-BE49-F238E27FC236}">
+                <a16:creationId xmlns:a16="http://schemas.microsoft.com/office/drawing/2014/main" id="{ED0173B2-4B84-BC16-67E5-5E6F5F911EF5}"/>
+              </a:ext>
+            </a:extLst>
+          </p:cNvPr>
+          <p:cNvCxnSpPr/>
+          <p:nvPr/>
+        </p:nvCxnSpPr>
+        <p:spPr>
+          <a:xfrm flipH="1" flipV="1">
+            <a:off x="5480790" y="802204"/>
+            <a:ext cx="1430503" cy="2137340"/>
+          </a:xfrm>
+          <a:prstGeom prst="line">
+            <a:avLst/>
+          </a:prstGeom>
+          <a:ln w="9525"/>
+        </p:spPr>
+        <p:style>
+          <a:lnRef idx="2">
+            <a:schemeClr val="dk1"/>
+          </a:lnRef>
+          <a:fillRef idx="0">
+            <a:schemeClr val="dk1"/>
+          </a:fillRef>
+          <a:effectRef idx="1">
+            <a:schemeClr val="dk1"/>
+          </a:effectRef>
+          <a:fontRef idx="minor">
+            <a:schemeClr val="tx1"/>
+          </a:fontRef>
+        </p:style>
+      </p:cxnSp>
+      <p:cxnSp>
+        <p:nvCxnSpPr>
+          <p:cNvPr id="33" name="Gerader Verbinder 32">
+            <a:extLst>
+              <a:ext uri="{FF2B5EF4-FFF2-40B4-BE49-F238E27FC236}">
+                <a16:creationId xmlns:a16="http://schemas.microsoft.com/office/drawing/2014/main" id="{6943028A-2DA2-9551-0D2D-14B3531B2DDA}"/>
+              </a:ext>
+            </a:extLst>
+          </p:cNvPr>
+          <p:cNvCxnSpPr/>
+          <p:nvPr/>
+        </p:nvCxnSpPr>
+        <p:spPr>
+          <a:xfrm flipV="1">
+            <a:off x="5346155" y="802204"/>
+            <a:ext cx="100977" cy="1935386"/>
+          </a:xfrm>
+          <a:prstGeom prst="line">
+            <a:avLst/>
+          </a:prstGeom>
+          <a:ln w="9525"/>
+        </p:spPr>
+        <p:style>
+          <a:lnRef idx="2">
+            <a:schemeClr val="dk1"/>
+          </a:lnRef>
+          <a:fillRef idx="0">
+            <a:schemeClr val="dk1"/>
+          </a:fillRef>
+          <a:effectRef idx="1">
+            <a:schemeClr val="dk1"/>
+          </a:effectRef>
+          <a:fontRef idx="minor">
+            <a:schemeClr val="tx1"/>
+          </a:fontRef>
+        </p:style>
+      </p:cxnSp>
+      <p:cxnSp>
+        <p:nvCxnSpPr>
+          <p:cNvPr id="35" name="Gerader Verbinder 34">
+            <a:extLst>
+              <a:ext uri="{FF2B5EF4-FFF2-40B4-BE49-F238E27FC236}">
+                <a16:creationId xmlns:a16="http://schemas.microsoft.com/office/drawing/2014/main" id="{A06CE8BF-6B23-3854-3365-1F09E7B9CE2D}"/>
+              </a:ext>
+            </a:extLst>
+          </p:cNvPr>
+          <p:cNvCxnSpPr/>
+          <p:nvPr/>
+        </p:nvCxnSpPr>
+        <p:spPr>
+          <a:xfrm>
+            <a:off x="3668820" y="1255897"/>
+            <a:ext cx="84147" cy="3658301"/>
+          </a:xfrm>
+          <a:prstGeom prst="line">
+            <a:avLst/>
+          </a:prstGeom>
+          <a:ln w="9525">
+            <a:solidFill>
+              <a:srgbClr val="94B31C"/>
+            </a:solidFill>
+          </a:ln>
+        </p:spPr>
+        <p:style>
+          <a:lnRef idx="2">
+            <a:schemeClr val="accent1"/>
+          </a:lnRef>
+          <a:fillRef idx="0">
+            <a:schemeClr val="accent1"/>
+          </a:fillRef>
+          <a:effectRef idx="1">
+            <a:schemeClr val="accent1"/>
+          </a:effectRef>
+          <a:fontRef idx="minor">
+            <a:schemeClr val="tx1"/>
+          </a:fontRef>
+        </p:style>
+      </p:cxnSp>
+      <p:cxnSp>
+        <p:nvCxnSpPr>
+          <p:cNvPr id="37" name="Gerader Verbinder 36">
+            <a:extLst>
+              <a:ext uri="{FF2B5EF4-FFF2-40B4-BE49-F238E27FC236}">
+                <a16:creationId xmlns:a16="http://schemas.microsoft.com/office/drawing/2014/main" id="{3A3F9B94-D591-4722-1FC8-59E12584B3AE}"/>
+              </a:ext>
+            </a:extLst>
+          </p:cNvPr>
+          <p:cNvCxnSpPr/>
+          <p:nvPr/>
+        </p:nvCxnSpPr>
+        <p:spPr>
+          <a:xfrm flipV="1">
+            <a:off x="3769797" y="4447882"/>
+            <a:ext cx="1385623" cy="443878"/>
+          </a:xfrm>
+          <a:prstGeom prst="line">
+            <a:avLst/>
+          </a:prstGeom>
+          <a:ln w="9525">
+            <a:solidFill>
+              <a:srgbClr val="94B31C"/>
+            </a:solidFill>
+          </a:ln>
+        </p:spPr>
+        <p:style>
+          <a:lnRef idx="2">
+            <a:schemeClr val="accent1"/>
+          </a:lnRef>
+          <a:fillRef idx="0">
+            <a:schemeClr val="accent1"/>
+          </a:fillRef>
+          <a:effectRef idx="1">
+            <a:schemeClr val="accent1"/>
+          </a:effectRef>
+          <a:fontRef idx="minor">
+            <a:schemeClr val="tx1"/>
+          </a:fontRef>
+        </p:style>
+      </p:cxnSp>
+      <p:cxnSp>
+        <p:nvCxnSpPr>
+          <p:cNvPr id="2" name="Gerade Verbindung mit Pfeil 1">
+            <a:extLst>
+              <a:ext uri="{FF2B5EF4-FFF2-40B4-BE49-F238E27FC236}">
+                <a16:creationId xmlns:a16="http://schemas.microsoft.com/office/drawing/2014/main" id="{679D061E-4B24-50EA-0173-A03E5699E4FF}"/>
+              </a:ext>
+            </a:extLst>
+          </p:cNvPr>
+          <p:cNvCxnSpPr>
+            <a:cxnSpLocks/>
+          </p:cNvCxnSpPr>
+          <p:nvPr/>
+        </p:nvCxnSpPr>
+        <p:spPr>
+          <a:xfrm flipV="1">
+            <a:off x="1757479" y="4286746"/>
+            <a:ext cx="333375" cy="461963"/>
+          </a:xfrm>
+          <a:prstGeom prst="straightConnector1">
+            <a:avLst/>
+          </a:prstGeom>
+          <a:ln w="9525">
+            <a:solidFill>
+              <a:srgbClr val="94B31C"/>
+            </a:solidFill>
+            <a:headEnd w="lg" len="lg"/>
+            <a:tailEnd type="stealth" w="lg" len="lg"/>
+          </a:ln>
+        </p:spPr>
+        <p:style>
+          <a:lnRef idx="2">
+            <a:schemeClr val="accent1"/>
+          </a:lnRef>
+          <a:fillRef idx="0">
+            <a:schemeClr val="accent1"/>
+          </a:fillRef>
+          <a:effectRef idx="1">
+            <a:schemeClr val="accent1"/>
+          </a:effectRef>
+          <a:fontRef idx="minor">
+            <a:schemeClr val="tx1"/>
+          </a:fontRef>
+        </p:style>
+      </p:cxnSp>
+    </p:spTree>
+    <p:extLst>
+      <p:ext uri="{BB962C8B-B14F-4D97-AF65-F5344CB8AC3E}">
+        <p14:creationId xmlns:p14="http://schemas.microsoft.com/office/powerpoint/2010/main" val="3660824256"/>
+      </p:ext>
+    </p:extLst>
+  </p:cSld>
+  <p:clrMapOvr>
+    <a:masterClrMapping/>
+  </p:clrMapOvr>
+</p:sld>
+</file>
+
+<file path=ppt/slides/slide7.xml><?xml version="1.0" encoding="utf-8"?>
+<p:sld xmlns:a="http://schemas.openxmlformats.org/drawingml/2006/main" xmlns:r="http://schemas.openxmlformats.org/officeDocument/2006/relationships" xmlns:p="http://schemas.openxmlformats.org/presentationml/2006/main">
+  <p:cSld>
+    <p:spTree>
+      <p:nvGrpSpPr>
+        <p:cNvPr id="1" name=""/>
+        <p:cNvGrpSpPr/>
+        <p:nvPr/>
+      </p:nvGrpSpPr>
+      <p:grpSpPr>
+        <a:xfrm>
+          <a:off x="0" y="0"/>
+          <a:ext cx="0" cy="0"/>
+          <a:chOff x="0" y="0"/>
+          <a:chExt cx="0" cy="0"/>
+        </a:xfrm>
+      </p:grpSpPr>
+      <p:cxnSp>
+        <p:nvCxnSpPr>
+          <p:cNvPr id="7" name="Gerader Verbinder 6">
+            <a:extLst>
+              <a:ext uri="{FF2B5EF4-FFF2-40B4-BE49-F238E27FC236}">
+                <a16:creationId xmlns:a16="http://schemas.microsoft.com/office/drawing/2014/main" id="{871513E0-27F3-46EA-A76E-3E818E72613C}"/>
+              </a:ext>
+            </a:extLst>
+          </p:cNvPr>
+          <p:cNvCxnSpPr/>
+          <p:nvPr/>
+        </p:nvCxnSpPr>
+        <p:spPr>
+          <a:xfrm flipV="1">
+            <a:off x="2917104" y="953669"/>
+            <a:ext cx="4370047" cy="2002704"/>
+          </a:xfrm>
+          <a:prstGeom prst="line">
+            <a:avLst/>
+          </a:prstGeom>
+          <a:ln w="9525"/>
+        </p:spPr>
+        <p:style>
+          <a:lnRef idx="2">
+            <a:schemeClr val="dk1"/>
+          </a:lnRef>
+          <a:fillRef idx="0">
+            <a:schemeClr val="dk1"/>
+          </a:fillRef>
+          <a:effectRef idx="1">
+            <a:schemeClr val="dk1"/>
+          </a:effectRef>
+          <a:fontRef idx="minor">
+            <a:schemeClr val="tx1"/>
+          </a:fontRef>
+        </p:style>
+      </p:cxnSp>
+      <p:cxnSp>
+        <p:nvCxnSpPr>
+          <p:cNvPr id="9" name="Gerader Verbinder 8">
+            <a:extLst>
+              <a:ext uri="{FF2B5EF4-FFF2-40B4-BE49-F238E27FC236}">
+                <a16:creationId xmlns:a16="http://schemas.microsoft.com/office/drawing/2014/main" id="{30176299-A412-17C1-3662-24D85C7C04E9}"/>
+              </a:ext>
+            </a:extLst>
+          </p:cNvPr>
+          <p:cNvCxnSpPr/>
+          <p:nvPr/>
+        </p:nvCxnSpPr>
+        <p:spPr>
+          <a:xfrm flipV="1">
+            <a:off x="2911494" y="1262209"/>
+            <a:ext cx="751716" cy="1710993"/>
+          </a:xfrm>
+          <a:prstGeom prst="line">
+            <a:avLst/>
+          </a:prstGeom>
+          <a:ln w="9525"/>
+        </p:spPr>
+        <p:style>
+          <a:lnRef idx="2">
+            <a:schemeClr val="dk1"/>
+          </a:lnRef>
+          <a:fillRef idx="0">
+            <a:schemeClr val="dk1"/>
+          </a:fillRef>
+          <a:effectRef idx="1">
+            <a:schemeClr val="dk1"/>
+          </a:effectRef>
+          <a:fontRef idx="minor">
+            <a:schemeClr val="tx1"/>
+          </a:fontRef>
+        </p:style>
+      </p:cxnSp>
+      <p:cxnSp>
+        <p:nvCxnSpPr>
+          <p:cNvPr id="11" name="Gerader Verbinder 10">
+            <a:extLst>
+              <a:ext uri="{FF2B5EF4-FFF2-40B4-BE49-F238E27FC236}">
+                <a16:creationId xmlns:a16="http://schemas.microsoft.com/office/drawing/2014/main" id="{297B748D-1927-BE70-9D3B-6CD4FC253C29}"/>
+              </a:ext>
+            </a:extLst>
+          </p:cNvPr>
+          <p:cNvCxnSpPr/>
+          <p:nvPr/>
+        </p:nvCxnSpPr>
+        <p:spPr>
+          <a:xfrm>
+            <a:off x="3702479" y="1262209"/>
+            <a:ext cx="1464161" cy="3191985"/>
+          </a:xfrm>
+          <a:prstGeom prst="line">
+            <a:avLst/>
+          </a:prstGeom>
+          <a:ln w="9525"/>
+        </p:spPr>
+        <p:style>
+          <a:lnRef idx="2">
+            <a:schemeClr val="dk1"/>
+          </a:lnRef>
+          <a:fillRef idx="0">
+            <a:schemeClr val="dk1"/>
+          </a:fillRef>
+          <a:effectRef idx="1">
+            <a:schemeClr val="dk1"/>
+          </a:effectRef>
+          <a:fontRef idx="minor">
+            <a:schemeClr val="tx1"/>
+          </a:fontRef>
+        </p:style>
+      </p:cxnSp>
+      <p:cxnSp>
+        <p:nvCxnSpPr>
+          <p:cNvPr id="13" name="Gerader Verbinder 12">
+            <a:extLst>
+              <a:ext uri="{FF2B5EF4-FFF2-40B4-BE49-F238E27FC236}">
+                <a16:creationId xmlns:a16="http://schemas.microsoft.com/office/drawing/2014/main" id="{4576D5A5-5CDD-766F-47C9-676D5DEB3C8C}"/>
+              </a:ext>
+            </a:extLst>
+          </p:cNvPr>
+          <p:cNvCxnSpPr/>
+          <p:nvPr/>
+        </p:nvCxnSpPr>
+        <p:spPr>
+          <a:xfrm>
+            <a:off x="2911494" y="2956373"/>
+            <a:ext cx="5617298" cy="1346356"/>
+          </a:xfrm>
+          <a:prstGeom prst="line">
+            <a:avLst/>
+          </a:prstGeom>
+          <a:ln w="9525"/>
+        </p:spPr>
+        <p:style>
+          <a:lnRef idx="2">
+            <a:schemeClr val="dk1"/>
+          </a:lnRef>
+          <a:fillRef idx="0">
+            <a:schemeClr val="dk1"/>
+          </a:fillRef>
+          <a:effectRef idx="1">
+            <a:schemeClr val="dk1"/>
+          </a:effectRef>
+          <a:fontRef idx="minor">
+            <a:schemeClr val="tx1"/>
+          </a:fontRef>
+        </p:style>
+      </p:cxnSp>
+      <p:cxnSp>
+        <p:nvCxnSpPr>
+          <p:cNvPr id="15" name="Gerader Verbinder 14">
+            <a:extLst>
+              <a:ext uri="{FF2B5EF4-FFF2-40B4-BE49-F238E27FC236}">
+                <a16:creationId xmlns:a16="http://schemas.microsoft.com/office/drawing/2014/main" id="{52191099-8CD5-7958-BEBB-3AC4E7F0FA71}"/>
+              </a:ext>
+            </a:extLst>
+          </p:cNvPr>
+          <p:cNvCxnSpPr/>
+          <p:nvPr/>
+        </p:nvCxnSpPr>
+        <p:spPr>
+          <a:xfrm>
+            <a:off x="2911494" y="2973202"/>
+            <a:ext cx="2255146" cy="1480992"/>
+          </a:xfrm>
+          <a:prstGeom prst="line">
+            <a:avLst/>
+          </a:prstGeom>
+          <a:ln w="9525"/>
+        </p:spPr>
+        <p:style>
+          <a:lnRef idx="2">
+            <a:schemeClr val="dk1"/>
+          </a:lnRef>
+          <a:fillRef idx="0">
+            <a:schemeClr val="dk1"/>
+          </a:fillRef>
+          <a:effectRef idx="1">
+            <a:schemeClr val="dk1"/>
+          </a:effectRef>
+          <a:fontRef idx="minor">
+            <a:schemeClr val="tx1"/>
+          </a:fontRef>
+        </p:style>
+      </p:cxnSp>
+      <p:cxnSp>
+        <p:nvCxnSpPr>
+          <p:cNvPr id="17" name="Gerader Verbinder 16">
+            <a:extLst>
+              <a:ext uri="{FF2B5EF4-FFF2-40B4-BE49-F238E27FC236}">
+                <a16:creationId xmlns:a16="http://schemas.microsoft.com/office/drawing/2014/main" id="{6BF01FA4-616D-EA93-654F-B4C1739D5220}"/>
+              </a:ext>
+            </a:extLst>
+          </p:cNvPr>
+          <p:cNvCxnSpPr/>
+          <p:nvPr/>
+        </p:nvCxnSpPr>
+        <p:spPr>
+          <a:xfrm>
+            <a:off x="5166640" y="4454194"/>
+            <a:ext cx="1744653" cy="589031"/>
+          </a:xfrm>
+          <a:prstGeom prst="line">
+            <a:avLst/>
+          </a:prstGeom>
+          <a:ln w="9525"/>
+        </p:spPr>
+        <p:style>
+          <a:lnRef idx="2">
+            <a:schemeClr val="dk1"/>
+          </a:lnRef>
+          <a:fillRef idx="0">
+            <a:schemeClr val="dk1"/>
+          </a:fillRef>
+          <a:effectRef idx="1">
+            <a:schemeClr val="dk1"/>
+          </a:effectRef>
+          <a:fontRef idx="minor">
+            <a:schemeClr val="tx1"/>
+          </a:fontRef>
+        </p:style>
+      </p:cxnSp>
+      <p:cxnSp>
+        <p:nvCxnSpPr>
+          <p:cNvPr id="19" name="Gerader Verbinder 18">
+            <a:extLst>
+              <a:ext uri="{FF2B5EF4-FFF2-40B4-BE49-F238E27FC236}">
+                <a16:creationId xmlns:a16="http://schemas.microsoft.com/office/drawing/2014/main" id="{C8B0F0C3-AD10-CE99-C571-964EACD1EDC7}"/>
+              </a:ext>
+            </a:extLst>
+          </p:cNvPr>
+          <p:cNvCxnSpPr/>
+          <p:nvPr/>
+        </p:nvCxnSpPr>
+        <p:spPr>
+          <a:xfrm flipV="1">
+            <a:off x="6973001" y="4302729"/>
+            <a:ext cx="1555791" cy="740496"/>
+          </a:xfrm>
+          <a:prstGeom prst="line">
+            <a:avLst/>
+          </a:prstGeom>
+          <a:ln w="9525"/>
+        </p:spPr>
+        <p:style>
+          <a:lnRef idx="2">
+            <a:schemeClr val="dk1"/>
+          </a:lnRef>
+          <a:fillRef idx="0">
+            <a:schemeClr val="dk1"/>
+          </a:fillRef>
+          <a:effectRef idx="1">
+            <a:schemeClr val="dk1"/>
+          </a:effectRef>
+          <a:fontRef idx="minor">
+            <a:schemeClr val="tx1"/>
+          </a:fontRef>
+        </p:style>
+      </p:cxnSp>
+      <p:cxnSp>
+        <p:nvCxnSpPr>
+          <p:cNvPr id="21" name="Gerader Verbinder 20">
+            <a:extLst>
+              <a:ext uri="{FF2B5EF4-FFF2-40B4-BE49-F238E27FC236}">
+                <a16:creationId xmlns:a16="http://schemas.microsoft.com/office/drawing/2014/main" id="{0FEC2F52-A362-1717-BF91-EE5017ED5B2A}"/>
+              </a:ext>
+            </a:extLst>
+          </p:cNvPr>
+          <p:cNvCxnSpPr/>
+          <p:nvPr/>
+        </p:nvCxnSpPr>
+        <p:spPr>
+          <a:xfrm flipH="1" flipV="1">
+            <a:off x="6911293" y="2889055"/>
+            <a:ext cx="1656768" cy="1413674"/>
+          </a:xfrm>
+          <a:prstGeom prst="line">
+            <a:avLst/>
+          </a:prstGeom>
+          <a:ln w="9525"/>
+        </p:spPr>
+        <p:style>
+          <a:lnRef idx="2">
+            <a:schemeClr val="dk1"/>
+          </a:lnRef>
+          <a:fillRef idx="0">
+            <a:schemeClr val="dk1"/>
+          </a:fillRef>
+          <a:effectRef idx="1">
+            <a:schemeClr val="dk1"/>
+          </a:effectRef>
+          <a:fontRef idx="minor">
+            <a:schemeClr val="tx1"/>
+          </a:fontRef>
+        </p:style>
+      </p:cxnSp>
+      <p:cxnSp>
+        <p:nvCxnSpPr>
+          <p:cNvPr id="23" name="Gerader Verbinder 22">
+            <a:extLst>
+              <a:ext uri="{FF2B5EF4-FFF2-40B4-BE49-F238E27FC236}">
+                <a16:creationId xmlns:a16="http://schemas.microsoft.com/office/drawing/2014/main" id="{EC9DC9FB-FF54-31F7-0206-128972C556A3}"/>
+              </a:ext>
+            </a:extLst>
+          </p:cNvPr>
+          <p:cNvCxnSpPr/>
+          <p:nvPr/>
+        </p:nvCxnSpPr>
+        <p:spPr>
+          <a:xfrm flipH="1" flipV="1">
+            <a:off x="5346155" y="2753718"/>
+            <a:ext cx="1565138" cy="157776"/>
+          </a:xfrm>
+          <a:prstGeom prst="line">
+            <a:avLst/>
+          </a:prstGeom>
+          <a:ln w="9525"/>
+        </p:spPr>
+        <p:style>
+          <a:lnRef idx="2">
+            <a:schemeClr val="dk1"/>
+          </a:lnRef>
+          <a:fillRef idx="0">
+            <a:schemeClr val="dk1"/>
+          </a:fillRef>
+          <a:effectRef idx="1">
+            <a:schemeClr val="dk1"/>
+          </a:effectRef>
+          <a:fontRef idx="minor">
+            <a:schemeClr val="tx1"/>
+          </a:fontRef>
+        </p:style>
+      </p:cxnSp>
+      <p:cxnSp>
+        <p:nvCxnSpPr>
+          <p:cNvPr id="25" name="Gerader Verbinder 24">
+            <a:extLst>
+              <a:ext uri="{FF2B5EF4-FFF2-40B4-BE49-F238E27FC236}">
+                <a16:creationId xmlns:a16="http://schemas.microsoft.com/office/drawing/2014/main" id="{4ED29B56-AE50-EA1F-B070-C4BC288AA28A}"/>
+              </a:ext>
+            </a:extLst>
+          </p:cNvPr>
+          <p:cNvCxnSpPr/>
+          <p:nvPr/>
+        </p:nvCxnSpPr>
+        <p:spPr>
+          <a:xfrm flipV="1">
+            <a:off x="6911293" y="2434660"/>
+            <a:ext cx="2260756" cy="521713"/>
+          </a:xfrm>
+          <a:prstGeom prst="line">
+            <a:avLst/>
+          </a:prstGeom>
+          <a:ln w="9525"/>
+        </p:spPr>
+        <p:style>
+          <a:lnRef idx="2">
+            <a:schemeClr val="dk1"/>
+          </a:lnRef>
+          <a:fillRef idx="0">
+            <a:schemeClr val="dk1"/>
+          </a:fillRef>
+          <a:effectRef idx="1">
+            <a:schemeClr val="dk1"/>
+          </a:effectRef>
+          <a:fontRef idx="minor">
+            <a:schemeClr val="tx1"/>
+          </a:fontRef>
+        </p:style>
+      </p:cxnSp>
+      <p:cxnSp>
+        <p:nvCxnSpPr>
+          <p:cNvPr id="27" name="Gerader Verbinder 26">
+            <a:extLst>
+              <a:ext uri="{FF2B5EF4-FFF2-40B4-BE49-F238E27FC236}">
+                <a16:creationId xmlns:a16="http://schemas.microsoft.com/office/drawing/2014/main" id="{3DE7468D-DFD5-A58E-9C27-D57D67AFF75D}"/>
+              </a:ext>
+            </a:extLst>
+          </p:cNvPr>
+          <p:cNvCxnSpPr/>
+          <p:nvPr/>
+        </p:nvCxnSpPr>
+        <p:spPr>
+          <a:xfrm flipH="1" flipV="1">
+            <a:off x="7236663" y="953669"/>
+            <a:ext cx="1885059" cy="1469771"/>
+          </a:xfrm>
+          <a:prstGeom prst="line">
+            <a:avLst/>
+          </a:prstGeom>
+          <a:ln w="9525"/>
+        </p:spPr>
+        <p:style>
+          <a:lnRef idx="2">
+            <a:schemeClr val="dk1"/>
+          </a:lnRef>
+          <a:fillRef idx="0">
+            <a:schemeClr val="dk1"/>
+          </a:fillRef>
+          <a:effectRef idx="1">
+            <a:schemeClr val="dk1"/>
+          </a:effectRef>
+          <a:fontRef idx="minor">
+            <a:schemeClr val="tx1"/>
+          </a:fontRef>
+        </p:style>
+      </p:cxnSp>
+      <p:cxnSp>
+        <p:nvCxnSpPr>
+          <p:cNvPr id="29" name="Gerader Verbinder 28">
+            <a:extLst>
+              <a:ext uri="{FF2B5EF4-FFF2-40B4-BE49-F238E27FC236}">
+                <a16:creationId xmlns:a16="http://schemas.microsoft.com/office/drawing/2014/main" id="{B86476C7-3541-64E8-5014-B405EB6CACC7}"/>
+              </a:ext>
+            </a:extLst>
+          </p:cNvPr>
+          <p:cNvCxnSpPr/>
+          <p:nvPr/>
+        </p:nvCxnSpPr>
+        <p:spPr>
+          <a:xfrm flipV="1">
+            <a:off x="6911293" y="936840"/>
+            <a:ext cx="314150" cy="1974654"/>
+          </a:xfrm>
+          <a:prstGeom prst="line">
+            <a:avLst/>
+          </a:prstGeom>
+          <a:ln w="9525"/>
+        </p:spPr>
+        <p:style>
+          <a:lnRef idx="2">
+            <a:schemeClr val="dk1"/>
+          </a:lnRef>
+          <a:fillRef idx="0">
+            <a:schemeClr val="dk1"/>
+          </a:fillRef>
+          <a:effectRef idx="1">
+            <a:schemeClr val="dk1"/>
+          </a:effectRef>
+          <a:fontRef idx="minor">
+            <a:schemeClr val="tx1"/>
+          </a:fontRef>
+        </p:style>
+      </p:cxnSp>
+      <p:cxnSp>
+        <p:nvCxnSpPr>
+          <p:cNvPr id="31" name="Gerader Verbinder 30">
+            <a:extLst>
+              <a:ext uri="{FF2B5EF4-FFF2-40B4-BE49-F238E27FC236}">
+                <a16:creationId xmlns:a16="http://schemas.microsoft.com/office/drawing/2014/main" id="{ED0173B2-4B84-BC16-67E5-5E6F5F911EF5}"/>
+              </a:ext>
+            </a:extLst>
+          </p:cNvPr>
+          <p:cNvCxnSpPr/>
+          <p:nvPr/>
+        </p:nvCxnSpPr>
+        <p:spPr>
+          <a:xfrm flipH="1" flipV="1">
+            <a:off x="5480790" y="802204"/>
+            <a:ext cx="1430503" cy="2137340"/>
+          </a:xfrm>
+          <a:prstGeom prst="line">
+            <a:avLst/>
+          </a:prstGeom>
+          <a:ln w="9525"/>
+        </p:spPr>
+        <p:style>
+          <a:lnRef idx="2">
+            <a:schemeClr val="dk1"/>
+          </a:lnRef>
+          <a:fillRef idx="0">
+            <a:schemeClr val="dk1"/>
+          </a:fillRef>
+          <a:effectRef idx="1">
+            <a:schemeClr val="dk1"/>
+          </a:effectRef>
+          <a:fontRef idx="minor">
+            <a:schemeClr val="tx1"/>
+          </a:fontRef>
+        </p:style>
+      </p:cxnSp>
+      <p:cxnSp>
+        <p:nvCxnSpPr>
+          <p:cNvPr id="33" name="Gerader Verbinder 32">
+            <a:extLst>
+              <a:ext uri="{FF2B5EF4-FFF2-40B4-BE49-F238E27FC236}">
+                <a16:creationId xmlns:a16="http://schemas.microsoft.com/office/drawing/2014/main" id="{6943028A-2DA2-9551-0D2D-14B3531B2DDA}"/>
+              </a:ext>
+            </a:extLst>
+          </p:cNvPr>
+          <p:cNvCxnSpPr/>
+          <p:nvPr/>
+        </p:nvCxnSpPr>
+        <p:spPr>
+          <a:xfrm flipV="1">
+            <a:off x="5346155" y="802204"/>
+            <a:ext cx="100977" cy="1935386"/>
+          </a:xfrm>
+          <a:prstGeom prst="line">
+            <a:avLst/>
+          </a:prstGeom>
+          <a:ln w="9525"/>
+        </p:spPr>
+        <p:style>
+          <a:lnRef idx="2">
+            <a:schemeClr val="dk1"/>
+          </a:lnRef>
+          <a:fillRef idx="0">
+            <a:schemeClr val="dk1"/>
+          </a:fillRef>
+          <a:effectRef idx="1">
+            <a:schemeClr val="dk1"/>
+          </a:effectRef>
+          <a:fontRef idx="minor">
+            <a:schemeClr val="tx1"/>
+          </a:fontRef>
+        </p:style>
+      </p:cxnSp>
+      <p:cxnSp>
+        <p:nvCxnSpPr>
+          <p:cNvPr id="35" name="Gerader Verbinder 34">
+            <a:extLst>
+              <a:ext uri="{FF2B5EF4-FFF2-40B4-BE49-F238E27FC236}">
+                <a16:creationId xmlns:a16="http://schemas.microsoft.com/office/drawing/2014/main" id="{A06CE8BF-6B23-3854-3365-1F09E7B9CE2D}"/>
+              </a:ext>
+            </a:extLst>
+          </p:cNvPr>
+          <p:cNvCxnSpPr/>
+          <p:nvPr/>
+        </p:nvCxnSpPr>
+        <p:spPr>
+          <a:xfrm>
+            <a:off x="3668820" y="1255897"/>
+            <a:ext cx="84147" cy="3658301"/>
+          </a:xfrm>
+          <a:prstGeom prst="line">
+            <a:avLst/>
+          </a:prstGeom>
+          <a:ln w="9525"/>
+        </p:spPr>
+        <p:style>
+          <a:lnRef idx="1">
+            <a:schemeClr val="dk1"/>
+          </a:lnRef>
+          <a:fillRef idx="0">
+            <a:schemeClr val="dk1"/>
+          </a:fillRef>
+          <a:effectRef idx="0">
+            <a:schemeClr val="dk1"/>
+          </a:effectRef>
+          <a:fontRef idx="minor">
+            <a:schemeClr val="tx1"/>
+          </a:fontRef>
+        </p:style>
+      </p:cxnSp>
+      <p:cxnSp>
+        <p:nvCxnSpPr>
+          <p:cNvPr id="37" name="Gerader Verbinder 36">
+            <a:extLst>
+              <a:ext uri="{FF2B5EF4-FFF2-40B4-BE49-F238E27FC236}">
+                <a16:creationId xmlns:a16="http://schemas.microsoft.com/office/drawing/2014/main" id="{3A3F9B94-D591-4722-1FC8-59E12584B3AE}"/>
+              </a:ext>
+            </a:extLst>
+          </p:cNvPr>
+          <p:cNvCxnSpPr/>
+          <p:nvPr/>
+        </p:nvCxnSpPr>
+        <p:spPr>
+          <a:xfrm flipV="1">
+            <a:off x="3769797" y="4447882"/>
+            <a:ext cx="1385623" cy="443878"/>
+          </a:xfrm>
+          <a:prstGeom prst="line">
+            <a:avLst/>
+          </a:prstGeom>
+          <a:ln w="9525"/>
+        </p:spPr>
+        <p:style>
+          <a:lnRef idx="1">
+            <a:schemeClr val="dk1"/>
+          </a:lnRef>
+          <a:fillRef idx="0">
+            <a:schemeClr val="dk1"/>
+          </a:fillRef>
+          <a:effectRef idx="0">
+            <a:schemeClr val="dk1"/>
+          </a:effectRef>
+          <a:fontRef idx="minor">
+            <a:schemeClr val="tx1"/>
+          </a:fontRef>
+        </p:style>
+      </p:cxnSp>
+      <p:cxnSp>
+        <p:nvCxnSpPr>
+          <p:cNvPr id="2" name="Gerade Verbindung mit Pfeil 1">
+            <a:extLst>
+              <a:ext uri="{FF2B5EF4-FFF2-40B4-BE49-F238E27FC236}">
+                <a16:creationId xmlns:a16="http://schemas.microsoft.com/office/drawing/2014/main" id="{679D061E-4B24-50EA-0173-A03E5699E4FF}"/>
+              </a:ext>
+            </a:extLst>
+          </p:cNvPr>
+          <p:cNvCxnSpPr>
+            <a:cxnSpLocks/>
+          </p:cNvCxnSpPr>
+          <p:nvPr/>
+        </p:nvCxnSpPr>
+        <p:spPr>
+          <a:xfrm flipV="1">
+            <a:off x="1757479" y="4286746"/>
+            <a:ext cx="333375" cy="461963"/>
+          </a:xfrm>
+          <a:prstGeom prst="straightConnector1">
+            <a:avLst/>
+          </a:prstGeom>
+          <a:ln w="9525">
+            <a:headEnd w="lg" len="lg"/>
+            <a:tailEnd type="stealth" w="lg" len="lg"/>
+          </a:ln>
+        </p:spPr>
+        <p:style>
+          <a:lnRef idx="1">
+            <a:schemeClr val="dk1"/>
+          </a:lnRef>
+          <a:fillRef idx="0">
+            <a:schemeClr val="dk1"/>
+          </a:fillRef>
+          <a:effectRef idx="0">
+            <a:schemeClr val="dk1"/>
+          </a:effectRef>
+          <a:fontRef idx="minor">
+            <a:schemeClr val="tx1"/>
+          </a:fontRef>
+        </p:style>
+      </p:cxnSp>
+    </p:spTree>
+    <p:extLst>
+      <p:ext uri="{BB962C8B-B14F-4D97-AF65-F5344CB8AC3E}">
+        <p14:creationId xmlns:p14="http://schemas.microsoft.com/office/powerpoint/2010/main" val="1178704449"/>
+      </p:ext>
+    </p:extLst>
+  </p:cSld>
+  <p:clrMapOvr>
+    <a:masterClrMapping/>
+  </p:clrMapOvr>
+</p:sld>
+</file>
+
+<file path=ppt/slides/slide8.xml><?xml version="1.0" encoding="utf-8"?>
+<p:sld xmlns:a="http://schemas.openxmlformats.org/drawingml/2006/main" xmlns:r="http://schemas.openxmlformats.org/officeDocument/2006/relationships" xmlns:p="http://schemas.openxmlformats.org/presentationml/2006/main">
+  <p:cSld>
+    <p:spTree>
+      <p:nvGrpSpPr>
+        <p:cNvPr id="1" name=""/>
+        <p:cNvGrpSpPr/>
+        <p:nvPr/>
+      </p:nvGrpSpPr>
+      <p:grpSpPr>
+        <a:xfrm>
+          <a:off x="0" y="0"/>
+          <a:ext cx="0" cy="0"/>
+          <a:chOff x="0" y="0"/>
+          <a:chExt cx="0" cy="0"/>
+        </a:xfrm>
+      </p:grpSpPr>
       <p:pic>
         <p:nvPicPr>
           <p:cNvPr id="5" name="Grafik 4" descr="Ein Bild, das Text, Screenshot, Kreis, Schrift enthält.&#10;&#10;Automatisch generierte Beschreibung">
@@ -5644,7 +6864,7 @@
 </p:sld>
 </file>
 
-<file path=ppt/slides/slide7.xml><?xml version="1.0" encoding="utf-8"?>
+<file path=ppt/slides/slide9.xml><?xml version="1.0" encoding="utf-8"?>
 <p:sld xmlns:a="http://schemas.openxmlformats.org/drawingml/2006/main" xmlns:r="http://schemas.openxmlformats.org/officeDocument/2006/relationships" xmlns:p="http://schemas.openxmlformats.org/presentationml/2006/main">
   <p:cSld>
     <p:spTree>

</xml_diff>

<commit_message>
files zur Farbauswahl des Designs erstellt
</commit_message>
<xml_diff>
--- a/prototyp/symbole_und_farben.pptx
+++ b/prototyp/symbole_und_farben.pptx
@@ -7,14 +7,14 @@
   <p:sldIdLst>
     <p:sldId id="266" r:id="rId2"/>
     <p:sldId id="267" r:id="rId3"/>
-    <p:sldId id="265" r:id="rId4"/>
-    <p:sldId id="256" r:id="rId5"/>
-    <p:sldId id="268" r:id="rId6"/>
-    <p:sldId id="259" r:id="rId7"/>
-    <p:sldId id="263" r:id="rId8"/>
-    <p:sldId id="262" r:id="rId9"/>
-    <p:sldId id="261" r:id="rId10"/>
-    <p:sldId id="264" r:id="rId11"/>
+    <p:sldId id="264" r:id="rId4"/>
+    <p:sldId id="265" r:id="rId5"/>
+    <p:sldId id="256" r:id="rId6"/>
+    <p:sldId id="268" r:id="rId7"/>
+    <p:sldId id="259" r:id="rId8"/>
+    <p:sldId id="263" r:id="rId9"/>
+    <p:sldId id="262" r:id="rId10"/>
+    <p:sldId id="261" r:id="rId11"/>
   </p:sldIdLst>
   <p:sldSz cx="12192000" cy="6858000"/>
   <p:notesSz cx="6858000" cy="9144000"/>
@@ -270,7 +270,7 @@
           <a:p>
             <a:fld id="{B52076B9-41B9-4289-B1FF-FFD8BCB4D7C3}" type="datetimeFigureOut">
               <a:rPr lang="de-AT" smtClean="0"/>
-              <a:t>21.05.2024</a:t>
+              <a:t>23.05.2024</a:t>
             </a:fld>
             <a:endParaRPr lang="de-AT"/>
           </a:p>
@@ -470,7 +470,7 @@
           <a:p>
             <a:fld id="{B52076B9-41B9-4289-B1FF-FFD8BCB4D7C3}" type="datetimeFigureOut">
               <a:rPr lang="de-AT" smtClean="0"/>
-              <a:t>21.05.2024</a:t>
+              <a:t>23.05.2024</a:t>
             </a:fld>
             <a:endParaRPr lang="de-AT"/>
           </a:p>
@@ -680,7 +680,7 @@
           <a:p>
             <a:fld id="{B52076B9-41B9-4289-B1FF-FFD8BCB4D7C3}" type="datetimeFigureOut">
               <a:rPr lang="de-AT" smtClean="0"/>
-              <a:t>21.05.2024</a:t>
+              <a:t>23.05.2024</a:t>
             </a:fld>
             <a:endParaRPr lang="de-AT"/>
           </a:p>
@@ -880,7 +880,7 @@
           <a:p>
             <a:fld id="{B52076B9-41B9-4289-B1FF-FFD8BCB4D7C3}" type="datetimeFigureOut">
               <a:rPr lang="de-AT" smtClean="0"/>
-              <a:t>21.05.2024</a:t>
+              <a:t>23.05.2024</a:t>
             </a:fld>
             <a:endParaRPr lang="de-AT"/>
           </a:p>
@@ -1156,7 +1156,7 @@
           <a:p>
             <a:fld id="{B52076B9-41B9-4289-B1FF-FFD8BCB4D7C3}" type="datetimeFigureOut">
               <a:rPr lang="de-AT" smtClean="0"/>
-              <a:t>21.05.2024</a:t>
+              <a:t>23.05.2024</a:t>
             </a:fld>
             <a:endParaRPr lang="de-AT"/>
           </a:p>
@@ -1424,7 +1424,7 @@
           <a:p>
             <a:fld id="{B52076B9-41B9-4289-B1FF-FFD8BCB4D7C3}" type="datetimeFigureOut">
               <a:rPr lang="de-AT" smtClean="0"/>
-              <a:t>21.05.2024</a:t>
+              <a:t>23.05.2024</a:t>
             </a:fld>
             <a:endParaRPr lang="de-AT"/>
           </a:p>
@@ -1839,7 +1839,7 @@
           <a:p>
             <a:fld id="{B52076B9-41B9-4289-B1FF-FFD8BCB4D7C3}" type="datetimeFigureOut">
               <a:rPr lang="de-AT" smtClean="0"/>
-              <a:t>21.05.2024</a:t>
+              <a:t>23.05.2024</a:t>
             </a:fld>
             <a:endParaRPr lang="de-AT"/>
           </a:p>
@@ -1981,7 +1981,7 @@
           <a:p>
             <a:fld id="{B52076B9-41B9-4289-B1FF-FFD8BCB4D7C3}" type="datetimeFigureOut">
               <a:rPr lang="de-AT" smtClean="0"/>
-              <a:t>21.05.2024</a:t>
+              <a:t>23.05.2024</a:t>
             </a:fld>
             <a:endParaRPr lang="de-AT"/>
           </a:p>
@@ -2094,7 +2094,7 @@
           <a:p>
             <a:fld id="{B52076B9-41B9-4289-B1FF-FFD8BCB4D7C3}" type="datetimeFigureOut">
               <a:rPr lang="de-AT" smtClean="0"/>
-              <a:t>21.05.2024</a:t>
+              <a:t>23.05.2024</a:t>
             </a:fld>
             <a:endParaRPr lang="de-AT"/>
           </a:p>
@@ -2407,7 +2407,7 @@
           <a:p>
             <a:fld id="{B52076B9-41B9-4289-B1FF-FFD8BCB4D7C3}" type="datetimeFigureOut">
               <a:rPr lang="de-AT" smtClean="0"/>
-              <a:t>21.05.2024</a:t>
+              <a:t>23.05.2024</a:t>
             </a:fld>
             <a:endParaRPr lang="de-AT"/>
           </a:p>
@@ -2696,7 +2696,7 @@
           <a:p>
             <a:fld id="{B52076B9-41B9-4289-B1FF-FFD8BCB4D7C3}" type="datetimeFigureOut">
               <a:rPr lang="de-AT" smtClean="0"/>
-              <a:t>21.05.2024</a:t>
+              <a:t>23.05.2024</a:t>
             </a:fld>
             <a:endParaRPr lang="de-AT"/>
           </a:p>
@@ -2939,7 +2939,7 @@
           <a:p>
             <a:fld id="{B52076B9-41B9-4289-B1FF-FFD8BCB4D7C3}" type="datetimeFigureOut">
               <a:rPr lang="de-AT" smtClean="0"/>
-              <a:t>21.05.2024</a:t>
+              <a:t>23.05.2024</a:t>
             </a:fld>
             <a:endParaRPr lang="de-AT"/>
           </a:p>
@@ -3379,7 +3379,7 @@
             </a:avLst>
           </a:prstGeom>
           <a:solidFill>
-            <a:srgbClr val="D5E5C2"/>
+            <a:srgbClr val="B0D5A6"/>
           </a:solidFill>
           <a:ln w="76200"/>
         </p:spPr>
@@ -3553,7 +3553,7 @@
             <a:r>
               <a:rPr lang="de-AT" sz="18000" dirty="0">
                 <a:solidFill>
-                  <a:srgbClr val="336117"/>
+                  <a:srgbClr val="354C28"/>
                 </a:solidFill>
                 <a:latin typeface="SquareSlab711 Lt BT" panose="02060506020206060203" pitchFamily="18" charset="0"/>
               </a:rPr>
@@ -3594,7 +3594,7 @@
             <a:r>
               <a:rPr lang="de-AT" sz="18000" dirty="0">
                 <a:solidFill>
-                  <a:srgbClr val="336117"/>
+                  <a:srgbClr val="354C28"/>
                 </a:solidFill>
                 <a:latin typeface="SquareSlab711 Lt BT" panose="02060506020206060203" pitchFamily="18" charset="0"/>
               </a:rPr>
@@ -3967,178 +3967,46 @@
           <a:chExt cx="0" cy="0"/>
         </a:xfrm>
       </p:grpSpPr>
-      <p:sp>
-        <p:nvSpPr>
-          <p:cNvPr id="4" name="Rechteck: abgerundete Ecken 3">
-            <a:extLst>
-              <a:ext uri="{FF2B5EF4-FFF2-40B4-BE49-F238E27FC236}">
-                <a16:creationId xmlns:a16="http://schemas.microsoft.com/office/drawing/2014/main" id="{D581A684-B317-BCD1-749C-E7D0DEAB183F}"/>
-              </a:ext>
-            </a:extLst>
-          </p:cNvPr>
-          <p:cNvSpPr/>
-          <p:nvPr/>
-        </p:nvSpPr>
+      <p:pic>
+        <p:nvPicPr>
+          <p:cNvPr id="5" name="Grafik 4" descr="Ein Bild, das Text, Screenshot, Kreis, Schrift enthält.&#10;&#10;Automatisch generierte Beschreibung">
+            <a:extLst>
+              <a:ext uri="{FF2B5EF4-FFF2-40B4-BE49-F238E27FC236}">
+                <a16:creationId xmlns:a16="http://schemas.microsoft.com/office/drawing/2014/main" id="{C53078EB-04F9-7BAB-F0D4-32ED20280B12}"/>
+              </a:ext>
+            </a:extLst>
+          </p:cNvPr>
+          <p:cNvPicPr>
+            <a:picLocks noChangeAspect="1"/>
+          </p:cNvPicPr>
+          <p:nvPr/>
+        </p:nvPicPr>
+        <p:blipFill>
+          <a:blip r:embed="rId2">
+            <a:extLst>
+              <a:ext uri="{28A0092B-C50C-407E-A947-70E740481C1C}">
+                <a14:useLocalDpi xmlns:a14="http://schemas.microsoft.com/office/drawing/2010/main" val="0"/>
+              </a:ext>
+            </a:extLst>
+          </a:blip>
+          <a:stretch>
+            <a:fillRect/>
+          </a:stretch>
+        </p:blipFill>
         <p:spPr>
           <a:xfrm>
-            <a:off x="4380614" y="2200941"/>
-            <a:ext cx="3476846" cy="398720"/>
-          </a:xfrm>
-          <a:prstGeom prst="roundRect">
-            <a:avLst>
-              <a:gd name="adj" fmla="val 50000"/>
-            </a:avLst>
-          </a:prstGeom>
-          <a:solidFill>
-            <a:srgbClr val="0070C0"/>
-          </a:solidFill>
-          <a:ln>
-            <a:solidFill>
-              <a:srgbClr val="0070C0"/>
-            </a:solidFill>
-          </a:ln>
-        </p:spPr>
-        <p:style>
-          <a:lnRef idx="2">
-            <a:schemeClr val="accent1">
-              <a:shade val="15000"/>
-            </a:schemeClr>
-          </a:lnRef>
-          <a:fillRef idx="1">
-            <a:schemeClr val="accent1"/>
-          </a:fillRef>
-          <a:effectRef idx="0">
-            <a:schemeClr val="accent1"/>
-          </a:effectRef>
-          <a:fontRef idx="minor">
-            <a:schemeClr val="lt1"/>
-          </a:fontRef>
-        </p:style>
-        <p:txBody>
-          <a:bodyPr rtlCol="0" anchor="ctr"/>
-          <a:lstStyle/>
-          <a:p>
-            <a:pPr algn="ctr"/>
-            <a:endParaRPr lang="de-AT"/>
-          </a:p>
-        </p:txBody>
-      </p:sp>
-      <p:sp>
-        <p:nvSpPr>
-          <p:cNvPr id="5" name="Rechteck: abgerundete Ecken 4">
-            <a:extLst>
-              <a:ext uri="{FF2B5EF4-FFF2-40B4-BE49-F238E27FC236}">
-                <a16:creationId xmlns:a16="http://schemas.microsoft.com/office/drawing/2014/main" id="{75A51632-564E-359E-DDD8-3AC9A8C75A35}"/>
-              </a:ext>
-            </a:extLst>
-          </p:cNvPr>
-          <p:cNvSpPr/>
-          <p:nvPr/>
-        </p:nvSpPr>
-        <p:spPr>
-          <a:xfrm>
-            <a:off x="4380614" y="3156100"/>
-            <a:ext cx="3476846" cy="398720"/>
-          </a:xfrm>
-          <a:prstGeom prst="roundRect">
-            <a:avLst>
-              <a:gd name="adj" fmla="val 50000"/>
-            </a:avLst>
-          </a:prstGeom>
-          <a:solidFill>
-            <a:srgbClr val="0070C0"/>
-          </a:solidFill>
-          <a:ln>
-            <a:solidFill>
-              <a:srgbClr val="0070C0"/>
-            </a:solidFill>
-          </a:ln>
-        </p:spPr>
-        <p:style>
-          <a:lnRef idx="2">
-            <a:schemeClr val="accent1">
-              <a:shade val="15000"/>
-            </a:schemeClr>
-          </a:lnRef>
-          <a:fillRef idx="1">
-            <a:schemeClr val="accent1"/>
-          </a:fillRef>
-          <a:effectRef idx="0">
-            <a:schemeClr val="accent1"/>
-          </a:effectRef>
-          <a:fontRef idx="minor">
-            <a:schemeClr val="lt1"/>
-          </a:fontRef>
-        </p:style>
-        <p:txBody>
-          <a:bodyPr rtlCol="0" anchor="ctr"/>
-          <a:lstStyle/>
-          <a:p>
-            <a:pPr algn="ctr"/>
-            <a:endParaRPr lang="de-AT"/>
-          </a:p>
-        </p:txBody>
-      </p:sp>
-      <p:sp>
-        <p:nvSpPr>
-          <p:cNvPr id="6" name="Rechteck: abgerundete Ecken 5">
-            <a:extLst>
-              <a:ext uri="{FF2B5EF4-FFF2-40B4-BE49-F238E27FC236}">
-                <a16:creationId xmlns:a16="http://schemas.microsoft.com/office/drawing/2014/main" id="{EE523258-8D63-A4E8-2E0F-5F22BA861A78}"/>
-              </a:ext>
-            </a:extLst>
-          </p:cNvPr>
-          <p:cNvSpPr/>
-          <p:nvPr/>
-        </p:nvSpPr>
-        <p:spPr>
-          <a:xfrm>
-            <a:off x="4380614" y="4150243"/>
-            <a:ext cx="3476846" cy="398720"/>
-          </a:xfrm>
-          <a:prstGeom prst="roundRect">
-            <a:avLst>
-              <a:gd name="adj" fmla="val 50000"/>
-            </a:avLst>
-          </a:prstGeom>
-          <a:solidFill>
-            <a:srgbClr val="0070C0"/>
-          </a:solidFill>
-          <a:ln>
-            <a:solidFill>
-              <a:srgbClr val="0070C0"/>
-            </a:solidFill>
-          </a:ln>
-        </p:spPr>
-        <p:style>
-          <a:lnRef idx="2">
-            <a:schemeClr val="accent1">
-              <a:shade val="15000"/>
-            </a:schemeClr>
-          </a:lnRef>
-          <a:fillRef idx="1">
-            <a:schemeClr val="accent1"/>
-          </a:fillRef>
-          <a:effectRef idx="0">
-            <a:schemeClr val="accent1"/>
-          </a:effectRef>
-          <a:fontRef idx="minor">
-            <a:schemeClr val="lt1"/>
-          </a:fontRef>
-        </p:style>
-        <p:txBody>
-          <a:bodyPr rtlCol="0" anchor="ctr"/>
-          <a:lstStyle/>
-          <a:p>
-            <a:pPr algn="ctr"/>
-            <a:endParaRPr lang="de-AT"/>
-          </a:p>
-        </p:txBody>
-      </p:sp>
+            <a:off x="2318564" y="145905"/>
+            <a:ext cx="7518856" cy="6597796"/>
+          </a:xfrm>
+          <a:prstGeom prst="rect">
+            <a:avLst/>
+          </a:prstGeom>
+        </p:spPr>
+      </p:pic>
     </p:spTree>
     <p:extLst>
       <p:ext uri="{BB962C8B-B14F-4D97-AF65-F5344CB8AC3E}">
-        <p14:creationId xmlns:p14="http://schemas.microsoft.com/office/powerpoint/2010/main" val="2002859208"/>
+        <p14:creationId xmlns:p14="http://schemas.microsoft.com/office/powerpoint/2010/main" val="1268346369"/>
       </p:ext>
     </p:extLst>
   </p:cSld>
@@ -4188,7 +4056,7 @@
             </a:avLst>
           </a:prstGeom>
           <a:solidFill>
-            <a:srgbClr val="D5E5C2"/>
+            <a:srgbClr val="B0D5A6"/>
           </a:solidFill>
           <a:ln w="133350"/>
         </p:spPr>
@@ -4358,7 +4226,7 @@
             <a:r>
               <a:rPr lang="de-AT" sz="35000" dirty="0">
                 <a:solidFill>
-                  <a:srgbClr val="336117"/>
+                  <a:srgbClr val="354C28"/>
                 </a:solidFill>
                 <a:latin typeface="SquareSlab711 Lt BT" panose="02060506020206060203" pitchFamily="18" charset="0"/>
               </a:rPr>
@@ -4399,7 +4267,7 @@
             <a:r>
               <a:rPr lang="de-AT" sz="35000" dirty="0">
                 <a:solidFill>
-                  <a:srgbClr val="336117"/>
+                  <a:srgbClr val="354C28"/>
                 </a:solidFill>
                 <a:latin typeface="SquareSlab711 Lt BT" panose="02060506020206060203" pitchFamily="18" charset="0"/>
               </a:rPr>
@@ -4772,82 +4640,178 @@
           <a:chExt cx="0" cy="0"/>
         </a:xfrm>
       </p:grpSpPr>
-      <p:pic>
-        <p:nvPicPr>
-          <p:cNvPr id="8" name="Grafik 7">
-            <a:extLst>
-              <a:ext uri="{FF2B5EF4-FFF2-40B4-BE49-F238E27FC236}">
-                <a16:creationId xmlns:a16="http://schemas.microsoft.com/office/drawing/2014/main" id="{9B1AB4DF-E8E7-D254-CAEA-FDB23F88DA3C}"/>
-              </a:ext>
-            </a:extLst>
-          </p:cNvPr>
-          <p:cNvPicPr>
-            <a:picLocks noChangeAspect="1"/>
-          </p:cNvPicPr>
-          <p:nvPr/>
-        </p:nvPicPr>
-        <p:blipFill>
-          <a:blip r:embed="rId2">
-            <a:extLst>
-              <a:ext uri="{96DAC541-7B7A-43D3-8B79-37D633B846F1}">
-                <asvg:svgBlip xmlns:asvg="http://schemas.microsoft.com/office/drawing/2016/SVG/main" r:embed="rId3"/>
-              </a:ext>
-            </a:extLst>
-          </a:blip>
-          <a:stretch>
-            <a:fillRect/>
-          </a:stretch>
-        </p:blipFill>
+      <p:sp>
+        <p:nvSpPr>
+          <p:cNvPr id="4" name="Rechteck: abgerundete Ecken 3">
+            <a:extLst>
+              <a:ext uri="{FF2B5EF4-FFF2-40B4-BE49-F238E27FC236}">
+                <a16:creationId xmlns:a16="http://schemas.microsoft.com/office/drawing/2014/main" id="{D581A684-B317-BCD1-749C-E7D0DEAB183F}"/>
+              </a:ext>
+            </a:extLst>
+          </p:cNvPr>
+          <p:cNvSpPr/>
+          <p:nvPr/>
+        </p:nvSpPr>
         <p:spPr>
           <a:xfrm>
-            <a:off x="1117767" y="1646032"/>
-            <a:ext cx="3551538" cy="3420000"/>
-          </a:xfrm>
-          <a:prstGeom prst="rect">
-            <a:avLst/>
-          </a:prstGeom>
-        </p:spPr>
-      </p:pic>
-      <p:pic>
-        <p:nvPicPr>
-          <p:cNvPr id="10" name="Grafik 9">
-            <a:extLst>
-              <a:ext uri="{FF2B5EF4-FFF2-40B4-BE49-F238E27FC236}">
-                <a16:creationId xmlns:a16="http://schemas.microsoft.com/office/drawing/2014/main" id="{316360F0-C34D-B3BC-C5C6-47299752FC83}"/>
-              </a:ext>
-            </a:extLst>
-          </p:cNvPr>
-          <p:cNvPicPr>
-            <a:picLocks noChangeAspect="1"/>
-          </p:cNvPicPr>
-          <p:nvPr/>
-        </p:nvPicPr>
-        <p:blipFill>
-          <a:blip r:embed="rId4">
-            <a:extLst>
-              <a:ext uri="{96DAC541-7B7A-43D3-8B79-37D633B846F1}">
-                <asvg:svgBlip xmlns:asvg="http://schemas.microsoft.com/office/drawing/2016/SVG/main" r:embed="rId5"/>
-              </a:ext>
-            </a:extLst>
-          </a:blip>
-          <a:stretch>
-            <a:fillRect/>
-          </a:stretch>
-        </p:blipFill>
+            <a:off x="4380614" y="2200941"/>
+            <a:ext cx="3476846" cy="398720"/>
+          </a:xfrm>
+          <a:prstGeom prst="roundRect">
+            <a:avLst>
+              <a:gd name="adj" fmla="val 50000"/>
+            </a:avLst>
+          </a:prstGeom>
+          <a:solidFill>
+            <a:srgbClr val="5E711C"/>
+          </a:solidFill>
+          <a:ln>
+            <a:solidFill>
+              <a:srgbClr val="5E711C"/>
+            </a:solidFill>
+          </a:ln>
+        </p:spPr>
+        <p:style>
+          <a:lnRef idx="2">
+            <a:schemeClr val="accent1">
+              <a:shade val="15000"/>
+            </a:schemeClr>
+          </a:lnRef>
+          <a:fillRef idx="1">
+            <a:schemeClr val="accent1"/>
+          </a:fillRef>
+          <a:effectRef idx="0">
+            <a:schemeClr val="accent1"/>
+          </a:effectRef>
+          <a:fontRef idx="minor">
+            <a:schemeClr val="lt1"/>
+          </a:fontRef>
+        </p:style>
+        <p:txBody>
+          <a:bodyPr rtlCol="0" anchor="ctr"/>
+          <a:lstStyle/>
+          <a:p>
+            <a:pPr algn="ctr"/>
+            <a:endParaRPr lang="de-AT"/>
+          </a:p>
+        </p:txBody>
+      </p:sp>
+      <p:sp>
+        <p:nvSpPr>
+          <p:cNvPr id="5" name="Rechteck: abgerundete Ecken 4">
+            <a:extLst>
+              <a:ext uri="{FF2B5EF4-FFF2-40B4-BE49-F238E27FC236}">
+                <a16:creationId xmlns:a16="http://schemas.microsoft.com/office/drawing/2014/main" id="{75A51632-564E-359E-DDD8-3AC9A8C75A35}"/>
+              </a:ext>
+            </a:extLst>
+          </p:cNvPr>
+          <p:cNvSpPr/>
+          <p:nvPr/>
+        </p:nvSpPr>
         <p:spPr>
           <a:xfrm>
-            <a:off x="6426460" y="1858086"/>
-            <a:ext cx="4104000" cy="3420000"/>
-          </a:xfrm>
-          <a:prstGeom prst="rect">
-            <a:avLst/>
-          </a:prstGeom>
-        </p:spPr>
-      </p:pic>
+            <a:off x="4380614" y="3156100"/>
+            <a:ext cx="3476846" cy="398720"/>
+          </a:xfrm>
+          <a:prstGeom prst="roundRect">
+            <a:avLst>
+              <a:gd name="adj" fmla="val 50000"/>
+            </a:avLst>
+          </a:prstGeom>
+          <a:solidFill>
+            <a:srgbClr val="5E711C"/>
+          </a:solidFill>
+          <a:ln>
+            <a:solidFill>
+              <a:srgbClr val="5E711C"/>
+            </a:solidFill>
+          </a:ln>
+        </p:spPr>
+        <p:style>
+          <a:lnRef idx="2">
+            <a:schemeClr val="accent1">
+              <a:shade val="15000"/>
+            </a:schemeClr>
+          </a:lnRef>
+          <a:fillRef idx="1">
+            <a:schemeClr val="accent1"/>
+          </a:fillRef>
+          <a:effectRef idx="0">
+            <a:schemeClr val="accent1"/>
+          </a:effectRef>
+          <a:fontRef idx="minor">
+            <a:schemeClr val="lt1"/>
+          </a:fontRef>
+        </p:style>
+        <p:txBody>
+          <a:bodyPr rtlCol="0" anchor="ctr"/>
+          <a:lstStyle/>
+          <a:p>
+            <a:pPr algn="ctr"/>
+            <a:endParaRPr lang="de-AT"/>
+          </a:p>
+        </p:txBody>
+      </p:sp>
+      <p:sp>
+        <p:nvSpPr>
+          <p:cNvPr id="6" name="Rechteck: abgerundete Ecken 5">
+            <a:extLst>
+              <a:ext uri="{FF2B5EF4-FFF2-40B4-BE49-F238E27FC236}">
+                <a16:creationId xmlns:a16="http://schemas.microsoft.com/office/drawing/2014/main" id="{EE523258-8D63-A4E8-2E0F-5F22BA861A78}"/>
+              </a:ext>
+            </a:extLst>
+          </p:cNvPr>
+          <p:cNvSpPr/>
+          <p:nvPr/>
+        </p:nvSpPr>
+        <p:spPr>
+          <a:xfrm>
+            <a:off x="4380614" y="4150243"/>
+            <a:ext cx="3476846" cy="398720"/>
+          </a:xfrm>
+          <a:prstGeom prst="roundRect">
+            <a:avLst>
+              <a:gd name="adj" fmla="val 50000"/>
+            </a:avLst>
+          </a:prstGeom>
+          <a:solidFill>
+            <a:srgbClr val="5E711C"/>
+          </a:solidFill>
+          <a:ln>
+            <a:solidFill>
+              <a:srgbClr val="5E711C"/>
+            </a:solidFill>
+          </a:ln>
+        </p:spPr>
+        <p:style>
+          <a:lnRef idx="2">
+            <a:schemeClr val="accent1">
+              <a:shade val="15000"/>
+            </a:schemeClr>
+          </a:lnRef>
+          <a:fillRef idx="1">
+            <a:schemeClr val="accent1"/>
+          </a:fillRef>
+          <a:effectRef idx="0">
+            <a:schemeClr val="accent1"/>
+          </a:effectRef>
+          <a:fontRef idx="minor">
+            <a:schemeClr val="lt1"/>
+          </a:fontRef>
+        </p:style>
+        <p:txBody>
+          <a:bodyPr rtlCol="0" anchor="ctr"/>
+          <a:lstStyle/>
+          <a:p>
+            <a:pPr algn="ctr"/>
+            <a:endParaRPr lang="de-AT"/>
+          </a:p>
+        </p:txBody>
+      </p:sp>
     </p:spTree>
     <p:extLst>
       <p:ext uri="{BB962C8B-B14F-4D97-AF65-F5344CB8AC3E}">
-        <p14:creationId xmlns:p14="http://schemas.microsoft.com/office/powerpoint/2010/main" val="4144257889"/>
+        <p14:creationId xmlns:p14="http://schemas.microsoft.com/office/powerpoint/2010/main" val="2002859208"/>
       </p:ext>
     </p:extLst>
   </p:cSld>
@@ -4874,205 +4838,12 @@
           <a:chExt cx="0" cy="0"/>
         </a:xfrm>
       </p:grpSpPr>
-      <p:sp>
-        <p:nvSpPr>
-          <p:cNvPr id="4" name="Ellipse 3">
-            <a:extLst>
-              <a:ext uri="{FF2B5EF4-FFF2-40B4-BE49-F238E27FC236}">
-                <a16:creationId xmlns:a16="http://schemas.microsoft.com/office/drawing/2014/main" id="{501A0FE4-DB83-169F-053E-C81E177DE4BF}"/>
-              </a:ext>
-            </a:extLst>
-          </p:cNvPr>
-          <p:cNvSpPr/>
-          <p:nvPr/>
-        </p:nvSpPr>
-        <p:spPr>
-          <a:xfrm>
-            <a:off x="3902148" y="2292618"/>
-            <a:ext cx="3240000" cy="3240000"/>
-          </a:xfrm>
-          <a:prstGeom prst="ellipse">
-            <a:avLst/>
-          </a:prstGeom>
-          <a:noFill/>
-          <a:ln w="114300">
-            <a:solidFill>
-              <a:srgbClr val="ED3C0B"/>
-            </a:solidFill>
-          </a:ln>
-        </p:spPr>
-        <p:style>
-          <a:lnRef idx="2">
-            <a:schemeClr val="accent1">
-              <a:shade val="15000"/>
-            </a:schemeClr>
-          </a:lnRef>
-          <a:fillRef idx="1">
-            <a:schemeClr val="accent1"/>
-          </a:fillRef>
-          <a:effectRef idx="0">
-            <a:schemeClr val="accent1"/>
-          </a:effectRef>
-          <a:fontRef idx="minor">
-            <a:schemeClr val="lt1"/>
-          </a:fontRef>
-        </p:style>
-        <p:txBody>
-          <a:bodyPr rtlCol="0" anchor="ctr"/>
-          <a:lstStyle/>
-          <a:p>
-            <a:pPr algn="ctr"/>
-            <a:endParaRPr lang="de-AT"/>
-          </a:p>
-        </p:txBody>
-      </p:sp>
-      <p:sp>
-        <p:nvSpPr>
-          <p:cNvPr id="5" name="Ellipse 4">
-            <a:extLst>
-              <a:ext uri="{FF2B5EF4-FFF2-40B4-BE49-F238E27FC236}">
-                <a16:creationId xmlns:a16="http://schemas.microsoft.com/office/drawing/2014/main" id="{5CBF1A37-1023-CFF2-5D23-7183F1F6EFFA}"/>
-              </a:ext>
-            </a:extLst>
-          </p:cNvPr>
-          <p:cNvSpPr/>
-          <p:nvPr/>
-        </p:nvSpPr>
-        <p:spPr>
-          <a:xfrm>
-            <a:off x="4172148" y="2562618"/>
-            <a:ext cx="2700000" cy="2700000"/>
-          </a:xfrm>
-          <a:prstGeom prst="ellipse">
-            <a:avLst/>
-          </a:prstGeom>
-          <a:noFill/>
-          <a:ln w="114300">
-            <a:solidFill>
-              <a:srgbClr val="ED3C0B"/>
-            </a:solidFill>
-          </a:ln>
-        </p:spPr>
-        <p:style>
-          <a:lnRef idx="2">
-            <a:schemeClr val="accent1">
-              <a:shade val="15000"/>
-            </a:schemeClr>
-          </a:lnRef>
-          <a:fillRef idx="1">
-            <a:schemeClr val="accent1"/>
-          </a:fillRef>
-          <a:effectRef idx="0">
-            <a:schemeClr val="accent1"/>
-          </a:effectRef>
-          <a:fontRef idx="minor">
-            <a:schemeClr val="lt1"/>
-          </a:fontRef>
-        </p:style>
-        <p:txBody>
-          <a:bodyPr rtlCol="0" anchor="ctr"/>
-          <a:lstStyle/>
-          <a:p>
-            <a:pPr algn="ctr"/>
-            <a:endParaRPr lang="de-AT" sz="15000" dirty="0">
-              <a:solidFill>
-                <a:srgbClr val="ED3C0B"/>
-              </a:solidFill>
-              <a:latin typeface="OCR A Extended" panose="02010509020102010303" pitchFamily="50" charset="0"/>
-            </a:endParaRPr>
-          </a:p>
-        </p:txBody>
-      </p:sp>
-      <p:sp>
-        <p:nvSpPr>
-          <p:cNvPr id="7" name="Textfeld 6">
-            <a:extLst>
-              <a:ext uri="{FF2B5EF4-FFF2-40B4-BE49-F238E27FC236}">
-                <a16:creationId xmlns:a16="http://schemas.microsoft.com/office/drawing/2014/main" id="{27BFBACB-375C-B4E5-8AEC-C75880750C4F}"/>
-              </a:ext>
-            </a:extLst>
-          </p:cNvPr>
-          <p:cNvSpPr txBox="1"/>
-          <p:nvPr/>
-        </p:nvSpPr>
-        <p:spPr>
-          <a:xfrm>
-            <a:off x="4878899" y="2649409"/>
-            <a:ext cx="854591" cy="2400657"/>
-          </a:xfrm>
-          <a:prstGeom prst="rect">
-            <a:avLst/>
-          </a:prstGeom>
-          <a:noFill/>
-        </p:spPr>
-        <p:txBody>
-          <a:bodyPr wrap="square">
-            <a:spAutoFit/>
-          </a:bodyPr>
-          <a:lstStyle/>
-          <a:p>
-            <a:r>
-              <a:rPr lang="de-DE" sz="15000" dirty="0">
-                <a:solidFill>
-                  <a:srgbClr val="ED3C0B"/>
-                </a:solidFill>
-                <a:latin typeface="OCR A Extended" panose="02010509020102010303" pitchFamily="50" charset="0"/>
-              </a:rPr>
-              <a:t>i</a:t>
-            </a:r>
-            <a:endParaRPr lang="de-AT" sz="15000" dirty="0"/>
-          </a:p>
-        </p:txBody>
-      </p:sp>
-      <p:sp>
-        <p:nvSpPr>
-          <p:cNvPr id="8" name="Textfeld 7">
-            <a:extLst>
-              <a:ext uri="{FF2B5EF4-FFF2-40B4-BE49-F238E27FC236}">
-                <a16:creationId xmlns:a16="http://schemas.microsoft.com/office/drawing/2014/main" id="{60E4CC86-7B2C-D4B8-E36B-17CAC186596F}"/>
-              </a:ext>
-            </a:extLst>
-          </p:cNvPr>
-          <p:cNvSpPr txBox="1"/>
-          <p:nvPr/>
-        </p:nvSpPr>
-        <p:spPr>
-          <a:xfrm>
-            <a:off x="9609925" y="1814522"/>
-            <a:ext cx="1561658" cy="2862322"/>
-          </a:xfrm>
-          <a:prstGeom prst="rect">
-            <a:avLst/>
-          </a:prstGeom>
-          <a:noFill/>
-        </p:spPr>
-        <p:txBody>
-          <a:bodyPr wrap="square">
-            <a:spAutoFit/>
-          </a:bodyPr>
-          <a:lstStyle/>
-          <a:p>
-            <a:r>
-              <a:rPr lang="de-DE" sz="18000" b="1" dirty="0">
-                <a:solidFill>
-                  <a:srgbClr val="ED3C0B"/>
-                </a:solidFill>
-                <a:latin typeface="Eurostile" panose="020B0504020202050204" pitchFamily="34" charset="0"/>
-              </a:rPr>
-              <a:t>?</a:t>
-            </a:r>
-            <a:endParaRPr lang="de-AT" sz="18000" b="1" dirty="0">
-              <a:latin typeface="Eurostile" panose="020B0504020202050204" pitchFamily="34" charset="0"/>
-            </a:endParaRPr>
-          </a:p>
-        </p:txBody>
-      </p:sp>
       <p:pic>
         <p:nvPicPr>
-          <p:cNvPr id="10" name="Grafik 9">
-            <a:extLst>
-              <a:ext uri="{FF2B5EF4-FFF2-40B4-BE49-F238E27FC236}">
-                <a16:creationId xmlns:a16="http://schemas.microsoft.com/office/drawing/2014/main" id="{0A8AC64D-8BDB-63BE-2C3A-7CE34454BF60}"/>
+          <p:cNvPr id="8" name="Grafik 7">
+            <a:extLst>
+              <a:ext uri="{FF2B5EF4-FFF2-40B4-BE49-F238E27FC236}">
+                <a16:creationId xmlns:a16="http://schemas.microsoft.com/office/drawing/2014/main" id="{9B1AB4DF-E8E7-D254-CAEA-FDB23F88DA3C}"/>
               </a:ext>
             </a:extLst>
           </p:cNvPr>
@@ -5082,15 +4853,57 @@
           <p:nvPr/>
         </p:nvPicPr>
         <p:blipFill>
-          <a:blip r:embed="rId2"/>
+          <a:blip r:embed="rId2">
+            <a:extLst>
+              <a:ext uri="{96DAC541-7B7A-43D3-8B79-37D633B846F1}">
+                <asvg:svgBlip xmlns:asvg="http://schemas.microsoft.com/office/drawing/2016/SVG/main" r:embed="rId3"/>
+              </a:ext>
+            </a:extLst>
+          </a:blip>
           <a:stretch>
             <a:fillRect/>
           </a:stretch>
         </p:blipFill>
         <p:spPr>
           <a:xfrm>
-            <a:off x="215501" y="1189572"/>
-            <a:ext cx="3956647" cy="4810161"/>
+            <a:off x="1117767" y="1646032"/>
+            <a:ext cx="3551538" cy="3420000"/>
+          </a:xfrm>
+          <a:prstGeom prst="rect">
+            <a:avLst/>
+          </a:prstGeom>
+        </p:spPr>
+      </p:pic>
+      <p:pic>
+        <p:nvPicPr>
+          <p:cNvPr id="10" name="Grafik 9">
+            <a:extLst>
+              <a:ext uri="{FF2B5EF4-FFF2-40B4-BE49-F238E27FC236}">
+                <a16:creationId xmlns:a16="http://schemas.microsoft.com/office/drawing/2014/main" id="{316360F0-C34D-B3BC-C5C6-47299752FC83}"/>
+              </a:ext>
+            </a:extLst>
+          </p:cNvPr>
+          <p:cNvPicPr>
+            <a:picLocks noChangeAspect="1"/>
+          </p:cNvPicPr>
+          <p:nvPr/>
+        </p:nvPicPr>
+        <p:blipFill>
+          <a:blip r:embed="rId4">
+            <a:extLst>
+              <a:ext uri="{96DAC541-7B7A-43D3-8B79-37D633B846F1}">
+                <asvg:svgBlip xmlns:asvg="http://schemas.microsoft.com/office/drawing/2016/SVG/main" r:embed="rId5"/>
+              </a:ext>
+            </a:extLst>
+          </a:blip>
+          <a:stretch>
+            <a:fillRect/>
+          </a:stretch>
+        </p:blipFill>
+        <p:spPr>
+          <a:xfrm>
+            <a:off x="6426460" y="1858086"/>
+            <a:ext cx="4104000" cy="3420000"/>
           </a:xfrm>
           <a:prstGeom prst="rect">
             <a:avLst/>
@@ -5100,7 +4913,7 @@
     </p:spTree>
     <p:extLst>
       <p:ext uri="{BB962C8B-B14F-4D97-AF65-F5344CB8AC3E}">
-        <p14:creationId xmlns:p14="http://schemas.microsoft.com/office/powerpoint/2010/main" val="2182264236"/>
+        <p14:creationId xmlns:p14="http://schemas.microsoft.com/office/powerpoint/2010/main" val="4144257889"/>
       </p:ext>
     </p:extLst>
   </p:cSld>
@@ -5127,181 +4940,240 @@
           <a:chExt cx="0" cy="0"/>
         </a:xfrm>
       </p:grpSpPr>
-      <p:cxnSp>
-        <p:nvCxnSpPr>
-          <p:cNvPr id="3" name="Gerade Verbindung mit Pfeil 2">
-            <a:extLst>
-              <a:ext uri="{FF2B5EF4-FFF2-40B4-BE49-F238E27FC236}">
-                <a16:creationId xmlns:a16="http://schemas.microsoft.com/office/drawing/2014/main" id="{FE75F7C9-168F-3297-BDE7-9C74F745BFB6}"/>
-              </a:ext>
-            </a:extLst>
-          </p:cNvPr>
-          <p:cNvCxnSpPr>
-            <a:cxnSpLocks/>
-          </p:cNvCxnSpPr>
-          <p:nvPr/>
-        </p:nvCxnSpPr>
-        <p:spPr>
-          <a:xfrm flipV="1">
-            <a:off x="2153478" y="1855304"/>
-            <a:ext cx="1782418" cy="1954696"/>
-          </a:xfrm>
-          <a:prstGeom prst="straightConnector1">
-            <a:avLst/>
-          </a:prstGeom>
-          <a:ln w="38100" cap="flat">
+      <p:sp>
+        <p:nvSpPr>
+          <p:cNvPr id="4" name="Ellipse 3">
+            <a:extLst>
+              <a:ext uri="{FF2B5EF4-FFF2-40B4-BE49-F238E27FC236}">
+                <a16:creationId xmlns:a16="http://schemas.microsoft.com/office/drawing/2014/main" id="{501A0FE4-DB83-169F-053E-C81E177DE4BF}"/>
+              </a:ext>
+            </a:extLst>
+          </p:cNvPr>
+          <p:cNvSpPr/>
+          <p:nvPr/>
+        </p:nvSpPr>
+        <p:spPr>
+          <a:xfrm>
+            <a:off x="3902148" y="2292618"/>
+            <a:ext cx="3240000" cy="3240000"/>
+          </a:xfrm>
+          <a:prstGeom prst="ellipse">
+            <a:avLst/>
+          </a:prstGeom>
+          <a:solidFill>
+            <a:srgbClr val="B0D5A6"/>
+          </a:solidFill>
+          <a:ln w="114300">
             <a:solidFill>
-              <a:schemeClr val="tx1"/>
-            </a:solidFill>
-            <a:headEnd type="oval" w="lg" len="lg"/>
-            <a:tailEnd type="arrow" w="lg" len="lg"/>
-          </a:ln>
-        </p:spPr>
-        <p:style>
-          <a:lnRef idx="2">
-            <a:schemeClr val="accent1"/>
-          </a:lnRef>
-          <a:fillRef idx="0">
-            <a:schemeClr val="accent1"/>
-          </a:fillRef>
-          <a:effectRef idx="1">
-            <a:schemeClr val="accent1"/>
-          </a:effectRef>
-          <a:fontRef idx="minor">
-            <a:schemeClr val="tx1"/>
-          </a:fontRef>
-        </p:style>
-      </p:cxnSp>
-      <p:cxnSp>
-        <p:nvCxnSpPr>
-          <p:cNvPr id="6" name="Gerader Verbinder 5">
-            <a:extLst>
-              <a:ext uri="{FF2B5EF4-FFF2-40B4-BE49-F238E27FC236}">
-                <a16:creationId xmlns:a16="http://schemas.microsoft.com/office/drawing/2014/main" id="{888A20D9-C8A7-2EDF-4C33-09D415D16325}"/>
-              </a:ext>
-            </a:extLst>
-          </p:cNvPr>
-          <p:cNvCxnSpPr/>
-          <p:nvPr/>
-        </p:nvCxnSpPr>
-        <p:spPr>
-          <a:xfrm>
-            <a:off x="5526157" y="3737113"/>
-            <a:ext cx="2325756" cy="0"/>
-          </a:xfrm>
-          <a:prstGeom prst="line">
-            <a:avLst/>
-          </a:prstGeom>
-          <a:ln w="38100">
-            <a:solidFill>
-              <a:schemeClr val="tx1"/>
-            </a:solidFill>
-            <a:headEnd type="oval" w="lg" len="lg"/>
-            <a:tailEnd type="none" w="med" len="med"/>
-          </a:ln>
-        </p:spPr>
-        <p:style>
-          <a:lnRef idx="2">
-            <a:schemeClr val="accent1"/>
-          </a:lnRef>
-          <a:fillRef idx="0">
-            <a:schemeClr val="accent1"/>
-          </a:fillRef>
-          <a:effectRef idx="1">
-            <a:schemeClr val="accent1"/>
-          </a:effectRef>
-          <a:fontRef idx="minor">
-            <a:schemeClr val="tx1"/>
-          </a:fontRef>
-        </p:style>
-      </p:cxnSp>
-      <p:cxnSp>
-        <p:nvCxnSpPr>
-          <p:cNvPr id="8" name="Gerader Verbinder 7">
-            <a:extLst>
-              <a:ext uri="{FF2B5EF4-FFF2-40B4-BE49-F238E27FC236}">
-                <a16:creationId xmlns:a16="http://schemas.microsoft.com/office/drawing/2014/main" id="{FEE89BF5-78C5-18C8-82C4-EB472DE3C0C8}"/>
-              </a:ext>
-            </a:extLst>
-          </p:cNvPr>
-          <p:cNvCxnSpPr/>
-          <p:nvPr/>
-        </p:nvCxnSpPr>
-        <p:spPr>
-          <a:xfrm>
-            <a:off x="8574157" y="1219200"/>
-            <a:ext cx="72886" cy="4313583"/>
-          </a:xfrm>
-          <a:prstGeom prst="line">
-            <a:avLst/>
-          </a:prstGeom>
-          <a:ln w="38100">
-            <a:solidFill>
-              <a:schemeClr val="tx1"/>
+              <a:srgbClr val="ED3C0B"/>
             </a:solidFill>
           </a:ln>
+          <a:effectLst>
+            <a:outerShdw blurRad="457200" sx="102000" sy="102000" algn="ctr" rotWithShape="0">
+              <a:srgbClr val="5E711C"/>
+            </a:outerShdw>
+          </a:effectLst>
         </p:spPr>
         <p:style>
           <a:lnRef idx="2">
-            <a:schemeClr val="accent1"/>
-          </a:lnRef>
-          <a:fillRef idx="0">
-            <a:schemeClr val="accent1"/>
-          </a:fillRef>
-          <a:effectRef idx="1">
-            <a:schemeClr val="accent1"/>
-          </a:effectRef>
-          <a:fontRef idx="minor">
-            <a:schemeClr val="tx1"/>
-          </a:fontRef>
-        </p:style>
-      </p:cxnSp>
-      <p:cxnSp>
-        <p:nvCxnSpPr>
-          <p:cNvPr id="10" name="Gerade Verbindung mit Pfeil 9">
-            <a:extLst>
-              <a:ext uri="{FF2B5EF4-FFF2-40B4-BE49-F238E27FC236}">
-                <a16:creationId xmlns:a16="http://schemas.microsoft.com/office/drawing/2014/main" id="{F584AF18-2171-B324-6308-708B743E34CF}"/>
-              </a:ext>
-            </a:extLst>
-          </p:cNvPr>
-          <p:cNvCxnSpPr/>
-          <p:nvPr/>
-        </p:nvCxnSpPr>
+            <a:schemeClr val="accent1">
+              <a:shade val="15000"/>
+            </a:schemeClr>
+          </a:lnRef>
+          <a:fillRef idx="1">
+            <a:schemeClr val="accent1"/>
+          </a:fillRef>
+          <a:effectRef idx="0">
+            <a:schemeClr val="accent1"/>
+          </a:effectRef>
+          <a:fontRef idx="minor">
+            <a:schemeClr val="lt1"/>
+          </a:fontRef>
+        </p:style>
+        <p:txBody>
+          <a:bodyPr rtlCol="0" anchor="ctr"/>
+          <a:lstStyle/>
+          <a:p>
+            <a:pPr algn="ctr"/>
+            <a:endParaRPr lang="de-AT" dirty="0"/>
+          </a:p>
+        </p:txBody>
+      </p:sp>
+      <p:sp>
+        <p:nvSpPr>
+          <p:cNvPr id="5" name="Ellipse 4">
+            <a:extLst>
+              <a:ext uri="{FF2B5EF4-FFF2-40B4-BE49-F238E27FC236}">
+                <a16:creationId xmlns:a16="http://schemas.microsoft.com/office/drawing/2014/main" id="{5CBF1A37-1023-CFF2-5D23-7183F1F6EFFA}"/>
+              </a:ext>
+            </a:extLst>
+          </p:cNvPr>
+          <p:cNvSpPr/>
+          <p:nvPr/>
+        </p:nvSpPr>
         <p:spPr>
           <a:xfrm>
-            <a:off x="8647043" y="841513"/>
-            <a:ext cx="2120348" cy="0"/>
-          </a:xfrm>
-          <a:prstGeom prst="straightConnector1">
-            <a:avLst/>
-          </a:prstGeom>
-          <a:ln w="38100">
+            <a:off x="4172148" y="2562618"/>
+            <a:ext cx="2700000" cy="2700000"/>
+          </a:xfrm>
+          <a:prstGeom prst="ellipse">
+            <a:avLst/>
+          </a:prstGeom>
+          <a:noFill/>
+          <a:ln w="114300">
             <a:solidFill>
-              <a:schemeClr val="tx1"/>
+              <a:srgbClr val="ED3C0B"/>
             </a:solidFill>
-            <a:tailEnd type="arrow" w="lg" len="lg"/>
           </a:ln>
         </p:spPr>
         <p:style>
           <a:lnRef idx="2">
-            <a:schemeClr val="accent1"/>
-          </a:lnRef>
-          <a:fillRef idx="0">
-            <a:schemeClr val="accent1"/>
-          </a:fillRef>
-          <a:effectRef idx="1">
-            <a:schemeClr val="accent1"/>
-          </a:effectRef>
-          <a:fontRef idx="minor">
-            <a:schemeClr val="tx1"/>
-          </a:fontRef>
-        </p:style>
-      </p:cxnSp>
+            <a:schemeClr val="accent1">
+              <a:shade val="15000"/>
+            </a:schemeClr>
+          </a:lnRef>
+          <a:fillRef idx="1">
+            <a:schemeClr val="accent1"/>
+          </a:fillRef>
+          <a:effectRef idx="0">
+            <a:schemeClr val="accent1"/>
+          </a:effectRef>
+          <a:fontRef idx="minor">
+            <a:schemeClr val="lt1"/>
+          </a:fontRef>
+        </p:style>
+        <p:txBody>
+          <a:bodyPr rtlCol="0" anchor="ctr"/>
+          <a:lstStyle/>
+          <a:p>
+            <a:pPr algn="ctr"/>
+            <a:endParaRPr lang="de-AT" sz="15000" dirty="0">
+              <a:solidFill>
+                <a:srgbClr val="ED3C0B"/>
+              </a:solidFill>
+              <a:latin typeface="OCR A Extended" panose="02010509020102010303" pitchFamily="50" charset="0"/>
+            </a:endParaRPr>
+          </a:p>
+        </p:txBody>
+      </p:sp>
+      <p:sp>
+        <p:nvSpPr>
+          <p:cNvPr id="7" name="Textfeld 6">
+            <a:extLst>
+              <a:ext uri="{FF2B5EF4-FFF2-40B4-BE49-F238E27FC236}">
+                <a16:creationId xmlns:a16="http://schemas.microsoft.com/office/drawing/2014/main" id="{27BFBACB-375C-B4E5-8AEC-C75880750C4F}"/>
+              </a:ext>
+            </a:extLst>
+          </p:cNvPr>
+          <p:cNvSpPr txBox="1"/>
+          <p:nvPr/>
+        </p:nvSpPr>
+        <p:spPr>
+          <a:xfrm>
+            <a:off x="4878899" y="2649409"/>
+            <a:ext cx="854591" cy="2400657"/>
+          </a:xfrm>
+          <a:prstGeom prst="rect">
+            <a:avLst/>
+          </a:prstGeom>
+          <a:noFill/>
+        </p:spPr>
+        <p:txBody>
+          <a:bodyPr wrap="square">
+            <a:spAutoFit/>
+          </a:bodyPr>
+          <a:lstStyle/>
+          <a:p>
+            <a:r>
+              <a:rPr lang="de-DE" sz="15000" dirty="0">
+                <a:solidFill>
+                  <a:srgbClr val="ED3C0B"/>
+                </a:solidFill>
+                <a:latin typeface="OCR A Extended" panose="02010509020102010303" pitchFamily="50" charset="0"/>
+              </a:rPr>
+              <a:t>i</a:t>
+            </a:r>
+            <a:endParaRPr lang="de-AT" sz="15000" dirty="0"/>
+          </a:p>
+        </p:txBody>
+      </p:sp>
+      <p:sp>
+        <p:nvSpPr>
+          <p:cNvPr id="8" name="Textfeld 7">
+            <a:extLst>
+              <a:ext uri="{FF2B5EF4-FFF2-40B4-BE49-F238E27FC236}">
+                <a16:creationId xmlns:a16="http://schemas.microsoft.com/office/drawing/2014/main" id="{60E4CC86-7B2C-D4B8-E36B-17CAC186596F}"/>
+              </a:ext>
+            </a:extLst>
+          </p:cNvPr>
+          <p:cNvSpPr txBox="1"/>
+          <p:nvPr/>
+        </p:nvSpPr>
+        <p:spPr>
+          <a:xfrm>
+            <a:off x="9609925" y="1814522"/>
+            <a:ext cx="1561658" cy="2862322"/>
+          </a:xfrm>
+          <a:prstGeom prst="rect">
+            <a:avLst/>
+          </a:prstGeom>
+          <a:noFill/>
+        </p:spPr>
+        <p:txBody>
+          <a:bodyPr wrap="square">
+            <a:spAutoFit/>
+          </a:bodyPr>
+          <a:lstStyle/>
+          <a:p>
+            <a:r>
+              <a:rPr lang="de-DE" sz="18000" b="1" dirty="0">
+                <a:solidFill>
+                  <a:srgbClr val="ED3C0B"/>
+                </a:solidFill>
+                <a:latin typeface="Eurostile" panose="020B0504020202050204" pitchFamily="34" charset="0"/>
+              </a:rPr>
+              <a:t>?</a:t>
+            </a:r>
+            <a:endParaRPr lang="de-AT" sz="18000" b="1" dirty="0">
+              <a:latin typeface="Eurostile" panose="020B0504020202050204" pitchFamily="34" charset="0"/>
+            </a:endParaRPr>
+          </a:p>
+        </p:txBody>
+      </p:sp>
+      <p:pic>
+        <p:nvPicPr>
+          <p:cNvPr id="10" name="Grafik 9">
+            <a:extLst>
+              <a:ext uri="{FF2B5EF4-FFF2-40B4-BE49-F238E27FC236}">
+                <a16:creationId xmlns:a16="http://schemas.microsoft.com/office/drawing/2014/main" id="{0A8AC64D-8BDB-63BE-2C3A-7CE34454BF60}"/>
+              </a:ext>
+            </a:extLst>
+          </p:cNvPr>
+          <p:cNvPicPr>
+            <a:picLocks noChangeAspect="1"/>
+          </p:cNvPicPr>
+          <p:nvPr/>
+        </p:nvPicPr>
+        <p:blipFill>
+          <a:blip r:embed="rId2"/>
+          <a:stretch>
+            <a:fillRect/>
+          </a:stretch>
+        </p:blipFill>
+        <p:spPr>
+          <a:xfrm>
+            <a:off x="-189499" y="1275711"/>
+            <a:ext cx="3956647" cy="4810161"/>
+          </a:xfrm>
+          <a:prstGeom prst="rect">
+            <a:avLst/>
+          </a:prstGeom>
+        </p:spPr>
+      </p:pic>
     </p:spTree>
     <p:extLst>
       <p:ext uri="{BB962C8B-B14F-4D97-AF65-F5344CB8AC3E}">
-        <p14:creationId xmlns:p14="http://schemas.microsoft.com/office/powerpoint/2010/main" val="3094168420"/>
+        <p14:creationId xmlns:p14="http://schemas.microsoft.com/office/powerpoint/2010/main" val="2182264236"/>
       </p:ext>
     </p:extLst>
   </p:cSld>
@@ -5330,35 +5202,43 @@
       </p:grpSpPr>
       <p:cxnSp>
         <p:nvCxnSpPr>
-          <p:cNvPr id="7" name="Gerader Verbinder 6">
-            <a:extLst>
-              <a:ext uri="{FF2B5EF4-FFF2-40B4-BE49-F238E27FC236}">
-                <a16:creationId xmlns:a16="http://schemas.microsoft.com/office/drawing/2014/main" id="{871513E0-27F3-46EA-A76E-3E818E72613C}"/>
-              </a:ext>
-            </a:extLst>
-          </p:cNvPr>
-          <p:cNvCxnSpPr/>
+          <p:cNvPr id="3" name="Gerade Verbindung mit Pfeil 2">
+            <a:extLst>
+              <a:ext uri="{FF2B5EF4-FFF2-40B4-BE49-F238E27FC236}">
+                <a16:creationId xmlns:a16="http://schemas.microsoft.com/office/drawing/2014/main" id="{FE75F7C9-168F-3297-BDE7-9C74F745BFB6}"/>
+              </a:ext>
+            </a:extLst>
+          </p:cNvPr>
+          <p:cNvCxnSpPr>
+            <a:cxnSpLocks/>
+          </p:cNvCxnSpPr>
           <p:nvPr/>
         </p:nvCxnSpPr>
         <p:spPr>
           <a:xfrm flipV="1">
-            <a:off x="2917104" y="953669"/>
-            <a:ext cx="4370047" cy="2002704"/>
-          </a:xfrm>
-          <a:prstGeom prst="line">
-            <a:avLst/>
-          </a:prstGeom>
-          <a:ln w="9525"/>
+            <a:off x="2153478" y="1855304"/>
+            <a:ext cx="1782418" cy="1954696"/>
+          </a:xfrm>
+          <a:prstGeom prst="straightConnector1">
+            <a:avLst/>
+          </a:prstGeom>
+          <a:ln w="38100" cap="flat">
+            <a:solidFill>
+              <a:schemeClr val="tx1"/>
+            </a:solidFill>
+            <a:headEnd type="oval" w="lg" len="lg"/>
+            <a:tailEnd type="arrow" w="lg" len="lg"/>
+          </a:ln>
         </p:spPr>
         <p:style>
           <a:lnRef idx="2">
-            <a:schemeClr val="dk1"/>
+            <a:schemeClr val="accent1"/>
           </a:lnRef>
           <a:fillRef idx="0">
-            <a:schemeClr val="dk1"/>
+            <a:schemeClr val="accent1"/>
           </a:fillRef>
           <a:effectRef idx="1">
-            <a:schemeClr val="dk1"/>
+            <a:schemeClr val="accent1"/>
           </a:effectRef>
           <a:fontRef idx="minor">
             <a:schemeClr val="tx1"/>
@@ -5367,10 +5247,10 @@
       </p:cxnSp>
       <p:cxnSp>
         <p:nvCxnSpPr>
-          <p:cNvPr id="9" name="Gerader Verbinder 8">
-            <a:extLst>
-              <a:ext uri="{FF2B5EF4-FFF2-40B4-BE49-F238E27FC236}">
-                <a16:creationId xmlns:a16="http://schemas.microsoft.com/office/drawing/2014/main" id="{30176299-A412-17C1-3662-24D85C7C04E9}"/>
+          <p:cNvPr id="6" name="Gerader Verbinder 5">
+            <a:extLst>
+              <a:ext uri="{FF2B5EF4-FFF2-40B4-BE49-F238E27FC236}">
+                <a16:creationId xmlns:a16="http://schemas.microsoft.com/office/drawing/2014/main" id="{888A20D9-C8A7-2EDF-4C33-09D415D16325}"/>
               </a:ext>
             </a:extLst>
           </p:cNvPr>
@@ -5378,24 +5258,30 @@
           <p:nvPr/>
         </p:nvCxnSpPr>
         <p:spPr>
-          <a:xfrm flipV="1">
-            <a:off x="2911494" y="1262209"/>
-            <a:ext cx="751716" cy="1710993"/>
+          <a:xfrm>
+            <a:off x="5526157" y="3737113"/>
+            <a:ext cx="2325756" cy="0"/>
           </a:xfrm>
           <a:prstGeom prst="line">
             <a:avLst/>
           </a:prstGeom>
-          <a:ln w="9525"/>
+          <a:ln w="38100">
+            <a:solidFill>
+              <a:schemeClr val="tx1"/>
+            </a:solidFill>
+            <a:headEnd type="oval" w="lg" len="lg"/>
+            <a:tailEnd type="none" w="med" len="med"/>
+          </a:ln>
         </p:spPr>
         <p:style>
           <a:lnRef idx="2">
-            <a:schemeClr val="dk1"/>
+            <a:schemeClr val="accent1"/>
           </a:lnRef>
           <a:fillRef idx="0">
-            <a:schemeClr val="dk1"/>
+            <a:schemeClr val="accent1"/>
           </a:fillRef>
           <a:effectRef idx="1">
-            <a:schemeClr val="dk1"/>
+            <a:schemeClr val="accent1"/>
           </a:effectRef>
           <a:fontRef idx="minor">
             <a:schemeClr val="tx1"/>
@@ -5404,10 +5290,10 @@
       </p:cxnSp>
       <p:cxnSp>
         <p:nvCxnSpPr>
-          <p:cNvPr id="11" name="Gerader Verbinder 10">
-            <a:extLst>
-              <a:ext uri="{FF2B5EF4-FFF2-40B4-BE49-F238E27FC236}">
-                <a16:creationId xmlns:a16="http://schemas.microsoft.com/office/drawing/2014/main" id="{297B748D-1927-BE70-9D3B-6CD4FC253C29}"/>
+          <p:cNvPr id="8" name="Gerader Verbinder 7">
+            <a:extLst>
+              <a:ext uri="{FF2B5EF4-FFF2-40B4-BE49-F238E27FC236}">
+                <a16:creationId xmlns:a16="http://schemas.microsoft.com/office/drawing/2014/main" id="{FEE89BF5-78C5-18C8-82C4-EB472DE3C0C8}"/>
               </a:ext>
             </a:extLst>
           </p:cNvPr>
@@ -5416,23 +5302,27 @@
         </p:nvCxnSpPr>
         <p:spPr>
           <a:xfrm>
-            <a:off x="3702479" y="1262209"/>
-            <a:ext cx="1464161" cy="3191985"/>
+            <a:off x="8574157" y="1219200"/>
+            <a:ext cx="72886" cy="4313583"/>
           </a:xfrm>
           <a:prstGeom prst="line">
             <a:avLst/>
           </a:prstGeom>
-          <a:ln w="9525"/>
+          <a:ln w="38100">
+            <a:solidFill>
+              <a:schemeClr val="tx1"/>
+            </a:solidFill>
+          </a:ln>
         </p:spPr>
         <p:style>
           <a:lnRef idx="2">
-            <a:schemeClr val="dk1"/>
+            <a:schemeClr val="accent1"/>
           </a:lnRef>
           <a:fillRef idx="0">
-            <a:schemeClr val="dk1"/>
+            <a:schemeClr val="accent1"/>
           </a:fillRef>
           <a:effectRef idx="1">
-            <a:schemeClr val="dk1"/>
+            <a:schemeClr val="accent1"/>
           </a:effectRef>
           <a:fontRef idx="minor">
             <a:schemeClr val="tx1"/>
@@ -5441,10 +5331,10 @@
       </p:cxnSp>
       <p:cxnSp>
         <p:nvCxnSpPr>
-          <p:cNvPr id="13" name="Gerader Verbinder 12">
-            <a:extLst>
-              <a:ext uri="{FF2B5EF4-FFF2-40B4-BE49-F238E27FC236}">
-                <a16:creationId xmlns:a16="http://schemas.microsoft.com/office/drawing/2014/main" id="{4576D5A5-5CDD-766F-47C9-676D5DEB3C8C}"/>
+          <p:cNvPr id="10" name="Gerade Verbindung mit Pfeil 9">
+            <a:extLst>
+              <a:ext uri="{FF2B5EF4-FFF2-40B4-BE49-F238E27FC236}">
+                <a16:creationId xmlns:a16="http://schemas.microsoft.com/office/drawing/2014/main" id="{F584AF18-2171-B324-6308-708B743E34CF}"/>
               </a:ext>
             </a:extLst>
           </p:cNvPr>
@@ -5453,393 +5343,28 @@
         </p:nvCxnSpPr>
         <p:spPr>
           <a:xfrm>
-            <a:off x="2911494" y="2956373"/>
-            <a:ext cx="5617298" cy="1346356"/>
-          </a:xfrm>
-          <a:prstGeom prst="line">
-            <a:avLst/>
-          </a:prstGeom>
-          <a:ln w="9525"/>
+            <a:off x="8647043" y="841513"/>
+            <a:ext cx="2120348" cy="0"/>
+          </a:xfrm>
+          <a:prstGeom prst="straightConnector1">
+            <a:avLst/>
+          </a:prstGeom>
+          <a:ln w="38100">
+            <a:solidFill>
+              <a:schemeClr val="tx1"/>
+            </a:solidFill>
+            <a:tailEnd type="arrow" w="lg" len="lg"/>
+          </a:ln>
         </p:spPr>
         <p:style>
           <a:lnRef idx="2">
-            <a:schemeClr val="dk1"/>
+            <a:schemeClr val="accent1"/>
           </a:lnRef>
           <a:fillRef idx="0">
-            <a:schemeClr val="dk1"/>
+            <a:schemeClr val="accent1"/>
           </a:fillRef>
           <a:effectRef idx="1">
-            <a:schemeClr val="dk1"/>
-          </a:effectRef>
-          <a:fontRef idx="minor">
-            <a:schemeClr val="tx1"/>
-          </a:fontRef>
-        </p:style>
-      </p:cxnSp>
-      <p:cxnSp>
-        <p:nvCxnSpPr>
-          <p:cNvPr id="15" name="Gerader Verbinder 14">
-            <a:extLst>
-              <a:ext uri="{FF2B5EF4-FFF2-40B4-BE49-F238E27FC236}">
-                <a16:creationId xmlns:a16="http://schemas.microsoft.com/office/drawing/2014/main" id="{52191099-8CD5-7958-BEBB-3AC4E7F0FA71}"/>
-              </a:ext>
-            </a:extLst>
-          </p:cNvPr>
-          <p:cNvCxnSpPr/>
-          <p:nvPr/>
-        </p:nvCxnSpPr>
-        <p:spPr>
-          <a:xfrm>
-            <a:off x="2911494" y="2973202"/>
-            <a:ext cx="2255146" cy="1480992"/>
-          </a:xfrm>
-          <a:prstGeom prst="line">
-            <a:avLst/>
-          </a:prstGeom>
-          <a:ln w="9525"/>
-        </p:spPr>
-        <p:style>
-          <a:lnRef idx="2">
-            <a:schemeClr val="dk1"/>
-          </a:lnRef>
-          <a:fillRef idx="0">
-            <a:schemeClr val="dk1"/>
-          </a:fillRef>
-          <a:effectRef idx="1">
-            <a:schemeClr val="dk1"/>
-          </a:effectRef>
-          <a:fontRef idx="minor">
-            <a:schemeClr val="tx1"/>
-          </a:fontRef>
-        </p:style>
-      </p:cxnSp>
-      <p:cxnSp>
-        <p:nvCxnSpPr>
-          <p:cNvPr id="17" name="Gerader Verbinder 16">
-            <a:extLst>
-              <a:ext uri="{FF2B5EF4-FFF2-40B4-BE49-F238E27FC236}">
-                <a16:creationId xmlns:a16="http://schemas.microsoft.com/office/drawing/2014/main" id="{6BF01FA4-616D-EA93-654F-B4C1739D5220}"/>
-              </a:ext>
-            </a:extLst>
-          </p:cNvPr>
-          <p:cNvCxnSpPr/>
-          <p:nvPr/>
-        </p:nvCxnSpPr>
-        <p:spPr>
-          <a:xfrm>
-            <a:off x="5166640" y="4454194"/>
-            <a:ext cx="1744653" cy="589031"/>
-          </a:xfrm>
-          <a:prstGeom prst="line">
-            <a:avLst/>
-          </a:prstGeom>
-          <a:ln w="9525"/>
-        </p:spPr>
-        <p:style>
-          <a:lnRef idx="2">
-            <a:schemeClr val="dk1"/>
-          </a:lnRef>
-          <a:fillRef idx="0">
-            <a:schemeClr val="dk1"/>
-          </a:fillRef>
-          <a:effectRef idx="1">
-            <a:schemeClr val="dk1"/>
-          </a:effectRef>
-          <a:fontRef idx="minor">
-            <a:schemeClr val="tx1"/>
-          </a:fontRef>
-        </p:style>
-      </p:cxnSp>
-      <p:cxnSp>
-        <p:nvCxnSpPr>
-          <p:cNvPr id="19" name="Gerader Verbinder 18">
-            <a:extLst>
-              <a:ext uri="{FF2B5EF4-FFF2-40B4-BE49-F238E27FC236}">
-                <a16:creationId xmlns:a16="http://schemas.microsoft.com/office/drawing/2014/main" id="{C8B0F0C3-AD10-CE99-C571-964EACD1EDC7}"/>
-              </a:ext>
-            </a:extLst>
-          </p:cNvPr>
-          <p:cNvCxnSpPr/>
-          <p:nvPr/>
-        </p:nvCxnSpPr>
-        <p:spPr>
-          <a:xfrm flipV="1">
-            <a:off x="6973001" y="4302729"/>
-            <a:ext cx="1555791" cy="740496"/>
-          </a:xfrm>
-          <a:prstGeom prst="line">
-            <a:avLst/>
-          </a:prstGeom>
-          <a:ln w="9525"/>
-        </p:spPr>
-        <p:style>
-          <a:lnRef idx="2">
-            <a:schemeClr val="dk1"/>
-          </a:lnRef>
-          <a:fillRef idx="0">
-            <a:schemeClr val="dk1"/>
-          </a:fillRef>
-          <a:effectRef idx="1">
-            <a:schemeClr val="dk1"/>
-          </a:effectRef>
-          <a:fontRef idx="minor">
-            <a:schemeClr val="tx1"/>
-          </a:fontRef>
-        </p:style>
-      </p:cxnSp>
-      <p:cxnSp>
-        <p:nvCxnSpPr>
-          <p:cNvPr id="21" name="Gerader Verbinder 20">
-            <a:extLst>
-              <a:ext uri="{FF2B5EF4-FFF2-40B4-BE49-F238E27FC236}">
-                <a16:creationId xmlns:a16="http://schemas.microsoft.com/office/drawing/2014/main" id="{0FEC2F52-A362-1717-BF91-EE5017ED5B2A}"/>
-              </a:ext>
-            </a:extLst>
-          </p:cNvPr>
-          <p:cNvCxnSpPr/>
-          <p:nvPr/>
-        </p:nvCxnSpPr>
-        <p:spPr>
-          <a:xfrm flipH="1" flipV="1">
-            <a:off x="6911293" y="2889055"/>
-            <a:ext cx="1656768" cy="1413674"/>
-          </a:xfrm>
-          <a:prstGeom prst="line">
-            <a:avLst/>
-          </a:prstGeom>
-          <a:ln w="9525"/>
-        </p:spPr>
-        <p:style>
-          <a:lnRef idx="2">
-            <a:schemeClr val="dk1"/>
-          </a:lnRef>
-          <a:fillRef idx="0">
-            <a:schemeClr val="dk1"/>
-          </a:fillRef>
-          <a:effectRef idx="1">
-            <a:schemeClr val="dk1"/>
-          </a:effectRef>
-          <a:fontRef idx="minor">
-            <a:schemeClr val="tx1"/>
-          </a:fontRef>
-        </p:style>
-      </p:cxnSp>
-      <p:cxnSp>
-        <p:nvCxnSpPr>
-          <p:cNvPr id="23" name="Gerader Verbinder 22">
-            <a:extLst>
-              <a:ext uri="{FF2B5EF4-FFF2-40B4-BE49-F238E27FC236}">
-                <a16:creationId xmlns:a16="http://schemas.microsoft.com/office/drawing/2014/main" id="{EC9DC9FB-FF54-31F7-0206-128972C556A3}"/>
-              </a:ext>
-            </a:extLst>
-          </p:cNvPr>
-          <p:cNvCxnSpPr/>
-          <p:nvPr/>
-        </p:nvCxnSpPr>
-        <p:spPr>
-          <a:xfrm flipH="1" flipV="1">
-            <a:off x="5346155" y="2753718"/>
-            <a:ext cx="1565138" cy="157776"/>
-          </a:xfrm>
-          <a:prstGeom prst="line">
-            <a:avLst/>
-          </a:prstGeom>
-          <a:ln w="9525"/>
-        </p:spPr>
-        <p:style>
-          <a:lnRef idx="2">
-            <a:schemeClr val="dk1"/>
-          </a:lnRef>
-          <a:fillRef idx="0">
-            <a:schemeClr val="dk1"/>
-          </a:fillRef>
-          <a:effectRef idx="1">
-            <a:schemeClr val="dk1"/>
-          </a:effectRef>
-          <a:fontRef idx="minor">
-            <a:schemeClr val="tx1"/>
-          </a:fontRef>
-        </p:style>
-      </p:cxnSp>
-      <p:cxnSp>
-        <p:nvCxnSpPr>
-          <p:cNvPr id="25" name="Gerader Verbinder 24">
-            <a:extLst>
-              <a:ext uri="{FF2B5EF4-FFF2-40B4-BE49-F238E27FC236}">
-                <a16:creationId xmlns:a16="http://schemas.microsoft.com/office/drawing/2014/main" id="{4ED29B56-AE50-EA1F-B070-C4BC288AA28A}"/>
-              </a:ext>
-            </a:extLst>
-          </p:cNvPr>
-          <p:cNvCxnSpPr/>
-          <p:nvPr/>
-        </p:nvCxnSpPr>
-        <p:spPr>
-          <a:xfrm flipV="1">
-            <a:off x="6911293" y="2434660"/>
-            <a:ext cx="2260756" cy="521713"/>
-          </a:xfrm>
-          <a:prstGeom prst="line">
-            <a:avLst/>
-          </a:prstGeom>
-          <a:ln w="9525"/>
-        </p:spPr>
-        <p:style>
-          <a:lnRef idx="2">
-            <a:schemeClr val="dk1"/>
-          </a:lnRef>
-          <a:fillRef idx="0">
-            <a:schemeClr val="dk1"/>
-          </a:fillRef>
-          <a:effectRef idx="1">
-            <a:schemeClr val="dk1"/>
-          </a:effectRef>
-          <a:fontRef idx="minor">
-            <a:schemeClr val="tx1"/>
-          </a:fontRef>
-        </p:style>
-      </p:cxnSp>
-      <p:cxnSp>
-        <p:nvCxnSpPr>
-          <p:cNvPr id="27" name="Gerader Verbinder 26">
-            <a:extLst>
-              <a:ext uri="{FF2B5EF4-FFF2-40B4-BE49-F238E27FC236}">
-                <a16:creationId xmlns:a16="http://schemas.microsoft.com/office/drawing/2014/main" id="{3DE7468D-DFD5-A58E-9C27-D57D67AFF75D}"/>
-              </a:ext>
-            </a:extLst>
-          </p:cNvPr>
-          <p:cNvCxnSpPr/>
-          <p:nvPr/>
-        </p:nvCxnSpPr>
-        <p:spPr>
-          <a:xfrm flipH="1" flipV="1">
-            <a:off x="7236663" y="953669"/>
-            <a:ext cx="1885059" cy="1469771"/>
-          </a:xfrm>
-          <a:prstGeom prst="line">
-            <a:avLst/>
-          </a:prstGeom>
-          <a:ln w="9525"/>
-        </p:spPr>
-        <p:style>
-          <a:lnRef idx="2">
-            <a:schemeClr val="dk1"/>
-          </a:lnRef>
-          <a:fillRef idx="0">
-            <a:schemeClr val="dk1"/>
-          </a:fillRef>
-          <a:effectRef idx="1">
-            <a:schemeClr val="dk1"/>
-          </a:effectRef>
-          <a:fontRef idx="minor">
-            <a:schemeClr val="tx1"/>
-          </a:fontRef>
-        </p:style>
-      </p:cxnSp>
-      <p:cxnSp>
-        <p:nvCxnSpPr>
-          <p:cNvPr id="29" name="Gerader Verbinder 28">
-            <a:extLst>
-              <a:ext uri="{FF2B5EF4-FFF2-40B4-BE49-F238E27FC236}">
-                <a16:creationId xmlns:a16="http://schemas.microsoft.com/office/drawing/2014/main" id="{B86476C7-3541-64E8-5014-B405EB6CACC7}"/>
-              </a:ext>
-            </a:extLst>
-          </p:cNvPr>
-          <p:cNvCxnSpPr/>
-          <p:nvPr/>
-        </p:nvCxnSpPr>
-        <p:spPr>
-          <a:xfrm flipV="1">
-            <a:off x="6911293" y="936840"/>
-            <a:ext cx="314150" cy="1974654"/>
-          </a:xfrm>
-          <a:prstGeom prst="line">
-            <a:avLst/>
-          </a:prstGeom>
-          <a:ln w="9525"/>
-        </p:spPr>
-        <p:style>
-          <a:lnRef idx="2">
-            <a:schemeClr val="dk1"/>
-          </a:lnRef>
-          <a:fillRef idx="0">
-            <a:schemeClr val="dk1"/>
-          </a:fillRef>
-          <a:effectRef idx="1">
-            <a:schemeClr val="dk1"/>
-          </a:effectRef>
-          <a:fontRef idx="minor">
-            <a:schemeClr val="tx1"/>
-          </a:fontRef>
-        </p:style>
-      </p:cxnSp>
-      <p:cxnSp>
-        <p:nvCxnSpPr>
-          <p:cNvPr id="31" name="Gerader Verbinder 30">
-            <a:extLst>
-              <a:ext uri="{FF2B5EF4-FFF2-40B4-BE49-F238E27FC236}">
-                <a16:creationId xmlns:a16="http://schemas.microsoft.com/office/drawing/2014/main" id="{ED0173B2-4B84-BC16-67E5-5E6F5F911EF5}"/>
-              </a:ext>
-            </a:extLst>
-          </p:cNvPr>
-          <p:cNvCxnSpPr/>
-          <p:nvPr/>
-        </p:nvCxnSpPr>
-        <p:spPr>
-          <a:xfrm flipH="1" flipV="1">
-            <a:off x="5480790" y="802204"/>
-            <a:ext cx="1430503" cy="2137340"/>
-          </a:xfrm>
-          <a:prstGeom prst="line">
-            <a:avLst/>
-          </a:prstGeom>
-          <a:ln w="9525"/>
-        </p:spPr>
-        <p:style>
-          <a:lnRef idx="2">
-            <a:schemeClr val="dk1"/>
-          </a:lnRef>
-          <a:fillRef idx="0">
-            <a:schemeClr val="dk1"/>
-          </a:fillRef>
-          <a:effectRef idx="1">
-            <a:schemeClr val="dk1"/>
-          </a:effectRef>
-          <a:fontRef idx="minor">
-            <a:schemeClr val="tx1"/>
-          </a:fontRef>
-        </p:style>
-      </p:cxnSp>
-      <p:cxnSp>
-        <p:nvCxnSpPr>
-          <p:cNvPr id="33" name="Gerader Verbinder 32">
-            <a:extLst>
-              <a:ext uri="{FF2B5EF4-FFF2-40B4-BE49-F238E27FC236}">
-                <a16:creationId xmlns:a16="http://schemas.microsoft.com/office/drawing/2014/main" id="{6943028A-2DA2-9551-0D2D-14B3531B2DDA}"/>
-              </a:ext>
-            </a:extLst>
-          </p:cNvPr>
-          <p:cNvCxnSpPr/>
-          <p:nvPr/>
-        </p:nvCxnSpPr>
-        <p:spPr>
-          <a:xfrm flipV="1">
-            <a:off x="5346155" y="802204"/>
-            <a:ext cx="100977" cy="1935386"/>
-          </a:xfrm>
-          <a:prstGeom prst="line">
-            <a:avLst/>
-          </a:prstGeom>
-          <a:ln w="9525"/>
-        </p:spPr>
-        <p:style>
-          <a:lnRef idx="2">
-            <a:schemeClr val="dk1"/>
-          </a:lnRef>
-          <a:fillRef idx="0">
-            <a:schemeClr val="dk1"/>
-          </a:fillRef>
-          <a:effectRef idx="1">
-            <a:schemeClr val="dk1"/>
+            <a:schemeClr val="accent1"/>
           </a:effectRef>
           <a:fontRef idx="minor">
             <a:schemeClr val="tx1"/>
@@ -5849,7 +5374,7 @@
     </p:spTree>
     <p:extLst>
       <p:ext uri="{BB962C8B-B14F-4D97-AF65-F5344CB8AC3E}">
-        <p14:creationId xmlns:p14="http://schemas.microsoft.com/office/powerpoint/2010/main" val="756043445"/>
+        <p14:creationId xmlns:p14="http://schemas.microsoft.com/office/powerpoint/2010/main" val="3094168420"/>
       </p:ext>
     </p:extLst>
   </p:cSld>
@@ -6394,137 +5919,10 @@
           </a:fontRef>
         </p:style>
       </p:cxnSp>
-      <p:cxnSp>
-        <p:nvCxnSpPr>
-          <p:cNvPr id="35" name="Gerader Verbinder 34">
-            <a:extLst>
-              <a:ext uri="{FF2B5EF4-FFF2-40B4-BE49-F238E27FC236}">
-                <a16:creationId xmlns:a16="http://schemas.microsoft.com/office/drawing/2014/main" id="{A06CE8BF-6B23-3854-3365-1F09E7B9CE2D}"/>
-              </a:ext>
-            </a:extLst>
-          </p:cNvPr>
-          <p:cNvCxnSpPr/>
-          <p:nvPr/>
-        </p:nvCxnSpPr>
-        <p:spPr>
-          <a:xfrm>
-            <a:off x="3668820" y="1255897"/>
-            <a:ext cx="84147" cy="3658301"/>
-          </a:xfrm>
-          <a:prstGeom prst="line">
-            <a:avLst/>
-          </a:prstGeom>
-          <a:ln w="9525">
-            <a:solidFill>
-              <a:srgbClr val="94B31C"/>
-            </a:solidFill>
-          </a:ln>
-        </p:spPr>
-        <p:style>
-          <a:lnRef idx="2">
-            <a:schemeClr val="accent1"/>
-          </a:lnRef>
-          <a:fillRef idx="0">
-            <a:schemeClr val="accent1"/>
-          </a:fillRef>
-          <a:effectRef idx="1">
-            <a:schemeClr val="accent1"/>
-          </a:effectRef>
-          <a:fontRef idx="minor">
-            <a:schemeClr val="tx1"/>
-          </a:fontRef>
-        </p:style>
-      </p:cxnSp>
-      <p:cxnSp>
-        <p:nvCxnSpPr>
-          <p:cNvPr id="37" name="Gerader Verbinder 36">
-            <a:extLst>
-              <a:ext uri="{FF2B5EF4-FFF2-40B4-BE49-F238E27FC236}">
-                <a16:creationId xmlns:a16="http://schemas.microsoft.com/office/drawing/2014/main" id="{3A3F9B94-D591-4722-1FC8-59E12584B3AE}"/>
-              </a:ext>
-            </a:extLst>
-          </p:cNvPr>
-          <p:cNvCxnSpPr/>
-          <p:nvPr/>
-        </p:nvCxnSpPr>
-        <p:spPr>
-          <a:xfrm flipV="1">
-            <a:off x="3769797" y="4447882"/>
-            <a:ext cx="1385623" cy="443878"/>
-          </a:xfrm>
-          <a:prstGeom prst="line">
-            <a:avLst/>
-          </a:prstGeom>
-          <a:ln w="9525">
-            <a:solidFill>
-              <a:srgbClr val="94B31C"/>
-            </a:solidFill>
-          </a:ln>
-        </p:spPr>
-        <p:style>
-          <a:lnRef idx="2">
-            <a:schemeClr val="accent1"/>
-          </a:lnRef>
-          <a:fillRef idx="0">
-            <a:schemeClr val="accent1"/>
-          </a:fillRef>
-          <a:effectRef idx="1">
-            <a:schemeClr val="accent1"/>
-          </a:effectRef>
-          <a:fontRef idx="minor">
-            <a:schemeClr val="tx1"/>
-          </a:fontRef>
-        </p:style>
-      </p:cxnSp>
-      <p:cxnSp>
-        <p:nvCxnSpPr>
-          <p:cNvPr id="2" name="Gerade Verbindung mit Pfeil 1">
-            <a:extLst>
-              <a:ext uri="{FF2B5EF4-FFF2-40B4-BE49-F238E27FC236}">
-                <a16:creationId xmlns:a16="http://schemas.microsoft.com/office/drawing/2014/main" id="{679D061E-4B24-50EA-0173-A03E5699E4FF}"/>
-              </a:ext>
-            </a:extLst>
-          </p:cNvPr>
-          <p:cNvCxnSpPr>
-            <a:cxnSpLocks/>
-          </p:cNvCxnSpPr>
-          <p:nvPr/>
-        </p:nvCxnSpPr>
-        <p:spPr>
-          <a:xfrm flipV="1">
-            <a:off x="1757479" y="4286746"/>
-            <a:ext cx="333375" cy="461963"/>
-          </a:xfrm>
-          <a:prstGeom prst="straightConnector1">
-            <a:avLst/>
-          </a:prstGeom>
-          <a:ln w="9525">
-            <a:solidFill>
-              <a:srgbClr val="94B31C"/>
-            </a:solidFill>
-            <a:headEnd w="lg" len="lg"/>
-            <a:tailEnd type="stealth" w="lg" len="lg"/>
-          </a:ln>
-        </p:spPr>
-        <p:style>
-          <a:lnRef idx="2">
-            <a:schemeClr val="accent1"/>
-          </a:lnRef>
-          <a:fillRef idx="0">
-            <a:schemeClr val="accent1"/>
-          </a:fillRef>
-          <a:effectRef idx="1">
-            <a:schemeClr val="accent1"/>
-          </a:effectRef>
-          <a:fontRef idx="minor">
-            <a:schemeClr val="tx1"/>
-          </a:fontRef>
-        </p:style>
-      </p:cxnSp>
     </p:spTree>
     <p:extLst>
       <p:ext uri="{BB962C8B-B14F-4D97-AF65-F5344CB8AC3E}">
-        <p14:creationId xmlns:p14="http://schemas.microsoft.com/office/powerpoint/2010/main" val="3660824256"/>
+        <p14:creationId xmlns:p14="http://schemas.microsoft.com/office/powerpoint/2010/main" val="756043445"/>
       </p:ext>
     </p:extLst>
   </p:cSld>
@@ -7089,17 +6487,21 @@
           <a:prstGeom prst="line">
             <a:avLst/>
           </a:prstGeom>
-          <a:ln w="9525"/>
-        </p:spPr>
-        <p:style>
-          <a:lnRef idx="1">
-            <a:schemeClr val="dk1"/>
+          <a:ln w="9525">
+            <a:solidFill>
+              <a:srgbClr val="5E711C"/>
+            </a:solidFill>
+          </a:ln>
+        </p:spPr>
+        <p:style>
+          <a:lnRef idx="2">
+            <a:schemeClr val="accent1"/>
           </a:lnRef>
           <a:fillRef idx="0">
-            <a:schemeClr val="dk1"/>
-          </a:fillRef>
-          <a:effectRef idx="0">
-            <a:schemeClr val="dk1"/>
+            <a:schemeClr val="accent1"/>
+          </a:fillRef>
+          <a:effectRef idx="1">
+            <a:schemeClr val="accent1"/>
           </a:effectRef>
           <a:fontRef idx="minor">
             <a:schemeClr val="tx1"/>
@@ -7126,17 +6528,21 @@
           <a:prstGeom prst="line">
             <a:avLst/>
           </a:prstGeom>
-          <a:ln w="9525"/>
-        </p:spPr>
-        <p:style>
-          <a:lnRef idx="1">
-            <a:schemeClr val="dk1"/>
+          <a:ln w="9525">
+            <a:solidFill>
+              <a:srgbClr val="5E711C"/>
+            </a:solidFill>
+          </a:ln>
+        </p:spPr>
+        <p:style>
+          <a:lnRef idx="2">
+            <a:schemeClr val="accent1"/>
           </a:lnRef>
           <a:fillRef idx="0">
-            <a:schemeClr val="dk1"/>
-          </a:fillRef>
-          <a:effectRef idx="0">
-            <a:schemeClr val="dk1"/>
+            <a:schemeClr val="accent1"/>
+          </a:fillRef>
+          <a:effectRef idx="1">
+            <a:schemeClr val="accent1"/>
           </a:effectRef>
           <a:fontRef idx="minor">
             <a:schemeClr val="tx1"/>
@@ -7166,19 +6572,22 @@
             <a:avLst/>
           </a:prstGeom>
           <a:ln w="9525">
+            <a:solidFill>
+              <a:srgbClr val="5E711C"/>
+            </a:solidFill>
             <a:headEnd w="lg" len="lg"/>
             <a:tailEnd type="stealth" w="lg" len="lg"/>
           </a:ln>
         </p:spPr>
         <p:style>
-          <a:lnRef idx="1">
-            <a:schemeClr val="dk1"/>
+          <a:lnRef idx="2">
+            <a:schemeClr val="accent1"/>
           </a:lnRef>
           <a:fillRef idx="0">
-            <a:schemeClr val="dk1"/>
-          </a:fillRef>
-          <a:effectRef idx="0">
-            <a:schemeClr val="dk1"/>
+            <a:schemeClr val="accent1"/>
+          </a:fillRef>
+          <a:effectRef idx="1">
+            <a:schemeClr val="accent1"/>
           </a:effectRef>
           <a:fontRef idx="minor">
             <a:schemeClr val="tx1"/>
@@ -7188,7 +6597,7 @@
     </p:spTree>
     <p:extLst>
       <p:ext uri="{BB962C8B-B14F-4D97-AF65-F5344CB8AC3E}">
-        <p14:creationId xmlns:p14="http://schemas.microsoft.com/office/powerpoint/2010/main" val="1178704449"/>
+        <p14:creationId xmlns:p14="http://schemas.microsoft.com/office/powerpoint/2010/main" val="3660824256"/>
       </p:ext>
     </p:extLst>
   </p:cSld>
@@ -7215,46 +6624,644 @@
           <a:chExt cx="0" cy="0"/>
         </a:xfrm>
       </p:grpSpPr>
-      <p:pic>
-        <p:nvPicPr>
-          <p:cNvPr id="5" name="Grafik 4" descr="Ein Bild, das Text, Screenshot, Kreis, Schrift enthält.&#10;&#10;Automatisch generierte Beschreibung">
-            <a:extLst>
-              <a:ext uri="{FF2B5EF4-FFF2-40B4-BE49-F238E27FC236}">
-                <a16:creationId xmlns:a16="http://schemas.microsoft.com/office/drawing/2014/main" id="{C53078EB-04F9-7BAB-F0D4-32ED20280B12}"/>
-              </a:ext>
-            </a:extLst>
-          </p:cNvPr>
-          <p:cNvPicPr>
-            <a:picLocks noChangeAspect="1"/>
-          </p:cNvPicPr>
-          <p:nvPr/>
-        </p:nvPicPr>
-        <p:blipFill>
-          <a:blip r:embed="rId2">
-            <a:extLst>
-              <a:ext uri="{28A0092B-C50C-407E-A947-70E740481C1C}">
-                <a14:useLocalDpi xmlns:a14="http://schemas.microsoft.com/office/drawing/2010/main" val="0"/>
-              </a:ext>
-            </a:extLst>
-          </a:blip>
-          <a:stretch>
-            <a:fillRect/>
-          </a:stretch>
-        </p:blipFill>
+      <p:cxnSp>
+        <p:nvCxnSpPr>
+          <p:cNvPr id="7" name="Gerader Verbinder 6">
+            <a:extLst>
+              <a:ext uri="{FF2B5EF4-FFF2-40B4-BE49-F238E27FC236}">
+                <a16:creationId xmlns:a16="http://schemas.microsoft.com/office/drawing/2014/main" id="{871513E0-27F3-46EA-A76E-3E818E72613C}"/>
+              </a:ext>
+            </a:extLst>
+          </p:cNvPr>
+          <p:cNvCxnSpPr/>
+          <p:nvPr/>
+        </p:nvCxnSpPr>
+        <p:spPr>
+          <a:xfrm flipV="1">
+            <a:off x="2917104" y="953669"/>
+            <a:ext cx="4370047" cy="2002704"/>
+          </a:xfrm>
+          <a:prstGeom prst="line">
+            <a:avLst/>
+          </a:prstGeom>
+          <a:ln w="9525"/>
+        </p:spPr>
+        <p:style>
+          <a:lnRef idx="2">
+            <a:schemeClr val="dk1"/>
+          </a:lnRef>
+          <a:fillRef idx="0">
+            <a:schemeClr val="dk1"/>
+          </a:fillRef>
+          <a:effectRef idx="1">
+            <a:schemeClr val="dk1"/>
+          </a:effectRef>
+          <a:fontRef idx="minor">
+            <a:schemeClr val="tx1"/>
+          </a:fontRef>
+        </p:style>
+      </p:cxnSp>
+      <p:cxnSp>
+        <p:nvCxnSpPr>
+          <p:cNvPr id="9" name="Gerader Verbinder 8">
+            <a:extLst>
+              <a:ext uri="{FF2B5EF4-FFF2-40B4-BE49-F238E27FC236}">
+                <a16:creationId xmlns:a16="http://schemas.microsoft.com/office/drawing/2014/main" id="{30176299-A412-17C1-3662-24D85C7C04E9}"/>
+              </a:ext>
+            </a:extLst>
+          </p:cNvPr>
+          <p:cNvCxnSpPr/>
+          <p:nvPr/>
+        </p:nvCxnSpPr>
+        <p:spPr>
+          <a:xfrm flipV="1">
+            <a:off x="2911494" y="1262209"/>
+            <a:ext cx="751716" cy="1710993"/>
+          </a:xfrm>
+          <a:prstGeom prst="line">
+            <a:avLst/>
+          </a:prstGeom>
+          <a:ln w="9525"/>
+        </p:spPr>
+        <p:style>
+          <a:lnRef idx="2">
+            <a:schemeClr val="dk1"/>
+          </a:lnRef>
+          <a:fillRef idx="0">
+            <a:schemeClr val="dk1"/>
+          </a:fillRef>
+          <a:effectRef idx="1">
+            <a:schemeClr val="dk1"/>
+          </a:effectRef>
+          <a:fontRef idx="minor">
+            <a:schemeClr val="tx1"/>
+          </a:fontRef>
+        </p:style>
+      </p:cxnSp>
+      <p:cxnSp>
+        <p:nvCxnSpPr>
+          <p:cNvPr id="11" name="Gerader Verbinder 10">
+            <a:extLst>
+              <a:ext uri="{FF2B5EF4-FFF2-40B4-BE49-F238E27FC236}">
+                <a16:creationId xmlns:a16="http://schemas.microsoft.com/office/drawing/2014/main" id="{297B748D-1927-BE70-9D3B-6CD4FC253C29}"/>
+              </a:ext>
+            </a:extLst>
+          </p:cNvPr>
+          <p:cNvCxnSpPr/>
+          <p:nvPr/>
+        </p:nvCxnSpPr>
         <p:spPr>
           <a:xfrm>
-            <a:off x="2318564" y="145905"/>
-            <a:ext cx="7518856" cy="6597796"/>
-          </a:xfrm>
-          <a:prstGeom prst="rect">
-            <a:avLst/>
-          </a:prstGeom>
-        </p:spPr>
-      </p:pic>
+            <a:off x="3702479" y="1262209"/>
+            <a:ext cx="1464161" cy="3191985"/>
+          </a:xfrm>
+          <a:prstGeom prst="line">
+            <a:avLst/>
+          </a:prstGeom>
+          <a:ln w="9525"/>
+        </p:spPr>
+        <p:style>
+          <a:lnRef idx="2">
+            <a:schemeClr val="dk1"/>
+          </a:lnRef>
+          <a:fillRef idx="0">
+            <a:schemeClr val="dk1"/>
+          </a:fillRef>
+          <a:effectRef idx="1">
+            <a:schemeClr val="dk1"/>
+          </a:effectRef>
+          <a:fontRef idx="minor">
+            <a:schemeClr val="tx1"/>
+          </a:fontRef>
+        </p:style>
+      </p:cxnSp>
+      <p:cxnSp>
+        <p:nvCxnSpPr>
+          <p:cNvPr id="13" name="Gerader Verbinder 12">
+            <a:extLst>
+              <a:ext uri="{FF2B5EF4-FFF2-40B4-BE49-F238E27FC236}">
+                <a16:creationId xmlns:a16="http://schemas.microsoft.com/office/drawing/2014/main" id="{4576D5A5-5CDD-766F-47C9-676D5DEB3C8C}"/>
+              </a:ext>
+            </a:extLst>
+          </p:cNvPr>
+          <p:cNvCxnSpPr/>
+          <p:nvPr/>
+        </p:nvCxnSpPr>
+        <p:spPr>
+          <a:xfrm>
+            <a:off x="2911494" y="2956373"/>
+            <a:ext cx="5617298" cy="1346356"/>
+          </a:xfrm>
+          <a:prstGeom prst="line">
+            <a:avLst/>
+          </a:prstGeom>
+          <a:ln w="9525"/>
+        </p:spPr>
+        <p:style>
+          <a:lnRef idx="2">
+            <a:schemeClr val="dk1"/>
+          </a:lnRef>
+          <a:fillRef idx="0">
+            <a:schemeClr val="dk1"/>
+          </a:fillRef>
+          <a:effectRef idx="1">
+            <a:schemeClr val="dk1"/>
+          </a:effectRef>
+          <a:fontRef idx="minor">
+            <a:schemeClr val="tx1"/>
+          </a:fontRef>
+        </p:style>
+      </p:cxnSp>
+      <p:cxnSp>
+        <p:nvCxnSpPr>
+          <p:cNvPr id="15" name="Gerader Verbinder 14">
+            <a:extLst>
+              <a:ext uri="{FF2B5EF4-FFF2-40B4-BE49-F238E27FC236}">
+                <a16:creationId xmlns:a16="http://schemas.microsoft.com/office/drawing/2014/main" id="{52191099-8CD5-7958-BEBB-3AC4E7F0FA71}"/>
+              </a:ext>
+            </a:extLst>
+          </p:cNvPr>
+          <p:cNvCxnSpPr/>
+          <p:nvPr/>
+        </p:nvCxnSpPr>
+        <p:spPr>
+          <a:xfrm>
+            <a:off x="2911494" y="2973202"/>
+            <a:ext cx="2255146" cy="1480992"/>
+          </a:xfrm>
+          <a:prstGeom prst="line">
+            <a:avLst/>
+          </a:prstGeom>
+          <a:ln w="9525"/>
+        </p:spPr>
+        <p:style>
+          <a:lnRef idx="2">
+            <a:schemeClr val="dk1"/>
+          </a:lnRef>
+          <a:fillRef idx="0">
+            <a:schemeClr val="dk1"/>
+          </a:fillRef>
+          <a:effectRef idx="1">
+            <a:schemeClr val="dk1"/>
+          </a:effectRef>
+          <a:fontRef idx="minor">
+            <a:schemeClr val="tx1"/>
+          </a:fontRef>
+        </p:style>
+      </p:cxnSp>
+      <p:cxnSp>
+        <p:nvCxnSpPr>
+          <p:cNvPr id="17" name="Gerader Verbinder 16">
+            <a:extLst>
+              <a:ext uri="{FF2B5EF4-FFF2-40B4-BE49-F238E27FC236}">
+                <a16:creationId xmlns:a16="http://schemas.microsoft.com/office/drawing/2014/main" id="{6BF01FA4-616D-EA93-654F-B4C1739D5220}"/>
+              </a:ext>
+            </a:extLst>
+          </p:cNvPr>
+          <p:cNvCxnSpPr/>
+          <p:nvPr/>
+        </p:nvCxnSpPr>
+        <p:spPr>
+          <a:xfrm>
+            <a:off x="5166640" y="4454194"/>
+            <a:ext cx="1744653" cy="589031"/>
+          </a:xfrm>
+          <a:prstGeom prst="line">
+            <a:avLst/>
+          </a:prstGeom>
+          <a:ln w="9525"/>
+        </p:spPr>
+        <p:style>
+          <a:lnRef idx="2">
+            <a:schemeClr val="dk1"/>
+          </a:lnRef>
+          <a:fillRef idx="0">
+            <a:schemeClr val="dk1"/>
+          </a:fillRef>
+          <a:effectRef idx="1">
+            <a:schemeClr val="dk1"/>
+          </a:effectRef>
+          <a:fontRef idx="minor">
+            <a:schemeClr val="tx1"/>
+          </a:fontRef>
+        </p:style>
+      </p:cxnSp>
+      <p:cxnSp>
+        <p:nvCxnSpPr>
+          <p:cNvPr id="19" name="Gerader Verbinder 18">
+            <a:extLst>
+              <a:ext uri="{FF2B5EF4-FFF2-40B4-BE49-F238E27FC236}">
+                <a16:creationId xmlns:a16="http://schemas.microsoft.com/office/drawing/2014/main" id="{C8B0F0C3-AD10-CE99-C571-964EACD1EDC7}"/>
+              </a:ext>
+            </a:extLst>
+          </p:cNvPr>
+          <p:cNvCxnSpPr/>
+          <p:nvPr/>
+        </p:nvCxnSpPr>
+        <p:spPr>
+          <a:xfrm flipV="1">
+            <a:off x="6973001" y="4302729"/>
+            <a:ext cx="1555791" cy="740496"/>
+          </a:xfrm>
+          <a:prstGeom prst="line">
+            <a:avLst/>
+          </a:prstGeom>
+          <a:ln w="9525"/>
+        </p:spPr>
+        <p:style>
+          <a:lnRef idx="2">
+            <a:schemeClr val="dk1"/>
+          </a:lnRef>
+          <a:fillRef idx="0">
+            <a:schemeClr val="dk1"/>
+          </a:fillRef>
+          <a:effectRef idx="1">
+            <a:schemeClr val="dk1"/>
+          </a:effectRef>
+          <a:fontRef idx="minor">
+            <a:schemeClr val="tx1"/>
+          </a:fontRef>
+        </p:style>
+      </p:cxnSp>
+      <p:cxnSp>
+        <p:nvCxnSpPr>
+          <p:cNvPr id="21" name="Gerader Verbinder 20">
+            <a:extLst>
+              <a:ext uri="{FF2B5EF4-FFF2-40B4-BE49-F238E27FC236}">
+                <a16:creationId xmlns:a16="http://schemas.microsoft.com/office/drawing/2014/main" id="{0FEC2F52-A362-1717-BF91-EE5017ED5B2A}"/>
+              </a:ext>
+            </a:extLst>
+          </p:cNvPr>
+          <p:cNvCxnSpPr/>
+          <p:nvPr/>
+        </p:nvCxnSpPr>
+        <p:spPr>
+          <a:xfrm flipH="1" flipV="1">
+            <a:off x="6911293" y="2889055"/>
+            <a:ext cx="1656768" cy="1413674"/>
+          </a:xfrm>
+          <a:prstGeom prst="line">
+            <a:avLst/>
+          </a:prstGeom>
+          <a:ln w="9525"/>
+        </p:spPr>
+        <p:style>
+          <a:lnRef idx="2">
+            <a:schemeClr val="dk1"/>
+          </a:lnRef>
+          <a:fillRef idx="0">
+            <a:schemeClr val="dk1"/>
+          </a:fillRef>
+          <a:effectRef idx="1">
+            <a:schemeClr val="dk1"/>
+          </a:effectRef>
+          <a:fontRef idx="minor">
+            <a:schemeClr val="tx1"/>
+          </a:fontRef>
+        </p:style>
+      </p:cxnSp>
+      <p:cxnSp>
+        <p:nvCxnSpPr>
+          <p:cNvPr id="23" name="Gerader Verbinder 22">
+            <a:extLst>
+              <a:ext uri="{FF2B5EF4-FFF2-40B4-BE49-F238E27FC236}">
+                <a16:creationId xmlns:a16="http://schemas.microsoft.com/office/drawing/2014/main" id="{EC9DC9FB-FF54-31F7-0206-128972C556A3}"/>
+              </a:ext>
+            </a:extLst>
+          </p:cNvPr>
+          <p:cNvCxnSpPr/>
+          <p:nvPr/>
+        </p:nvCxnSpPr>
+        <p:spPr>
+          <a:xfrm flipH="1" flipV="1">
+            <a:off x="5346155" y="2753718"/>
+            <a:ext cx="1565138" cy="157776"/>
+          </a:xfrm>
+          <a:prstGeom prst="line">
+            <a:avLst/>
+          </a:prstGeom>
+          <a:ln w="9525"/>
+        </p:spPr>
+        <p:style>
+          <a:lnRef idx="2">
+            <a:schemeClr val="dk1"/>
+          </a:lnRef>
+          <a:fillRef idx="0">
+            <a:schemeClr val="dk1"/>
+          </a:fillRef>
+          <a:effectRef idx="1">
+            <a:schemeClr val="dk1"/>
+          </a:effectRef>
+          <a:fontRef idx="minor">
+            <a:schemeClr val="tx1"/>
+          </a:fontRef>
+        </p:style>
+      </p:cxnSp>
+      <p:cxnSp>
+        <p:nvCxnSpPr>
+          <p:cNvPr id="25" name="Gerader Verbinder 24">
+            <a:extLst>
+              <a:ext uri="{FF2B5EF4-FFF2-40B4-BE49-F238E27FC236}">
+                <a16:creationId xmlns:a16="http://schemas.microsoft.com/office/drawing/2014/main" id="{4ED29B56-AE50-EA1F-B070-C4BC288AA28A}"/>
+              </a:ext>
+            </a:extLst>
+          </p:cNvPr>
+          <p:cNvCxnSpPr/>
+          <p:nvPr/>
+        </p:nvCxnSpPr>
+        <p:spPr>
+          <a:xfrm flipV="1">
+            <a:off x="6911293" y="2434660"/>
+            <a:ext cx="2260756" cy="521713"/>
+          </a:xfrm>
+          <a:prstGeom prst="line">
+            <a:avLst/>
+          </a:prstGeom>
+          <a:ln w="9525"/>
+        </p:spPr>
+        <p:style>
+          <a:lnRef idx="2">
+            <a:schemeClr val="dk1"/>
+          </a:lnRef>
+          <a:fillRef idx="0">
+            <a:schemeClr val="dk1"/>
+          </a:fillRef>
+          <a:effectRef idx="1">
+            <a:schemeClr val="dk1"/>
+          </a:effectRef>
+          <a:fontRef idx="minor">
+            <a:schemeClr val="tx1"/>
+          </a:fontRef>
+        </p:style>
+      </p:cxnSp>
+      <p:cxnSp>
+        <p:nvCxnSpPr>
+          <p:cNvPr id="27" name="Gerader Verbinder 26">
+            <a:extLst>
+              <a:ext uri="{FF2B5EF4-FFF2-40B4-BE49-F238E27FC236}">
+                <a16:creationId xmlns:a16="http://schemas.microsoft.com/office/drawing/2014/main" id="{3DE7468D-DFD5-A58E-9C27-D57D67AFF75D}"/>
+              </a:ext>
+            </a:extLst>
+          </p:cNvPr>
+          <p:cNvCxnSpPr/>
+          <p:nvPr/>
+        </p:nvCxnSpPr>
+        <p:spPr>
+          <a:xfrm flipH="1" flipV="1">
+            <a:off x="7236663" y="953669"/>
+            <a:ext cx="1885059" cy="1469771"/>
+          </a:xfrm>
+          <a:prstGeom prst="line">
+            <a:avLst/>
+          </a:prstGeom>
+          <a:ln w="9525"/>
+        </p:spPr>
+        <p:style>
+          <a:lnRef idx="2">
+            <a:schemeClr val="dk1"/>
+          </a:lnRef>
+          <a:fillRef idx="0">
+            <a:schemeClr val="dk1"/>
+          </a:fillRef>
+          <a:effectRef idx="1">
+            <a:schemeClr val="dk1"/>
+          </a:effectRef>
+          <a:fontRef idx="minor">
+            <a:schemeClr val="tx1"/>
+          </a:fontRef>
+        </p:style>
+      </p:cxnSp>
+      <p:cxnSp>
+        <p:nvCxnSpPr>
+          <p:cNvPr id="29" name="Gerader Verbinder 28">
+            <a:extLst>
+              <a:ext uri="{FF2B5EF4-FFF2-40B4-BE49-F238E27FC236}">
+                <a16:creationId xmlns:a16="http://schemas.microsoft.com/office/drawing/2014/main" id="{B86476C7-3541-64E8-5014-B405EB6CACC7}"/>
+              </a:ext>
+            </a:extLst>
+          </p:cNvPr>
+          <p:cNvCxnSpPr/>
+          <p:nvPr/>
+        </p:nvCxnSpPr>
+        <p:spPr>
+          <a:xfrm flipV="1">
+            <a:off x="6911293" y="936840"/>
+            <a:ext cx="314150" cy="1974654"/>
+          </a:xfrm>
+          <a:prstGeom prst="line">
+            <a:avLst/>
+          </a:prstGeom>
+          <a:ln w="9525"/>
+        </p:spPr>
+        <p:style>
+          <a:lnRef idx="2">
+            <a:schemeClr val="dk1"/>
+          </a:lnRef>
+          <a:fillRef idx="0">
+            <a:schemeClr val="dk1"/>
+          </a:fillRef>
+          <a:effectRef idx="1">
+            <a:schemeClr val="dk1"/>
+          </a:effectRef>
+          <a:fontRef idx="minor">
+            <a:schemeClr val="tx1"/>
+          </a:fontRef>
+        </p:style>
+      </p:cxnSp>
+      <p:cxnSp>
+        <p:nvCxnSpPr>
+          <p:cNvPr id="31" name="Gerader Verbinder 30">
+            <a:extLst>
+              <a:ext uri="{FF2B5EF4-FFF2-40B4-BE49-F238E27FC236}">
+                <a16:creationId xmlns:a16="http://schemas.microsoft.com/office/drawing/2014/main" id="{ED0173B2-4B84-BC16-67E5-5E6F5F911EF5}"/>
+              </a:ext>
+            </a:extLst>
+          </p:cNvPr>
+          <p:cNvCxnSpPr/>
+          <p:nvPr/>
+        </p:nvCxnSpPr>
+        <p:spPr>
+          <a:xfrm flipH="1" flipV="1">
+            <a:off x="5480790" y="802204"/>
+            <a:ext cx="1430503" cy="2137340"/>
+          </a:xfrm>
+          <a:prstGeom prst="line">
+            <a:avLst/>
+          </a:prstGeom>
+          <a:ln w="9525"/>
+        </p:spPr>
+        <p:style>
+          <a:lnRef idx="2">
+            <a:schemeClr val="dk1"/>
+          </a:lnRef>
+          <a:fillRef idx="0">
+            <a:schemeClr val="dk1"/>
+          </a:fillRef>
+          <a:effectRef idx="1">
+            <a:schemeClr val="dk1"/>
+          </a:effectRef>
+          <a:fontRef idx="minor">
+            <a:schemeClr val="tx1"/>
+          </a:fontRef>
+        </p:style>
+      </p:cxnSp>
+      <p:cxnSp>
+        <p:nvCxnSpPr>
+          <p:cNvPr id="33" name="Gerader Verbinder 32">
+            <a:extLst>
+              <a:ext uri="{FF2B5EF4-FFF2-40B4-BE49-F238E27FC236}">
+                <a16:creationId xmlns:a16="http://schemas.microsoft.com/office/drawing/2014/main" id="{6943028A-2DA2-9551-0D2D-14B3531B2DDA}"/>
+              </a:ext>
+            </a:extLst>
+          </p:cNvPr>
+          <p:cNvCxnSpPr/>
+          <p:nvPr/>
+        </p:nvCxnSpPr>
+        <p:spPr>
+          <a:xfrm flipV="1">
+            <a:off x="5346155" y="802204"/>
+            <a:ext cx="100977" cy="1935386"/>
+          </a:xfrm>
+          <a:prstGeom prst="line">
+            <a:avLst/>
+          </a:prstGeom>
+          <a:ln w="9525"/>
+        </p:spPr>
+        <p:style>
+          <a:lnRef idx="2">
+            <a:schemeClr val="dk1"/>
+          </a:lnRef>
+          <a:fillRef idx="0">
+            <a:schemeClr val="dk1"/>
+          </a:fillRef>
+          <a:effectRef idx="1">
+            <a:schemeClr val="dk1"/>
+          </a:effectRef>
+          <a:fontRef idx="minor">
+            <a:schemeClr val="tx1"/>
+          </a:fontRef>
+        </p:style>
+      </p:cxnSp>
+      <p:cxnSp>
+        <p:nvCxnSpPr>
+          <p:cNvPr id="35" name="Gerader Verbinder 34">
+            <a:extLst>
+              <a:ext uri="{FF2B5EF4-FFF2-40B4-BE49-F238E27FC236}">
+                <a16:creationId xmlns:a16="http://schemas.microsoft.com/office/drawing/2014/main" id="{A06CE8BF-6B23-3854-3365-1F09E7B9CE2D}"/>
+              </a:ext>
+            </a:extLst>
+          </p:cNvPr>
+          <p:cNvCxnSpPr/>
+          <p:nvPr/>
+        </p:nvCxnSpPr>
+        <p:spPr>
+          <a:xfrm>
+            <a:off x="3668820" y="1255897"/>
+            <a:ext cx="84147" cy="3658301"/>
+          </a:xfrm>
+          <a:prstGeom prst="line">
+            <a:avLst/>
+          </a:prstGeom>
+          <a:ln w="9525"/>
+        </p:spPr>
+        <p:style>
+          <a:lnRef idx="1">
+            <a:schemeClr val="dk1"/>
+          </a:lnRef>
+          <a:fillRef idx="0">
+            <a:schemeClr val="dk1"/>
+          </a:fillRef>
+          <a:effectRef idx="0">
+            <a:schemeClr val="dk1"/>
+          </a:effectRef>
+          <a:fontRef idx="minor">
+            <a:schemeClr val="tx1"/>
+          </a:fontRef>
+        </p:style>
+      </p:cxnSp>
+      <p:cxnSp>
+        <p:nvCxnSpPr>
+          <p:cNvPr id="37" name="Gerader Verbinder 36">
+            <a:extLst>
+              <a:ext uri="{FF2B5EF4-FFF2-40B4-BE49-F238E27FC236}">
+                <a16:creationId xmlns:a16="http://schemas.microsoft.com/office/drawing/2014/main" id="{3A3F9B94-D591-4722-1FC8-59E12584B3AE}"/>
+              </a:ext>
+            </a:extLst>
+          </p:cNvPr>
+          <p:cNvCxnSpPr/>
+          <p:nvPr/>
+        </p:nvCxnSpPr>
+        <p:spPr>
+          <a:xfrm flipV="1">
+            <a:off x="3769797" y="4447882"/>
+            <a:ext cx="1385623" cy="443878"/>
+          </a:xfrm>
+          <a:prstGeom prst="line">
+            <a:avLst/>
+          </a:prstGeom>
+          <a:ln w="9525"/>
+        </p:spPr>
+        <p:style>
+          <a:lnRef idx="1">
+            <a:schemeClr val="dk1"/>
+          </a:lnRef>
+          <a:fillRef idx="0">
+            <a:schemeClr val="dk1"/>
+          </a:fillRef>
+          <a:effectRef idx="0">
+            <a:schemeClr val="dk1"/>
+          </a:effectRef>
+          <a:fontRef idx="minor">
+            <a:schemeClr val="tx1"/>
+          </a:fontRef>
+        </p:style>
+      </p:cxnSp>
+      <p:cxnSp>
+        <p:nvCxnSpPr>
+          <p:cNvPr id="2" name="Gerade Verbindung mit Pfeil 1">
+            <a:extLst>
+              <a:ext uri="{FF2B5EF4-FFF2-40B4-BE49-F238E27FC236}">
+                <a16:creationId xmlns:a16="http://schemas.microsoft.com/office/drawing/2014/main" id="{679D061E-4B24-50EA-0173-A03E5699E4FF}"/>
+              </a:ext>
+            </a:extLst>
+          </p:cNvPr>
+          <p:cNvCxnSpPr>
+            <a:cxnSpLocks/>
+          </p:cNvCxnSpPr>
+          <p:nvPr/>
+        </p:nvCxnSpPr>
+        <p:spPr>
+          <a:xfrm flipV="1">
+            <a:off x="1757479" y="4286746"/>
+            <a:ext cx="333375" cy="461963"/>
+          </a:xfrm>
+          <a:prstGeom prst="straightConnector1">
+            <a:avLst/>
+          </a:prstGeom>
+          <a:ln w="9525">
+            <a:headEnd w="lg" len="lg"/>
+            <a:tailEnd type="stealth" w="lg" len="lg"/>
+          </a:ln>
+        </p:spPr>
+        <p:style>
+          <a:lnRef idx="1">
+            <a:schemeClr val="dk1"/>
+          </a:lnRef>
+          <a:fillRef idx="0">
+            <a:schemeClr val="dk1"/>
+          </a:fillRef>
+          <a:effectRef idx="0">
+            <a:schemeClr val="dk1"/>
+          </a:effectRef>
+          <a:fontRef idx="minor">
+            <a:schemeClr val="tx1"/>
+          </a:fontRef>
+        </p:style>
+      </p:cxnSp>
     </p:spTree>
     <p:extLst>
       <p:ext uri="{BB962C8B-B14F-4D97-AF65-F5344CB8AC3E}">
-        <p14:creationId xmlns:p14="http://schemas.microsoft.com/office/powerpoint/2010/main" val="1268346369"/>
+        <p14:creationId xmlns:p14="http://schemas.microsoft.com/office/powerpoint/2010/main" val="1178704449"/>
       </p:ext>
     </p:extLst>
   </p:cSld>

</xml_diff>

<commit_message>
Animation 2b und 2c hinzugefuegt
</commit_message>
<xml_diff>
--- a/prototyp/symbole_und_farben.pptx
+++ b/prototyp/symbole_und_farben.pptx
@@ -272,7 +272,7 @@
           <a:p>
             <a:fld id="{B52076B9-41B9-4289-B1FF-FFD8BCB4D7C3}" type="datetimeFigureOut">
               <a:rPr lang="de-AT" smtClean="0"/>
-              <a:t>25.06.2024</a:t>
+              <a:t>28.06.2024</a:t>
             </a:fld>
             <a:endParaRPr lang="de-AT"/>
           </a:p>
@@ -472,7 +472,7 @@
           <a:p>
             <a:fld id="{B52076B9-41B9-4289-B1FF-FFD8BCB4D7C3}" type="datetimeFigureOut">
               <a:rPr lang="de-AT" smtClean="0"/>
-              <a:t>25.06.2024</a:t>
+              <a:t>28.06.2024</a:t>
             </a:fld>
             <a:endParaRPr lang="de-AT"/>
           </a:p>
@@ -682,7 +682,7 @@
           <a:p>
             <a:fld id="{B52076B9-41B9-4289-B1FF-FFD8BCB4D7C3}" type="datetimeFigureOut">
               <a:rPr lang="de-AT" smtClean="0"/>
-              <a:t>25.06.2024</a:t>
+              <a:t>28.06.2024</a:t>
             </a:fld>
             <a:endParaRPr lang="de-AT"/>
           </a:p>
@@ -882,7 +882,7 @@
           <a:p>
             <a:fld id="{B52076B9-41B9-4289-B1FF-FFD8BCB4D7C3}" type="datetimeFigureOut">
               <a:rPr lang="de-AT" smtClean="0"/>
-              <a:t>25.06.2024</a:t>
+              <a:t>28.06.2024</a:t>
             </a:fld>
             <a:endParaRPr lang="de-AT"/>
           </a:p>
@@ -1158,7 +1158,7 @@
           <a:p>
             <a:fld id="{B52076B9-41B9-4289-B1FF-FFD8BCB4D7C3}" type="datetimeFigureOut">
               <a:rPr lang="de-AT" smtClean="0"/>
-              <a:t>25.06.2024</a:t>
+              <a:t>28.06.2024</a:t>
             </a:fld>
             <a:endParaRPr lang="de-AT"/>
           </a:p>
@@ -1426,7 +1426,7 @@
           <a:p>
             <a:fld id="{B52076B9-41B9-4289-B1FF-FFD8BCB4D7C3}" type="datetimeFigureOut">
               <a:rPr lang="de-AT" smtClean="0"/>
-              <a:t>25.06.2024</a:t>
+              <a:t>28.06.2024</a:t>
             </a:fld>
             <a:endParaRPr lang="de-AT"/>
           </a:p>
@@ -1841,7 +1841,7 @@
           <a:p>
             <a:fld id="{B52076B9-41B9-4289-B1FF-FFD8BCB4D7C3}" type="datetimeFigureOut">
               <a:rPr lang="de-AT" smtClean="0"/>
-              <a:t>25.06.2024</a:t>
+              <a:t>28.06.2024</a:t>
             </a:fld>
             <a:endParaRPr lang="de-AT"/>
           </a:p>
@@ -1983,7 +1983,7 @@
           <a:p>
             <a:fld id="{B52076B9-41B9-4289-B1FF-FFD8BCB4D7C3}" type="datetimeFigureOut">
               <a:rPr lang="de-AT" smtClean="0"/>
-              <a:t>25.06.2024</a:t>
+              <a:t>28.06.2024</a:t>
             </a:fld>
             <a:endParaRPr lang="de-AT"/>
           </a:p>
@@ -2096,7 +2096,7 @@
           <a:p>
             <a:fld id="{B52076B9-41B9-4289-B1FF-FFD8BCB4D7C3}" type="datetimeFigureOut">
               <a:rPr lang="de-AT" smtClean="0"/>
-              <a:t>25.06.2024</a:t>
+              <a:t>28.06.2024</a:t>
             </a:fld>
             <a:endParaRPr lang="de-AT"/>
           </a:p>
@@ -2409,7 +2409,7 @@
           <a:p>
             <a:fld id="{B52076B9-41B9-4289-B1FF-FFD8BCB4D7C3}" type="datetimeFigureOut">
               <a:rPr lang="de-AT" smtClean="0"/>
-              <a:t>25.06.2024</a:t>
+              <a:t>28.06.2024</a:t>
             </a:fld>
             <a:endParaRPr lang="de-AT"/>
           </a:p>
@@ -2698,7 +2698,7 @@
           <a:p>
             <a:fld id="{B52076B9-41B9-4289-B1FF-FFD8BCB4D7C3}" type="datetimeFigureOut">
               <a:rPr lang="de-AT" smtClean="0"/>
-              <a:t>25.06.2024</a:t>
+              <a:t>28.06.2024</a:t>
             </a:fld>
             <a:endParaRPr lang="de-AT"/>
           </a:p>
@@ -2941,7 +2941,7 @@
           <a:p>
             <a:fld id="{B52076B9-41B9-4289-B1FF-FFD8BCB4D7C3}" type="datetimeFigureOut">
               <a:rPr lang="de-AT" smtClean="0"/>
-              <a:t>25.06.2024</a:t>
+              <a:t>28.06.2024</a:t>
             </a:fld>
             <a:endParaRPr lang="de-AT"/>
           </a:p>
@@ -4584,9 +4584,9 @@
           <p:nvPr/>
         </p:nvCxnSpPr>
         <p:spPr>
-          <a:xfrm flipV="1">
-            <a:off x="1757479" y="4286746"/>
-            <a:ext cx="333375" cy="461963"/>
+          <a:xfrm flipH="1" flipV="1">
+            <a:off x="1297172" y="4396563"/>
+            <a:ext cx="460307" cy="352146"/>
           </a:xfrm>
           <a:prstGeom prst="straightConnector1">
             <a:avLst/>
@@ -5238,10 +5238,10 @@
       </p:cxnSp>
       <p:cxnSp>
         <p:nvCxnSpPr>
-          <p:cNvPr id="2" name="Gerade Verbindung mit Pfeil 1">
-            <a:extLst>
-              <a:ext uri="{FF2B5EF4-FFF2-40B4-BE49-F238E27FC236}">
-                <a16:creationId xmlns:a16="http://schemas.microsoft.com/office/drawing/2014/main" id="{679D061E-4B24-50EA-0173-A03E5699E4FF}"/>
+          <p:cNvPr id="3" name="Gerade Verbindung mit Pfeil 2">
+            <a:extLst>
+              <a:ext uri="{FF2B5EF4-FFF2-40B4-BE49-F238E27FC236}">
+                <a16:creationId xmlns:a16="http://schemas.microsoft.com/office/drawing/2014/main" id="{5BDBD02B-3E89-BADF-33D0-FD05025970D8}"/>
               </a:ext>
             </a:extLst>
           </p:cNvPr>
@@ -5251,27 +5251,30 @@
           <p:nvPr/>
         </p:nvCxnSpPr>
         <p:spPr>
-          <a:xfrm flipV="1">
-            <a:off x="1757479" y="4286746"/>
-            <a:ext cx="333375" cy="461963"/>
+          <a:xfrm flipH="1" flipV="1">
+            <a:off x="1297172" y="4396563"/>
+            <a:ext cx="460307" cy="352146"/>
           </a:xfrm>
           <a:prstGeom prst="straightConnector1">
             <a:avLst/>
           </a:prstGeom>
           <a:ln w="9525">
+            <a:solidFill>
+              <a:schemeClr val="tx1"/>
+            </a:solidFill>
             <a:headEnd w="lg" len="lg"/>
             <a:tailEnd type="stealth" w="lg" len="lg"/>
           </a:ln>
         </p:spPr>
         <p:style>
-          <a:lnRef idx="1">
-            <a:schemeClr val="dk1"/>
+          <a:lnRef idx="2">
+            <a:schemeClr val="accent1"/>
           </a:lnRef>
           <a:fillRef idx="0">
-            <a:schemeClr val="dk1"/>
-          </a:fillRef>
-          <a:effectRef idx="0">
-            <a:schemeClr val="dk1"/>
+            <a:schemeClr val="accent1"/>
+          </a:fillRef>
+          <a:effectRef idx="1">
+            <a:schemeClr val="accent1"/>
           </a:effectRef>
           <a:fontRef idx="minor">
             <a:schemeClr val="tx1"/>

</xml_diff>

<commit_message>
Alle Elemente für Animation 4b und 4c positioniert
</commit_message>
<xml_diff>
--- a/prototyp/symbole_und_farben.pptx
+++ b/prototyp/symbole_und_farben.pptx
@@ -272,7 +272,7 @@
           <a:p>
             <a:fld id="{B52076B9-41B9-4289-B1FF-FFD8BCB4D7C3}" type="datetimeFigureOut">
               <a:rPr lang="de-AT" smtClean="0"/>
-              <a:t>28.06.2024</a:t>
+              <a:t>08.07.2024</a:t>
             </a:fld>
             <a:endParaRPr lang="de-AT"/>
           </a:p>
@@ -472,7 +472,7 @@
           <a:p>
             <a:fld id="{B52076B9-41B9-4289-B1FF-FFD8BCB4D7C3}" type="datetimeFigureOut">
               <a:rPr lang="de-AT" smtClean="0"/>
-              <a:t>28.06.2024</a:t>
+              <a:t>08.07.2024</a:t>
             </a:fld>
             <a:endParaRPr lang="de-AT"/>
           </a:p>
@@ -682,7 +682,7 @@
           <a:p>
             <a:fld id="{B52076B9-41B9-4289-B1FF-FFD8BCB4D7C3}" type="datetimeFigureOut">
               <a:rPr lang="de-AT" smtClean="0"/>
-              <a:t>28.06.2024</a:t>
+              <a:t>08.07.2024</a:t>
             </a:fld>
             <a:endParaRPr lang="de-AT"/>
           </a:p>
@@ -882,7 +882,7 @@
           <a:p>
             <a:fld id="{B52076B9-41B9-4289-B1FF-FFD8BCB4D7C3}" type="datetimeFigureOut">
               <a:rPr lang="de-AT" smtClean="0"/>
-              <a:t>28.06.2024</a:t>
+              <a:t>08.07.2024</a:t>
             </a:fld>
             <a:endParaRPr lang="de-AT"/>
           </a:p>
@@ -1158,7 +1158,7 @@
           <a:p>
             <a:fld id="{B52076B9-41B9-4289-B1FF-FFD8BCB4D7C3}" type="datetimeFigureOut">
               <a:rPr lang="de-AT" smtClean="0"/>
-              <a:t>28.06.2024</a:t>
+              <a:t>08.07.2024</a:t>
             </a:fld>
             <a:endParaRPr lang="de-AT"/>
           </a:p>
@@ -1426,7 +1426,7 @@
           <a:p>
             <a:fld id="{B52076B9-41B9-4289-B1FF-FFD8BCB4D7C3}" type="datetimeFigureOut">
               <a:rPr lang="de-AT" smtClean="0"/>
-              <a:t>28.06.2024</a:t>
+              <a:t>08.07.2024</a:t>
             </a:fld>
             <a:endParaRPr lang="de-AT"/>
           </a:p>
@@ -1841,7 +1841,7 @@
           <a:p>
             <a:fld id="{B52076B9-41B9-4289-B1FF-FFD8BCB4D7C3}" type="datetimeFigureOut">
               <a:rPr lang="de-AT" smtClean="0"/>
-              <a:t>28.06.2024</a:t>
+              <a:t>08.07.2024</a:t>
             </a:fld>
             <a:endParaRPr lang="de-AT"/>
           </a:p>
@@ -1983,7 +1983,7 @@
           <a:p>
             <a:fld id="{B52076B9-41B9-4289-B1FF-FFD8BCB4D7C3}" type="datetimeFigureOut">
               <a:rPr lang="de-AT" smtClean="0"/>
-              <a:t>28.06.2024</a:t>
+              <a:t>08.07.2024</a:t>
             </a:fld>
             <a:endParaRPr lang="de-AT"/>
           </a:p>
@@ -2096,7 +2096,7 @@
           <a:p>
             <a:fld id="{B52076B9-41B9-4289-B1FF-FFD8BCB4D7C3}" type="datetimeFigureOut">
               <a:rPr lang="de-AT" smtClean="0"/>
-              <a:t>28.06.2024</a:t>
+              <a:t>08.07.2024</a:t>
             </a:fld>
             <a:endParaRPr lang="de-AT"/>
           </a:p>
@@ -2409,7 +2409,7 @@
           <a:p>
             <a:fld id="{B52076B9-41B9-4289-B1FF-FFD8BCB4D7C3}" type="datetimeFigureOut">
               <a:rPr lang="de-AT" smtClean="0"/>
-              <a:t>28.06.2024</a:t>
+              <a:t>08.07.2024</a:t>
             </a:fld>
             <a:endParaRPr lang="de-AT"/>
           </a:p>
@@ -2698,7 +2698,7 @@
           <a:p>
             <a:fld id="{B52076B9-41B9-4289-B1FF-FFD8BCB4D7C3}" type="datetimeFigureOut">
               <a:rPr lang="de-AT" smtClean="0"/>
-              <a:t>28.06.2024</a:t>
+              <a:t>08.07.2024</a:t>
             </a:fld>
             <a:endParaRPr lang="de-AT"/>
           </a:p>
@@ -2941,7 +2941,7 @@
           <a:p>
             <a:fld id="{B52076B9-41B9-4289-B1FF-FFD8BCB4D7C3}" type="datetimeFigureOut">
               <a:rPr lang="de-AT" smtClean="0"/>
-              <a:t>28.06.2024</a:t>
+              <a:t>08.07.2024</a:t>
             </a:fld>
             <a:endParaRPr lang="de-AT"/>
           </a:p>
@@ -7178,10 +7178,136 @@
       </p:grpSpPr>
       <p:cxnSp>
         <p:nvCxnSpPr>
-          <p:cNvPr id="3" name="Gerade Verbindung mit Pfeil 2">
-            <a:extLst>
-              <a:ext uri="{FF2B5EF4-FFF2-40B4-BE49-F238E27FC236}">
-                <a16:creationId xmlns:a16="http://schemas.microsoft.com/office/drawing/2014/main" id="{FE75F7C9-168F-3297-BDE7-9C74F745BFB6}"/>
+          <p:cNvPr id="6" name="Gerader Verbinder 5">
+            <a:extLst>
+              <a:ext uri="{FF2B5EF4-FFF2-40B4-BE49-F238E27FC236}">
+                <a16:creationId xmlns:a16="http://schemas.microsoft.com/office/drawing/2014/main" id="{888A20D9-C8A7-2EDF-4C33-09D415D16325}"/>
+              </a:ext>
+            </a:extLst>
+          </p:cNvPr>
+          <p:cNvCxnSpPr/>
+          <p:nvPr/>
+        </p:nvCxnSpPr>
+        <p:spPr>
+          <a:xfrm>
+            <a:off x="5526157" y="3737113"/>
+            <a:ext cx="2325756" cy="0"/>
+          </a:xfrm>
+          <a:prstGeom prst="line">
+            <a:avLst/>
+          </a:prstGeom>
+          <a:ln w="38100">
+            <a:solidFill>
+              <a:schemeClr val="tx1"/>
+            </a:solidFill>
+            <a:headEnd type="oval" w="lg" len="lg"/>
+            <a:tailEnd type="none" w="med" len="med"/>
+          </a:ln>
+        </p:spPr>
+        <p:style>
+          <a:lnRef idx="2">
+            <a:schemeClr val="accent1"/>
+          </a:lnRef>
+          <a:fillRef idx="0">
+            <a:schemeClr val="accent1"/>
+          </a:fillRef>
+          <a:effectRef idx="1">
+            <a:schemeClr val="accent1"/>
+          </a:effectRef>
+          <a:fontRef idx="minor">
+            <a:schemeClr val="tx1"/>
+          </a:fontRef>
+        </p:style>
+      </p:cxnSp>
+      <p:cxnSp>
+        <p:nvCxnSpPr>
+          <p:cNvPr id="8" name="Gerader Verbinder 7">
+            <a:extLst>
+              <a:ext uri="{FF2B5EF4-FFF2-40B4-BE49-F238E27FC236}">
+                <a16:creationId xmlns:a16="http://schemas.microsoft.com/office/drawing/2014/main" id="{FEE89BF5-78C5-18C8-82C4-EB472DE3C0C8}"/>
+              </a:ext>
+            </a:extLst>
+          </p:cNvPr>
+          <p:cNvCxnSpPr/>
+          <p:nvPr/>
+        </p:nvCxnSpPr>
+        <p:spPr>
+          <a:xfrm>
+            <a:off x="8574157" y="1219200"/>
+            <a:ext cx="72886" cy="4313583"/>
+          </a:xfrm>
+          <a:prstGeom prst="line">
+            <a:avLst/>
+          </a:prstGeom>
+          <a:ln w="38100">
+            <a:solidFill>
+              <a:schemeClr val="tx1"/>
+            </a:solidFill>
+          </a:ln>
+        </p:spPr>
+        <p:style>
+          <a:lnRef idx="2">
+            <a:schemeClr val="accent1"/>
+          </a:lnRef>
+          <a:fillRef idx="0">
+            <a:schemeClr val="accent1"/>
+          </a:fillRef>
+          <a:effectRef idx="1">
+            <a:schemeClr val="accent1"/>
+          </a:effectRef>
+          <a:fontRef idx="minor">
+            <a:schemeClr val="tx1"/>
+          </a:fontRef>
+        </p:style>
+      </p:cxnSp>
+      <p:cxnSp>
+        <p:nvCxnSpPr>
+          <p:cNvPr id="10" name="Gerade Verbindung mit Pfeil 9">
+            <a:extLst>
+              <a:ext uri="{FF2B5EF4-FFF2-40B4-BE49-F238E27FC236}">
+                <a16:creationId xmlns:a16="http://schemas.microsoft.com/office/drawing/2014/main" id="{F584AF18-2171-B324-6308-708B743E34CF}"/>
+              </a:ext>
+            </a:extLst>
+          </p:cNvPr>
+          <p:cNvCxnSpPr/>
+          <p:nvPr/>
+        </p:nvCxnSpPr>
+        <p:spPr>
+          <a:xfrm>
+            <a:off x="8647043" y="841513"/>
+            <a:ext cx="2120348" cy="0"/>
+          </a:xfrm>
+          <a:prstGeom prst="straightConnector1">
+            <a:avLst/>
+          </a:prstGeom>
+          <a:ln w="38100">
+            <a:solidFill>
+              <a:schemeClr val="tx1"/>
+            </a:solidFill>
+            <a:tailEnd type="arrow" w="lg" len="lg"/>
+          </a:ln>
+        </p:spPr>
+        <p:style>
+          <a:lnRef idx="2">
+            <a:schemeClr val="accent1"/>
+          </a:lnRef>
+          <a:fillRef idx="0">
+            <a:schemeClr val="accent1"/>
+          </a:fillRef>
+          <a:effectRef idx="1">
+            <a:schemeClr val="accent1"/>
+          </a:effectRef>
+          <a:fontRef idx="minor">
+            <a:schemeClr val="tx1"/>
+          </a:fontRef>
+        </p:style>
+      </p:cxnSp>
+      <p:cxnSp>
+        <p:nvCxnSpPr>
+          <p:cNvPr id="2" name="Gerade Verbindung mit Pfeil 1">
+            <a:extLst>
+              <a:ext uri="{FF2B5EF4-FFF2-40B4-BE49-F238E27FC236}">
+                <a16:creationId xmlns:a16="http://schemas.microsoft.com/office/drawing/2014/main" id="{B60F0EEF-944E-080F-B786-7C176B4FB066}"/>
               </a:ext>
             </a:extLst>
           </p:cNvPr>
@@ -7191,9 +7317,9 @@
           <p:nvPr/>
         </p:nvCxnSpPr>
         <p:spPr>
-          <a:xfrm>
-            <a:off x="2015255" y="1924493"/>
-            <a:ext cx="0" cy="3046228"/>
+          <a:xfrm flipH="1">
+            <a:off x="3150082" y="1318437"/>
+            <a:ext cx="4752149" cy="1212112"/>
           </a:xfrm>
           <a:prstGeom prst="straightConnector1">
             <a:avLst/>
@@ -7223,112 +7349,31 @@
       </p:cxnSp>
       <p:cxnSp>
         <p:nvCxnSpPr>
-          <p:cNvPr id="6" name="Gerader Verbinder 5">
-            <a:extLst>
-              <a:ext uri="{FF2B5EF4-FFF2-40B4-BE49-F238E27FC236}">
-                <a16:creationId xmlns:a16="http://schemas.microsoft.com/office/drawing/2014/main" id="{888A20D9-C8A7-2EDF-4C33-09D415D16325}"/>
-              </a:ext>
-            </a:extLst>
-          </p:cNvPr>
-          <p:cNvCxnSpPr/>
+          <p:cNvPr id="3" name="Gerade Verbindung mit Pfeil 2">
+            <a:extLst>
+              <a:ext uri="{FF2B5EF4-FFF2-40B4-BE49-F238E27FC236}">
+                <a16:creationId xmlns:a16="http://schemas.microsoft.com/office/drawing/2014/main" id="{FE75F7C9-168F-3297-BDE7-9C74F745BFB6}"/>
+              </a:ext>
+            </a:extLst>
+          </p:cNvPr>
+          <p:cNvCxnSpPr>
+            <a:cxnSpLocks/>
+          </p:cNvCxnSpPr>
           <p:nvPr/>
         </p:nvCxnSpPr>
         <p:spPr>
           <a:xfrm>
-            <a:off x="5526157" y="3737113"/>
-            <a:ext cx="2325756" cy="0"/>
-          </a:xfrm>
-          <a:prstGeom prst="line">
-            <a:avLst/>
-          </a:prstGeom>
-          <a:ln w="38100">
+            <a:off x="3657989" y="2982202"/>
+            <a:ext cx="0" cy="2232837"/>
+          </a:xfrm>
+          <a:prstGeom prst="straightConnector1">
+            <a:avLst/>
+          </a:prstGeom>
+          <a:ln w="46990" cap="flat">
             <a:solidFill>
               <a:schemeClr val="tx1"/>
             </a:solidFill>
             <a:headEnd type="oval" w="lg" len="lg"/>
-            <a:tailEnd type="none" w="med" len="med"/>
-          </a:ln>
-        </p:spPr>
-        <p:style>
-          <a:lnRef idx="2">
-            <a:schemeClr val="accent1"/>
-          </a:lnRef>
-          <a:fillRef idx="0">
-            <a:schemeClr val="accent1"/>
-          </a:fillRef>
-          <a:effectRef idx="1">
-            <a:schemeClr val="accent1"/>
-          </a:effectRef>
-          <a:fontRef idx="minor">
-            <a:schemeClr val="tx1"/>
-          </a:fontRef>
-        </p:style>
-      </p:cxnSp>
-      <p:cxnSp>
-        <p:nvCxnSpPr>
-          <p:cNvPr id="8" name="Gerader Verbinder 7">
-            <a:extLst>
-              <a:ext uri="{FF2B5EF4-FFF2-40B4-BE49-F238E27FC236}">
-                <a16:creationId xmlns:a16="http://schemas.microsoft.com/office/drawing/2014/main" id="{FEE89BF5-78C5-18C8-82C4-EB472DE3C0C8}"/>
-              </a:ext>
-            </a:extLst>
-          </p:cNvPr>
-          <p:cNvCxnSpPr/>
-          <p:nvPr/>
-        </p:nvCxnSpPr>
-        <p:spPr>
-          <a:xfrm>
-            <a:off x="8574157" y="1219200"/>
-            <a:ext cx="72886" cy="4313583"/>
-          </a:xfrm>
-          <a:prstGeom prst="line">
-            <a:avLst/>
-          </a:prstGeom>
-          <a:ln w="38100">
-            <a:solidFill>
-              <a:schemeClr val="tx1"/>
-            </a:solidFill>
-          </a:ln>
-        </p:spPr>
-        <p:style>
-          <a:lnRef idx="2">
-            <a:schemeClr val="accent1"/>
-          </a:lnRef>
-          <a:fillRef idx="0">
-            <a:schemeClr val="accent1"/>
-          </a:fillRef>
-          <a:effectRef idx="1">
-            <a:schemeClr val="accent1"/>
-          </a:effectRef>
-          <a:fontRef idx="minor">
-            <a:schemeClr val="tx1"/>
-          </a:fontRef>
-        </p:style>
-      </p:cxnSp>
-      <p:cxnSp>
-        <p:nvCxnSpPr>
-          <p:cNvPr id="10" name="Gerade Verbindung mit Pfeil 9">
-            <a:extLst>
-              <a:ext uri="{FF2B5EF4-FFF2-40B4-BE49-F238E27FC236}">
-                <a16:creationId xmlns:a16="http://schemas.microsoft.com/office/drawing/2014/main" id="{F584AF18-2171-B324-6308-708B743E34CF}"/>
-              </a:ext>
-            </a:extLst>
-          </p:cNvPr>
-          <p:cNvCxnSpPr/>
-          <p:nvPr/>
-        </p:nvCxnSpPr>
-        <p:spPr>
-          <a:xfrm>
-            <a:off x="8647043" y="841513"/>
-            <a:ext cx="2120348" cy="0"/>
-          </a:xfrm>
-          <a:prstGeom prst="straightConnector1">
-            <a:avLst/>
-          </a:prstGeom>
-          <a:ln w="38100">
-            <a:solidFill>
-              <a:schemeClr val="tx1"/>
-            </a:solidFill>
             <a:tailEnd type="arrow" w="lg" len="lg"/>
           </a:ln>
         </p:spPr>
@@ -7393,8 +7438,8 @@
         </p:nvCxnSpPr>
         <p:spPr>
           <a:xfrm flipH="1">
-            <a:off x="7107865" y="5007704"/>
-            <a:ext cx="706834" cy="0"/>
+            <a:off x="6115050" y="4554252"/>
+            <a:ext cx="5856412" cy="0"/>
           </a:xfrm>
           <a:prstGeom prst="line">
             <a:avLst/>
@@ -7438,8 +7483,8 @@
         </p:nvCxnSpPr>
         <p:spPr>
           <a:xfrm>
-            <a:off x="7107865" y="616688"/>
-            <a:ext cx="0" cy="4391016"/>
+            <a:off x="6096000" y="2177143"/>
+            <a:ext cx="0" cy="2397238"/>
           </a:xfrm>
           <a:prstGeom prst="line">
             <a:avLst/>
@@ -7480,9 +7525,9 @@
           <p:nvPr/>
         </p:nvCxnSpPr>
         <p:spPr>
-          <a:xfrm flipH="1">
-            <a:off x="6362044" y="635642"/>
-            <a:ext cx="745821" cy="0"/>
+          <a:xfrm flipH="1" flipV="1">
+            <a:off x="163043" y="2157990"/>
+            <a:ext cx="5952007" cy="19153"/>
           </a:xfrm>
           <a:prstGeom prst="straightConnector1">
             <a:avLst/>

</xml_diff>